<commit_message>
update assignment 7 and week 10 lecture
</commit_message>
<xml_diff>
--- a/lectures/infrastructure-week-10.pptx
+++ b/lectures/infrastructure-week-10.pptx
@@ -13,12 +13,16 @@
     <p:sldId id="262" r:id="rId7"/>
     <p:sldId id="263" r:id="rId8"/>
     <p:sldId id="264" r:id="rId9"/>
-    <p:sldId id="265" r:id="rId10"/>
+    <p:sldId id="272" r:id="rId10"/>
     <p:sldId id="266" r:id="rId11"/>
     <p:sldId id="267" r:id="rId12"/>
     <p:sldId id="268" r:id="rId13"/>
     <p:sldId id="270" r:id="rId14"/>
-    <p:sldId id="258" r:id="rId15"/>
+    <p:sldId id="273" r:id="rId15"/>
+    <p:sldId id="265" r:id="rId16"/>
+    <p:sldId id="271" r:id="rId17"/>
+    <p:sldId id="274" r:id="rId18"/>
+    <p:sldId id="258" r:id="rId19"/>
   </p:sldIdLst>
   <p:sldSz cx="9144000" cy="6858000" type="screen4x3"/>
   <p:notesSz cx="6858000" cy="9144000"/>
@@ -3314,7 +3318,7 @@
           <a:p>
             <a:r>
               <a:rPr lang="en-US" dirty="0" smtClean="0"/>
-              <a:t>Immutable Infrastructure</a:t>
+              <a:t>Create a new server</a:t>
             </a:r>
             <a:endParaRPr lang="en-US" dirty="0"/>
           </a:p>
@@ -3330,16 +3334,21 @@
             <p:ph idx="1"/>
           </p:nvPr>
         </p:nvSpPr>
-        <p:spPr/>
+        <p:spPr>
+          <a:xfrm>
+            <a:off x="457200" y="1600200"/>
+            <a:ext cx="8229600" cy="4872519"/>
+          </a:xfrm>
+        </p:spPr>
         <p:txBody>
           <a:bodyPr>
-            <a:normAutofit fontScale="92500" lnSpcReduction="20000"/>
+            <a:normAutofit fontScale="62500" lnSpcReduction="20000"/>
           </a:bodyPr>
           <a:lstStyle/>
           <a:p>
             <a:r>
               <a:rPr lang="en-US" dirty="0" smtClean="0"/>
-              <a:t>How do we rebuild servers using automation?</a:t>
+              <a:t>How do we create new servers using automation?</a:t>
             </a:r>
           </a:p>
           <a:p>
@@ -3406,13 +3415,13 @@
           </a:p>
           <a:p>
             <a:pPr lvl="1"/>
-            <a:endParaRPr lang="en-US" dirty="0" smtClean="0"/>
+            <a:endParaRPr lang="en-US" dirty="0"/>
           </a:p>
           <a:p>
             <a:pPr lvl="1"/>
             <a:r>
               <a:rPr lang="en-US" dirty="0" smtClean="0"/>
-              <a:t>We can use Terraform, CloudFormation, Auto-scaling or other tools to create the infrastructure.</a:t>
+              <a:t>Use Terraform, CloudFormation, Auto-scaling or other tools to create the infrastructure.</a:t>
             </a:r>
           </a:p>
           <a:p>
@@ -3422,9 +3431,51 @@
           <a:p>
             <a:pPr lvl="1"/>
             <a:r>
-              <a:rPr lang="en-US" dirty="0" smtClean="0"/>
-              <a:t>Need a way to all all the software pieces.</a:t>
-            </a:r>
+              <a:rPr lang="en-US" dirty="0"/>
+              <a:t>S</a:t>
+            </a:r>
+            <a:r>
+              <a:rPr lang="en-US" dirty="0" smtClean="0"/>
+              <a:t>elect a server template (image) containing an operating system and software.</a:t>
+            </a:r>
+          </a:p>
+          <a:p>
+            <a:pPr lvl="1"/>
+            <a:endParaRPr lang="en-US" dirty="0"/>
+          </a:p>
+          <a:p>
+            <a:pPr lvl="1"/>
+            <a:r>
+              <a:rPr lang="en-US" dirty="0" smtClean="0"/>
+              <a:t>Deploy software and configuration using a command tool (Capistrano) or configuration management tool (Chef/ Puppet/ </a:t>
+            </a:r>
+            <a:r>
+              <a:rPr lang="en-US" dirty="0" err="1" smtClean="0"/>
+              <a:t>Ansible</a:t>
+            </a:r>
+            <a:r>
+              <a:rPr lang="en-US" dirty="0" smtClean="0"/>
+              <a:t>).</a:t>
+            </a:r>
+          </a:p>
+          <a:p>
+            <a:pPr lvl="1"/>
+            <a:endParaRPr lang="en-US" dirty="0"/>
+          </a:p>
+          <a:p>
+            <a:pPr lvl="1"/>
+            <a:r>
+              <a:rPr lang="en-US" dirty="0" smtClean="0"/>
+              <a:t>Potentially package everything in containers (Docker – Lecture 12).</a:t>
+            </a:r>
+          </a:p>
+          <a:p>
+            <a:pPr lvl="1"/>
+            <a:endParaRPr lang="en-US" dirty="0"/>
+          </a:p>
+          <a:p>
+            <a:pPr lvl="1"/>
+            <a:endParaRPr lang="en-US" dirty="0" smtClean="0"/>
           </a:p>
         </p:txBody>
       </p:sp>
@@ -3475,7 +3526,7 @@
           <a:p>
             <a:r>
               <a:rPr lang="en-US" dirty="0" smtClean="0"/>
-              <a:t>Bake vs. Fry</a:t>
+              <a:t>Server Template</a:t>
             </a:r>
             <a:endParaRPr lang="en-US" dirty="0"/>
           </a:p>
@@ -3505,7 +3556,7 @@
           <a:p>
             <a:r>
               <a:rPr lang="en-US" dirty="0" smtClean="0"/>
-              <a:t>There are two general approaches to installing software on a server:</a:t>
+              <a:t>There are two general approaches to building a server:</a:t>
             </a:r>
           </a:p>
           <a:p>
@@ -3523,7 +3574,7 @@
             <a:pPr lvl="2"/>
             <a:r>
               <a:rPr lang="en-US" dirty="0" smtClean="0"/>
-              <a:t>Like an AMI based on a snapshot of a fully working system.</a:t>
+              <a:t>Example: Use an AMI based on a snapshot of a fully working system.</a:t>
             </a:r>
           </a:p>
           <a:p>
@@ -3545,6 +3596,17 @@
             <a:r>
               <a:rPr lang="en-US" dirty="0" smtClean="0"/>
               <a:t>Risk: May require you to frequently create and manage new images.</a:t>
+            </a:r>
+          </a:p>
+          <a:p>
+            <a:pPr lvl="2"/>
+            <a:r>
+              <a:rPr lang="en-US" dirty="0"/>
+              <a:t>Practice: minimize amount of software in a template</a:t>
+            </a:r>
+            <a:r>
+              <a:rPr lang="en-US" dirty="0" smtClean="0"/>
+              <a:t>.</a:t>
             </a:r>
           </a:p>
           <a:p>
@@ -3566,7 +3628,7 @@
             <a:pPr lvl="2"/>
             <a:r>
               <a:rPr lang="en-US" dirty="0" smtClean="0"/>
-              <a:t>Like a base AMI image running a </a:t>
+              <a:t>Example: Use a base AMI image and run a </a:t>
             </a:r>
             <a:r>
               <a:rPr lang="en-US" dirty="0" err="1" smtClean="0"/>
@@ -3835,13 +3897,8 @@
           <a:p>
             <a:r>
               <a:rPr lang="en-US" dirty="0" smtClean="0"/>
-              <a:t>Build </a:t>
-            </a:r>
-            <a:r>
-              <a:rPr lang="en-US" smtClean="0"/>
-              <a:t>new image.</a:t>
-            </a:r>
-            <a:endParaRPr lang="en-US" dirty="0" smtClean="0"/>
+              <a:t>Build new image.</a:t>
+            </a:r>
           </a:p>
           <a:p>
             <a:pPr marL="0" indent="0">
@@ -3975,6 +4032,704 @@
 </file>
 
 <file path=ppt/slides/slide14.xml><?xml version="1.0" encoding="utf-8"?>
+<p:sld xmlns:a="http://schemas.openxmlformats.org/drawingml/2006/main" xmlns:r="http://schemas.openxmlformats.org/officeDocument/2006/relationships" xmlns:p="http://schemas.openxmlformats.org/presentationml/2006/main">
+  <p:cSld>
+    <p:spTree>
+      <p:nvGrpSpPr>
+        <p:cNvPr id="1" name=""/>
+        <p:cNvGrpSpPr/>
+        <p:nvPr/>
+      </p:nvGrpSpPr>
+      <p:grpSpPr>
+        <a:xfrm>
+          <a:off x="0" y="0"/>
+          <a:ext cx="0" cy="0"/>
+          <a:chOff x="0" y="0"/>
+          <a:chExt cx="0" cy="0"/>
+        </a:xfrm>
+      </p:grpSpPr>
+      <p:sp>
+        <p:nvSpPr>
+          <p:cNvPr id="2" name="Title 1"/>
+          <p:cNvSpPr>
+            <a:spLocks noGrp="1"/>
+          </p:cNvSpPr>
+          <p:nvPr>
+            <p:ph type="title"/>
+          </p:nvPr>
+        </p:nvSpPr>
+        <p:spPr/>
+        <p:txBody>
+          <a:bodyPr/>
+          <a:lstStyle/>
+          <a:p>
+            <a:r>
+              <a:rPr lang="en-US" dirty="0" smtClean="0"/>
+              <a:t>Update a server</a:t>
+            </a:r>
+            <a:endParaRPr lang="en-US" dirty="0"/>
+          </a:p>
+        </p:txBody>
+      </p:sp>
+      <p:sp>
+        <p:nvSpPr>
+          <p:cNvPr id="3" name="Content Placeholder 2"/>
+          <p:cNvSpPr>
+            <a:spLocks noGrp="1"/>
+          </p:cNvSpPr>
+          <p:nvPr>
+            <p:ph idx="1"/>
+          </p:nvPr>
+        </p:nvSpPr>
+        <p:spPr>
+          <a:xfrm>
+            <a:off x="457200" y="1600200"/>
+            <a:ext cx="8229600" cy="4903342"/>
+          </a:xfrm>
+        </p:spPr>
+        <p:txBody>
+          <a:bodyPr>
+            <a:normAutofit fontScale="77500" lnSpcReduction="20000"/>
+          </a:bodyPr>
+          <a:lstStyle/>
+          <a:p>
+            <a:r>
+              <a:rPr lang="en-US" dirty="0" smtClean="0"/>
+              <a:t>4 models for making configuration changes to servers:</a:t>
+            </a:r>
+          </a:p>
+          <a:p>
+            <a:pPr lvl="1"/>
+            <a:r>
+              <a:rPr lang="en-US" b="1" dirty="0" smtClean="0"/>
+              <a:t>Ad hoc </a:t>
+            </a:r>
+            <a:r>
+              <a:rPr lang="en-US" dirty="0" smtClean="0"/>
+              <a:t>change management: leave server alone until a specific change needs to be made and manually make the change.</a:t>
+            </a:r>
+          </a:p>
+          <a:p>
+            <a:pPr lvl="2"/>
+            <a:r>
+              <a:rPr lang="en-US" dirty="0" smtClean="0"/>
+              <a:t>Tends to leave servers inconsistently configured.</a:t>
+            </a:r>
+          </a:p>
+          <a:p>
+            <a:pPr lvl="2"/>
+            <a:endParaRPr lang="en-US" dirty="0" smtClean="0"/>
+          </a:p>
+          <a:p>
+            <a:pPr lvl="2"/>
+            <a:r>
+              <a:rPr lang="en-US" dirty="0" smtClean="0"/>
+              <a:t>Leads to </a:t>
+            </a:r>
+            <a:r>
+              <a:rPr lang="en-US" b="1" dirty="0" smtClean="0"/>
+              <a:t>configuration drift </a:t>
+            </a:r>
+            <a:r>
+              <a:rPr lang="en-US" dirty="0" smtClean="0"/>
+              <a:t>– a set of servers identically configured will gradually drift apart.</a:t>
+            </a:r>
+          </a:p>
+          <a:p>
+            <a:pPr lvl="1"/>
+            <a:endParaRPr lang="en-US" dirty="0"/>
+          </a:p>
+          <a:p>
+            <a:pPr lvl="1"/>
+            <a:r>
+              <a:rPr lang="en-US" b="1" dirty="0" smtClean="0"/>
+              <a:t>Continuous configuration synchronization</a:t>
+            </a:r>
+            <a:r>
+              <a:rPr lang="en-US" dirty="0" smtClean="0"/>
+              <a:t>: server configuration tool runs on an unattended schedule and applies the current set of configuration definitions.</a:t>
+            </a:r>
+          </a:p>
+          <a:p>
+            <a:pPr lvl="2"/>
+            <a:r>
+              <a:rPr lang="en-US" dirty="0" smtClean="0"/>
+              <a:t>Minimizes configuration drift by continuously reapplying configuration.</a:t>
+            </a:r>
+          </a:p>
+          <a:p>
+            <a:pPr lvl="2"/>
+            <a:endParaRPr lang="en-US" dirty="0" smtClean="0"/>
+          </a:p>
+          <a:p>
+            <a:pPr lvl="2"/>
+            <a:r>
+              <a:rPr lang="en-US" dirty="0" smtClean="0"/>
+              <a:t>Only manages configuration covered by definition files, creating opportunities for other parts of the server configuration to drift.</a:t>
+            </a:r>
+            <a:endParaRPr lang="en-US" dirty="0"/>
+          </a:p>
+        </p:txBody>
+      </p:sp>
+    </p:spTree>
+    <p:extLst>
+      <p:ext uri="{BB962C8B-B14F-4D97-AF65-F5344CB8AC3E}">
+        <p14:creationId xmlns:p14="http://schemas.microsoft.com/office/powerpoint/2010/main" val="2022118344"/>
+      </p:ext>
+    </p:extLst>
+  </p:cSld>
+  <p:clrMapOvr>
+    <a:masterClrMapping/>
+  </p:clrMapOvr>
+</p:sld>
+</file>
+
+<file path=ppt/slides/slide15.xml><?xml version="1.0" encoding="utf-8"?>
+<p:sld xmlns:a="http://schemas.openxmlformats.org/drawingml/2006/main" xmlns:r="http://schemas.openxmlformats.org/officeDocument/2006/relationships" xmlns:p="http://schemas.openxmlformats.org/presentationml/2006/main">
+  <p:cSld>
+    <p:spTree>
+      <p:nvGrpSpPr>
+        <p:cNvPr id="1" name=""/>
+        <p:cNvGrpSpPr/>
+        <p:nvPr/>
+      </p:nvGrpSpPr>
+      <p:grpSpPr>
+        <a:xfrm>
+          <a:off x="0" y="0"/>
+          <a:ext cx="0" cy="0"/>
+          <a:chOff x="0" y="0"/>
+          <a:chExt cx="0" cy="0"/>
+        </a:xfrm>
+      </p:grpSpPr>
+      <p:sp>
+        <p:nvSpPr>
+          <p:cNvPr id="2" name="Title 1"/>
+          <p:cNvSpPr>
+            <a:spLocks noGrp="1"/>
+          </p:cNvSpPr>
+          <p:nvPr>
+            <p:ph type="title"/>
+          </p:nvPr>
+        </p:nvSpPr>
+        <p:spPr/>
+        <p:txBody>
+          <a:bodyPr/>
+          <a:lstStyle/>
+          <a:p>
+            <a:r>
+              <a:rPr lang="en-US" dirty="0" smtClean="0"/>
+              <a:t>Update a server</a:t>
+            </a:r>
+            <a:endParaRPr lang="en-US" dirty="0"/>
+          </a:p>
+        </p:txBody>
+      </p:sp>
+      <p:sp>
+        <p:nvSpPr>
+          <p:cNvPr id="3" name="Content Placeholder 2"/>
+          <p:cNvSpPr>
+            <a:spLocks noGrp="1"/>
+          </p:cNvSpPr>
+          <p:nvPr>
+            <p:ph idx="1"/>
+          </p:nvPr>
+        </p:nvSpPr>
+        <p:spPr>
+          <a:xfrm>
+            <a:off x="457200" y="1600200"/>
+            <a:ext cx="8229600" cy="4687584"/>
+          </a:xfrm>
+        </p:spPr>
+        <p:txBody>
+          <a:bodyPr>
+            <a:normAutofit fontScale="70000" lnSpcReduction="20000"/>
+          </a:bodyPr>
+          <a:lstStyle/>
+          <a:p>
+            <a:pPr lvl="1"/>
+            <a:r>
+              <a:rPr lang="en-US" b="1" dirty="0" smtClean="0"/>
+              <a:t>Immutable servers</a:t>
+            </a:r>
+            <a:r>
+              <a:rPr lang="en-US" dirty="0" smtClean="0"/>
+              <a:t>: a deployment methodology where we replace systems instead of updating them.</a:t>
+            </a:r>
+          </a:p>
+          <a:p>
+            <a:pPr lvl="2"/>
+            <a:r>
+              <a:rPr lang="en-US" dirty="0" smtClean="0"/>
+              <a:t>Allows us to fully test configuration changes and not worry about unexpected effects of changing running systems.</a:t>
+            </a:r>
+          </a:p>
+          <a:p>
+            <a:pPr lvl="2"/>
+            <a:endParaRPr lang="en-US" dirty="0" smtClean="0"/>
+          </a:p>
+          <a:p>
+            <a:pPr lvl="2"/>
+            <a:r>
+              <a:rPr lang="en-US" dirty="0" smtClean="0"/>
+              <a:t>Eliminates pets from the infrastructure environment.</a:t>
+            </a:r>
+          </a:p>
+          <a:p>
+            <a:pPr lvl="1"/>
+            <a:endParaRPr lang="en-US" dirty="0" smtClean="0"/>
+          </a:p>
+          <a:p>
+            <a:pPr lvl="2"/>
+            <a:r>
+              <a:rPr lang="en-US" dirty="0" smtClean="0"/>
+              <a:t>Mitigates configuration drift because systems don’t live long.</a:t>
+            </a:r>
+          </a:p>
+          <a:p>
+            <a:pPr lvl="2"/>
+            <a:endParaRPr lang="en-US" dirty="0"/>
+          </a:p>
+          <a:p>
+            <a:pPr lvl="2"/>
+            <a:r>
+              <a:rPr lang="en-US" dirty="0" smtClean="0"/>
+              <a:t>Practice: replace servers anytime a server template changes.</a:t>
+            </a:r>
+          </a:p>
+          <a:p>
+            <a:pPr lvl="1"/>
+            <a:endParaRPr lang="en-US" dirty="0"/>
+          </a:p>
+          <a:p>
+            <a:pPr lvl="2"/>
+            <a:r>
+              <a:rPr lang="en-US" b="1" dirty="0" smtClean="0"/>
+              <a:t>Phoenix server </a:t>
+            </a:r>
+            <a:r>
+              <a:rPr lang="en-US" dirty="0" smtClean="0"/>
+              <a:t>pattern: replace servers on a scheduled basis regardless of whether changes need to be made or not. </a:t>
+            </a:r>
+          </a:p>
+          <a:p>
+            <a:pPr lvl="1"/>
+            <a:endParaRPr lang="en-US" dirty="0"/>
+          </a:p>
+          <a:p>
+            <a:pPr lvl="1"/>
+            <a:r>
+              <a:rPr lang="en-US" b="1" dirty="0" smtClean="0"/>
+              <a:t>Containerized servers</a:t>
+            </a:r>
+            <a:r>
+              <a:rPr lang="en-US" dirty="0" smtClean="0"/>
+              <a:t>: use containers to package applications and their dependencies.</a:t>
+            </a:r>
+          </a:p>
+          <a:p>
+            <a:pPr lvl="2"/>
+            <a:r>
+              <a:rPr lang="en-US" dirty="0" smtClean="0"/>
+              <a:t>Basically immutable servers, but with containers.</a:t>
+            </a:r>
+          </a:p>
+          <a:p>
+            <a:pPr lvl="2"/>
+            <a:endParaRPr lang="en-US" dirty="0" smtClean="0"/>
+          </a:p>
+          <a:p>
+            <a:pPr lvl="1"/>
+            <a:endParaRPr lang="en-US" dirty="0"/>
+          </a:p>
+        </p:txBody>
+      </p:sp>
+    </p:spTree>
+    <p:extLst>
+      <p:ext uri="{BB962C8B-B14F-4D97-AF65-F5344CB8AC3E}">
+        <p14:creationId xmlns:p14="http://schemas.microsoft.com/office/powerpoint/2010/main" val="1969535460"/>
+      </p:ext>
+    </p:extLst>
+  </p:cSld>
+  <p:clrMapOvr>
+    <a:masterClrMapping/>
+  </p:clrMapOvr>
+</p:sld>
+</file>
+
+<file path=ppt/slides/slide16.xml><?xml version="1.0" encoding="utf-8"?>
+<p:sld xmlns:a="http://schemas.openxmlformats.org/drawingml/2006/main" xmlns:r="http://schemas.openxmlformats.org/officeDocument/2006/relationships" xmlns:p="http://schemas.openxmlformats.org/presentationml/2006/main">
+  <p:cSld>
+    <p:spTree>
+      <p:nvGrpSpPr>
+        <p:cNvPr id="1" name=""/>
+        <p:cNvGrpSpPr/>
+        <p:nvPr/>
+      </p:nvGrpSpPr>
+      <p:grpSpPr>
+        <a:xfrm>
+          <a:off x="0" y="0"/>
+          <a:ext cx="0" cy="0"/>
+          <a:chOff x="0" y="0"/>
+          <a:chExt cx="0" cy="0"/>
+        </a:xfrm>
+      </p:grpSpPr>
+      <p:sp>
+        <p:nvSpPr>
+          <p:cNvPr id="2" name="Title 1"/>
+          <p:cNvSpPr>
+            <a:spLocks noGrp="1"/>
+          </p:cNvSpPr>
+          <p:nvPr>
+            <p:ph type="title"/>
+          </p:nvPr>
+        </p:nvSpPr>
+        <p:spPr/>
+        <p:txBody>
+          <a:bodyPr/>
+          <a:lstStyle/>
+          <a:p>
+            <a:r>
+              <a:rPr lang="en-US" dirty="0" smtClean="0"/>
+              <a:t>Continuous synchronization</a:t>
+            </a:r>
+            <a:endParaRPr lang="en-US" dirty="0"/>
+          </a:p>
+        </p:txBody>
+      </p:sp>
+      <p:sp>
+        <p:nvSpPr>
+          <p:cNvPr id="3" name="Content Placeholder 2"/>
+          <p:cNvSpPr>
+            <a:spLocks noGrp="1"/>
+          </p:cNvSpPr>
+          <p:nvPr>
+            <p:ph idx="1"/>
+          </p:nvPr>
+        </p:nvSpPr>
+        <p:spPr>
+          <a:xfrm>
+            <a:off x="457200" y="1600200"/>
+            <a:ext cx="8229600" cy="5257800"/>
+          </a:xfrm>
+        </p:spPr>
+        <p:txBody>
+          <a:bodyPr>
+            <a:normAutofit fontScale="62500" lnSpcReduction="20000"/>
+          </a:bodyPr>
+          <a:lstStyle/>
+          <a:p>
+            <a:r>
+              <a:rPr lang="en-US" dirty="0" smtClean="0"/>
+              <a:t>Regularly run a process to apply the current configuration definitions to a server.</a:t>
+            </a:r>
+          </a:p>
+          <a:p>
+            <a:endParaRPr lang="en-US" dirty="0" smtClean="0"/>
+          </a:p>
+          <a:p>
+            <a:r>
+              <a:rPr lang="en-US" dirty="0" smtClean="0"/>
+              <a:t>Three synchronization patterns:</a:t>
+            </a:r>
+          </a:p>
+          <a:p>
+            <a:pPr lvl="1"/>
+            <a:r>
+              <a:rPr lang="en-US" b="1" dirty="0" smtClean="0"/>
+              <a:t>Pushing to synchronize</a:t>
+            </a:r>
+            <a:r>
+              <a:rPr lang="en-US" dirty="0" smtClean="0"/>
+              <a:t>: a master server pushes configuration to the servers it manages.</a:t>
+            </a:r>
+          </a:p>
+          <a:p>
+            <a:pPr lvl="2"/>
+            <a:r>
+              <a:rPr lang="en-US" dirty="0" smtClean="0"/>
+              <a:t>Typically uses common communication channels like SSH.</a:t>
+            </a:r>
+          </a:p>
+          <a:p>
+            <a:pPr lvl="2"/>
+            <a:r>
+              <a:rPr lang="en-US" dirty="0" smtClean="0"/>
+              <a:t>No need to install special software agent on managed servers.</a:t>
+            </a:r>
+          </a:p>
+          <a:p>
+            <a:pPr lvl="2"/>
+            <a:r>
+              <a:rPr lang="en-US" dirty="0" smtClean="0"/>
+              <a:t>Centralized control over when changes are distributed to servers.</a:t>
+            </a:r>
+          </a:p>
+          <a:p>
+            <a:pPr lvl="2"/>
+            <a:endParaRPr lang="en-US" dirty="0" smtClean="0"/>
+          </a:p>
+          <a:p>
+            <a:pPr lvl="1"/>
+            <a:r>
+              <a:rPr lang="en-US" b="1" dirty="0" smtClean="0"/>
+              <a:t>Pulling to synchronize</a:t>
+            </a:r>
+            <a:r>
+              <a:rPr lang="en-US" dirty="0" smtClean="0"/>
+              <a:t>: each managed server pulls configuration from a master server.</a:t>
+            </a:r>
+          </a:p>
+          <a:p>
+            <a:pPr lvl="2"/>
+            <a:r>
+              <a:rPr lang="en-US" dirty="0" smtClean="0"/>
+              <a:t>Polling is controlled by an agent on each managed server.</a:t>
+            </a:r>
+          </a:p>
+          <a:p>
+            <a:pPr lvl="2"/>
+            <a:r>
+              <a:rPr lang="en-US" dirty="0" smtClean="0"/>
+              <a:t>May be more secure because an incoming communications channel does not need to be always open on the server.</a:t>
+            </a:r>
+          </a:p>
+          <a:p>
+            <a:pPr lvl="2"/>
+            <a:r>
+              <a:rPr lang="en-US" dirty="0" smtClean="0"/>
+              <a:t>May be more scalable than a push-based synchronization architecture.</a:t>
+            </a:r>
+          </a:p>
+          <a:p>
+            <a:pPr lvl="1"/>
+            <a:endParaRPr lang="en-US" dirty="0"/>
+          </a:p>
+          <a:p>
+            <a:pPr lvl="1"/>
+            <a:r>
+              <a:rPr lang="en-US" b="1" dirty="0" err="1" smtClean="0"/>
+              <a:t>Masterless</a:t>
+            </a:r>
+            <a:r>
+              <a:rPr lang="en-US" b="1" dirty="0" smtClean="0"/>
+              <a:t> configuration management</a:t>
+            </a:r>
+            <a:r>
+              <a:rPr lang="en-US" dirty="0" smtClean="0"/>
+              <a:t>: each managed server downloads copies of the configuration definitions and runs a configuration management tool in a local mode.</a:t>
+            </a:r>
+          </a:p>
+          <a:p>
+            <a:pPr lvl="2"/>
+            <a:r>
+              <a:rPr lang="en-US" dirty="0" smtClean="0"/>
+              <a:t>Eliminates a central server as a single point of failure.</a:t>
+            </a:r>
+          </a:p>
+        </p:txBody>
+      </p:sp>
+    </p:spTree>
+    <p:extLst>
+      <p:ext uri="{BB962C8B-B14F-4D97-AF65-F5344CB8AC3E}">
+        <p14:creationId xmlns:p14="http://schemas.microsoft.com/office/powerpoint/2010/main" val="1113486051"/>
+      </p:ext>
+    </p:extLst>
+  </p:cSld>
+  <p:clrMapOvr>
+    <a:masterClrMapping/>
+  </p:clrMapOvr>
+</p:sld>
+</file>
+
+<file path=ppt/slides/slide17.xml><?xml version="1.0" encoding="utf-8"?>
+<p:sld xmlns:a="http://schemas.openxmlformats.org/drawingml/2006/main" xmlns:r="http://schemas.openxmlformats.org/officeDocument/2006/relationships" xmlns:p="http://schemas.openxmlformats.org/presentationml/2006/main">
+  <p:cSld>
+    <p:spTree>
+      <p:nvGrpSpPr>
+        <p:cNvPr id="1" name=""/>
+        <p:cNvGrpSpPr/>
+        <p:nvPr/>
+      </p:nvGrpSpPr>
+      <p:grpSpPr>
+        <a:xfrm>
+          <a:off x="0" y="0"/>
+          <a:ext cx="0" cy="0"/>
+          <a:chOff x="0" y="0"/>
+          <a:chExt cx="0" cy="0"/>
+        </a:xfrm>
+      </p:grpSpPr>
+      <p:sp>
+        <p:nvSpPr>
+          <p:cNvPr id="2" name="Title 1"/>
+          <p:cNvSpPr>
+            <a:spLocks noGrp="1"/>
+          </p:cNvSpPr>
+          <p:nvPr>
+            <p:ph type="title"/>
+          </p:nvPr>
+        </p:nvSpPr>
+        <p:spPr/>
+        <p:txBody>
+          <a:bodyPr/>
+          <a:lstStyle/>
+          <a:p>
+            <a:r>
+              <a:rPr lang="en-US" dirty="0" err="1" smtClean="0"/>
+              <a:t>Ansible</a:t>
+            </a:r>
+            <a:endParaRPr lang="en-US" dirty="0"/>
+          </a:p>
+        </p:txBody>
+      </p:sp>
+      <p:sp>
+        <p:nvSpPr>
+          <p:cNvPr id="3" name="Content Placeholder 2"/>
+          <p:cNvSpPr>
+            <a:spLocks noGrp="1"/>
+          </p:cNvSpPr>
+          <p:nvPr>
+            <p:ph idx="1"/>
+          </p:nvPr>
+        </p:nvSpPr>
+        <p:spPr>
+          <a:xfrm>
+            <a:off x="457200" y="1600200"/>
+            <a:ext cx="8229600" cy="4800600"/>
+          </a:xfrm>
+        </p:spPr>
+        <p:txBody>
+          <a:bodyPr>
+            <a:normAutofit fontScale="77500" lnSpcReduction="20000"/>
+          </a:bodyPr>
+          <a:lstStyle/>
+          <a:p>
+            <a:r>
+              <a:rPr lang="en-US" dirty="0" smtClean="0"/>
+              <a:t>A free-software platform for configuring and managing servers.</a:t>
+            </a:r>
+          </a:p>
+          <a:p>
+            <a:pPr lvl="1"/>
+            <a:r>
+              <a:rPr lang="en-US" dirty="0" smtClean="0"/>
+              <a:t>Push-based configuration using SSH as a communications channel.</a:t>
+            </a:r>
+          </a:p>
+          <a:p>
+            <a:pPr lvl="1"/>
+            <a:endParaRPr lang="en-US" dirty="0" smtClean="0"/>
+          </a:p>
+          <a:p>
+            <a:pPr lvl="1"/>
+            <a:r>
+              <a:rPr lang="en-US" dirty="0" smtClean="0"/>
+              <a:t>Supports both synchronized and ad hoc task execution. </a:t>
+            </a:r>
+          </a:p>
+          <a:p>
+            <a:pPr lvl="1"/>
+            <a:endParaRPr lang="en-US" dirty="0" smtClean="0"/>
+          </a:p>
+          <a:p>
+            <a:pPr lvl="1"/>
+            <a:r>
+              <a:rPr lang="en-US" dirty="0" smtClean="0"/>
+              <a:t>Uses YAML to describe the configuration of systems.</a:t>
+            </a:r>
+          </a:p>
+          <a:p>
+            <a:pPr lvl="1"/>
+            <a:endParaRPr lang="en-US" dirty="0" smtClean="0"/>
+          </a:p>
+          <a:p>
+            <a:pPr lvl="1"/>
+            <a:r>
+              <a:rPr lang="en-US" dirty="0" smtClean="0"/>
+              <a:t>Originally developed by Michael </a:t>
+            </a:r>
+            <a:r>
+              <a:rPr lang="en-US" dirty="0" err="1" smtClean="0"/>
+              <a:t>DeHaan</a:t>
+            </a:r>
+            <a:r>
+              <a:rPr lang="en-US" dirty="0"/>
+              <a:t> </a:t>
+            </a:r>
+            <a:r>
+              <a:rPr lang="en-US" dirty="0" smtClean="0"/>
+              <a:t>and acquired by Red Hat.</a:t>
+            </a:r>
+          </a:p>
+          <a:p>
+            <a:pPr lvl="1"/>
+            <a:endParaRPr lang="en-US" dirty="0"/>
+          </a:p>
+          <a:p>
+            <a:pPr lvl="1"/>
+            <a:r>
+              <a:rPr lang="en-US" dirty="0" smtClean="0"/>
+              <a:t>Written in Python and available at </a:t>
+            </a:r>
+            <a:r>
+              <a:rPr lang="en-US" dirty="0" smtClean="0">
+                <a:hlinkClick r:id="rId2"/>
+              </a:rPr>
+              <a:t>www.ansible.com</a:t>
+            </a:r>
+            <a:endParaRPr lang="en-US" dirty="0" smtClean="0"/>
+          </a:p>
+          <a:p>
+            <a:pPr lvl="2"/>
+            <a:r>
+              <a:rPr lang="en-US" dirty="0" smtClean="0"/>
+              <a:t>Control application must run on </a:t>
+            </a:r>
+            <a:r>
+              <a:rPr lang="en-US" smtClean="0"/>
+              <a:t>Unix/Linux system</a:t>
+            </a:r>
+            <a:endParaRPr lang="en-US" dirty="0" smtClean="0"/>
+          </a:p>
+        </p:txBody>
+      </p:sp>
+      <p:pic>
+        <p:nvPicPr>
+          <p:cNvPr id="4" name="Picture 3"/>
+          <p:cNvPicPr>
+            <a:picLocks noChangeAspect="1"/>
+          </p:cNvPicPr>
+          <p:nvPr/>
+        </p:nvPicPr>
+        <p:blipFill>
+          <a:blip r:embed="rId3"/>
+          <a:stretch>
+            <a:fillRect/>
+          </a:stretch>
+        </p:blipFill>
+        <p:spPr>
+          <a:xfrm>
+            <a:off x="7046930" y="26203"/>
+            <a:ext cx="1639870" cy="1639870"/>
+          </a:xfrm>
+          <a:prstGeom prst="rect">
+            <a:avLst/>
+          </a:prstGeom>
+        </p:spPr>
+      </p:pic>
+    </p:spTree>
+    <p:extLst>
+      <p:ext uri="{BB962C8B-B14F-4D97-AF65-F5344CB8AC3E}">
+        <p14:creationId xmlns:p14="http://schemas.microsoft.com/office/powerpoint/2010/main" val="1544820095"/>
+      </p:ext>
+    </p:extLst>
+  </p:cSld>
+  <p:clrMapOvr>
+    <a:masterClrMapping/>
+  </p:clrMapOvr>
+</p:sld>
+</file>
+
+<file path=ppt/slides/slide18.xml><?xml version="1.0" encoding="utf-8"?>
 <p:sld xmlns:a="http://schemas.openxmlformats.org/drawingml/2006/main" xmlns:r="http://schemas.openxmlformats.org/officeDocument/2006/relationships" xmlns:p="http://schemas.openxmlformats.org/presentationml/2006/main">
   <p:cSld>
     <p:spTree>
@@ -8653,108 +9408,40 @@
           <a:p>
             <a:r>
               <a:rPr lang="en-US" dirty="0" smtClean="0"/>
-              <a:t>Immutable Infrastructure</a:t>
+              <a:t>Server Lifecycle</a:t>
             </a:r>
             <a:endParaRPr lang="en-US" dirty="0"/>
           </a:p>
         </p:txBody>
       </p:sp>
-      <p:sp>
-        <p:nvSpPr>
-          <p:cNvPr id="3" name="Content Placeholder 2"/>
-          <p:cNvSpPr>
-            <a:spLocks noGrp="1"/>
-          </p:cNvSpPr>
-          <p:nvPr>
-            <p:ph idx="1"/>
-          </p:nvPr>
-        </p:nvSpPr>
-        <p:spPr>
-          <a:xfrm>
-            <a:off x="457200" y="1600200"/>
-            <a:ext cx="8229600" cy="4687584"/>
-          </a:xfrm>
-        </p:spPr>
-        <p:txBody>
-          <a:bodyPr>
-            <a:normAutofit fontScale="85000" lnSpcReduction="20000"/>
-          </a:bodyPr>
-          <a:lstStyle/>
-          <a:p>
-            <a:r>
-              <a:rPr lang="en-US" dirty="0" smtClean="0"/>
-              <a:t>A deployment methodology where we replace systems instead of updating them.</a:t>
-            </a:r>
-          </a:p>
-          <a:p>
-            <a:pPr lvl="1"/>
-            <a:r>
-              <a:rPr lang="en-US" dirty="0" smtClean="0"/>
-              <a:t>Aligns well with dynamic nature of cloud computing.</a:t>
-            </a:r>
-          </a:p>
-          <a:p>
-            <a:pPr lvl="1"/>
-            <a:endParaRPr lang="en-US" dirty="0" smtClean="0"/>
-          </a:p>
-          <a:p>
-            <a:pPr lvl="1"/>
-            <a:r>
-              <a:rPr lang="en-US" dirty="0" smtClean="0"/>
-              <a:t>Eliminates pets from the infrastructure environment.</a:t>
-            </a:r>
-          </a:p>
-          <a:p>
-            <a:pPr lvl="1"/>
-            <a:endParaRPr lang="en-US" dirty="0" smtClean="0"/>
-          </a:p>
-          <a:p>
-            <a:pPr lvl="1"/>
-            <a:r>
-              <a:rPr lang="en-US" dirty="0" smtClean="0"/>
-              <a:t>Mitigates natural entropy experienced by systems.</a:t>
-            </a:r>
-          </a:p>
-          <a:p>
-            <a:pPr lvl="1"/>
-            <a:endParaRPr lang="en-US" dirty="0"/>
-          </a:p>
-          <a:p>
-            <a:pPr lvl="1"/>
-            <a:r>
-              <a:rPr lang="en-US" dirty="0" smtClean="0"/>
-              <a:t>We need to be able to build any system at any time in an automated and repeatable fashion.</a:t>
-            </a:r>
-          </a:p>
-          <a:p>
-            <a:pPr lvl="1"/>
-            <a:endParaRPr lang="en-US" dirty="0"/>
-          </a:p>
-          <a:p>
-            <a:pPr lvl="1"/>
-            <a:r>
-              <a:rPr lang="en-US" dirty="0" smtClean="0"/>
-              <a:t>Sometimes called </a:t>
-            </a:r>
-            <a:r>
-              <a:rPr lang="en-US" b="1" dirty="0" smtClean="0"/>
-              <a:t>phoenix servers </a:t>
-            </a:r>
-            <a:r>
-              <a:rPr lang="en-US" dirty="0" smtClean="0"/>
-              <a:t>– able to rise from the ashes.</a:t>
-            </a:r>
-          </a:p>
-          <a:p>
-            <a:pPr lvl="1"/>
-            <a:endParaRPr lang="en-US" dirty="0"/>
-          </a:p>
-        </p:txBody>
-      </p:sp>
+      <p:pic>
+        <p:nvPicPr>
+          <p:cNvPr id="4" name="Picture 3"/>
+          <p:cNvPicPr>
+            <a:picLocks noChangeAspect="1"/>
+          </p:cNvPicPr>
+          <p:nvPr/>
+        </p:nvPicPr>
+        <p:blipFill>
+          <a:blip r:embed="rId2"/>
+          <a:stretch>
+            <a:fillRect/>
+          </a:stretch>
+        </p:blipFill>
+        <p:spPr>
+          <a:xfrm>
+            <a:off x="554804" y="2252234"/>
+            <a:ext cx="8332342" cy="2812428"/>
+          </a:xfrm>
+          <a:prstGeom prst="rect">
+            <a:avLst/>
+          </a:prstGeom>
+        </p:spPr>
+      </p:pic>
     </p:spTree>
     <p:extLst>
       <p:ext uri="{BB962C8B-B14F-4D97-AF65-F5344CB8AC3E}">
-        <p14:creationId xmlns:p14="http://schemas.microsoft.com/office/powerpoint/2010/main" val="1969535460"/>
+        <p14:creationId xmlns:p14="http://schemas.microsoft.com/office/powerpoint/2010/main" val="845040489"/>
       </p:ext>
     </p:extLst>
   </p:cSld>

</xml_diff>

<commit_message>
update lecture 9 and 10
</commit_message>
<xml_diff>
--- a/lectures/infrastructure-week-10.pptx
+++ b/lectures/infrastructure-week-10.pptx
@@ -20,9 +20,18 @@
     <p:sldId id="270" r:id="rId14"/>
     <p:sldId id="273" r:id="rId15"/>
     <p:sldId id="265" r:id="rId16"/>
-    <p:sldId id="271" r:id="rId17"/>
-    <p:sldId id="274" r:id="rId18"/>
-    <p:sldId id="258" r:id="rId19"/>
+    <p:sldId id="275" r:id="rId17"/>
+    <p:sldId id="271" r:id="rId18"/>
+    <p:sldId id="274" r:id="rId19"/>
+    <p:sldId id="276" r:id="rId20"/>
+    <p:sldId id="277" r:id="rId21"/>
+    <p:sldId id="278" r:id="rId22"/>
+    <p:sldId id="279" r:id="rId23"/>
+    <p:sldId id="281" r:id="rId24"/>
+    <p:sldId id="280" r:id="rId25"/>
+    <p:sldId id="282" r:id="rId26"/>
+    <p:sldId id="283" r:id="rId27"/>
+    <p:sldId id="258" r:id="rId28"/>
   </p:sldIdLst>
   <p:sldSz cx="9144000" cy="6858000" type="screen4x3"/>
   <p:notesSz cx="6858000" cy="9144000"/>
@@ -321,7 +330,7 @@
           <a:p>
             <a:fld id="{972605B8-2E90-124E-924E-6F58993143C6}" type="datetimeFigureOut">
               <a:rPr lang="en-US" smtClean="0"/>
-              <a:t>10/30/16</a:t>
+              <a:t>11/4/16</a:t>
             </a:fld>
             <a:endParaRPr lang="en-US"/>
           </a:p>
@@ -491,7 +500,7 @@
           <a:p>
             <a:fld id="{972605B8-2E90-124E-924E-6F58993143C6}" type="datetimeFigureOut">
               <a:rPr lang="en-US" smtClean="0"/>
-              <a:t>10/30/16</a:t>
+              <a:t>11/4/16</a:t>
             </a:fld>
             <a:endParaRPr lang="en-US"/>
           </a:p>
@@ -671,7 +680,7 @@
           <a:p>
             <a:fld id="{972605B8-2E90-124E-924E-6F58993143C6}" type="datetimeFigureOut">
               <a:rPr lang="en-US" smtClean="0"/>
-              <a:t>10/30/16</a:t>
+              <a:t>11/4/16</a:t>
             </a:fld>
             <a:endParaRPr lang="en-US"/>
           </a:p>
@@ -841,7 +850,7 @@
           <a:p>
             <a:fld id="{972605B8-2E90-124E-924E-6F58993143C6}" type="datetimeFigureOut">
               <a:rPr lang="en-US" smtClean="0"/>
-              <a:t>10/30/16</a:t>
+              <a:t>11/4/16</a:t>
             </a:fld>
             <a:endParaRPr lang="en-US"/>
           </a:p>
@@ -1087,7 +1096,7 @@
           <a:p>
             <a:fld id="{972605B8-2E90-124E-924E-6F58993143C6}" type="datetimeFigureOut">
               <a:rPr lang="en-US" smtClean="0"/>
-              <a:t>10/30/16</a:t>
+              <a:t>11/4/16</a:t>
             </a:fld>
             <a:endParaRPr lang="en-US"/>
           </a:p>
@@ -1375,7 +1384,7 @@
           <a:p>
             <a:fld id="{972605B8-2E90-124E-924E-6F58993143C6}" type="datetimeFigureOut">
               <a:rPr lang="en-US" smtClean="0"/>
-              <a:t>10/30/16</a:t>
+              <a:t>11/4/16</a:t>
             </a:fld>
             <a:endParaRPr lang="en-US"/>
           </a:p>
@@ -1797,7 +1806,7 @@
           <a:p>
             <a:fld id="{972605B8-2E90-124E-924E-6F58993143C6}" type="datetimeFigureOut">
               <a:rPr lang="en-US" smtClean="0"/>
-              <a:t>10/30/16</a:t>
+              <a:t>11/4/16</a:t>
             </a:fld>
             <a:endParaRPr lang="en-US"/>
           </a:p>
@@ -1915,7 +1924,7 @@
           <a:p>
             <a:fld id="{972605B8-2E90-124E-924E-6F58993143C6}" type="datetimeFigureOut">
               <a:rPr lang="en-US" smtClean="0"/>
-              <a:t>10/30/16</a:t>
+              <a:t>11/4/16</a:t>
             </a:fld>
             <a:endParaRPr lang="en-US"/>
           </a:p>
@@ -2010,7 +2019,7 @@
           <a:p>
             <a:fld id="{972605B8-2E90-124E-924E-6F58993143C6}" type="datetimeFigureOut">
               <a:rPr lang="en-US" smtClean="0"/>
-              <a:t>10/30/16</a:t>
+              <a:t>11/4/16</a:t>
             </a:fld>
             <a:endParaRPr lang="en-US"/>
           </a:p>
@@ -2287,7 +2296,7 @@
           <a:p>
             <a:fld id="{972605B8-2E90-124E-924E-6F58993143C6}" type="datetimeFigureOut">
               <a:rPr lang="en-US" smtClean="0"/>
-              <a:t>10/30/16</a:t>
+              <a:t>11/4/16</a:t>
             </a:fld>
             <a:endParaRPr lang="en-US"/>
           </a:p>
@@ -2540,7 +2549,7 @@
           <a:p>
             <a:fld id="{972605B8-2E90-124E-924E-6F58993143C6}" type="datetimeFigureOut">
               <a:rPr lang="en-US" smtClean="0"/>
-              <a:t>10/30/16</a:t>
+              <a:t>11/4/16</a:t>
             </a:fld>
             <a:endParaRPr lang="en-US"/>
           </a:p>
@@ -2753,7 +2762,7 @@
           <a:p>
             <a:fld id="{972605B8-2E90-124E-924E-6F58993143C6}" type="datetimeFigureOut">
               <a:rPr lang="en-US" smtClean="0"/>
-              <a:t>10/30/16</a:t>
+              <a:t>11/4/16</a:t>
             </a:fld>
             <a:endParaRPr lang="en-US"/>
           </a:p>
@@ -3978,7 +3987,6 @@
               <a:rPr lang="en-US" dirty="0" smtClean="0"/>
               <a:t>View image in AWS console.</a:t>
             </a:r>
-            <a:endParaRPr lang="en-US" dirty="0" smtClean="0"/>
           </a:p>
           <a:p>
             <a:pPr marL="0" indent="0">
@@ -4390,7 +4398,7 @@
           <a:p>
             <a:r>
               <a:rPr lang="en-US" dirty="0" smtClean="0"/>
-              <a:t>Continuous synchronization</a:t>
+              <a:t>Dynamic Infrastructure Challenges</a:t>
             </a:r>
             <a:endParaRPr lang="en-US" dirty="0"/>
           </a:p>
@@ -4408,130 +4416,123 @@
         </p:nvSpPr>
         <p:spPr>
           <a:xfrm>
-            <a:off x="457200" y="1600200"/>
-            <a:ext cx="8229600" cy="5257800"/>
+            <a:off x="457200" y="1600199"/>
+            <a:ext cx="8229600" cy="4625940"/>
           </a:xfrm>
         </p:spPr>
         <p:txBody>
           <a:bodyPr>
-            <a:normAutofit fontScale="62500" lnSpcReduction="20000"/>
+            <a:normAutofit fontScale="55000" lnSpcReduction="20000"/>
           </a:bodyPr>
           <a:lstStyle/>
           <a:p>
             <a:r>
               <a:rPr lang="en-US" dirty="0" smtClean="0"/>
-              <a:t>Regularly run a process to apply the current configuration definitions to a server.</a:t>
-            </a:r>
-          </a:p>
-          <a:p>
+              <a:t>Server sprawl</a:t>
+            </a:r>
+          </a:p>
+          <a:p>
+            <a:pPr lvl="1"/>
+            <a:r>
+              <a:rPr lang="en-US" dirty="0" smtClean="0"/>
+              <a:t>It’s really easy to provision new servers.</a:t>
+            </a:r>
+          </a:p>
+          <a:p>
+            <a:pPr lvl="1"/>
+            <a:r>
+              <a:rPr lang="en-US" dirty="0" smtClean="0"/>
+              <a:t>It becomes difficult to patch and consistently maintain servers and the numbers grow.</a:t>
+            </a:r>
+          </a:p>
+          <a:p>
+            <a:pPr lvl="1"/>
             <a:endParaRPr lang="en-US" dirty="0" smtClean="0"/>
           </a:p>
           <a:p>
             <a:r>
               <a:rPr lang="en-US" dirty="0" smtClean="0"/>
-              <a:t>Three synchronization patterns:</a:t>
+              <a:t>Configuration drift</a:t>
             </a:r>
           </a:p>
           <a:p>
             <a:pPr lvl="1"/>
             <a:r>
-              <a:rPr lang="en-US" b="1" dirty="0" smtClean="0"/>
-              <a:t>Pushing to synchronize</a:t>
-            </a:r>
-            <a:r>
-              <a:rPr lang="en-US" dirty="0" smtClean="0"/>
-              <a:t>: a master server pushes configuration to the servers it manages.</a:t>
-            </a:r>
-          </a:p>
-          <a:p>
-            <a:pPr lvl="2"/>
-            <a:r>
-              <a:rPr lang="en-US" dirty="0" smtClean="0"/>
-              <a:t>Typically uses common communication channels like SSH.</a:t>
-            </a:r>
-          </a:p>
-          <a:p>
-            <a:pPr lvl="2"/>
-            <a:r>
-              <a:rPr lang="en-US" dirty="0" smtClean="0"/>
-              <a:t>No need to install special software agent on managed servers.</a:t>
-            </a:r>
-          </a:p>
-          <a:p>
-            <a:pPr lvl="2"/>
-            <a:r>
-              <a:rPr lang="en-US" dirty="0" smtClean="0"/>
-              <a:t>Centralized control over when changes are distributed to servers.</a:t>
-            </a:r>
-          </a:p>
-          <a:p>
-            <a:pPr lvl="2"/>
+              <a:rPr lang="en-US" dirty="0" smtClean="0"/>
+              <a:t>Configuration of servers gradually change over time.</a:t>
+            </a:r>
+          </a:p>
+          <a:p>
+            <a:pPr lvl="1"/>
+            <a:r>
+              <a:rPr lang="en-US" dirty="0" smtClean="0"/>
+              <a:t>Unmanaged variation leads to support and maintenance challenges.</a:t>
+            </a:r>
+          </a:p>
+          <a:p>
+            <a:pPr lvl="1"/>
             <a:endParaRPr lang="en-US" dirty="0" smtClean="0"/>
           </a:p>
           <a:p>
+            <a:r>
+              <a:rPr lang="en-US" dirty="0" smtClean="0"/>
+              <a:t>Snowflake servers</a:t>
+            </a:r>
+          </a:p>
+          <a:p>
             <a:pPr lvl="1"/>
             <a:r>
-              <a:rPr lang="en-US" b="1" dirty="0" smtClean="0"/>
-              <a:t>Pulling to synchronize</a:t>
-            </a:r>
-            <a:r>
-              <a:rPr lang="en-US" dirty="0" smtClean="0"/>
-              <a:t>: each managed server pulls configuration from a master server.</a:t>
-            </a:r>
-          </a:p>
-          <a:p>
-            <a:pPr lvl="2"/>
-            <a:r>
-              <a:rPr lang="en-US" dirty="0" smtClean="0"/>
-              <a:t>Polling is controlled by an agent on each managed server.</a:t>
-            </a:r>
-          </a:p>
-          <a:p>
-            <a:pPr lvl="2"/>
-            <a:r>
-              <a:rPr lang="en-US" dirty="0" smtClean="0"/>
-              <a:t>May be more secure because an incoming communications channel does not need to be always open on the server.</a:t>
-            </a:r>
-          </a:p>
-          <a:p>
-            <a:pPr lvl="2"/>
-            <a:r>
-              <a:rPr lang="en-US" dirty="0" smtClean="0"/>
-              <a:t>May be more scalable than a push-based synchronization architecture.</a:t>
+              <a:rPr lang="en-US" dirty="0" smtClean="0"/>
+              <a:t>Unique servers that cannot be easily replicated.</a:t>
             </a:r>
           </a:p>
           <a:p>
             <a:pPr lvl="1"/>
+            <a:r>
+              <a:rPr lang="en-US" dirty="0" smtClean="0"/>
+              <a:t>Leads to fragile infrastructure and components that nobody knows how to fix.</a:t>
+            </a:r>
+          </a:p>
+          <a:p>
+            <a:endParaRPr lang="en-US" dirty="0" smtClean="0"/>
+          </a:p>
+          <a:p>
+            <a:r>
+              <a:rPr lang="en-US" dirty="0" smtClean="0"/>
+              <a:t>Automation fear</a:t>
+            </a:r>
+          </a:p>
+          <a:p>
+            <a:pPr lvl="1"/>
+            <a:r>
+              <a:rPr lang="en-US" dirty="0" smtClean="0"/>
+              <a:t>Fear of running automation tools because so much infrastructure is hand-cranked.</a:t>
+            </a:r>
+          </a:p>
+          <a:p>
+            <a:pPr lvl="1"/>
+            <a:endParaRPr lang="en-US" dirty="0" smtClean="0"/>
+          </a:p>
+          <a:p>
+            <a:r>
+              <a:rPr lang="en-US" dirty="0" smtClean="0"/>
+              <a:t>Erosion</a:t>
+            </a:r>
+          </a:p>
+          <a:p>
+            <a:pPr lvl="1"/>
+            <a:r>
+              <a:rPr lang="en-US" dirty="0" smtClean="0"/>
+              <a:t>Natural entropy suggests that problems will creep into systems over time.</a:t>
+            </a:r>
             <a:endParaRPr lang="en-US" dirty="0"/>
-          </a:p>
-          <a:p>
-            <a:pPr lvl="1"/>
-            <a:r>
-              <a:rPr lang="en-US" b="1" dirty="0" err="1" smtClean="0"/>
-              <a:t>Masterless</a:t>
-            </a:r>
-            <a:r>
-              <a:rPr lang="en-US" b="1" dirty="0" smtClean="0"/>
-              <a:t> configuration management</a:t>
-            </a:r>
-            <a:r>
-              <a:rPr lang="en-US" dirty="0" smtClean="0"/>
-              <a:t>: each managed server downloads copies of the configuration definitions and runs a configuration management tool in a local mode.</a:t>
-            </a:r>
-          </a:p>
-          <a:p>
-            <a:pPr lvl="2"/>
-            <a:r>
-              <a:rPr lang="en-US" dirty="0" smtClean="0"/>
-              <a:t>Eliminates a central server as a single point of failure.</a:t>
-            </a:r>
           </a:p>
         </p:txBody>
       </p:sp>
     </p:spTree>
     <p:extLst>
       <p:ext uri="{BB962C8B-B14F-4D97-AF65-F5344CB8AC3E}">
-        <p14:creationId xmlns:p14="http://schemas.microsoft.com/office/powerpoint/2010/main" val="1113486051"/>
+        <p14:creationId xmlns:p14="http://schemas.microsoft.com/office/powerpoint/2010/main" val="1937070469"/>
       </p:ext>
     </p:extLst>
   </p:cSld>
@@ -4574,8 +4575,8 @@
           <a:lstStyle/>
           <a:p>
             <a:r>
-              <a:rPr lang="en-US" dirty="0" err="1" smtClean="0"/>
-              <a:t>Ansible</a:t>
+              <a:rPr lang="en-US" dirty="0" smtClean="0"/>
+              <a:t>Continuous synchronization</a:t>
             </a:r>
             <a:endParaRPr lang="en-US" dirty="0"/>
           </a:p>
@@ -4594,70 +4595,95 @@
         <p:spPr>
           <a:xfrm>
             <a:off x="457200" y="1600200"/>
-            <a:ext cx="8229600" cy="4800600"/>
+            <a:ext cx="8229600" cy="5257800"/>
           </a:xfrm>
         </p:spPr>
         <p:txBody>
           <a:bodyPr>
-            <a:normAutofit fontScale="77500" lnSpcReduction="20000"/>
+            <a:normAutofit fontScale="62500" lnSpcReduction="20000"/>
           </a:bodyPr>
           <a:lstStyle/>
           <a:p>
             <a:r>
               <a:rPr lang="en-US" dirty="0" smtClean="0"/>
-              <a:t>A free-software platform for configuring and managing servers.</a:t>
+              <a:t>Regularly run a process to apply the current configuration definitions to a server.</a:t>
+            </a:r>
+          </a:p>
+          <a:p>
+            <a:endParaRPr lang="en-US" dirty="0" smtClean="0"/>
+          </a:p>
+          <a:p>
+            <a:r>
+              <a:rPr lang="en-US" dirty="0" smtClean="0"/>
+              <a:t>Three synchronization patterns:</a:t>
             </a:r>
           </a:p>
           <a:p>
             <a:pPr lvl="1"/>
             <a:r>
-              <a:rPr lang="en-US" dirty="0" smtClean="0"/>
-              <a:t>Push-based configuration using SSH as a communications channel.</a:t>
-            </a:r>
+              <a:rPr lang="en-US" b="1" dirty="0" smtClean="0"/>
+              <a:t>Pushing to synchronize</a:t>
+            </a:r>
+            <a:r>
+              <a:rPr lang="en-US" dirty="0" smtClean="0"/>
+              <a:t>: a master server pushes configuration to the servers it manages.</a:t>
+            </a:r>
+          </a:p>
+          <a:p>
+            <a:pPr lvl="2"/>
+            <a:r>
+              <a:rPr lang="en-US" dirty="0" smtClean="0"/>
+              <a:t>Typically uses common communication channels like SSH.</a:t>
+            </a:r>
+          </a:p>
+          <a:p>
+            <a:pPr lvl="2"/>
+            <a:r>
+              <a:rPr lang="en-US" dirty="0" smtClean="0"/>
+              <a:t>No need to install special software agent on managed servers.</a:t>
+            </a:r>
+          </a:p>
+          <a:p>
+            <a:pPr lvl="2"/>
+            <a:r>
+              <a:rPr lang="en-US" dirty="0" smtClean="0"/>
+              <a:t>Centralized control over when changes are distributed to servers.</a:t>
+            </a:r>
+          </a:p>
+          <a:p>
+            <a:pPr lvl="2"/>
+            <a:endParaRPr lang="en-US" dirty="0" smtClean="0"/>
           </a:p>
           <a:p>
             <a:pPr lvl="1"/>
-            <a:endParaRPr lang="en-US" dirty="0" smtClean="0"/>
-          </a:p>
-          <a:p>
-            <a:pPr lvl="1"/>
-            <a:r>
-              <a:rPr lang="en-US" dirty="0" smtClean="0"/>
-              <a:t>Supports both synchronized and ad hoc task execution. </a:t>
-            </a:r>
-          </a:p>
-          <a:p>
-            <a:pPr lvl="1"/>
-            <a:endParaRPr lang="en-US" dirty="0" smtClean="0"/>
-          </a:p>
-          <a:p>
-            <a:pPr lvl="1"/>
-            <a:r>
-              <a:rPr lang="en-US" dirty="0" smtClean="0"/>
-              <a:t>Uses YAML to describe the configuration of systems.</a:t>
-            </a:r>
-          </a:p>
-          <a:p>
-            <a:pPr lvl="1"/>
-            <a:endParaRPr lang="en-US" dirty="0" smtClean="0"/>
-          </a:p>
-          <a:p>
-            <a:pPr lvl="1"/>
-            <a:r>
-              <a:rPr lang="en-US" dirty="0" smtClean="0"/>
-              <a:t>Originally developed by Michael </a:t>
-            </a:r>
-            <a:r>
-              <a:rPr lang="en-US" dirty="0" err="1" smtClean="0"/>
-              <a:t>DeHaan</a:t>
-            </a:r>
-            <a:r>
-              <a:rPr lang="en-US" dirty="0"/>
-              <a:t> </a:t>
-            </a:r>
-            <a:r>
-              <a:rPr lang="en-US" dirty="0" smtClean="0"/>
-              <a:t>and acquired by Red Hat.</a:t>
+            <a:r>
+              <a:rPr lang="en-US" b="1" dirty="0" smtClean="0"/>
+              <a:t>Pulling to synchronize</a:t>
+            </a:r>
+            <a:r>
+              <a:rPr lang="en-US" dirty="0" smtClean="0"/>
+              <a:t>: each managed server pulls configuration from a master server.</a:t>
+            </a:r>
+          </a:p>
+          <a:p>
+            <a:pPr lvl="2"/>
+            <a:r>
+              <a:rPr lang="en-US" dirty="0" smtClean="0"/>
+              <a:t>Polling is controlled by an agent on each managed server.</a:t>
+            </a:r>
+          </a:p>
+          <a:p>
+            <a:pPr lvl="2"/>
+            <a:r>
+              <a:rPr lang="en-US" dirty="0" smtClean="0"/>
+              <a:t>May be more secure because an incoming communications channel does not need to be always open on the server.</a:t>
+            </a:r>
+          </a:p>
+          <a:p>
+            <a:pPr lvl="2"/>
+            <a:r>
+              <a:rPr lang="en-US" dirty="0" smtClean="0"/>
+              <a:t>May be more scalable than a push-based synchronization architecture.</a:t>
             </a:r>
           </a:p>
           <a:p>
@@ -4667,59 +4693,31 @@
           <a:p>
             <a:pPr lvl="1"/>
             <a:r>
-              <a:rPr lang="en-US" dirty="0" smtClean="0"/>
-              <a:t>Written in Python and available at </a:t>
-            </a:r>
-            <a:r>
-              <a:rPr lang="en-US" dirty="0" smtClean="0">
-                <a:hlinkClick r:id="rId2"/>
-              </a:rPr>
-              <a:t>www.ansible.com</a:t>
-            </a:r>
-            <a:endParaRPr lang="en-US" dirty="0" smtClean="0"/>
+              <a:rPr lang="en-US" b="1" dirty="0" err="1" smtClean="0"/>
+              <a:t>Masterless</a:t>
+            </a:r>
+            <a:r>
+              <a:rPr lang="en-US" b="1" dirty="0" smtClean="0"/>
+              <a:t> configuration management</a:t>
+            </a:r>
+            <a:r>
+              <a:rPr lang="en-US" dirty="0" smtClean="0"/>
+              <a:t>: each managed server downloads copies of the configuration definitions and runs a configuration management tool in a local mode.</a:t>
+            </a:r>
           </a:p>
           <a:p>
             <a:pPr lvl="2"/>
             <a:r>
               <a:rPr lang="en-US" dirty="0" smtClean="0"/>
-              <a:t>Control application must run on </a:t>
-            </a:r>
-            <a:r>
-              <a:rPr lang="en-US" smtClean="0"/>
-              <a:t>Unix/Linux system</a:t>
-            </a:r>
-            <a:endParaRPr lang="en-US" dirty="0" smtClean="0"/>
-          </a:p>
-        </p:txBody>
-      </p:sp>
-      <p:pic>
-        <p:nvPicPr>
-          <p:cNvPr id="4" name="Picture 3"/>
-          <p:cNvPicPr>
-            <a:picLocks noChangeAspect="1"/>
-          </p:cNvPicPr>
-          <p:nvPr/>
-        </p:nvPicPr>
-        <p:blipFill>
-          <a:blip r:embed="rId3"/>
-          <a:stretch>
-            <a:fillRect/>
-          </a:stretch>
-        </p:blipFill>
-        <p:spPr>
-          <a:xfrm>
-            <a:off x="7046930" y="26203"/>
-            <a:ext cx="1639870" cy="1639870"/>
-          </a:xfrm>
-          <a:prstGeom prst="rect">
-            <a:avLst/>
-          </a:prstGeom>
-        </p:spPr>
-      </p:pic>
+              <a:t>Eliminates a central server as a single point of failure.</a:t>
+            </a:r>
+          </a:p>
+        </p:txBody>
+      </p:sp>
     </p:spTree>
     <p:extLst>
       <p:ext uri="{BB962C8B-B14F-4D97-AF65-F5344CB8AC3E}">
-        <p14:creationId xmlns:p14="http://schemas.microsoft.com/office/powerpoint/2010/main" val="1544820095"/>
+        <p14:creationId xmlns:p14="http://schemas.microsoft.com/office/powerpoint/2010/main" val="1113486051"/>
       </p:ext>
     </p:extLst>
   </p:cSld>
@@ -4758,14 +4756,12 @@
         </p:nvSpPr>
         <p:spPr/>
         <p:txBody>
-          <a:bodyPr>
-            <a:normAutofit/>
-          </a:bodyPr>
-          <a:lstStyle/>
-          <a:p>
-            <a:r>
-              <a:rPr lang="en-US" dirty="0" smtClean="0"/>
-              <a:t>Homework</a:t>
+          <a:bodyPr/>
+          <a:lstStyle/>
+          <a:p>
+            <a:r>
+              <a:rPr lang="en-US" dirty="0" err="1" smtClean="0"/>
+              <a:t>Ansible</a:t>
             </a:r>
             <a:endParaRPr lang="en-US" dirty="0"/>
           </a:p>
@@ -4784,53 +4780,241 @@
         <p:spPr>
           <a:xfrm>
             <a:off x="457200" y="1600200"/>
-            <a:ext cx="8229600" cy="4920629"/>
+            <a:ext cx="8229600" cy="5017416"/>
           </a:xfrm>
         </p:spPr>
         <p:txBody>
           <a:bodyPr>
-            <a:normAutofit/>
+            <a:normAutofit fontScale="70000" lnSpcReduction="20000"/>
           </a:bodyPr>
           <a:lstStyle/>
           <a:p>
             <a:r>
               <a:rPr lang="en-US" dirty="0" smtClean="0"/>
-              <a:t>Assignment </a:t>
+              <a:t>A free-software platform for configuring and managing servers.</a:t>
+            </a:r>
+          </a:p>
+          <a:p>
+            <a:pPr lvl="1"/>
+            <a:r>
+              <a:rPr lang="en-US" dirty="0" smtClean="0"/>
+              <a:t>Push-based configuration using SSH as a communications </a:t>
+            </a:r>
+            <a:r>
+              <a:rPr lang="en-US" dirty="0" smtClean="0"/>
+              <a:t>channel – no agents!</a:t>
+            </a:r>
+            <a:endParaRPr lang="en-US" dirty="0" smtClean="0"/>
+          </a:p>
+          <a:p>
+            <a:pPr lvl="1"/>
+            <a:endParaRPr lang="en-US" dirty="0" smtClean="0"/>
+          </a:p>
+          <a:p>
+            <a:pPr lvl="1"/>
+            <a:r>
+              <a:rPr lang="en-US" dirty="0" smtClean="0"/>
+              <a:t>Supports both synchronized and ad hoc task </a:t>
+            </a:r>
+            <a:r>
+              <a:rPr lang="en-US" dirty="0" smtClean="0"/>
+              <a:t>execution</a:t>
             </a:r>
             <a:r>
               <a:rPr lang="en-US" dirty="0"/>
-              <a:t>8</a:t>
+              <a:t> </a:t>
+            </a:r>
+            <a:r>
+              <a:rPr lang="en-US" dirty="0" smtClean="0"/>
+              <a:t>on Linux and Windows systems.</a:t>
             </a:r>
             <a:endParaRPr lang="en-US" dirty="0" smtClean="0"/>
           </a:p>
           <a:p>
-            <a:r>
-              <a:rPr lang="en-US" dirty="0" smtClean="0"/>
-              <a:t>Read</a:t>
-            </a:r>
-            <a:r>
-              <a:rPr lang="en-US" i="1" dirty="0" smtClean="0"/>
-              <a:t> Infrastructure as Code </a:t>
-            </a:r>
-            <a:r>
-              <a:rPr lang="en-US" smtClean="0"/>
-              <a:t>Chapters</a:t>
-            </a:r>
-            <a:r>
-              <a:rPr lang="en-US" i="1" smtClean="0"/>
-              <a:t> 9 &amp; 10</a:t>
-            </a:r>
+            <a:pPr lvl="1"/>
+            <a:endParaRPr lang="en-US" dirty="0" smtClean="0"/>
+          </a:p>
+          <a:p>
+            <a:pPr lvl="1"/>
+            <a:r>
+              <a:rPr lang="en-US" dirty="0" smtClean="0"/>
+              <a:t>Uses YAML to describe the configuration of systems</a:t>
+            </a:r>
+            <a:r>
+              <a:rPr lang="en-US" dirty="0" smtClean="0"/>
+              <a:t>.</a:t>
+            </a:r>
+          </a:p>
+          <a:p>
+            <a:pPr lvl="1"/>
             <a:endParaRPr lang="en-US" dirty="0"/>
           </a:p>
           <a:p>
+            <a:pPr lvl="1"/>
+            <a:r>
+              <a:rPr lang="en-US" dirty="0" smtClean="0"/>
+              <a:t>Python over SSH.</a:t>
+            </a:r>
             <a:endParaRPr lang="en-US" dirty="0" smtClean="0"/>
           </a:p>
-        </p:txBody>
-      </p:sp>
+          <a:p>
+            <a:pPr lvl="1"/>
+            <a:endParaRPr lang="en-US" dirty="0" smtClean="0"/>
+          </a:p>
+          <a:p>
+            <a:pPr lvl="1"/>
+            <a:r>
+              <a:rPr lang="en-US" dirty="0" smtClean="0"/>
+              <a:t>Originally developed by Michael </a:t>
+            </a:r>
+            <a:r>
+              <a:rPr lang="en-US" dirty="0" err="1" smtClean="0"/>
+              <a:t>DeHaan</a:t>
+            </a:r>
+            <a:r>
+              <a:rPr lang="en-US" dirty="0"/>
+              <a:t> </a:t>
+            </a:r>
+            <a:r>
+              <a:rPr lang="en-US" dirty="0" smtClean="0"/>
+              <a:t>and acquired by Red Hat.</a:t>
+            </a:r>
+          </a:p>
+          <a:p>
+            <a:pPr lvl="1"/>
+            <a:endParaRPr lang="en-US" dirty="0"/>
+          </a:p>
+          <a:p>
+            <a:pPr lvl="1"/>
+            <a:r>
+              <a:rPr lang="en-US" dirty="0" smtClean="0"/>
+              <a:t>Written in Python and available at </a:t>
+            </a:r>
+            <a:r>
+              <a:rPr lang="en-US" dirty="0" smtClean="0">
+                <a:hlinkClick r:id="rId2"/>
+              </a:rPr>
+              <a:t>www.ansible.com</a:t>
+            </a:r>
+            <a:endParaRPr lang="en-US" dirty="0" smtClean="0"/>
+          </a:p>
+          <a:p>
+            <a:pPr lvl="2"/>
+            <a:r>
+              <a:rPr lang="en-US" dirty="0" smtClean="0"/>
+              <a:t>Control application must run on Unix/Linux system</a:t>
+            </a:r>
+          </a:p>
+        </p:txBody>
+      </p:sp>
+      <p:pic>
+        <p:nvPicPr>
+          <p:cNvPr id="4" name="Picture 3"/>
+          <p:cNvPicPr>
+            <a:picLocks noChangeAspect="1"/>
+          </p:cNvPicPr>
+          <p:nvPr/>
+        </p:nvPicPr>
+        <p:blipFill>
+          <a:blip r:embed="rId3"/>
+          <a:stretch>
+            <a:fillRect/>
+          </a:stretch>
+        </p:blipFill>
+        <p:spPr>
+          <a:xfrm>
+            <a:off x="7046930" y="26203"/>
+            <a:ext cx="1639870" cy="1639870"/>
+          </a:xfrm>
+          <a:prstGeom prst="rect">
+            <a:avLst/>
+          </a:prstGeom>
+        </p:spPr>
+      </p:pic>
     </p:spTree>
     <p:extLst>
       <p:ext uri="{BB962C8B-B14F-4D97-AF65-F5344CB8AC3E}">
-        <p14:creationId xmlns:p14="http://schemas.microsoft.com/office/powerpoint/2010/main" val="2135093818"/>
+        <p14:creationId xmlns:p14="http://schemas.microsoft.com/office/powerpoint/2010/main" val="1544820095"/>
+      </p:ext>
+    </p:extLst>
+  </p:cSld>
+  <p:clrMapOvr>
+    <a:masterClrMapping/>
+  </p:clrMapOvr>
+</p:sld>
+</file>
+
+<file path=ppt/slides/slide19.xml><?xml version="1.0" encoding="utf-8"?>
+<p:sld xmlns:a="http://schemas.openxmlformats.org/drawingml/2006/main" xmlns:r="http://schemas.openxmlformats.org/officeDocument/2006/relationships" xmlns:p="http://schemas.openxmlformats.org/presentationml/2006/main">
+  <p:cSld>
+    <p:spTree>
+      <p:nvGrpSpPr>
+        <p:cNvPr id="1" name=""/>
+        <p:cNvGrpSpPr/>
+        <p:nvPr/>
+      </p:nvGrpSpPr>
+      <p:grpSpPr>
+        <a:xfrm>
+          <a:off x="0" y="0"/>
+          <a:ext cx="0" cy="0"/>
+          <a:chOff x="0" y="0"/>
+          <a:chExt cx="0" cy="0"/>
+        </a:xfrm>
+      </p:grpSpPr>
+      <p:sp>
+        <p:nvSpPr>
+          <p:cNvPr id="2" name="Title 1"/>
+          <p:cNvSpPr>
+            <a:spLocks noGrp="1"/>
+          </p:cNvSpPr>
+          <p:nvPr>
+            <p:ph type="title"/>
+          </p:nvPr>
+        </p:nvSpPr>
+        <p:spPr/>
+        <p:txBody>
+          <a:bodyPr/>
+          <a:lstStyle/>
+          <a:p>
+            <a:r>
+              <a:rPr lang="en-US" dirty="0" err="1" smtClean="0"/>
+              <a:t>Ansible</a:t>
+            </a:r>
+            <a:r>
+              <a:rPr lang="en-US" dirty="0" smtClean="0"/>
+              <a:t> Architecture</a:t>
+            </a:r>
+            <a:endParaRPr lang="en-US" dirty="0"/>
+          </a:p>
+        </p:txBody>
+      </p:sp>
+      <p:pic>
+        <p:nvPicPr>
+          <p:cNvPr id="6" name="Picture 5"/>
+          <p:cNvPicPr>
+            <a:picLocks noChangeAspect="1"/>
+          </p:cNvPicPr>
+          <p:nvPr/>
+        </p:nvPicPr>
+        <p:blipFill rotWithShape="1">
+          <a:blip r:embed="rId2"/>
+          <a:srcRect l="328" t="5870" r="552" b="670"/>
+          <a:stretch/>
+        </p:blipFill>
+        <p:spPr>
+          <a:xfrm>
+            <a:off x="197963" y="2036189"/>
+            <a:ext cx="8606672" cy="3940405"/>
+          </a:xfrm>
+          <a:prstGeom prst="rect">
+            <a:avLst/>
+          </a:prstGeom>
+        </p:spPr>
+      </p:pic>
+    </p:spTree>
+    <p:extLst>
+      <p:ext uri="{BB962C8B-B14F-4D97-AF65-F5344CB8AC3E}">
+        <p14:creationId xmlns:p14="http://schemas.microsoft.com/office/powerpoint/2010/main" val="935373152"/>
       </p:ext>
     </p:extLst>
   </p:cSld>
@@ -4932,6 +5116,1894 @@
     <p:extLst>
       <p:ext uri="{BB962C8B-B14F-4D97-AF65-F5344CB8AC3E}">
         <p14:creationId xmlns:p14="http://schemas.microsoft.com/office/powerpoint/2010/main" val="1923720609"/>
+      </p:ext>
+    </p:extLst>
+  </p:cSld>
+  <p:clrMapOvr>
+    <a:masterClrMapping/>
+  </p:clrMapOvr>
+</p:sld>
+</file>
+
+<file path=ppt/slides/slide20.xml><?xml version="1.0" encoding="utf-8"?>
+<p:sld xmlns:a="http://schemas.openxmlformats.org/drawingml/2006/main" xmlns:r="http://schemas.openxmlformats.org/officeDocument/2006/relationships" xmlns:p="http://schemas.openxmlformats.org/presentationml/2006/main">
+  <p:cSld>
+    <p:spTree>
+      <p:nvGrpSpPr>
+        <p:cNvPr id="1" name=""/>
+        <p:cNvGrpSpPr/>
+        <p:nvPr/>
+      </p:nvGrpSpPr>
+      <p:grpSpPr>
+        <a:xfrm>
+          <a:off x="0" y="0"/>
+          <a:ext cx="0" cy="0"/>
+          <a:chOff x="0" y="0"/>
+          <a:chExt cx="0" cy="0"/>
+        </a:xfrm>
+      </p:grpSpPr>
+      <p:sp>
+        <p:nvSpPr>
+          <p:cNvPr id="2" name="Title 1"/>
+          <p:cNvSpPr>
+            <a:spLocks noGrp="1"/>
+          </p:cNvSpPr>
+          <p:nvPr>
+            <p:ph type="title"/>
+          </p:nvPr>
+        </p:nvSpPr>
+        <p:spPr/>
+        <p:txBody>
+          <a:bodyPr/>
+          <a:lstStyle/>
+          <a:p>
+            <a:r>
+              <a:rPr lang="en-US" dirty="0" smtClean="0"/>
+              <a:t>Inventory</a:t>
+            </a:r>
+            <a:endParaRPr lang="en-US" dirty="0"/>
+          </a:p>
+        </p:txBody>
+      </p:sp>
+      <p:sp>
+        <p:nvSpPr>
+          <p:cNvPr id="3" name="Content Placeholder 2"/>
+          <p:cNvSpPr>
+            <a:spLocks noGrp="1"/>
+          </p:cNvSpPr>
+          <p:nvPr>
+            <p:ph idx="1"/>
+          </p:nvPr>
+        </p:nvSpPr>
+        <p:spPr/>
+        <p:txBody>
+          <a:bodyPr>
+            <a:normAutofit lnSpcReduction="10000"/>
+          </a:bodyPr>
+          <a:lstStyle/>
+          <a:p>
+            <a:r>
+              <a:rPr lang="en-US" dirty="0" err="1" smtClean="0"/>
+              <a:t>Ansible</a:t>
+            </a:r>
+            <a:r>
+              <a:rPr lang="en-US" dirty="0" smtClean="0"/>
+              <a:t> uses an inventory file, named </a:t>
+            </a:r>
+            <a:r>
+              <a:rPr lang="en-US" sz="2800" b="1" dirty="0" smtClean="0">
+                <a:latin typeface="Consolas" charset="0"/>
+                <a:ea typeface="Consolas" charset="0"/>
+                <a:cs typeface="Consolas" charset="0"/>
+              </a:rPr>
+              <a:t>hosts</a:t>
+            </a:r>
+            <a:r>
+              <a:rPr lang="en-US" dirty="0" smtClean="0"/>
+              <a:t>, to store a list of systems.</a:t>
+            </a:r>
+          </a:p>
+          <a:p>
+            <a:pPr lvl="1"/>
+            <a:r>
+              <a:rPr lang="en-US" dirty="0" smtClean="0"/>
+              <a:t>The hosts file uses an INI-like format:</a:t>
+            </a:r>
+          </a:p>
+          <a:p>
+            <a:pPr lvl="1"/>
+            <a:endParaRPr lang="en-US" dirty="0" smtClean="0"/>
+          </a:p>
+          <a:p>
+            <a:pPr marL="457200" lvl="1" indent="0">
+              <a:buNone/>
+            </a:pPr>
+            <a:r>
+              <a:rPr lang="en-US" sz="1600" dirty="0">
+                <a:latin typeface="Consolas" charset="0"/>
+                <a:ea typeface="Consolas" charset="0"/>
+                <a:cs typeface="Consolas" charset="0"/>
+              </a:rPr>
+              <a:t>[webservers</a:t>
+            </a:r>
+            <a:r>
+              <a:rPr lang="en-US" sz="1600" dirty="0" smtClean="0">
+                <a:latin typeface="Consolas" charset="0"/>
+                <a:ea typeface="Consolas" charset="0"/>
+                <a:cs typeface="Consolas" charset="0"/>
+              </a:rPr>
+              <a:t>]</a:t>
+            </a:r>
+          </a:p>
+          <a:p>
+            <a:pPr marL="457200" lvl="1" indent="0">
+              <a:buNone/>
+            </a:pPr>
+            <a:r>
+              <a:rPr lang="en-US" sz="1600" dirty="0" smtClean="0">
+                <a:latin typeface="Consolas" charset="0"/>
+                <a:ea typeface="Consolas" charset="0"/>
+                <a:cs typeface="Consolas" charset="0"/>
+              </a:rPr>
+              <a:t>web1 </a:t>
+            </a:r>
+            <a:r>
+              <a:rPr lang="en-US" sz="1600" dirty="0" err="1">
+                <a:latin typeface="Consolas" charset="0"/>
+                <a:ea typeface="Consolas" charset="0"/>
+                <a:cs typeface="Consolas" charset="0"/>
+              </a:rPr>
+              <a:t>ansible_host</a:t>
+            </a:r>
+            <a:r>
+              <a:rPr lang="en-US" sz="1600" dirty="0">
+                <a:latin typeface="Consolas" charset="0"/>
+                <a:ea typeface="Consolas" charset="0"/>
+                <a:cs typeface="Consolas" charset="0"/>
+              </a:rPr>
+              <a:t>=54.162.154.245 </a:t>
+            </a:r>
+            <a:r>
+              <a:rPr lang="en-US" sz="1600" dirty="0" err="1" smtClean="0">
+                <a:latin typeface="Consolas" charset="0"/>
+                <a:ea typeface="Consolas" charset="0"/>
+                <a:cs typeface="Consolas" charset="0"/>
+              </a:rPr>
+              <a:t>ansible_user</a:t>
+            </a:r>
+            <a:r>
+              <a:rPr lang="en-US" sz="1600" dirty="0" smtClean="0">
+                <a:latin typeface="Consolas" charset="0"/>
+                <a:ea typeface="Consolas" charset="0"/>
+                <a:cs typeface="Consolas" charset="0"/>
+              </a:rPr>
+              <a:t>=ec2-user</a:t>
+            </a:r>
+          </a:p>
+          <a:p>
+            <a:pPr marL="457200" lvl="1" indent="0">
+              <a:buNone/>
+            </a:pPr>
+            <a:r>
+              <a:rPr lang="en-US" sz="1600" dirty="0">
+                <a:latin typeface="Consolas" charset="0"/>
+                <a:ea typeface="Consolas" charset="0"/>
+                <a:cs typeface="Consolas" charset="0"/>
+              </a:rPr>
+              <a:t>w</a:t>
+            </a:r>
+            <a:r>
+              <a:rPr lang="en-US" sz="1600" dirty="0" smtClean="0">
+                <a:latin typeface="Consolas" charset="0"/>
+                <a:ea typeface="Consolas" charset="0"/>
+                <a:cs typeface="Consolas" charset="0"/>
+              </a:rPr>
+              <a:t>eb2.mydomain.com </a:t>
+            </a:r>
+            <a:r>
+              <a:rPr lang="en-US" sz="1600" dirty="0" err="1" smtClean="0">
+                <a:latin typeface="Consolas" charset="0"/>
+                <a:ea typeface="Consolas" charset="0"/>
+                <a:cs typeface="Consolas" charset="0"/>
+              </a:rPr>
+              <a:t>ansible_user</a:t>
+            </a:r>
+            <a:r>
+              <a:rPr lang="en-US" sz="1600" dirty="0" smtClean="0">
+                <a:latin typeface="Consolas" charset="0"/>
+                <a:ea typeface="Consolas" charset="0"/>
+                <a:cs typeface="Consolas" charset="0"/>
+              </a:rPr>
+              <a:t>=ec2-user</a:t>
+            </a:r>
+          </a:p>
+          <a:p>
+            <a:pPr marL="457200" lvl="1" indent="0">
+              <a:buNone/>
+            </a:pPr>
+            <a:endParaRPr lang="en-US" sz="1600" dirty="0">
+              <a:latin typeface="Consolas" charset="0"/>
+              <a:ea typeface="Consolas" charset="0"/>
+              <a:cs typeface="Consolas" charset="0"/>
+            </a:endParaRPr>
+          </a:p>
+          <a:p>
+            <a:pPr marL="457200" lvl="1" indent="0">
+              <a:buNone/>
+            </a:pPr>
+            <a:r>
+              <a:rPr lang="en-US" sz="1600" dirty="0" smtClean="0">
+                <a:latin typeface="Consolas" charset="0"/>
+                <a:ea typeface="Consolas" charset="0"/>
+                <a:cs typeface="Consolas" charset="0"/>
+              </a:rPr>
+              <a:t>[databases]</a:t>
+            </a:r>
+          </a:p>
+          <a:p>
+            <a:pPr marL="457200" lvl="1" indent="0">
+              <a:buNone/>
+            </a:pPr>
+            <a:r>
+              <a:rPr lang="en-US" sz="1600" dirty="0" err="1" smtClean="0">
+                <a:latin typeface="Consolas" charset="0"/>
+                <a:ea typeface="Consolas" charset="0"/>
+                <a:cs typeface="Consolas" charset="0"/>
+              </a:rPr>
+              <a:t>db</a:t>
+            </a:r>
+            <a:r>
+              <a:rPr lang="en-US" sz="1600" dirty="0" smtClean="0">
+                <a:latin typeface="Consolas" charset="0"/>
+                <a:ea typeface="Consolas" charset="0"/>
+                <a:cs typeface="Consolas" charset="0"/>
+              </a:rPr>
+              <a:t>[01:10].</a:t>
+            </a:r>
+            <a:r>
+              <a:rPr lang="en-US" sz="1600" dirty="0" err="1" smtClean="0">
+                <a:latin typeface="Consolas" charset="0"/>
+                <a:ea typeface="Consolas" charset="0"/>
+                <a:cs typeface="Consolas" charset="0"/>
+              </a:rPr>
+              <a:t>mydomain.com</a:t>
+            </a:r>
+            <a:r>
+              <a:rPr lang="en-US" sz="1600" dirty="0" smtClean="0">
+                <a:latin typeface="Consolas" charset="0"/>
+                <a:ea typeface="Consolas" charset="0"/>
+                <a:cs typeface="Consolas" charset="0"/>
+              </a:rPr>
+              <a:t> </a:t>
+            </a:r>
+            <a:r>
+              <a:rPr lang="en-US" sz="1600" dirty="0" err="1" smtClean="0">
+                <a:latin typeface="Consolas" charset="0"/>
+                <a:ea typeface="Consolas" charset="0"/>
+                <a:cs typeface="Consolas" charset="0"/>
+              </a:rPr>
+              <a:t>maxRequests</a:t>
+            </a:r>
+            <a:r>
+              <a:rPr lang="en-US" sz="1600" dirty="0" smtClean="0">
+                <a:latin typeface="Consolas" charset="0"/>
+                <a:ea typeface="Consolas" charset="0"/>
+                <a:cs typeface="Consolas" charset="0"/>
+              </a:rPr>
+              <a:t>=1000</a:t>
+            </a:r>
+          </a:p>
+          <a:p>
+            <a:pPr marL="457200" lvl="1" indent="0">
+              <a:buNone/>
+            </a:pPr>
+            <a:endParaRPr lang="en-US" sz="1600" dirty="0">
+              <a:latin typeface="Consolas" charset="0"/>
+              <a:ea typeface="Consolas" charset="0"/>
+              <a:cs typeface="Consolas" charset="0"/>
+            </a:endParaRPr>
+          </a:p>
+          <a:p>
+            <a:pPr lvl="1"/>
+            <a:r>
+              <a:rPr lang="en-US" dirty="0" smtClean="0">
+                <a:ea typeface="Consolas" charset="0"/>
+                <a:cs typeface="Consolas" charset="0"/>
+              </a:rPr>
+              <a:t>Hosts may be members of one or more groups.</a:t>
+            </a:r>
+            <a:endParaRPr lang="en-US" dirty="0">
+              <a:ea typeface="Consolas" charset="0"/>
+              <a:cs typeface="Consolas" charset="0"/>
+            </a:endParaRPr>
+          </a:p>
+        </p:txBody>
+      </p:sp>
+    </p:spTree>
+    <p:extLst>
+      <p:ext uri="{BB962C8B-B14F-4D97-AF65-F5344CB8AC3E}">
+        <p14:creationId xmlns:p14="http://schemas.microsoft.com/office/powerpoint/2010/main" val="246243568"/>
+      </p:ext>
+    </p:extLst>
+  </p:cSld>
+  <p:clrMapOvr>
+    <a:masterClrMapping/>
+  </p:clrMapOvr>
+</p:sld>
+</file>
+
+<file path=ppt/slides/slide21.xml><?xml version="1.0" encoding="utf-8"?>
+<p:sld xmlns:a="http://schemas.openxmlformats.org/drawingml/2006/main" xmlns:r="http://schemas.openxmlformats.org/officeDocument/2006/relationships" xmlns:p="http://schemas.openxmlformats.org/presentationml/2006/main">
+  <p:cSld>
+    <p:spTree>
+      <p:nvGrpSpPr>
+        <p:cNvPr id="1" name=""/>
+        <p:cNvGrpSpPr/>
+        <p:nvPr/>
+      </p:nvGrpSpPr>
+      <p:grpSpPr>
+        <a:xfrm>
+          <a:off x="0" y="0"/>
+          <a:ext cx="0" cy="0"/>
+          <a:chOff x="0" y="0"/>
+          <a:chExt cx="0" cy="0"/>
+        </a:xfrm>
+      </p:grpSpPr>
+      <p:sp>
+        <p:nvSpPr>
+          <p:cNvPr id="2" name="Title 1"/>
+          <p:cNvSpPr>
+            <a:spLocks noGrp="1"/>
+          </p:cNvSpPr>
+          <p:nvPr>
+            <p:ph type="title"/>
+          </p:nvPr>
+        </p:nvSpPr>
+        <p:spPr/>
+        <p:txBody>
+          <a:bodyPr/>
+          <a:lstStyle/>
+          <a:p>
+            <a:r>
+              <a:rPr lang="en-US" dirty="0" smtClean="0"/>
+              <a:t>Variables</a:t>
+            </a:r>
+            <a:endParaRPr lang="en-US" dirty="0"/>
+          </a:p>
+        </p:txBody>
+      </p:sp>
+      <p:sp>
+        <p:nvSpPr>
+          <p:cNvPr id="3" name="Content Placeholder 2"/>
+          <p:cNvSpPr>
+            <a:spLocks noGrp="1"/>
+          </p:cNvSpPr>
+          <p:nvPr>
+            <p:ph idx="1"/>
+          </p:nvPr>
+        </p:nvSpPr>
+        <p:spPr/>
+        <p:txBody>
+          <a:bodyPr>
+            <a:normAutofit fontScale="85000" lnSpcReduction="20000"/>
+          </a:bodyPr>
+          <a:lstStyle/>
+          <a:p>
+            <a:r>
+              <a:rPr lang="en-US" dirty="0" smtClean="0"/>
+              <a:t>Variables hold values that hosts or groups of hosts can use for configuration.</a:t>
+            </a:r>
+          </a:p>
+          <a:p>
+            <a:endParaRPr lang="en-US" dirty="0"/>
+          </a:p>
+          <a:p>
+            <a:r>
+              <a:rPr lang="en-US" dirty="0" smtClean="0"/>
+              <a:t>While you can put variables in the inventory file, best practice is to use a </a:t>
+            </a:r>
+            <a:r>
+              <a:rPr lang="en-US" b="1" dirty="0" err="1" smtClean="0"/>
+              <a:t>group_vars</a:t>
+            </a:r>
+            <a:r>
+              <a:rPr lang="en-US" dirty="0" smtClean="0"/>
+              <a:t> or </a:t>
+            </a:r>
+            <a:r>
+              <a:rPr lang="en-US" b="1" dirty="0" err="1" smtClean="0"/>
+              <a:t>host_vars</a:t>
+            </a:r>
+            <a:r>
+              <a:rPr lang="en-US" dirty="0" smtClean="0"/>
+              <a:t> directory.</a:t>
+            </a:r>
+          </a:p>
+          <a:p>
+            <a:endParaRPr lang="en-US" dirty="0" smtClean="0"/>
+          </a:p>
+          <a:p>
+            <a:r>
+              <a:rPr lang="en-US" dirty="0" smtClean="0"/>
+              <a:t>Example for ../</a:t>
+            </a:r>
+            <a:r>
+              <a:rPr lang="en-US" dirty="0" err="1" smtClean="0"/>
+              <a:t>group_vars</a:t>
+            </a:r>
+            <a:r>
+              <a:rPr lang="en-US" dirty="0" smtClean="0"/>
+              <a:t>/</a:t>
+            </a:r>
+            <a:r>
+              <a:rPr lang="en-US" dirty="0" err="1" smtClean="0"/>
+              <a:t>webservers.yml</a:t>
+            </a:r>
+            <a:endParaRPr lang="en-US" dirty="0" smtClean="0"/>
+          </a:p>
+          <a:p>
+            <a:endParaRPr lang="en-US" dirty="0"/>
+          </a:p>
+          <a:p>
+            <a:pPr marL="0" indent="0">
+              <a:buNone/>
+            </a:pPr>
+            <a:r>
+              <a:rPr lang="en-US" dirty="0" smtClean="0">
+                <a:latin typeface="Consolas" charset="0"/>
+                <a:ea typeface="Consolas" charset="0"/>
+                <a:cs typeface="Consolas" charset="0"/>
+              </a:rPr>
+              <a:t>	</a:t>
+            </a:r>
+            <a:r>
+              <a:rPr lang="en-US" sz="2400" dirty="0" smtClean="0">
+                <a:latin typeface="Consolas" charset="0"/>
+                <a:ea typeface="Consolas" charset="0"/>
+                <a:cs typeface="Consolas" charset="0"/>
+              </a:rPr>
+              <a:t>---</a:t>
+            </a:r>
+          </a:p>
+          <a:p>
+            <a:pPr marL="0" indent="0">
+              <a:buNone/>
+            </a:pPr>
+            <a:r>
+              <a:rPr lang="en-US" sz="2400" dirty="0">
+                <a:latin typeface="Consolas" charset="0"/>
+                <a:ea typeface="Consolas" charset="0"/>
+                <a:cs typeface="Consolas" charset="0"/>
+              </a:rPr>
+              <a:t>	</a:t>
+            </a:r>
+            <a:r>
+              <a:rPr lang="en-US" sz="2400" dirty="0" err="1" smtClean="0">
+                <a:latin typeface="Consolas" charset="0"/>
+                <a:ea typeface="Consolas" charset="0"/>
+                <a:cs typeface="Consolas" charset="0"/>
+              </a:rPr>
+              <a:t>ntp_server</a:t>
+            </a:r>
+            <a:r>
+              <a:rPr lang="en-US" sz="2400" dirty="0" smtClean="0">
+                <a:latin typeface="Consolas" charset="0"/>
+                <a:ea typeface="Consolas" charset="0"/>
+                <a:cs typeface="Consolas" charset="0"/>
+              </a:rPr>
+              <a:t>: </a:t>
+            </a:r>
+            <a:r>
+              <a:rPr lang="en-US" sz="2400" dirty="0" err="1" smtClean="0">
+                <a:latin typeface="Consolas" charset="0"/>
+                <a:ea typeface="Consolas" charset="0"/>
+                <a:cs typeface="Consolas" charset="0"/>
+              </a:rPr>
+              <a:t>ntp.google.com</a:t>
+            </a:r>
+            <a:endParaRPr lang="en-US" sz="2400" dirty="0" smtClean="0">
+              <a:latin typeface="Consolas" charset="0"/>
+              <a:ea typeface="Consolas" charset="0"/>
+              <a:cs typeface="Consolas" charset="0"/>
+            </a:endParaRPr>
+          </a:p>
+          <a:p>
+            <a:pPr marL="0" indent="0">
+              <a:buNone/>
+            </a:pPr>
+            <a:r>
+              <a:rPr lang="en-US" sz="2400" dirty="0">
+                <a:latin typeface="Consolas" charset="0"/>
+                <a:ea typeface="Consolas" charset="0"/>
+                <a:cs typeface="Consolas" charset="0"/>
+              </a:rPr>
+              <a:t>	</a:t>
+            </a:r>
+            <a:r>
+              <a:rPr lang="en-US" sz="2400" dirty="0" err="1" smtClean="0">
+                <a:latin typeface="Consolas" charset="0"/>
+                <a:ea typeface="Consolas" charset="0"/>
+                <a:cs typeface="Consolas" charset="0"/>
+              </a:rPr>
+              <a:t>database_server</a:t>
+            </a:r>
+            <a:r>
+              <a:rPr lang="en-US" sz="2400" dirty="0" smtClean="0">
+                <a:latin typeface="Consolas" charset="0"/>
+                <a:ea typeface="Consolas" charset="0"/>
+                <a:cs typeface="Consolas" charset="0"/>
+              </a:rPr>
+              <a:t>: </a:t>
+            </a:r>
+            <a:r>
+              <a:rPr lang="en-US" sz="2400" dirty="0" err="1" smtClean="0">
+                <a:latin typeface="Consolas" charset="0"/>
+                <a:ea typeface="Consolas" charset="0"/>
+                <a:cs typeface="Consolas" charset="0"/>
+              </a:rPr>
+              <a:t>storage.mydomain.com</a:t>
+            </a:r>
+            <a:endParaRPr lang="en-US" sz="2400" dirty="0" smtClean="0">
+              <a:latin typeface="Consolas" charset="0"/>
+              <a:ea typeface="Consolas" charset="0"/>
+              <a:cs typeface="Consolas" charset="0"/>
+            </a:endParaRPr>
+          </a:p>
+        </p:txBody>
+      </p:sp>
+    </p:spTree>
+    <p:extLst>
+      <p:ext uri="{BB962C8B-B14F-4D97-AF65-F5344CB8AC3E}">
+        <p14:creationId xmlns:p14="http://schemas.microsoft.com/office/powerpoint/2010/main" val="1896023455"/>
+      </p:ext>
+    </p:extLst>
+  </p:cSld>
+  <p:clrMapOvr>
+    <a:masterClrMapping/>
+  </p:clrMapOvr>
+</p:sld>
+</file>
+
+<file path=ppt/slides/slide22.xml><?xml version="1.0" encoding="utf-8"?>
+<p:sld xmlns:a="http://schemas.openxmlformats.org/drawingml/2006/main" xmlns:r="http://schemas.openxmlformats.org/officeDocument/2006/relationships" xmlns:p="http://schemas.openxmlformats.org/presentationml/2006/main">
+  <p:cSld>
+    <p:spTree>
+      <p:nvGrpSpPr>
+        <p:cNvPr id="1" name=""/>
+        <p:cNvGrpSpPr/>
+        <p:nvPr/>
+      </p:nvGrpSpPr>
+      <p:grpSpPr>
+        <a:xfrm>
+          <a:off x="0" y="0"/>
+          <a:ext cx="0" cy="0"/>
+          <a:chOff x="0" y="0"/>
+          <a:chExt cx="0" cy="0"/>
+        </a:xfrm>
+      </p:grpSpPr>
+      <p:sp>
+        <p:nvSpPr>
+          <p:cNvPr id="2" name="Title 1"/>
+          <p:cNvSpPr>
+            <a:spLocks noGrp="1"/>
+          </p:cNvSpPr>
+          <p:nvPr>
+            <p:ph type="title"/>
+          </p:nvPr>
+        </p:nvSpPr>
+        <p:spPr/>
+        <p:txBody>
+          <a:bodyPr/>
+          <a:lstStyle/>
+          <a:p>
+            <a:r>
+              <a:rPr lang="en-US" dirty="0" smtClean="0"/>
+              <a:t>Dynamic Inventory</a:t>
+            </a:r>
+            <a:endParaRPr lang="en-US" dirty="0"/>
+          </a:p>
+        </p:txBody>
+      </p:sp>
+      <p:sp>
+        <p:nvSpPr>
+          <p:cNvPr id="3" name="Content Placeholder 2"/>
+          <p:cNvSpPr>
+            <a:spLocks noGrp="1"/>
+          </p:cNvSpPr>
+          <p:nvPr>
+            <p:ph idx="1"/>
+          </p:nvPr>
+        </p:nvSpPr>
+        <p:spPr/>
+        <p:txBody>
+          <a:bodyPr>
+            <a:normAutofit fontScale="85000" lnSpcReduction="20000"/>
+          </a:bodyPr>
+          <a:lstStyle/>
+          <a:p>
+            <a:r>
+              <a:rPr lang="en-US" dirty="0" smtClean="0"/>
+              <a:t>Oftentimes the set of hosts in an environment is not static because of mechanisms like auto scaling.</a:t>
+            </a:r>
+          </a:p>
+          <a:p>
+            <a:endParaRPr lang="en-US" dirty="0"/>
+          </a:p>
+          <a:p>
+            <a:r>
+              <a:rPr lang="en-US" dirty="0" err="1" smtClean="0"/>
+              <a:t>Ansible</a:t>
+            </a:r>
+            <a:r>
+              <a:rPr lang="en-US" dirty="0" smtClean="0"/>
+              <a:t> can use inventory data generated dynamically by scripts.</a:t>
+            </a:r>
+          </a:p>
+          <a:p>
+            <a:pPr lvl="1"/>
+            <a:r>
+              <a:rPr lang="en-US" dirty="0" smtClean="0"/>
+              <a:t>Gather the current list of running EC2 instances.</a:t>
+            </a:r>
+          </a:p>
+          <a:p>
+            <a:pPr lvl="1"/>
+            <a:r>
+              <a:rPr lang="en-US" dirty="0" smtClean="0"/>
+              <a:t>Pull host list from enterprise CMDB.</a:t>
+            </a:r>
+          </a:p>
+          <a:p>
+            <a:endParaRPr lang="en-US" dirty="0"/>
+          </a:p>
+          <a:p>
+            <a:r>
+              <a:rPr lang="en-US" dirty="0" smtClean="0"/>
+              <a:t>Example using Terraform:</a:t>
+            </a:r>
+          </a:p>
+          <a:p>
+            <a:pPr marL="0" indent="0">
+              <a:buNone/>
+            </a:pPr>
+            <a:endParaRPr lang="en-US" dirty="0" smtClean="0"/>
+          </a:p>
+          <a:p>
+            <a:pPr marL="0" indent="0">
+              <a:buNone/>
+            </a:pPr>
+            <a:r>
+              <a:rPr lang="en-US" sz="2400" dirty="0">
+                <a:latin typeface="Consolas" charset="0"/>
+                <a:ea typeface="Consolas" charset="0"/>
+                <a:cs typeface="Consolas" charset="0"/>
+              </a:rPr>
+              <a:t>	</a:t>
+            </a:r>
+            <a:r>
+              <a:rPr lang="en-US" sz="2400" dirty="0" smtClean="0">
+                <a:latin typeface="Consolas" charset="0"/>
+                <a:ea typeface="Consolas" charset="0"/>
+                <a:cs typeface="Consolas" charset="0"/>
+              </a:rPr>
+              <a:t>$ </a:t>
+            </a:r>
+            <a:r>
+              <a:rPr lang="en-US" sz="2400" dirty="0" err="1" smtClean="0">
+                <a:latin typeface="Consolas" charset="0"/>
+                <a:ea typeface="Consolas" charset="0"/>
+                <a:cs typeface="Consolas" charset="0"/>
+              </a:rPr>
+              <a:t>ansible</a:t>
+            </a:r>
+            <a:r>
+              <a:rPr lang="en-US" sz="2400" dirty="0" smtClean="0">
+                <a:latin typeface="Consolas" charset="0"/>
+                <a:ea typeface="Consolas" charset="0"/>
+                <a:cs typeface="Consolas" charset="0"/>
+              </a:rPr>
+              <a:t> </a:t>
+            </a:r>
+            <a:r>
+              <a:rPr lang="en-US" sz="2400" dirty="0">
+                <a:latin typeface="Consolas" charset="0"/>
+                <a:ea typeface="Consolas" charset="0"/>
+                <a:cs typeface="Consolas" charset="0"/>
+              </a:rPr>
+              <a:t>-</a:t>
+            </a:r>
+            <a:r>
+              <a:rPr lang="en-US" sz="2400" dirty="0" err="1">
+                <a:latin typeface="Consolas" charset="0"/>
+                <a:ea typeface="Consolas" charset="0"/>
+                <a:cs typeface="Consolas" charset="0"/>
+              </a:rPr>
+              <a:t>i</a:t>
+            </a:r>
+            <a:r>
+              <a:rPr lang="en-US" sz="2400" dirty="0">
+                <a:latin typeface="Consolas" charset="0"/>
+                <a:ea typeface="Consolas" charset="0"/>
+                <a:cs typeface="Consolas" charset="0"/>
+              </a:rPr>
+              <a:t> </a:t>
+            </a:r>
+            <a:r>
+              <a:rPr lang="en-US" sz="2400" dirty="0" err="1">
+                <a:latin typeface="Consolas" charset="0"/>
+                <a:ea typeface="Consolas" charset="0"/>
+                <a:cs typeface="Consolas" charset="0"/>
+              </a:rPr>
+              <a:t>terraform.py</a:t>
+            </a:r>
+            <a:r>
+              <a:rPr lang="en-US" sz="2400" dirty="0">
+                <a:latin typeface="Consolas" charset="0"/>
+                <a:ea typeface="Consolas" charset="0"/>
+                <a:cs typeface="Consolas" charset="0"/>
+              </a:rPr>
+              <a:t> -m ping all</a:t>
+            </a:r>
+          </a:p>
+          <a:p>
+            <a:pPr lvl="1"/>
+            <a:endParaRPr lang="en-US" dirty="0" smtClean="0"/>
+          </a:p>
+        </p:txBody>
+      </p:sp>
+    </p:spTree>
+    <p:extLst>
+      <p:ext uri="{BB962C8B-B14F-4D97-AF65-F5344CB8AC3E}">
+        <p14:creationId xmlns:p14="http://schemas.microsoft.com/office/powerpoint/2010/main" val="902307781"/>
+      </p:ext>
+    </p:extLst>
+  </p:cSld>
+  <p:clrMapOvr>
+    <a:masterClrMapping/>
+  </p:clrMapOvr>
+</p:sld>
+</file>
+
+<file path=ppt/slides/slide23.xml><?xml version="1.0" encoding="utf-8"?>
+<p:sld xmlns:a="http://schemas.openxmlformats.org/drawingml/2006/main" xmlns:r="http://schemas.openxmlformats.org/officeDocument/2006/relationships" xmlns:p="http://schemas.openxmlformats.org/presentationml/2006/main">
+  <p:cSld>
+    <p:spTree>
+      <p:nvGrpSpPr>
+        <p:cNvPr id="1" name=""/>
+        <p:cNvGrpSpPr/>
+        <p:nvPr/>
+      </p:nvGrpSpPr>
+      <p:grpSpPr>
+        <a:xfrm>
+          <a:off x="0" y="0"/>
+          <a:ext cx="0" cy="0"/>
+          <a:chOff x="0" y="0"/>
+          <a:chExt cx="0" cy="0"/>
+        </a:xfrm>
+      </p:grpSpPr>
+      <p:sp>
+        <p:nvSpPr>
+          <p:cNvPr id="2" name="Title 1"/>
+          <p:cNvSpPr>
+            <a:spLocks noGrp="1"/>
+          </p:cNvSpPr>
+          <p:nvPr>
+            <p:ph type="title"/>
+          </p:nvPr>
+        </p:nvSpPr>
+        <p:spPr/>
+        <p:txBody>
+          <a:bodyPr/>
+          <a:lstStyle/>
+          <a:p>
+            <a:r>
+              <a:rPr lang="en-US" dirty="0" smtClean="0"/>
+              <a:t>Patterns</a:t>
+            </a:r>
+            <a:endParaRPr lang="en-US" dirty="0"/>
+          </a:p>
+        </p:txBody>
+      </p:sp>
+      <p:sp>
+        <p:nvSpPr>
+          <p:cNvPr id="3" name="Content Placeholder 2"/>
+          <p:cNvSpPr>
+            <a:spLocks noGrp="1"/>
+          </p:cNvSpPr>
+          <p:nvPr>
+            <p:ph idx="1"/>
+          </p:nvPr>
+        </p:nvSpPr>
+        <p:spPr/>
+        <p:txBody>
+          <a:bodyPr/>
+          <a:lstStyle/>
+          <a:p>
+            <a:r>
+              <a:rPr lang="en-US" dirty="0" smtClean="0"/>
+              <a:t>We use patterns to decide which groups of hosts to manage.</a:t>
+            </a:r>
+          </a:p>
+          <a:p>
+            <a:pPr marL="457200" lvl="1" indent="0">
+              <a:buNone/>
+            </a:pPr>
+            <a:r>
+              <a:rPr lang="en-US" sz="2000" dirty="0" smtClean="0"/>
+              <a:t>all					 (all hosts, can also use *)</a:t>
+            </a:r>
+          </a:p>
+          <a:p>
+            <a:pPr marL="457200" lvl="1" indent="0">
+              <a:buNone/>
+            </a:pPr>
+            <a:r>
+              <a:rPr lang="en-US" sz="2000" dirty="0" smtClean="0"/>
+              <a:t>*.com			</a:t>
+            </a:r>
+            <a:r>
+              <a:rPr lang="en-US" sz="2000" dirty="0"/>
+              <a:t>	</a:t>
+            </a:r>
+            <a:r>
+              <a:rPr lang="en-US" sz="2000" dirty="0" smtClean="0"/>
+              <a:t> (all hosts ending in .com domain)</a:t>
+            </a:r>
+          </a:p>
+          <a:p>
+            <a:pPr marL="457200" lvl="1" indent="0">
+              <a:buNone/>
+            </a:pPr>
+            <a:r>
+              <a:rPr lang="en-US" sz="2000" dirty="0" smtClean="0"/>
+              <a:t>web1.mydomain.com  (single host)</a:t>
+            </a:r>
+          </a:p>
+          <a:p>
+            <a:pPr marL="457200" lvl="1" indent="0">
+              <a:buNone/>
+            </a:pPr>
+            <a:r>
+              <a:rPr lang="en-US" sz="2000" dirty="0" err="1" smtClean="0"/>
+              <a:t>webservers:dbservers</a:t>
+            </a:r>
+            <a:r>
+              <a:rPr lang="en-US" sz="2000" dirty="0" smtClean="0"/>
+              <a:t>  (webservers OR </a:t>
+            </a:r>
+            <a:r>
+              <a:rPr lang="en-US" sz="2000" dirty="0" err="1" smtClean="0"/>
+              <a:t>dbservers</a:t>
+            </a:r>
+            <a:r>
+              <a:rPr lang="en-US" sz="2000" dirty="0" smtClean="0"/>
+              <a:t>)</a:t>
+            </a:r>
+          </a:p>
+          <a:p>
+            <a:pPr marL="457200" lvl="1" indent="0">
+              <a:buNone/>
+            </a:pPr>
+            <a:r>
+              <a:rPr lang="en-US" sz="2000" dirty="0"/>
+              <a:t>w</a:t>
+            </a:r>
+            <a:r>
+              <a:rPr lang="en-US" sz="2000" dirty="0" smtClean="0"/>
+              <a:t>ebservers:!web1        (webservers, except for web1)</a:t>
+            </a:r>
+          </a:p>
+          <a:p>
+            <a:pPr marL="457200" lvl="1" indent="0">
+              <a:buNone/>
+            </a:pPr>
+            <a:r>
+              <a:rPr lang="en-US" sz="2000" dirty="0"/>
+              <a:t>w</a:t>
+            </a:r>
+            <a:r>
+              <a:rPr lang="en-US" sz="2000" dirty="0" smtClean="0"/>
+              <a:t>ebservers:&amp;</a:t>
+            </a:r>
+            <a:r>
+              <a:rPr lang="en-US" sz="2000" dirty="0" err="1" smtClean="0"/>
+              <a:t>mpls</a:t>
+            </a:r>
+            <a:r>
+              <a:rPr lang="en-US" sz="2000" dirty="0" smtClean="0"/>
+              <a:t>	 (intersection of webservers &amp; </a:t>
+            </a:r>
+            <a:r>
+              <a:rPr lang="en-US" sz="2000" dirty="0" err="1" smtClean="0"/>
+              <a:t>mpls</a:t>
+            </a:r>
+            <a:r>
+              <a:rPr lang="en-US" sz="2000" dirty="0" smtClean="0"/>
+              <a:t>)</a:t>
+            </a:r>
+          </a:p>
+          <a:p>
+            <a:pPr marL="457200" lvl="1" indent="0">
+              <a:buNone/>
+            </a:pPr>
+            <a:r>
+              <a:rPr lang="en-US" sz="2000" dirty="0"/>
+              <a:t>w</a:t>
+            </a:r>
+            <a:r>
+              <a:rPr lang="en-US" sz="2000" dirty="0" smtClean="0"/>
+              <a:t>ebservers[1]		 (2</a:t>
+            </a:r>
+            <a:r>
+              <a:rPr lang="en-US" sz="2000" baseline="30000" dirty="0" smtClean="0"/>
+              <a:t>nd</a:t>
+            </a:r>
+            <a:r>
+              <a:rPr lang="en-US" sz="2000" dirty="0" smtClean="0"/>
+              <a:t> host listed in webservers group)</a:t>
+            </a:r>
+          </a:p>
+          <a:p>
+            <a:pPr marL="457200" lvl="1" indent="0">
+              <a:buNone/>
+            </a:pPr>
+            <a:endParaRPr lang="en-US" sz="2400" dirty="0" smtClean="0"/>
+          </a:p>
+        </p:txBody>
+      </p:sp>
+    </p:spTree>
+    <p:extLst>
+      <p:ext uri="{BB962C8B-B14F-4D97-AF65-F5344CB8AC3E}">
+        <p14:creationId xmlns:p14="http://schemas.microsoft.com/office/powerpoint/2010/main" val="555082523"/>
+      </p:ext>
+    </p:extLst>
+  </p:cSld>
+  <p:clrMapOvr>
+    <a:masterClrMapping/>
+  </p:clrMapOvr>
+</p:sld>
+</file>
+
+<file path=ppt/slides/slide24.xml><?xml version="1.0" encoding="utf-8"?>
+<p:sld xmlns:a="http://schemas.openxmlformats.org/drawingml/2006/main" xmlns:r="http://schemas.openxmlformats.org/officeDocument/2006/relationships" xmlns:p="http://schemas.openxmlformats.org/presentationml/2006/main">
+  <p:cSld>
+    <p:spTree>
+      <p:nvGrpSpPr>
+        <p:cNvPr id="1" name=""/>
+        <p:cNvGrpSpPr/>
+        <p:nvPr/>
+      </p:nvGrpSpPr>
+      <p:grpSpPr>
+        <a:xfrm>
+          <a:off x="0" y="0"/>
+          <a:ext cx="0" cy="0"/>
+          <a:chOff x="0" y="0"/>
+          <a:chExt cx="0" cy="0"/>
+        </a:xfrm>
+      </p:grpSpPr>
+      <p:sp>
+        <p:nvSpPr>
+          <p:cNvPr id="2" name="Title 1"/>
+          <p:cNvSpPr>
+            <a:spLocks noGrp="1"/>
+          </p:cNvSpPr>
+          <p:nvPr>
+            <p:ph type="title"/>
+          </p:nvPr>
+        </p:nvSpPr>
+        <p:spPr/>
+        <p:txBody>
+          <a:bodyPr/>
+          <a:lstStyle/>
+          <a:p>
+            <a:r>
+              <a:rPr lang="en-US" dirty="0" smtClean="0"/>
+              <a:t>Ad hoc commands</a:t>
+            </a:r>
+            <a:endParaRPr lang="en-US" dirty="0"/>
+          </a:p>
+        </p:txBody>
+      </p:sp>
+      <p:sp>
+        <p:nvSpPr>
+          <p:cNvPr id="3" name="Content Placeholder 2"/>
+          <p:cNvSpPr>
+            <a:spLocks noGrp="1"/>
+          </p:cNvSpPr>
+          <p:nvPr>
+            <p:ph idx="1"/>
+          </p:nvPr>
+        </p:nvSpPr>
+        <p:spPr/>
+        <p:txBody>
+          <a:bodyPr>
+            <a:normAutofit fontScale="85000" lnSpcReduction="20000"/>
+          </a:bodyPr>
+          <a:lstStyle/>
+          <a:p>
+            <a:r>
+              <a:rPr lang="en-US" dirty="0" err="1" smtClean="0"/>
+              <a:t>Ansible</a:t>
+            </a:r>
+            <a:r>
+              <a:rPr lang="en-US" dirty="0" smtClean="0"/>
+              <a:t> can be used to execute quick commands on hosts.</a:t>
+            </a:r>
+          </a:p>
+          <a:p>
+            <a:pPr lvl="1"/>
+            <a:r>
+              <a:rPr lang="en-US" dirty="0" smtClean="0"/>
+              <a:t>Used for very small tasks or testing.</a:t>
+            </a:r>
+          </a:p>
+          <a:p>
+            <a:pPr lvl="1"/>
+            <a:endParaRPr lang="en-US" dirty="0" smtClean="0"/>
+          </a:p>
+          <a:p>
+            <a:pPr marL="457200" lvl="1" indent="0">
+              <a:buNone/>
+            </a:pPr>
+            <a:r>
+              <a:rPr lang="en-US" sz="2000" dirty="0" smtClean="0"/>
+              <a:t>$ </a:t>
+            </a:r>
+            <a:r>
+              <a:rPr lang="en-US" sz="2000" dirty="0" err="1" smtClean="0"/>
+              <a:t>ansible</a:t>
+            </a:r>
+            <a:r>
+              <a:rPr lang="en-US" sz="2000" dirty="0" smtClean="0"/>
+              <a:t> –</a:t>
+            </a:r>
+            <a:r>
+              <a:rPr lang="en-US" sz="2000" dirty="0" err="1" smtClean="0"/>
+              <a:t>i</a:t>
+            </a:r>
+            <a:r>
+              <a:rPr lang="en-US" sz="2000" dirty="0" smtClean="0"/>
+              <a:t> hosts &lt;pattern&gt; -m &lt;</a:t>
+            </a:r>
+            <a:r>
+              <a:rPr lang="en-US" sz="2000" dirty="0" err="1" smtClean="0"/>
+              <a:t>module_name</a:t>
+            </a:r>
+            <a:r>
+              <a:rPr lang="en-US" sz="2000" dirty="0" smtClean="0"/>
+              <a:t>&gt; -a &lt;arguments&gt;</a:t>
+            </a:r>
+          </a:p>
+          <a:p>
+            <a:pPr marL="457200" lvl="1" indent="0">
+              <a:buNone/>
+            </a:pPr>
+            <a:endParaRPr lang="en-US" sz="2000" dirty="0"/>
+          </a:p>
+          <a:p>
+            <a:pPr marL="457200" lvl="1" indent="0">
+              <a:buNone/>
+            </a:pPr>
+            <a:r>
+              <a:rPr lang="en-US" sz="2000" dirty="0" smtClean="0"/>
+              <a:t>$ </a:t>
+            </a:r>
+            <a:r>
+              <a:rPr lang="en-US" sz="2000" dirty="0" err="1" smtClean="0"/>
+              <a:t>ansible</a:t>
+            </a:r>
+            <a:r>
+              <a:rPr lang="en-US" sz="2000" dirty="0" smtClean="0"/>
+              <a:t> –</a:t>
+            </a:r>
+            <a:r>
+              <a:rPr lang="en-US" sz="2000" dirty="0" err="1" smtClean="0"/>
+              <a:t>i</a:t>
+            </a:r>
+            <a:r>
+              <a:rPr lang="en-US" sz="2000" dirty="0" smtClean="0"/>
+              <a:t> hosts web1 command –a “uptime”</a:t>
+            </a:r>
+          </a:p>
+          <a:p>
+            <a:endParaRPr lang="en-US" sz="2400" dirty="0"/>
+          </a:p>
+          <a:p>
+            <a:r>
+              <a:rPr lang="en-US" sz="2400" dirty="0" smtClean="0"/>
+              <a:t>The </a:t>
+            </a:r>
+            <a:r>
+              <a:rPr lang="en-US" sz="2400" b="1" dirty="0" smtClean="0"/>
+              <a:t>command</a:t>
+            </a:r>
+            <a:r>
+              <a:rPr lang="en-US" sz="2400" dirty="0" smtClean="0"/>
+              <a:t> module is the default module, so we don’t have to specify it.</a:t>
+            </a:r>
+          </a:p>
+          <a:p>
+            <a:endParaRPr lang="en-US" sz="2400" dirty="0"/>
+          </a:p>
+          <a:p>
+            <a:pPr marL="457200" lvl="1" indent="0">
+              <a:buNone/>
+            </a:pPr>
+            <a:r>
+              <a:rPr lang="en-US" sz="2000" dirty="0" smtClean="0"/>
+              <a:t>$ </a:t>
+            </a:r>
+            <a:r>
+              <a:rPr lang="en-US" sz="2000" dirty="0" err="1" smtClean="0"/>
+              <a:t>ansible</a:t>
+            </a:r>
+            <a:r>
+              <a:rPr lang="en-US" sz="2000" dirty="0" smtClean="0"/>
+              <a:t> –</a:t>
+            </a:r>
+            <a:r>
+              <a:rPr lang="en-US" sz="2000" dirty="0" err="1" smtClean="0"/>
+              <a:t>i</a:t>
+            </a:r>
+            <a:r>
+              <a:rPr lang="en-US" sz="2000" dirty="0" smtClean="0"/>
+              <a:t> hosts web1 –a “tail /</a:t>
+            </a:r>
+            <a:r>
+              <a:rPr lang="en-US" sz="2000" dirty="0" err="1" smtClean="0"/>
+              <a:t>var</a:t>
+            </a:r>
+            <a:r>
+              <a:rPr lang="en-US" sz="2000" dirty="0" smtClean="0"/>
+              <a:t>/log/boot” –u </a:t>
+            </a:r>
+            <a:r>
+              <a:rPr lang="en-US" sz="2000" dirty="0" err="1" smtClean="0"/>
+              <a:t>sudo</a:t>
+            </a:r>
+            <a:endParaRPr lang="en-US" sz="2000" dirty="0" smtClean="0"/>
+          </a:p>
+          <a:p>
+            <a:pPr lvl="1"/>
+            <a:endParaRPr lang="en-US" sz="2000" dirty="0"/>
+          </a:p>
+          <a:p>
+            <a:r>
+              <a:rPr lang="en-US" sz="2400" dirty="0" err="1" smtClean="0"/>
+              <a:t>Ansible</a:t>
+            </a:r>
+            <a:r>
+              <a:rPr lang="en-US" sz="2400" dirty="0" smtClean="0"/>
+              <a:t> will execute the command as the user specified by the –u option.</a:t>
+            </a:r>
+            <a:endParaRPr lang="en-US" sz="2400" dirty="0"/>
+          </a:p>
+        </p:txBody>
+      </p:sp>
+    </p:spTree>
+    <p:extLst>
+      <p:ext uri="{BB962C8B-B14F-4D97-AF65-F5344CB8AC3E}">
+        <p14:creationId xmlns:p14="http://schemas.microsoft.com/office/powerpoint/2010/main" val="1378567233"/>
+      </p:ext>
+    </p:extLst>
+  </p:cSld>
+  <p:clrMapOvr>
+    <a:masterClrMapping/>
+  </p:clrMapOvr>
+</p:sld>
+</file>
+
+<file path=ppt/slides/slide25.xml><?xml version="1.0" encoding="utf-8"?>
+<p:sld xmlns:a="http://schemas.openxmlformats.org/drawingml/2006/main" xmlns:r="http://schemas.openxmlformats.org/officeDocument/2006/relationships" xmlns:p="http://schemas.openxmlformats.org/presentationml/2006/main">
+  <p:cSld>
+    <p:spTree>
+      <p:nvGrpSpPr>
+        <p:cNvPr id="1" name=""/>
+        <p:cNvGrpSpPr/>
+        <p:nvPr/>
+      </p:nvGrpSpPr>
+      <p:grpSpPr>
+        <a:xfrm>
+          <a:off x="0" y="0"/>
+          <a:ext cx="0" cy="0"/>
+          <a:chOff x="0" y="0"/>
+          <a:chExt cx="0" cy="0"/>
+        </a:xfrm>
+      </p:grpSpPr>
+      <p:sp>
+        <p:nvSpPr>
+          <p:cNvPr id="2" name="Title 1"/>
+          <p:cNvSpPr>
+            <a:spLocks noGrp="1"/>
+          </p:cNvSpPr>
+          <p:nvPr>
+            <p:ph type="title"/>
+          </p:nvPr>
+        </p:nvSpPr>
+        <p:spPr/>
+        <p:txBody>
+          <a:bodyPr/>
+          <a:lstStyle/>
+          <a:p>
+            <a:r>
+              <a:rPr lang="en-US" dirty="0" smtClean="0"/>
+              <a:t>Ad hoc commands</a:t>
+            </a:r>
+            <a:endParaRPr lang="en-US" dirty="0"/>
+          </a:p>
+        </p:txBody>
+      </p:sp>
+      <p:sp>
+        <p:nvSpPr>
+          <p:cNvPr id="3" name="Content Placeholder 2"/>
+          <p:cNvSpPr>
+            <a:spLocks noGrp="1"/>
+          </p:cNvSpPr>
+          <p:nvPr>
+            <p:ph idx="1"/>
+          </p:nvPr>
+        </p:nvSpPr>
+        <p:spPr/>
+        <p:txBody>
+          <a:bodyPr>
+            <a:normAutofit fontScale="85000" lnSpcReduction="20000"/>
+          </a:bodyPr>
+          <a:lstStyle/>
+          <a:p>
+            <a:r>
+              <a:rPr lang="en-US" dirty="0" smtClean="0"/>
+              <a:t>Copy files to a group of servers using </a:t>
+            </a:r>
+            <a:r>
+              <a:rPr lang="en-US" b="1" dirty="0" smtClean="0"/>
+              <a:t>copy</a:t>
+            </a:r>
+            <a:r>
+              <a:rPr lang="en-US" dirty="0" smtClean="0"/>
+              <a:t> module:</a:t>
+            </a:r>
+          </a:p>
+          <a:p>
+            <a:endParaRPr lang="en-US" dirty="0" smtClean="0"/>
+          </a:p>
+          <a:p>
+            <a:pPr marL="457200" lvl="1" indent="0">
+              <a:buNone/>
+            </a:pPr>
+            <a:r>
+              <a:rPr lang="en-US" sz="1900" dirty="0" smtClean="0"/>
+              <a:t>$ </a:t>
+            </a:r>
+            <a:r>
+              <a:rPr lang="en-US" sz="1900" dirty="0" err="1" smtClean="0"/>
+              <a:t>ansible</a:t>
+            </a:r>
+            <a:r>
+              <a:rPr lang="en-US" sz="1900" dirty="0" smtClean="0"/>
+              <a:t> –</a:t>
+            </a:r>
+            <a:r>
+              <a:rPr lang="en-US" sz="1900" dirty="0" err="1" smtClean="0"/>
+              <a:t>i</a:t>
+            </a:r>
+            <a:r>
+              <a:rPr lang="en-US" sz="1900" dirty="0" smtClean="0"/>
+              <a:t> hosts </a:t>
+            </a:r>
+            <a:r>
+              <a:rPr lang="en-US" sz="1900" dirty="0" err="1" smtClean="0"/>
+              <a:t>minneapolis</a:t>
+            </a:r>
+            <a:r>
+              <a:rPr lang="en-US" sz="1900" dirty="0" smtClean="0"/>
+              <a:t> –m copy –a “</a:t>
+            </a:r>
+            <a:r>
+              <a:rPr lang="en-US" sz="1900" dirty="0" err="1" smtClean="0"/>
+              <a:t>src</a:t>
+            </a:r>
+            <a:r>
+              <a:rPr lang="en-US" sz="1900" dirty="0" smtClean="0"/>
+              <a:t>=~/</a:t>
+            </a:r>
+            <a:r>
+              <a:rPr lang="en-US" sz="1900" dirty="0" err="1" smtClean="0"/>
+              <a:t>archive.zip</a:t>
+            </a:r>
+            <a:r>
+              <a:rPr lang="en-US" sz="1900" dirty="0" smtClean="0"/>
+              <a:t> </a:t>
+            </a:r>
+            <a:r>
+              <a:rPr lang="en-US" sz="1900" dirty="0" err="1" smtClean="0"/>
+              <a:t>dest</a:t>
+            </a:r>
+            <a:r>
+              <a:rPr lang="en-US" sz="1900" dirty="0" smtClean="0"/>
+              <a:t>=/</a:t>
+            </a:r>
+            <a:r>
+              <a:rPr lang="en-US" sz="1900" dirty="0" err="1" smtClean="0"/>
+              <a:t>var</a:t>
+            </a:r>
+            <a:r>
+              <a:rPr lang="en-US" sz="1900" dirty="0" smtClean="0"/>
+              <a:t>/www/</a:t>
+            </a:r>
+            <a:r>
+              <a:rPr lang="en-US" sz="1900" dirty="0" err="1" smtClean="0"/>
+              <a:t>archive.zip</a:t>
+            </a:r>
+            <a:r>
+              <a:rPr lang="en-US" sz="1900" dirty="0" smtClean="0"/>
+              <a:t>”</a:t>
+            </a:r>
+          </a:p>
+          <a:p>
+            <a:pPr lvl="1"/>
+            <a:endParaRPr lang="en-US" dirty="0"/>
+          </a:p>
+          <a:p>
+            <a:r>
+              <a:rPr lang="en-US" dirty="0" smtClean="0"/>
+              <a:t>Create and delete a directory using </a:t>
+            </a:r>
+            <a:r>
+              <a:rPr lang="en-US" b="1" dirty="0" smtClean="0"/>
+              <a:t>file</a:t>
+            </a:r>
+            <a:r>
+              <a:rPr lang="en-US" dirty="0" smtClean="0"/>
+              <a:t> module:</a:t>
+            </a:r>
+          </a:p>
+          <a:p>
+            <a:endParaRPr lang="en-US" dirty="0" smtClean="0"/>
+          </a:p>
+          <a:p>
+            <a:pPr marL="457200" lvl="1" indent="0">
+              <a:buNone/>
+            </a:pPr>
+            <a:r>
+              <a:rPr lang="en-US" sz="1900" dirty="0" smtClean="0"/>
+              <a:t>$ </a:t>
+            </a:r>
+            <a:r>
+              <a:rPr lang="en-US" sz="1900" dirty="0" err="1" smtClean="0"/>
+              <a:t>ansible</a:t>
+            </a:r>
+            <a:r>
+              <a:rPr lang="en-US" sz="1900" dirty="0" smtClean="0"/>
+              <a:t> –</a:t>
+            </a:r>
+            <a:r>
+              <a:rPr lang="en-US" sz="1900" dirty="0" err="1" smtClean="0"/>
+              <a:t>i</a:t>
+            </a:r>
+            <a:r>
+              <a:rPr lang="en-US" sz="1900" dirty="0" smtClean="0"/>
+              <a:t> hosts webservers -m file –a “</a:t>
+            </a:r>
+            <a:r>
+              <a:rPr lang="en-US" sz="1900" dirty="0" err="1" smtClean="0"/>
+              <a:t>dest</a:t>
+            </a:r>
+            <a:r>
+              <a:rPr lang="en-US" sz="1900" dirty="0" smtClean="0"/>
+              <a:t>=/path/to/files mode=755 state=directory”</a:t>
+            </a:r>
+          </a:p>
+          <a:p>
+            <a:pPr marL="457200" lvl="1" indent="0">
+              <a:buNone/>
+            </a:pPr>
+            <a:r>
+              <a:rPr lang="en-US" sz="1900" dirty="0" smtClean="0"/>
+              <a:t>$ </a:t>
+            </a:r>
+            <a:r>
+              <a:rPr lang="en-US" sz="1900" dirty="0" err="1" smtClean="0"/>
+              <a:t>ansible</a:t>
+            </a:r>
+            <a:r>
+              <a:rPr lang="en-US" sz="1900" dirty="0" smtClean="0"/>
+              <a:t> –</a:t>
+            </a:r>
+            <a:r>
+              <a:rPr lang="en-US" sz="1900" dirty="0" err="1" smtClean="0"/>
+              <a:t>i</a:t>
+            </a:r>
+            <a:r>
+              <a:rPr lang="en-US" sz="1900" dirty="0" smtClean="0"/>
+              <a:t> hosts webservers –m file –a “</a:t>
+            </a:r>
+            <a:r>
+              <a:rPr lang="en-US" sz="1900" dirty="0" err="1" smtClean="0"/>
+              <a:t>dest</a:t>
+            </a:r>
+            <a:r>
+              <a:rPr lang="en-US" sz="1900" dirty="0" smtClean="0"/>
+              <a:t>=/path/to/files state=absent”</a:t>
+            </a:r>
+          </a:p>
+          <a:p>
+            <a:endParaRPr lang="en-US" dirty="0"/>
+          </a:p>
+          <a:p>
+            <a:r>
+              <a:rPr lang="en-US" dirty="0" smtClean="0"/>
+              <a:t>Install a software package using </a:t>
+            </a:r>
+            <a:r>
+              <a:rPr lang="en-US" b="1" dirty="0" smtClean="0"/>
+              <a:t>yum</a:t>
+            </a:r>
+            <a:r>
+              <a:rPr lang="en-US" dirty="0" smtClean="0"/>
+              <a:t> module:</a:t>
+            </a:r>
+          </a:p>
+          <a:p>
+            <a:endParaRPr lang="en-US" dirty="0" smtClean="0"/>
+          </a:p>
+          <a:p>
+            <a:pPr marL="457200" lvl="1" indent="0">
+              <a:buNone/>
+            </a:pPr>
+            <a:r>
+              <a:rPr lang="en-US" sz="1900" dirty="0" smtClean="0"/>
+              <a:t>$ </a:t>
+            </a:r>
+            <a:r>
+              <a:rPr lang="en-US" sz="1900" dirty="0" err="1" smtClean="0"/>
+              <a:t>ansible</a:t>
+            </a:r>
+            <a:r>
+              <a:rPr lang="en-US" sz="1900" dirty="0" smtClean="0"/>
+              <a:t> –</a:t>
+            </a:r>
+            <a:r>
+              <a:rPr lang="en-US" sz="1900" dirty="0" err="1" smtClean="0"/>
+              <a:t>i</a:t>
+            </a:r>
+            <a:r>
+              <a:rPr lang="en-US" sz="1900" dirty="0" smtClean="0"/>
+              <a:t> hosts </a:t>
+            </a:r>
+            <a:r>
+              <a:rPr lang="en-US" sz="1900" dirty="0" err="1" smtClean="0"/>
+              <a:t>dbserver</a:t>
+            </a:r>
+            <a:r>
+              <a:rPr lang="en-US" sz="1900" dirty="0" smtClean="0"/>
+              <a:t> –m yum –a “name=</a:t>
+            </a:r>
+            <a:r>
+              <a:rPr lang="en-US" sz="1900" dirty="0" err="1" smtClean="0"/>
+              <a:t>mysql</a:t>
+            </a:r>
+            <a:r>
+              <a:rPr lang="en-US" sz="1900" dirty="0" smtClean="0"/>
+              <a:t> state=present”</a:t>
+            </a:r>
+          </a:p>
+          <a:p>
+            <a:endParaRPr lang="en-US" dirty="0"/>
+          </a:p>
+        </p:txBody>
+      </p:sp>
+    </p:spTree>
+    <p:extLst>
+      <p:ext uri="{BB962C8B-B14F-4D97-AF65-F5344CB8AC3E}">
+        <p14:creationId xmlns:p14="http://schemas.microsoft.com/office/powerpoint/2010/main" val="722358187"/>
+      </p:ext>
+    </p:extLst>
+  </p:cSld>
+  <p:clrMapOvr>
+    <a:masterClrMapping/>
+  </p:clrMapOvr>
+</p:sld>
+</file>
+
+<file path=ppt/slides/slide26.xml><?xml version="1.0" encoding="utf-8"?>
+<p:sld xmlns:a="http://schemas.openxmlformats.org/drawingml/2006/main" xmlns:r="http://schemas.openxmlformats.org/officeDocument/2006/relationships" xmlns:p="http://schemas.openxmlformats.org/presentationml/2006/main">
+  <p:cSld>
+    <p:spTree>
+      <p:nvGrpSpPr>
+        <p:cNvPr id="1" name=""/>
+        <p:cNvGrpSpPr/>
+        <p:nvPr/>
+      </p:nvGrpSpPr>
+      <p:grpSpPr>
+        <a:xfrm>
+          <a:off x="0" y="0"/>
+          <a:ext cx="0" cy="0"/>
+          <a:chOff x="0" y="0"/>
+          <a:chExt cx="0" cy="0"/>
+        </a:xfrm>
+      </p:grpSpPr>
+      <p:sp>
+        <p:nvSpPr>
+          <p:cNvPr id="2" name="Title 1"/>
+          <p:cNvSpPr>
+            <a:spLocks noGrp="1"/>
+          </p:cNvSpPr>
+          <p:nvPr>
+            <p:ph type="title"/>
+          </p:nvPr>
+        </p:nvSpPr>
+        <p:spPr/>
+        <p:txBody>
+          <a:bodyPr/>
+          <a:lstStyle/>
+          <a:p>
+            <a:r>
+              <a:rPr lang="en-US" dirty="0" smtClean="0"/>
+              <a:t>Ad hoc commands</a:t>
+            </a:r>
+            <a:endParaRPr lang="en-US" dirty="0"/>
+          </a:p>
+        </p:txBody>
+      </p:sp>
+      <p:sp>
+        <p:nvSpPr>
+          <p:cNvPr id="3" name="Content Placeholder 2"/>
+          <p:cNvSpPr>
+            <a:spLocks noGrp="1"/>
+          </p:cNvSpPr>
+          <p:nvPr>
+            <p:ph idx="1"/>
+          </p:nvPr>
+        </p:nvSpPr>
+        <p:spPr/>
+        <p:txBody>
+          <a:bodyPr>
+            <a:normAutofit fontScale="70000" lnSpcReduction="20000"/>
+          </a:bodyPr>
+          <a:lstStyle/>
+          <a:p>
+            <a:r>
+              <a:rPr lang="en-US" dirty="0" smtClean="0"/>
+              <a:t>Create and remove user accounts with </a:t>
+            </a:r>
+            <a:r>
+              <a:rPr lang="en-US" b="1" dirty="0" smtClean="0"/>
+              <a:t>user</a:t>
+            </a:r>
+            <a:r>
+              <a:rPr lang="en-US" dirty="0" smtClean="0"/>
+              <a:t> module:</a:t>
+            </a:r>
+          </a:p>
+          <a:p>
+            <a:endParaRPr lang="en-US" dirty="0" smtClean="0"/>
+          </a:p>
+          <a:p>
+            <a:pPr marL="457200" lvl="1" indent="0">
+              <a:buNone/>
+            </a:pPr>
+            <a:r>
+              <a:rPr lang="en-US" sz="1900" dirty="0" smtClean="0"/>
+              <a:t>$ </a:t>
+            </a:r>
+            <a:r>
+              <a:rPr lang="en-US" sz="1900" dirty="0" err="1" smtClean="0"/>
+              <a:t>ansible</a:t>
+            </a:r>
+            <a:r>
+              <a:rPr lang="en-US" sz="1900" dirty="0" smtClean="0"/>
+              <a:t> –</a:t>
+            </a:r>
+            <a:r>
+              <a:rPr lang="en-US" sz="1900" dirty="0" err="1" smtClean="0"/>
+              <a:t>i</a:t>
+            </a:r>
+            <a:r>
+              <a:rPr lang="en-US" sz="1900" dirty="0" smtClean="0"/>
+              <a:t> hosts web1 -m user –a “name=</a:t>
+            </a:r>
+            <a:r>
+              <a:rPr lang="en-US" sz="1900" dirty="0" err="1" smtClean="0"/>
+              <a:t>jason</a:t>
+            </a:r>
+            <a:r>
+              <a:rPr lang="en-US" sz="1900" dirty="0" smtClean="0"/>
+              <a:t> password=&lt;</a:t>
+            </a:r>
+            <a:r>
+              <a:rPr lang="en-US" sz="1900" dirty="0" err="1" smtClean="0"/>
+              <a:t>crypted</a:t>
+            </a:r>
+            <a:r>
+              <a:rPr lang="en-US" sz="1900" dirty="0" smtClean="0"/>
+              <a:t> password&gt;”</a:t>
+            </a:r>
+          </a:p>
+          <a:p>
+            <a:pPr marL="457200" lvl="1" indent="0">
+              <a:buNone/>
+            </a:pPr>
+            <a:r>
+              <a:rPr lang="en-US" sz="1900" dirty="0" smtClean="0"/>
+              <a:t>$ </a:t>
+            </a:r>
+            <a:r>
+              <a:rPr lang="en-US" sz="1900" dirty="0" err="1" smtClean="0"/>
+              <a:t>ansible</a:t>
+            </a:r>
+            <a:r>
+              <a:rPr lang="en-US" sz="1900" dirty="0" smtClean="0"/>
+              <a:t> –</a:t>
+            </a:r>
+            <a:r>
+              <a:rPr lang="en-US" sz="1900" dirty="0" err="1" smtClean="0"/>
+              <a:t>i</a:t>
+            </a:r>
+            <a:r>
+              <a:rPr lang="en-US" sz="1900" dirty="0" smtClean="0"/>
+              <a:t> hosts web1 -m user –a “name=</a:t>
+            </a:r>
+            <a:r>
+              <a:rPr lang="en-US" sz="1900" dirty="0" err="1" smtClean="0"/>
+              <a:t>jason</a:t>
+            </a:r>
+            <a:r>
+              <a:rPr lang="en-US" sz="1900" dirty="0" smtClean="0"/>
+              <a:t> state=absent”</a:t>
+            </a:r>
+          </a:p>
+          <a:p>
+            <a:pPr lvl="1"/>
+            <a:endParaRPr lang="en-US" dirty="0"/>
+          </a:p>
+          <a:p>
+            <a:r>
+              <a:rPr lang="en-US" dirty="0" smtClean="0"/>
+              <a:t>Manage services using </a:t>
+            </a:r>
+            <a:r>
+              <a:rPr lang="en-US" b="1" dirty="0" smtClean="0"/>
+              <a:t>service </a:t>
+            </a:r>
+            <a:r>
+              <a:rPr lang="en-US" dirty="0" smtClean="0"/>
+              <a:t>module:</a:t>
+            </a:r>
+          </a:p>
+          <a:p>
+            <a:endParaRPr lang="en-US" dirty="0" smtClean="0"/>
+          </a:p>
+          <a:p>
+            <a:pPr marL="457200" lvl="1" indent="0">
+              <a:buNone/>
+            </a:pPr>
+            <a:r>
+              <a:rPr lang="en-US" sz="1900" dirty="0" smtClean="0"/>
+              <a:t>$ </a:t>
+            </a:r>
+            <a:r>
+              <a:rPr lang="en-US" sz="1900" dirty="0" err="1" smtClean="0"/>
+              <a:t>ansible</a:t>
+            </a:r>
+            <a:r>
+              <a:rPr lang="en-US" sz="1900" dirty="0" smtClean="0"/>
+              <a:t> –</a:t>
+            </a:r>
+            <a:r>
+              <a:rPr lang="en-US" sz="1900" dirty="0" err="1" smtClean="0"/>
+              <a:t>i</a:t>
+            </a:r>
+            <a:r>
+              <a:rPr lang="en-US" sz="1900" dirty="0" smtClean="0"/>
+              <a:t> hosts webservers -m service –a “name=</a:t>
+            </a:r>
+            <a:r>
+              <a:rPr lang="en-US" sz="1900" dirty="0" err="1" smtClean="0"/>
+              <a:t>httpd</a:t>
+            </a:r>
+            <a:r>
+              <a:rPr lang="en-US" sz="1900" dirty="0" smtClean="0"/>
+              <a:t> state=started”</a:t>
+            </a:r>
+          </a:p>
+          <a:p>
+            <a:pPr marL="457200" lvl="1" indent="0">
+              <a:buNone/>
+            </a:pPr>
+            <a:r>
+              <a:rPr lang="en-US" sz="1900" dirty="0" smtClean="0"/>
+              <a:t>$ </a:t>
+            </a:r>
+            <a:r>
+              <a:rPr lang="en-US" sz="1900" dirty="0" err="1" smtClean="0"/>
+              <a:t>ansible</a:t>
+            </a:r>
+            <a:r>
+              <a:rPr lang="en-US" sz="1900" dirty="0" smtClean="0"/>
+              <a:t> –</a:t>
+            </a:r>
+            <a:r>
+              <a:rPr lang="en-US" sz="1900" dirty="0" err="1" smtClean="0"/>
+              <a:t>i</a:t>
+            </a:r>
+            <a:r>
+              <a:rPr lang="en-US" sz="1900" dirty="0" smtClean="0"/>
+              <a:t> hosts webservers –m service –a “name=</a:t>
+            </a:r>
+            <a:r>
+              <a:rPr lang="en-US" sz="1900" dirty="0" err="1" smtClean="0"/>
+              <a:t>httpd</a:t>
+            </a:r>
+            <a:r>
+              <a:rPr lang="en-US" sz="1900" dirty="0" smtClean="0"/>
+              <a:t> state=restarted”</a:t>
+            </a:r>
+          </a:p>
+          <a:p>
+            <a:endParaRPr lang="en-US" dirty="0"/>
+          </a:p>
+          <a:p>
+            <a:r>
+              <a:rPr lang="en-US" dirty="0" smtClean="0"/>
+              <a:t>Facts represent a set of values which describe the configuration of a system. Gather facts using the </a:t>
+            </a:r>
+            <a:r>
+              <a:rPr lang="en-US" b="1" dirty="0" smtClean="0"/>
+              <a:t>setup</a:t>
+            </a:r>
+            <a:r>
+              <a:rPr lang="en-US" dirty="0" smtClean="0"/>
+              <a:t> module:</a:t>
+            </a:r>
+          </a:p>
+          <a:p>
+            <a:endParaRPr lang="en-US" dirty="0" smtClean="0"/>
+          </a:p>
+          <a:p>
+            <a:pPr marL="457200" lvl="1" indent="0">
+              <a:buNone/>
+            </a:pPr>
+            <a:r>
+              <a:rPr lang="en-US" sz="1900" dirty="0" smtClean="0"/>
+              <a:t>$ </a:t>
+            </a:r>
+            <a:r>
+              <a:rPr lang="en-US" sz="1900" dirty="0" err="1" smtClean="0"/>
+              <a:t>ansible</a:t>
+            </a:r>
+            <a:r>
+              <a:rPr lang="en-US" sz="1900" dirty="0" smtClean="0"/>
+              <a:t> –</a:t>
+            </a:r>
+            <a:r>
+              <a:rPr lang="en-US" sz="1900" dirty="0" err="1" smtClean="0"/>
+              <a:t>i</a:t>
+            </a:r>
+            <a:r>
+              <a:rPr lang="en-US" sz="1900" dirty="0" smtClean="0"/>
+              <a:t> hosts web1 –m setup</a:t>
+            </a:r>
+          </a:p>
+          <a:p>
+            <a:endParaRPr lang="en-US" dirty="0"/>
+          </a:p>
+        </p:txBody>
+      </p:sp>
+    </p:spTree>
+    <p:extLst>
+      <p:ext uri="{BB962C8B-B14F-4D97-AF65-F5344CB8AC3E}">
+        <p14:creationId xmlns:p14="http://schemas.microsoft.com/office/powerpoint/2010/main" val="1532509081"/>
+      </p:ext>
+    </p:extLst>
+  </p:cSld>
+  <p:clrMapOvr>
+    <a:masterClrMapping/>
+  </p:clrMapOvr>
+</p:sld>
+</file>
+
+<file path=ppt/slides/slide27.xml><?xml version="1.0" encoding="utf-8"?>
+<p:sld xmlns:a="http://schemas.openxmlformats.org/drawingml/2006/main" xmlns:r="http://schemas.openxmlformats.org/officeDocument/2006/relationships" xmlns:p="http://schemas.openxmlformats.org/presentationml/2006/main">
+  <p:cSld>
+    <p:spTree>
+      <p:nvGrpSpPr>
+        <p:cNvPr id="1" name=""/>
+        <p:cNvGrpSpPr/>
+        <p:nvPr/>
+      </p:nvGrpSpPr>
+      <p:grpSpPr>
+        <a:xfrm>
+          <a:off x="0" y="0"/>
+          <a:ext cx="0" cy="0"/>
+          <a:chOff x="0" y="0"/>
+          <a:chExt cx="0" cy="0"/>
+        </a:xfrm>
+      </p:grpSpPr>
+      <p:sp>
+        <p:nvSpPr>
+          <p:cNvPr id="2" name="Title 1"/>
+          <p:cNvSpPr>
+            <a:spLocks noGrp="1"/>
+          </p:cNvSpPr>
+          <p:nvPr>
+            <p:ph type="title"/>
+          </p:nvPr>
+        </p:nvSpPr>
+        <p:spPr/>
+        <p:txBody>
+          <a:bodyPr>
+            <a:normAutofit/>
+          </a:bodyPr>
+          <a:lstStyle/>
+          <a:p>
+            <a:r>
+              <a:rPr lang="en-US" dirty="0" smtClean="0"/>
+              <a:t>Homework</a:t>
+            </a:r>
+            <a:endParaRPr lang="en-US" dirty="0"/>
+          </a:p>
+        </p:txBody>
+      </p:sp>
+      <p:sp>
+        <p:nvSpPr>
+          <p:cNvPr id="3" name="Content Placeholder 2"/>
+          <p:cNvSpPr>
+            <a:spLocks noGrp="1"/>
+          </p:cNvSpPr>
+          <p:nvPr>
+            <p:ph idx="1"/>
+          </p:nvPr>
+        </p:nvSpPr>
+        <p:spPr>
+          <a:xfrm>
+            <a:off x="457200" y="1600200"/>
+            <a:ext cx="8229600" cy="4920629"/>
+          </a:xfrm>
+        </p:spPr>
+        <p:txBody>
+          <a:bodyPr>
+            <a:normAutofit/>
+          </a:bodyPr>
+          <a:lstStyle/>
+          <a:p>
+            <a:r>
+              <a:rPr lang="en-US" dirty="0" smtClean="0"/>
+              <a:t>Assignment </a:t>
+            </a:r>
+            <a:r>
+              <a:rPr lang="en-US" dirty="0"/>
+              <a:t>8</a:t>
+            </a:r>
+            <a:endParaRPr lang="en-US" dirty="0" smtClean="0"/>
+          </a:p>
+          <a:p>
+            <a:r>
+              <a:rPr lang="en-US" dirty="0" smtClean="0"/>
+              <a:t>Read</a:t>
+            </a:r>
+            <a:r>
+              <a:rPr lang="en-US" i="1" dirty="0" smtClean="0"/>
+              <a:t> Infrastructure as Code </a:t>
+            </a:r>
+            <a:r>
+              <a:rPr lang="en-US" smtClean="0"/>
+              <a:t>Chapters</a:t>
+            </a:r>
+            <a:r>
+              <a:rPr lang="en-US" i="1" smtClean="0"/>
+              <a:t> 9 &amp; 10</a:t>
+            </a:r>
+            <a:endParaRPr lang="en-US" dirty="0"/>
+          </a:p>
+          <a:p>
+            <a:endParaRPr lang="en-US" dirty="0" smtClean="0"/>
+          </a:p>
+        </p:txBody>
+      </p:sp>
+    </p:spTree>
+    <p:extLst>
+      <p:ext uri="{BB962C8B-B14F-4D97-AF65-F5344CB8AC3E}">
+        <p14:creationId xmlns:p14="http://schemas.microsoft.com/office/powerpoint/2010/main" val="2135093818"/>
       </p:ext>
     </p:extLst>
   </p:cSld>

</xml_diff>

<commit_message>
update week 10 lecture and assignment 9
</commit_message>
<xml_diff>
--- a/lectures/infrastructure-week-10.pptx
+++ b/lectures/infrastructure-week-10.pptx
@@ -5,7 +5,7 @@
     <p:sldMasterId id="2147483648" r:id="rId1"/>
   </p:sldMasterIdLst>
   <p:notesMasterIdLst>
-    <p:notesMasterId r:id="rId59"/>
+    <p:notesMasterId r:id="rId61"/>
   </p:notesMasterIdLst>
   <p:sldIdLst>
     <p:sldId id="256" r:id="rId2"/>
@@ -64,7 +64,9 @@
     <p:sldId id="312" r:id="rId55"/>
     <p:sldId id="313" r:id="rId56"/>
     <p:sldId id="315" r:id="rId57"/>
-    <p:sldId id="258" r:id="rId58"/>
+    <p:sldId id="316" r:id="rId58"/>
+    <p:sldId id="317" r:id="rId59"/>
+    <p:sldId id="258" r:id="rId60"/>
   </p:sldIdLst>
   <p:sldSz cx="9144000" cy="6858000" type="screen4x3"/>
   <p:notesSz cx="6858000" cy="9144000"/>
@@ -17765,6 +17767,221 @@
 </file>
 
 <file path=ppt/slides/slide57.xml><?xml version="1.0" encoding="utf-8"?>
+<p:sld xmlns:a="http://schemas.openxmlformats.org/drawingml/2006/main" xmlns:r="http://schemas.openxmlformats.org/officeDocument/2006/relationships" xmlns:p="http://schemas.openxmlformats.org/presentationml/2006/main">
+  <p:cSld>
+    <p:spTree>
+      <p:nvGrpSpPr>
+        <p:cNvPr id="1" name=""/>
+        <p:cNvGrpSpPr/>
+        <p:nvPr/>
+      </p:nvGrpSpPr>
+      <p:grpSpPr>
+        <a:xfrm>
+          <a:off x="0" y="0"/>
+          <a:ext cx="0" cy="0"/>
+          <a:chOff x="0" y="0"/>
+          <a:chExt cx="0" cy="0"/>
+        </a:xfrm>
+      </p:grpSpPr>
+      <p:pic>
+        <p:nvPicPr>
+          <p:cNvPr id="5" name="Picture 4"/>
+          <p:cNvPicPr>
+            <a:picLocks noChangeAspect="1"/>
+          </p:cNvPicPr>
+          <p:nvPr/>
+        </p:nvPicPr>
+        <p:blipFill>
+          <a:blip r:embed="rId2">
+            <a:extLst>
+              <a:ext uri="{28A0092B-C50C-407E-A947-70E740481C1C}">
+                <a14:useLocalDpi xmlns:a14="http://schemas.microsoft.com/office/drawing/2010/main" val="0"/>
+              </a:ext>
+            </a:extLst>
+          </a:blip>
+          <a:stretch>
+            <a:fillRect/>
+          </a:stretch>
+        </p:blipFill>
+        <p:spPr>
+          <a:xfrm>
+            <a:off x="964504" y="1091886"/>
+            <a:ext cx="6976998" cy="5766114"/>
+          </a:xfrm>
+          <a:prstGeom prst="rect">
+            <a:avLst/>
+          </a:prstGeom>
+        </p:spPr>
+      </p:pic>
+      <p:sp>
+        <p:nvSpPr>
+          <p:cNvPr id="2" name="Title 1"/>
+          <p:cNvSpPr>
+            <a:spLocks noGrp="1"/>
+          </p:cNvSpPr>
+          <p:nvPr>
+            <p:ph type="title"/>
+          </p:nvPr>
+        </p:nvSpPr>
+        <p:spPr/>
+        <p:txBody>
+          <a:bodyPr/>
+          <a:lstStyle/>
+          <a:p>
+            <a:r>
+              <a:rPr lang="en-US" dirty="0" smtClean="0"/>
+              <a:t>Putting it all together</a:t>
+            </a:r>
+            <a:endParaRPr lang="en-US" dirty="0"/>
+          </a:p>
+        </p:txBody>
+      </p:sp>
+    </p:spTree>
+    <p:extLst>
+      <p:ext uri="{BB962C8B-B14F-4D97-AF65-F5344CB8AC3E}">
+        <p14:creationId xmlns:p14="http://schemas.microsoft.com/office/powerpoint/2010/main" val="266513098"/>
+      </p:ext>
+    </p:extLst>
+  </p:cSld>
+  <p:clrMapOvr>
+    <a:masterClrMapping/>
+  </p:clrMapOvr>
+</p:sld>
+</file>
+
+<file path=ppt/slides/slide58.xml><?xml version="1.0" encoding="utf-8"?>
+<p:sld xmlns:a="http://schemas.openxmlformats.org/drawingml/2006/main" xmlns:r="http://schemas.openxmlformats.org/officeDocument/2006/relationships" xmlns:p="http://schemas.openxmlformats.org/presentationml/2006/main">
+  <p:cSld>
+    <p:spTree>
+      <p:nvGrpSpPr>
+        <p:cNvPr id="1" name=""/>
+        <p:cNvGrpSpPr/>
+        <p:nvPr/>
+      </p:nvGrpSpPr>
+      <p:grpSpPr>
+        <a:xfrm>
+          <a:off x="0" y="0"/>
+          <a:ext cx="0" cy="0"/>
+          <a:chOff x="0" y="0"/>
+          <a:chExt cx="0" cy="0"/>
+        </a:xfrm>
+      </p:grpSpPr>
+      <p:sp>
+        <p:nvSpPr>
+          <p:cNvPr id="2" name="Title 1"/>
+          <p:cNvSpPr>
+            <a:spLocks noGrp="1"/>
+          </p:cNvSpPr>
+          <p:nvPr>
+            <p:ph type="title"/>
+          </p:nvPr>
+        </p:nvSpPr>
+        <p:spPr/>
+        <p:txBody>
+          <a:bodyPr/>
+          <a:lstStyle/>
+          <a:p>
+            <a:r>
+              <a:rPr lang="en-US" dirty="0" smtClean="0"/>
+              <a:t>Resources</a:t>
+            </a:r>
+            <a:endParaRPr lang="en-US" dirty="0"/>
+          </a:p>
+        </p:txBody>
+      </p:sp>
+      <p:sp>
+        <p:nvSpPr>
+          <p:cNvPr id="3" name="Content Placeholder 2"/>
+          <p:cNvSpPr>
+            <a:spLocks noGrp="1"/>
+          </p:cNvSpPr>
+          <p:nvPr>
+            <p:ph idx="1"/>
+          </p:nvPr>
+        </p:nvSpPr>
+        <p:spPr/>
+        <p:txBody>
+          <a:bodyPr/>
+          <a:lstStyle/>
+          <a:p>
+            <a:r>
+              <a:rPr lang="en-US" dirty="0" err="1" smtClean="0"/>
+              <a:t>Ansible</a:t>
+            </a:r>
+            <a:r>
+              <a:rPr lang="en-US" dirty="0" smtClean="0"/>
+              <a:t> documentation:</a:t>
+            </a:r>
+          </a:p>
+          <a:p>
+            <a:pPr lvl="1"/>
+            <a:r>
+              <a:rPr lang="en-US" sz="2000" dirty="0">
+                <a:hlinkClick r:id="rId2"/>
+              </a:rPr>
+              <a:t>http://docs.ansible.com</a:t>
+            </a:r>
+            <a:r>
+              <a:rPr lang="en-US" sz="2000" dirty="0" smtClean="0">
+                <a:hlinkClick r:id="rId2"/>
+              </a:rPr>
+              <a:t>/</a:t>
+            </a:r>
+            <a:endParaRPr lang="en-US" sz="2000" dirty="0" smtClean="0"/>
+          </a:p>
+          <a:p>
+            <a:pPr lvl="1"/>
+            <a:endParaRPr lang="en-US" dirty="0"/>
+          </a:p>
+          <a:p>
+            <a:r>
+              <a:rPr lang="en-US" dirty="0" err="1" smtClean="0"/>
+              <a:t>Ansible</a:t>
+            </a:r>
+            <a:r>
+              <a:rPr lang="en-US" dirty="0" smtClean="0"/>
+              <a:t> module index:</a:t>
+            </a:r>
+          </a:p>
+          <a:p>
+            <a:pPr lvl="1"/>
+            <a:r>
+              <a:rPr lang="en-US" sz="2000" dirty="0">
+                <a:hlinkClick r:id="rId3"/>
+              </a:rPr>
+              <a:t>http://</a:t>
+            </a:r>
+            <a:r>
+              <a:rPr lang="en-US" sz="2000" dirty="0" smtClean="0">
+                <a:hlinkClick r:id="rId3"/>
+              </a:rPr>
+              <a:t>docs.ansible.com/ansible/modules_by_category.html</a:t>
+            </a:r>
+            <a:endParaRPr lang="en-US" sz="2000" dirty="0" smtClean="0"/>
+          </a:p>
+          <a:p>
+            <a:pPr lvl="1"/>
+            <a:endParaRPr lang="en-US" dirty="0"/>
+          </a:p>
+          <a:p>
+            <a:endParaRPr lang="en-US" dirty="0"/>
+          </a:p>
+        </p:txBody>
+      </p:sp>
+    </p:spTree>
+    <p:extLst>
+      <p:ext uri="{BB962C8B-B14F-4D97-AF65-F5344CB8AC3E}">
+        <p14:creationId xmlns:p14="http://schemas.microsoft.com/office/powerpoint/2010/main" val="1036223181"/>
+      </p:ext>
+    </p:extLst>
+  </p:cSld>
+  <p:clrMapOvr>
+    <a:masterClrMapping/>
+  </p:clrMapOvr>
+</p:sld>
+</file>
+
+<file path=ppt/slides/slide59.xml><?xml version="1.0" encoding="utf-8"?>
 <p:sld xmlns:a="http://schemas.openxmlformats.org/drawingml/2006/main" xmlns:r="http://schemas.openxmlformats.org/officeDocument/2006/relationships" xmlns:p="http://schemas.openxmlformats.org/presentationml/2006/main">
   <p:cSld>
     <p:spTree>

</xml_diff>

<commit_message>
update assn 9 and lecture 10
</commit_message>
<xml_diff>
--- a/lectures/infrastructure-week-10.pptx
+++ b/lectures/infrastructure-week-10.pptx
@@ -4182,8 +4182,12 @@
           <a:p>
             <a:pPr lvl="1"/>
             <a:r>
-              <a:rPr lang="en-US" dirty="0" smtClean="0"/>
-              <a:t>Builders: describe the type of machine image to create and what infrastructure is used to create it.</a:t>
+              <a:rPr lang="en-US" b="1" dirty="0" smtClean="0"/>
+              <a:t>Builders</a:t>
+            </a:r>
+            <a:r>
+              <a:rPr lang="en-US" dirty="0" smtClean="0"/>
+              <a:t>: describe the type of machine image to create and what infrastructure is used to create it.</a:t>
             </a:r>
           </a:p>
           <a:p>
@@ -4193,7 +4197,7 @@
           <a:p>
             <a:pPr lvl="1"/>
             <a:r>
-              <a:rPr lang="en-US" dirty="0" err="1" smtClean="0"/>
+              <a:rPr lang="en-US" b="1" dirty="0" err="1" smtClean="0"/>
               <a:t>Provisioners</a:t>
             </a:r>
             <a:r>
@@ -4820,14 +4824,14 @@
           <a:p>
             <a:pPr lvl="1"/>
             <a:r>
-              <a:rPr lang="en-US" dirty="0" smtClean="0"/>
+              <a:rPr lang="en-US" sz="2900" dirty="0" smtClean="0"/>
               <a:t>It’s really easy to provision new servers.</a:t>
             </a:r>
           </a:p>
           <a:p>
             <a:pPr lvl="1"/>
             <a:r>
-              <a:rPr lang="en-US" dirty="0" smtClean="0"/>
+              <a:rPr lang="en-US" sz="2900" dirty="0" smtClean="0"/>
               <a:t>It becomes difficult to patch and consistently maintain servers and the numbers grow.</a:t>
             </a:r>
           </a:p>
@@ -4844,14 +4848,14 @@
           <a:p>
             <a:pPr lvl="1"/>
             <a:r>
-              <a:rPr lang="en-US" dirty="0" smtClean="0"/>
+              <a:rPr lang="en-US" sz="2900" dirty="0" smtClean="0"/>
               <a:t>Configuration of servers gradually change over time.</a:t>
             </a:r>
           </a:p>
           <a:p>
             <a:pPr lvl="1"/>
             <a:r>
-              <a:rPr lang="en-US" dirty="0" smtClean="0"/>
+              <a:rPr lang="en-US" sz="2900" dirty="0" smtClean="0"/>
               <a:t>Unmanaged variation leads to support and maintenance challenges.</a:t>
             </a:r>
           </a:p>
@@ -4868,14 +4872,14 @@
           <a:p>
             <a:pPr lvl="1"/>
             <a:r>
-              <a:rPr lang="en-US" dirty="0" smtClean="0"/>
+              <a:rPr lang="en-US" sz="2900" dirty="0" smtClean="0"/>
               <a:t>Unique servers that cannot be easily replicated.</a:t>
             </a:r>
           </a:p>
           <a:p>
             <a:pPr lvl="1"/>
             <a:r>
-              <a:rPr lang="en-US" dirty="0" smtClean="0"/>
+              <a:rPr lang="en-US" sz="2900" dirty="0" smtClean="0"/>
               <a:t>Leads to fragile infrastructure and components that nobody knows how to fix.</a:t>
             </a:r>
           </a:p>
@@ -4891,7 +4895,7 @@
           <a:p>
             <a:pPr lvl="1"/>
             <a:r>
-              <a:rPr lang="en-US" dirty="0" smtClean="0"/>
+              <a:rPr lang="en-US" sz="2900" dirty="0" smtClean="0"/>
               <a:t>Fear of running automation tools because so much infrastructure is hand-cranked.</a:t>
             </a:r>
           </a:p>
@@ -4908,10 +4912,10 @@
           <a:p>
             <a:pPr lvl="1"/>
             <a:r>
-              <a:rPr lang="en-US" dirty="0" smtClean="0"/>
+              <a:rPr lang="en-US" sz="2900" dirty="0" smtClean="0"/>
               <a:t>Natural entropy suggests that problems will creep into systems over time.</a:t>
             </a:r>
-            <a:endParaRPr lang="en-US" dirty="0"/>
+            <a:endParaRPr lang="en-US" sz="2900" dirty="0"/>
           </a:p>
         </p:txBody>
       </p:sp>
@@ -5294,8 +5298,8 @@
         </p:blipFill>
         <p:spPr>
           <a:xfrm>
-            <a:off x="7046930" y="26203"/>
-            <a:ext cx="1639870" cy="1639870"/>
+            <a:off x="7046930" y="178712"/>
+            <a:ext cx="1238926" cy="1238926"/>
           </a:xfrm>
           <a:prstGeom prst="rect">
             <a:avLst/>
@@ -5464,8 +5468,8 @@
           </a:p>
           <a:p>
             <a:r>
-              <a:rPr lang="en-US" dirty="0" err="1" smtClean="0"/>
-              <a:t>Packer.io</a:t>
+              <a:rPr lang="en-US" dirty="0" smtClean="0"/>
+              <a:t>Packer</a:t>
             </a:r>
             <a:endParaRPr lang="en-US" dirty="0" smtClean="0"/>
           </a:p>
@@ -7483,34 +7487,64 @@
         </p:nvSpPr>
         <p:spPr/>
         <p:txBody>
-          <a:bodyPr/>
-          <a:lstStyle/>
-          <a:p>
-            <a:r>
-              <a:rPr lang="en-US" dirty="0" smtClean="0"/>
-              <a:t>Question: Once an application is built, how do we deploy it to distributed infrastructure?</a:t>
-            </a:r>
+          <a:bodyPr>
+            <a:normAutofit fontScale="92500" lnSpcReduction="10000"/>
+          </a:bodyPr>
+          <a:lstStyle/>
+          <a:p>
+            <a:r>
+              <a:rPr lang="en-US" dirty="0" smtClean="0"/>
+              <a:t>Question: Once an application is built, how do we deploy it to distributed infrastructure</a:t>
+            </a:r>
+            <a:r>
+              <a:rPr lang="en-US" dirty="0" smtClean="0"/>
+              <a:t>?</a:t>
+            </a:r>
+          </a:p>
+          <a:p>
+            <a:endParaRPr lang="en-US" dirty="0" smtClean="0"/>
           </a:p>
           <a:p>
             <a:pPr lvl="1"/>
             <a:r>
               <a:rPr lang="en-US" dirty="0" smtClean="0"/>
-              <a:t>Strategy for deploying to 1 server very different than 100’s</a:t>
+              <a:t>Strategy for deploying to 1 server very different than </a:t>
+            </a:r>
+            <a:r>
+              <a:rPr lang="en-US" dirty="0" smtClean="0"/>
+              <a:t>100’s.</a:t>
             </a:r>
           </a:p>
           <a:p>
             <a:pPr lvl="1"/>
-            <a:r>
-              <a:rPr lang="en-US" dirty="0" smtClean="0"/>
-              <a:t>Trade-offs between deployment speed and risk</a:t>
-            </a:r>
+            <a:endParaRPr lang="en-US" dirty="0" smtClean="0"/>
           </a:p>
           <a:p>
             <a:pPr lvl="1"/>
             <a:r>
               <a:rPr lang="en-US" dirty="0" smtClean="0"/>
-              <a:t>Cloud elasticity and pricing model supports new strategies</a:t>
-            </a:r>
+              <a:t>Trade-offs between deployment speed and </a:t>
+            </a:r>
+            <a:r>
+              <a:rPr lang="en-US" dirty="0" smtClean="0"/>
+              <a:t>risk.</a:t>
+            </a:r>
+          </a:p>
+          <a:p>
+            <a:pPr lvl="1"/>
+            <a:endParaRPr lang="en-US" dirty="0" smtClean="0"/>
+          </a:p>
+          <a:p>
+            <a:pPr lvl="1"/>
+            <a:r>
+              <a:rPr lang="en-US" dirty="0" smtClean="0"/>
+              <a:t>Cloud elasticity and pricing model supports new </a:t>
+            </a:r>
+            <a:r>
+              <a:rPr lang="en-US" dirty="0" smtClean="0"/>
+              <a:t>strategies.</a:t>
+            </a:r>
+            <a:endParaRPr lang="en-US" dirty="0" smtClean="0"/>
           </a:p>
         </p:txBody>
       </p:sp>
@@ -8575,18 +8609,12 @@
         </p:spPr>
         <p:txBody>
           <a:bodyPr>
-            <a:normAutofit fontScale="92500" lnSpcReduction="20000"/>
+            <a:normAutofit fontScale="62500" lnSpcReduction="20000"/>
           </a:bodyPr>
           <a:lstStyle/>
           <a:p>
             <a:r>
               <a:rPr lang="en-US" dirty="0" smtClean="0"/>
-              <a:t>Update inventory file.</a:t>
-            </a:r>
-          </a:p>
-          <a:p>
-            <a:r>
-              <a:rPr lang="en-US" dirty="0" smtClean="0"/>
               <a:t>Run ad-hoc commands:</a:t>
             </a:r>
           </a:p>
@@ -8601,8 +8629,26 @@
             <a:pPr marL="914400" lvl="2" indent="0">
               <a:buNone/>
             </a:pPr>
-            <a:r>
-              <a:rPr lang="en-US" dirty="0" err="1" smtClean="0">
+            <a:endParaRPr lang="en-US" sz="2300" dirty="0" smtClean="0">
+              <a:latin typeface="Consolas" charset="0"/>
+              <a:ea typeface="Consolas" charset="0"/>
+              <a:cs typeface="Consolas" charset="0"/>
+            </a:endParaRPr>
+          </a:p>
+          <a:p>
+            <a:pPr marL="914400" lvl="2" indent="0">
+              <a:buNone/>
+            </a:pPr>
+            <a:r>
+              <a:rPr lang="en-US" sz="2300" dirty="0" smtClean="0">
+                <a:latin typeface="Consolas" charset="0"/>
+                <a:ea typeface="Consolas" charset="0"/>
+                <a:cs typeface="Consolas" charset="0"/>
+              </a:rPr>
+              <a:t>$ </a:t>
+            </a:r>
+            <a:r>
+              <a:rPr lang="en-US" sz="2300" dirty="0" err="1" smtClean="0">
                 <a:latin typeface="Consolas" charset="0"/>
                 <a:ea typeface="Consolas" charset="0"/>
                 <a:cs typeface="Consolas" charset="0"/>
@@ -8610,13 +8656,23 @@
               <a:t>ansible</a:t>
             </a:r>
             <a:r>
-              <a:rPr lang="en-US" dirty="0" smtClean="0">
-                <a:latin typeface="Consolas" charset="0"/>
-                <a:ea typeface="Consolas" charset="0"/>
-                <a:cs typeface="Consolas" charset="0"/>
-              </a:rPr>
-              <a:t> web –m ping</a:t>
-            </a:r>
+              <a:rPr lang="en-US" sz="2300" dirty="0" smtClean="0">
+                <a:latin typeface="Consolas" charset="0"/>
+                <a:ea typeface="Consolas" charset="0"/>
+                <a:cs typeface="Consolas" charset="0"/>
+              </a:rPr>
+              <a:t> localhost –m ping</a:t>
+            </a:r>
+          </a:p>
+          <a:p>
+            <a:pPr marL="914400" lvl="2" indent="0">
+              <a:buNone/>
+            </a:pPr>
+            <a:endParaRPr lang="en-US" sz="2300" dirty="0" smtClean="0">
+              <a:latin typeface="Consolas" charset="0"/>
+              <a:ea typeface="Consolas" charset="0"/>
+              <a:cs typeface="Consolas" charset="0"/>
+            </a:endParaRPr>
           </a:p>
           <a:p>
             <a:pPr lvl="1"/>
@@ -8624,13 +8680,34 @@
               <a:rPr lang="en-US" dirty="0" smtClean="0"/>
               <a:t>Uptime: </a:t>
             </a:r>
+            <a:endParaRPr lang="en-US" sz="2300" dirty="0" smtClean="0">
+              <a:latin typeface="Consolas" charset="0"/>
+              <a:ea typeface="Consolas" charset="0"/>
+              <a:cs typeface="Consolas" charset="0"/>
+            </a:endParaRPr>
           </a:p>
           <a:p>
             <a:pPr marL="914400" lvl="2" indent="0">
               <a:buNone/>
             </a:pPr>
             <a:r>
-              <a:rPr lang="en-US" dirty="0" err="1" smtClean="0">
+              <a:rPr lang="en-US" sz="2300" dirty="0">
+                <a:latin typeface="Consolas" charset="0"/>
+                <a:ea typeface="Consolas" charset="0"/>
+                <a:cs typeface="Consolas" charset="0"/>
+              </a:rPr>
+              <a:t>$</a:t>
+            </a:r>
+            <a:r>
+              <a:rPr lang="en-US" sz="2300" dirty="0" smtClean="0">
+                <a:latin typeface="Consolas" charset="0"/>
+                <a:ea typeface="Consolas" charset="0"/>
+                <a:cs typeface="Consolas" charset="0"/>
+              </a:rPr>
+              <a:t> </a:t>
+            </a:r>
+            <a:r>
+              <a:rPr lang="en-US" sz="2300" dirty="0" err="1" smtClean="0">
                 <a:latin typeface="Consolas" charset="0"/>
                 <a:ea typeface="Consolas" charset="0"/>
                 <a:cs typeface="Consolas" charset="0"/>
@@ -8638,13 +8715,23 @@
               <a:t>ansible</a:t>
             </a:r>
             <a:r>
-              <a:rPr lang="en-US" dirty="0" smtClean="0">
-                <a:latin typeface="Consolas" charset="0"/>
-                <a:ea typeface="Consolas" charset="0"/>
-                <a:cs typeface="Consolas" charset="0"/>
-              </a:rPr>
-              <a:t> web –a “uptime”</a:t>
-            </a:r>
+              <a:rPr lang="en-US" sz="2300" dirty="0" smtClean="0">
+                <a:latin typeface="Consolas" charset="0"/>
+                <a:ea typeface="Consolas" charset="0"/>
+                <a:cs typeface="Consolas" charset="0"/>
+              </a:rPr>
+              <a:t> localhost –a “uptime”</a:t>
+            </a:r>
+          </a:p>
+          <a:p>
+            <a:pPr marL="914400" lvl="2" indent="0">
+              <a:buNone/>
+            </a:pPr>
+            <a:endParaRPr lang="en-US" sz="2300" dirty="0" smtClean="0">
+              <a:latin typeface="Consolas" charset="0"/>
+              <a:ea typeface="Consolas" charset="0"/>
+              <a:cs typeface="Consolas" charset="0"/>
+            </a:endParaRPr>
           </a:p>
           <a:p>
             <a:pPr lvl="1"/>
@@ -8662,11 +8749,23 @@
             </a:r>
           </a:p>
           <a:p>
+            <a:pPr lvl="1"/>
+            <a:endParaRPr lang="en-US" dirty="0" smtClean="0"/>
+          </a:p>
+          <a:p>
             <a:pPr marL="914400" lvl="2" indent="0">
               <a:buNone/>
             </a:pPr>
             <a:r>
-              <a:rPr lang="en-US" sz="1900" dirty="0" err="1" smtClean="0">
+              <a:rPr lang="en-US" sz="2300" dirty="0" smtClean="0">
+                <a:latin typeface="Consolas" charset="0"/>
+                <a:ea typeface="Consolas" charset="0"/>
+                <a:cs typeface="Consolas" charset="0"/>
+              </a:rPr>
+              <a:t>$ </a:t>
+            </a:r>
+            <a:r>
+              <a:rPr lang="en-US" sz="2300" dirty="0" err="1" smtClean="0">
                 <a:latin typeface="Consolas" charset="0"/>
                 <a:ea typeface="Consolas" charset="0"/>
                 <a:cs typeface="Consolas" charset="0"/>
@@ -8674,15 +8773,15 @@
               <a:t>ansible</a:t>
             </a:r>
             <a:r>
-              <a:rPr lang="en-US" sz="1900" dirty="0" smtClean="0">
-                <a:latin typeface="Consolas" charset="0"/>
-                <a:ea typeface="Consolas" charset="0"/>
-                <a:cs typeface="Consolas" charset="0"/>
-              </a:rPr>
-              <a:t> web –m yum -a “name=</a:t>
-            </a:r>
-            <a:r>
-              <a:rPr lang="en-US" sz="1900" dirty="0" err="1" smtClean="0">
+              <a:rPr lang="en-US" sz="2300" dirty="0" smtClean="0">
+                <a:latin typeface="Consolas" charset="0"/>
+                <a:ea typeface="Consolas" charset="0"/>
+                <a:cs typeface="Consolas" charset="0"/>
+              </a:rPr>
+              <a:t> localhost –m yum --become -a “name=</a:t>
+            </a:r>
+            <a:r>
+              <a:rPr lang="en-US" sz="2300" dirty="0" err="1" smtClean="0">
                 <a:latin typeface="Consolas" charset="0"/>
                 <a:ea typeface="Consolas" charset="0"/>
                 <a:cs typeface="Consolas" charset="0"/>
@@ -8690,7 +8789,7 @@
               <a:t>nginx</a:t>
             </a:r>
             <a:r>
-              <a:rPr lang="en-US" sz="1900" dirty="0" smtClean="0">
+              <a:rPr lang="en-US" sz="2300" dirty="0" smtClean="0">
                 <a:latin typeface="Consolas" charset="0"/>
                 <a:ea typeface="Consolas" charset="0"/>
                 <a:cs typeface="Consolas" charset="0"/>
@@ -8728,6 +8827,100 @@
               <a:rPr lang="en-US" dirty="0" smtClean="0"/>
               <a:t>Manual changes to system will be removed to correct configuration drift.</a:t>
             </a:r>
+          </a:p>
+          <a:p>
+            <a:endParaRPr lang="en-US" dirty="0"/>
+          </a:p>
+          <a:p>
+            <a:r>
+              <a:rPr lang="en-US" dirty="0" smtClean="0"/>
+              <a:t>Remove </a:t>
+            </a:r>
+            <a:r>
+              <a:rPr lang="en-US" dirty="0" err="1" smtClean="0"/>
+              <a:t>nginx</a:t>
+            </a:r>
+            <a:r>
+              <a:rPr lang="en-US" dirty="0" smtClean="0"/>
+              <a:t> package:</a:t>
+            </a:r>
+          </a:p>
+          <a:p>
+            <a:endParaRPr lang="en-US" dirty="0" smtClean="0"/>
+          </a:p>
+          <a:p>
+            <a:pPr marL="457200" lvl="1" indent="0">
+              <a:buNone/>
+            </a:pPr>
+            <a:r>
+              <a:rPr lang="en-US" sz="2300" dirty="0" smtClean="0">
+                <a:latin typeface="Consolas" charset="0"/>
+                <a:ea typeface="Consolas" charset="0"/>
+                <a:cs typeface="Consolas" charset="0"/>
+              </a:rPr>
+              <a:t>$ </a:t>
+            </a:r>
+            <a:r>
+              <a:rPr lang="en-US" sz="2300" dirty="0" err="1" smtClean="0">
+                <a:latin typeface="Consolas" charset="0"/>
+                <a:ea typeface="Consolas" charset="0"/>
+                <a:cs typeface="Consolas" charset="0"/>
+              </a:rPr>
+              <a:t>ansible</a:t>
+            </a:r>
+            <a:r>
+              <a:rPr lang="en-US" sz="2300" dirty="0" smtClean="0">
+                <a:latin typeface="Consolas" charset="0"/>
+                <a:ea typeface="Consolas" charset="0"/>
+                <a:cs typeface="Consolas" charset="0"/>
+              </a:rPr>
+              <a:t> localhost –m </a:t>
+            </a:r>
+            <a:r>
+              <a:rPr lang="en-US" sz="2300" dirty="0">
+                <a:latin typeface="Consolas" charset="0"/>
+                <a:ea typeface="Consolas" charset="0"/>
+                <a:cs typeface="Consolas" charset="0"/>
+              </a:rPr>
+              <a:t>yum --become -a “name=</a:t>
+            </a:r>
+            <a:r>
+              <a:rPr lang="en-US" sz="2300" dirty="0" err="1">
+                <a:latin typeface="Consolas" charset="0"/>
+                <a:ea typeface="Consolas" charset="0"/>
+                <a:cs typeface="Consolas" charset="0"/>
+              </a:rPr>
+              <a:t>nginx</a:t>
+            </a:r>
+            <a:r>
+              <a:rPr lang="en-US" sz="2300" dirty="0">
+                <a:latin typeface="Consolas" charset="0"/>
+                <a:ea typeface="Consolas" charset="0"/>
+                <a:cs typeface="Consolas" charset="0"/>
+              </a:rPr>
+              <a:t> </a:t>
+            </a:r>
+            <a:r>
+              <a:rPr lang="en-US" sz="2300" dirty="0" smtClean="0">
+                <a:latin typeface="Consolas" charset="0"/>
+                <a:ea typeface="Consolas" charset="0"/>
+                <a:cs typeface="Consolas" charset="0"/>
+              </a:rPr>
+              <a:t>absent”</a:t>
+            </a:r>
+            <a:endParaRPr lang="en-US" sz="2300" dirty="0">
+              <a:latin typeface="Consolas" charset="0"/>
+              <a:ea typeface="Consolas" charset="0"/>
+              <a:cs typeface="Consolas" charset="0"/>
+            </a:endParaRPr>
+          </a:p>
+          <a:p>
+            <a:pPr lvl="1"/>
+            <a:endParaRPr lang="en-US" dirty="0" smtClean="0"/>
+          </a:p>
+          <a:p>
+            <a:pPr lvl="1"/>
+            <a:endParaRPr lang="en-US" dirty="0" smtClean="0"/>
           </a:p>
           <a:p>
             <a:pPr lvl="1"/>
@@ -10153,12 +10346,12 @@
         </p:spPr>
         <p:txBody>
           <a:bodyPr>
-            <a:normAutofit fontScale="85000" lnSpcReduction="20000"/>
+            <a:normAutofit fontScale="70000" lnSpcReduction="20000"/>
           </a:bodyPr>
           <a:lstStyle/>
           <a:p>
             <a:r>
-              <a:rPr lang="en-US" dirty="0" smtClean="0"/>
+              <a:rPr lang="en-US" b="1" dirty="0" smtClean="0"/>
               <a:t>Single Server Deployment</a:t>
             </a:r>
           </a:p>
@@ -10166,15 +10359,30 @@
             <a:pPr lvl="1"/>
             <a:r>
               <a:rPr lang="en-US" dirty="0" smtClean="0"/>
-              <a:t>Application is deployed to a single server</a:t>
+              <a:t>Application is deployed to a single </a:t>
+            </a:r>
+            <a:r>
+              <a:rPr lang="en-US" dirty="0" smtClean="0"/>
+              <a:t>server.</a:t>
             </a:r>
           </a:p>
           <a:p>
             <a:pPr lvl="1"/>
-            <a:r>
-              <a:rPr lang="en-US" dirty="0" smtClean="0"/>
-              <a:t>Very common for testing and small production applications</a:t>
-            </a:r>
+            <a:endParaRPr lang="en-US" dirty="0" smtClean="0"/>
+          </a:p>
+          <a:p>
+            <a:pPr lvl="1"/>
+            <a:r>
+              <a:rPr lang="en-US" dirty="0" smtClean="0"/>
+              <a:t>Very common for testing and small production </a:t>
+            </a:r>
+            <a:r>
+              <a:rPr lang="en-US" dirty="0" smtClean="0"/>
+              <a:t>applications.</a:t>
+            </a:r>
+          </a:p>
+          <a:p>
+            <a:pPr lvl="1"/>
             <a:endParaRPr lang="en-US" dirty="0"/>
           </a:p>
           <a:p>
@@ -10188,8 +10396,16 @@
             <a:pPr lvl="2"/>
             <a:r>
               <a:rPr lang="en-US" dirty="0" smtClean="0"/>
-              <a:t>Easy and quick to deploy app on a single server</a:t>
-            </a:r>
+              <a:t>Easy and quick to deploy app on a single </a:t>
+            </a:r>
+            <a:r>
+              <a:rPr lang="en-US" dirty="0" smtClean="0"/>
+              <a:t>server.</a:t>
+            </a:r>
+          </a:p>
+          <a:p>
+            <a:pPr lvl="2"/>
+            <a:endParaRPr lang="en-US" dirty="0" smtClean="0"/>
           </a:p>
           <a:p>
             <a:pPr lvl="1"/>
@@ -14998,7 +15214,7 @@
           <a:lstStyle/>
           <a:p>
             <a:r>
-              <a:rPr lang="en-US" dirty="0" smtClean="0"/>
+              <a:rPr lang="en-US" b="1" dirty="0" smtClean="0"/>
               <a:t>Big Bang Deployment</a:t>
             </a:r>
           </a:p>
@@ -15006,8 +15222,13 @@
             <a:pPr lvl="1"/>
             <a:r>
               <a:rPr lang="en-US" dirty="0" smtClean="0"/>
-              <a:t>Application is deployed to all servers at once</a:t>
-            </a:r>
+              <a:t>Application is deployed to all servers at </a:t>
+            </a:r>
+            <a:r>
+              <a:rPr lang="en-US" dirty="0" smtClean="0"/>
+              <a:t>once.</a:t>
+            </a:r>
+            <a:endParaRPr lang="en-US" dirty="0" smtClean="0"/>
           </a:p>
           <a:p>
             <a:pPr lvl="1"/>
@@ -15028,8 +15249,13 @@
             <a:pPr lvl="2"/>
             <a:r>
               <a:rPr lang="en-US" dirty="0" smtClean="0"/>
-              <a:t>Quick to deploy app on multiple servers, though requires orchestration</a:t>
-            </a:r>
+              <a:t>Quick to deploy app on multiple servers, though requires </a:t>
+            </a:r>
+            <a:r>
+              <a:rPr lang="en-US" dirty="0" smtClean="0"/>
+              <a:t>orchestration.</a:t>
+            </a:r>
+            <a:endParaRPr lang="en-US" dirty="0" smtClean="0"/>
           </a:p>
           <a:p>
             <a:pPr lvl="1"/>
@@ -15042,22 +15268,37 @@
             <a:pPr lvl="2"/>
             <a:r>
               <a:rPr lang="en-US" dirty="0" smtClean="0"/>
-              <a:t>Service outage occurs during app deployment</a:t>
-            </a:r>
+              <a:t>Service outage occurs during app </a:t>
+            </a:r>
+            <a:r>
+              <a:rPr lang="en-US" dirty="0" smtClean="0"/>
+              <a:t>deployment.</a:t>
+            </a:r>
+            <a:endParaRPr lang="en-US" dirty="0" smtClean="0"/>
           </a:p>
           <a:p>
             <a:pPr lvl="2"/>
             <a:r>
               <a:rPr lang="en-US" dirty="0" smtClean="0"/>
-              <a:t>No ability to test app in production before deployment</a:t>
-            </a:r>
+              <a:t>No ability to test app in production before </a:t>
+            </a:r>
+            <a:r>
+              <a:rPr lang="en-US" dirty="0" smtClean="0"/>
+              <a:t>deployment.</a:t>
+            </a:r>
+            <a:endParaRPr lang="en-US" dirty="0" smtClean="0"/>
           </a:p>
           <a:p>
             <a:pPr lvl="2"/>
             <a:r>
               <a:rPr lang="en-US" dirty="0" smtClean="0"/>
-              <a:t>Rolling back app requires complete reinstallation</a:t>
-            </a:r>
+              <a:t>Rolling back app requires complete </a:t>
+            </a:r>
+            <a:r>
+              <a:rPr lang="en-US" dirty="0" smtClean="0"/>
+              <a:t>reinstallation.</a:t>
+            </a:r>
+            <a:endParaRPr lang="en-US" dirty="0" smtClean="0"/>
           </a:p>
         </p:txBody>
       </p:sp>
@@ -18007,13 +18248,197 @@
         </p:spPr>
         <p:txBody>
           <a:bodyPr>
-            <a:normAutofit/>
+            <a:normAutofit fontScale="92500" lnSpcReduction="20000"/>
           </a:bodyPr>
           <a:lstStyle/>
           <a:p>
-            <a:pPr marL="0" indent="0">
-              <a:buNone/>
-            </a:pPr>
+            <a:r>
+              <a:rPr lang="en-US" dirty="0" smtClean="0"/>
+              <a:t>Launch two RHEL7 EC2 instances using Terraform.</a:t>
+            </a:r>
+          </a:p>
+          <a:p>
+            <a:pPr marL="457200" lvl="1" indent="0">
+              <a:buNone/>
+            </a:pPr>
+            <a:r>
+              <a:rPr lang="en-US" dirty="0" smtClean="0">
+                <a:latin typeface="Consolas" charset="0"/>
+                <a:ea typeface="Consolas" charset="0"/>
+                <a:cs typeface="Consolas" charset="0"/>
+              </a:rPr>
+              <a:t>$ terraform plan</a:t>
+            </a:r>
+          </a:p>
+          <a:p>
+            <a:pPr marL="457200" lvl="1" indent="0">
+              <a:buNone/>
+            </a:pPr>
+            <a:r>
+              <a:rPr lang="en-US" dirty="0" smtClean="0">
+                <a:latin typeface="Consolas" charset="0"/>
+                <a:ea typeface="Consolas" charset="0"/>
+                <a:cs typeface="Consolas" charset="0"/>
+              </a:rPr>
+              <a:t>$ terraform apply</a:t>
+            </a:r>
+          </a:p>
+          <a:p>
+            <a:pPr lvl="1"/>
+            <a:endParaRPr lang="en-US" dirty="0" smtClean="0"/>
+          </a:p>
+          <a:p>
+            <a:r>
+              <a:rPr lang="en-US" dirty="0" smtClean="0"/>
+              <a:t>Review </a:t>
+            </a:r>
+            <a:r>
+              <a:rPr lang="en-US" dirty="0" err="1" smtClean="0"/>
+              <a:t>Ansible</a:t>
+            </a:r>
+            <a:r>
+              <a:rPr lang="en-US" dirty="0" smtClean="0"/>
+              <a:t> playbook and role.</a:t>
+            </a:r>
+          </a:p>
+          <a:p>
+            <a:endParaRPr lang="en-US" dirty="0" smtClean="0"/>
+          </a:p>
+          <a:p>
+            <a:r>
+              <a:rPr lang="en-US" dirty="0" smtClean="0"/>
+              <a:t>Execute </a:t>
+            </a:r>
+            <a:r>
+              <a:rPr lang="en-US" dirty="0" err="1" smtClean="0"/>
+              <a:t>Ansible</a:t>
+            </a:r>
+            <a:r>
+              <a:rPr lang="en-US" dirty="0" smtClean="0"/>
+              <a:t> playbook using dynamic inventory script.</a:t>
+            </a:r>
+          </a:p>
+          <a:p>
+            <a:pPr marL="0" indent="0">
+              <a:buNone/>
+            </a:pPr>
+            <a:endParaRPr lang="en-US" sz="2000" dirty="0" smtClean="0">
+              <a:latin typeface="Consolas" charset="0"/>
+              <a:ea typeface="Consolas" charset="0"/>
+              <a:cs typeface="Consolas" charset="0"/>
+            </a:endParaRPr>
+          </a:p>
+          <a:p>
+            <a:pPr marL="0" indent="0">
+              <a:buNone/>
+            </a:pPr>
+            <a:r>
+              <a:rPr lang="en-US" sz="2000" dirty="0">
+                <a:latin typeface="Consolas" charset="0"/>
+                <a:ea typeface="Consolas" charset="0"/>
+                <a:cs typeface="Consolas" charset="0"/>
+              </a:rPr>
+              <a:t>	</a:t>
+            </a:r>
+            <a:r>
+              <a:rPr lang="en-US" sz="2000" dirty="0" smtClean="0">
+                <a:latin typeface="Consolas" charset="0"/>
+                <a:ea typeface="Consolas" charset="0"/>
+                <a:cs typeface="Consolas" charset="0"/>
+              </a:rPr>
+              <a:t>$ </a:t>
+            </a:r>
+            <a:r>
+              <a:rPr lang="en-US" sz="2000" dirty="0" err="1" smtClean="0">
+                <a:latin typeface="Consolas" charset="0"/>
+                <a:ea typeface="Consolas" charset="0"/>
+                <a:cs typeface="Consolas" charset="0"/>
+              </a:rPr>
+              <a:t>ansible</a:t>
+            </a:r>
+            <a:r>
+              <a:rPr lang="en-US" sz="2000" dirty="0" smtClean="0">
+                <a:latin typeface="Consolas" charset="0"/>
+                <a:ea typeface="Consolas" charset="0"/>
+                <a:cs typeface="Consolas" charset="0"/>
+              </a:rPr>
+              <a:t>-playbook </a:t>
+            </a:r>
+            <a:r>
+              <a:rPr lang="en-US" sz="2000" dirty="0">
+                <a:latin typeface="Consolas" charset="0"/>
+                <a:ea typeface="Consolas" charset="0"/>
+                <a:cs typeface="Consolas" charset="0"/>
+              </a:rPr>
+              <a:t>-</a:t>
+            </a:r>
+            <a:r>
+              <a:rPr lang="en-US" sz="2000" dirty="0" err="1">
+                <a:latin typeface="Consolas" charset="0"/>
+                <a:ea typeface="Consolas" charset="0"/>
+                <a:cs typeface="Consolas" charset="0"/>
+              </a:rPr>
+              <a:t>i</a:t>
+            </a:r>
+            <a:r>
+              <a:rPr lang="en-US" sz="2000" dirty="0">
+                <a:latin typeface="Consolas" charset="0"/>
+                <a:ea typeface="Consolas" charset="0"/>
+                <a:cs typeface="Consolas" charset="0"/>
+              </a:rPr>
+              <a:t> </a:t>
+            </a:r>
+            <a:r>
+              <a:rPr lang="en-US" sz="2000" dirty="0" err="1">
+                <a:latin typeface="Consolas" charset="0"/>
+                <a:ea typeface="Consolas" charset="0"/>
+                <a:cs typeface="Consolas" charset="0"/>
+              </a:rPr>
+              <a:t>terraform.py</a:t>
+            </a:r>
+            <a:r>
+              <a:rPr lang="en-US" sz="2000" dirty="0">
+                <a:latin typeface="Consolas" charset="0"/>
+                <a:ea typeface="Consolas" charset="0"/>
+                <a:cs typeface="Consolas" charset="0"/>
+              </a:rPr>
+              <a:t> </a:t>
+            </a:r>
+            <a:r>
+              <a:rPr lang="en-US" sz="2000" dirty="0" err="1" smtClean="0">
+                <a:latin typeface="Consolas" charset="0"/>
+                <a:ea typeface="Consolas" charset="0"/>
+                <a:cs typeface="Consolas" charset="0"/>
+              </a:rPr>
+              <a:t>site.yml</a:t>
+            </a:r>
+            <a:endParaRPr lang="en-US" sz="2000" dirty="0" smtClean="0">
+              <a:latin typeface="Consolas" charset="0"/>
+              <a:ea typeface="Consolas" charset="0"/>
+              <a:cs typeface="Consolas" charset="0"/>
+            </a:endParaRPr>
+          </a:p>
+          <a:p>
+            <a:pPr marL="0" indent="0">
+              <a:buNone/>
+            </a:pPr>
+            <a:endParaRPr lang="en-US" sz="2000" dirty="0" smtClean="0"/>
+          </a:p>
+          <a:p>
+            <a:r>
+              <a:rPr lang="en-US" dirty="0" smtClean="0"/>
+              <a:t>Watch script install full </a:t>
+            </a:r>
+            <a:r>
+              <a:rPr lang="en-US" dirty="0" err="1" smtClean="0"/>
+              <a:t>Wordpress</a:t>
+            </a:r>
+            <a:r>
+              <a:rPr lang="en-US" dirty="0" smtClean="0"/>
+              <a:t> application stack on each instance.</a:t>
+            </a:r>
+          </a:p>
+          <a:p>
             <a:endParaRPr lang="en-US" dirty="0"/>
           </a:p>
           <a:p>
@@ -18259,6 +18684,37 @@
             <a:endParaRPr lang="en-US" dirty="0"/>
           </a:p>
           <a:p>
+            <a:r>
+              <a:rPr lang="en-US" dirty="0" err="1" smtClean="0"/>
+              <a:t>Ansible</a:t>
+            </a:r>
+            <a:r>
+              <a:rPr lang="en-US" smtClean="0"/>
+              <a:t> Absolute Basic </a:t>
+            </a:r>
+            <a:r>
+              <a:rPr lang="en-US" dirty="0" smtClean="0"/>
+              <a:t>Overview video:</a:t>
+            </a:r>
+          </a:p>
+          <a:p>
+            <a:pPr lvl="1"/>
+            <a:r>
+              <a:rPr lang="en-US" sz="2000" dirty="0">
+                <a:hlinkClick r:id="rId4"/>
+              </a:rPr>
+              <a:t>https://</a:t>
+            </a:r>
+            <a:r>
+              <a:rPr lang="en-US" sz="2000" dirty="0" smtClean="0">
+                <a:hlinkClick r:id="rId4"/>
+              </a:rPr>
+              <a:t>www.youtube.com/watch?v=MfoAb50Br94</a:t>
+            </a:r>
+            <a:endParaRPr lang="en-US" sz="2000" dirty="0" smtClean="0"/>
+          </a:p>
+          <a:p>
+            <a:pPr lvl="1"/>
             <a:endParaRPr lang="en-US" dirty="0"/>
           </a:p>
         </p:txBody>
@@ -18339,7 +18795,7 @@
           <a:lstStyle/>
           <a:p>
             <a:r>
-              <a:rPr lang="en-US" dirty="0" smtClean="0"/>
+              <a:rPr lang="en-US" b="1" dirty="0" smtClean="0"/>
               <a:t>Minimum-in-service Deployment</a:t>
             </a:r>
           </a:p>
@@ -18347,8 +18803,13 @@
             <a:pPr lvl="1"/>
             <a:r>
               <a:rPr lang="en-US" dirty="0" smtClean="0"/>
-              <a:t>Application is deployed in multiple stages with a minimum set of servers supporting service</a:t>
-            </a:r>
+              <a:t>Application is deployed in multiple stages with a minimum set of servers supporting </a:t>
+            </a:r>
+            <a:r>
+              <a:rPr lang="en-US" dirty="0" smtClean="0"/>
+              <a:t>service.</a:t>
+            </a:r>
+            <a:endParaRPr lang="en-US" dirty="0" smtClean="0"/>
           </a:p>
           <a:p>
             <a:pPr lvl="1"/>
@@ -19828,7 +20289,7 @@
           <a:lstStyle/>
           <a:p>
             <a:r>
-              <a:rPr lang="en-US" dirty="0" smtClean="0"/>
+              <a:rPr lang="en-US" b="1" dirty="0" smtClean="0"/>
               <a:t>Rolling (Canary) Deployment</a:t>
             </a:r>
           </a:p>
@@ -19836,8 +20297,13 @@
             <a:pPr lvl="1"/>
             <a:r>
               <a:rPr lang="en-US" dirty="0" smtClean="0"/>
-              <a:t>Application is deployed to a specified number of servers at each stage</a:t>
-            </a:r>
+              <a:t>Application is deployed to a specified number of servers at each </a:t>
+            </a:r>
+            <a:r>
+              <a:rPr lang="en-US" dirty="0" smtClean="0"/>
+              <a:t>stage</a:t>
+            </a:r>
+            <a:endParaRPr lang="en-US" dirty="0" smtClean="0"/>
           </a:p>
           <a:p>
             <a:pPr lvl="1"/>
@@ -21259,7 +21725,7 @@
           <a:lstStyle/>
           <a:p>
             <a:r>
-              <a:rPr lang="en-US" dirty="0" smtClean="0"/>
+              <a:rPr lang="en-US" b="1" dirty="0" smtClean="0"/>
               <a:t>Blue Green Deployment</a:t>
             </a:r>
           </a:p>
@@ -21267,8 +21733,13 @@
             <a:pPr lvl="1"/>
             <a:r>
               <a:rPr lang="en-US" dirty="0" smtClean="0"/>
-              <a:t>Application is deployed to a completely new production environment in parallel</a:t>
-            </a:r>
+              <a:t>Application is deployed to a completely new production environment in </a:t>
+            </a:r>
+            <a:r>
+              <a:rPr lang="en-US" dirty="0" smtClean="0"/>
+              <a:t>parallel.</a:t>
+            </a:r>
+            <a:endParaRPr lang="en-US" dirty="0" smtClean="0"/>
           </a:p>
           <a:p>
             <a:pPr lvl="1"/>

</xml_diff>

<commit_message>
create a jenkins server demo environment for week 11
</commit_message>
<xml_diff>
--- a/lectures/infrastructure-week-10.pptx
+++ b/lectures/infrastructure-week-10.pptx
@@ -260,7 +260,7 @@
           <a:p>
             <a:fld id="{EAA08BAD-04ED-244C-92B6-E3671520D864}" type="datetimeFigureOut">
               <a:rPr lang="en-US" smtClean="0"/>
-              <a:t>4/10/17</a:t>
+              <a:t>8/27/17</a:t>
             </a:fld>
             <a:endParaRPr lang="en-US"/>
           </a:p>
@@ -709,7 +709,7 @@
           <a:p>
             <a:fld id="{972605B8-2E90-124E-924E-6F58993143C6}" type="datetimeFigureOut">
               <a:rPr lang="en-US" smtClean="0"/>
-              <a:t>4/10/17</a:t>
+              <a:t>8/27/17</a:t>
             </a:fld>
             <a:endParaRPr lang="en-US"/>
           </a:p>
@@ -879,7 +879,7 @@
           <a:p>
             <a:fld id="{972605B8-2E90-124E-924E-6F58993143C6}" type="datetimeFigureOut">
               <a:rPr lang="en-US" smtClean="0"/>
-              <a:t>4/10/17</a:t>
+              <a:t>8/27/17</a:t>
             </a:fld>
             <a:endParaRPr lang="en-US"/>
           </a:p>
@@ -1059,7 +1059,7 @@
           <a:p>
             <a:fld id="{972605B8-2E90-124E-924E-6F58993143C6}" type="datetimeFigureOut">
               <a:rPr lang="en-US" smtClean="0"/>
-              <a:t>4/10/17</a:t>
+              <a:t>8/27/17</a:t>
             </a:fld>
             <a:endParaRPr lang="en-US"/>
           </a:p>
@@ -1229,7 +1229,7 @@
           <a:p>
             <a:fld id="{972605B8-2E90-124E-924E-6F58993143C6}" type="datetimeFigureOut">
               <a:rPr lang="en-US" smtClean="0"/>
-              <a:t>4/10/17</a:t>
+              <a:t>8/27/17</a:t>
             </a:fld>
             <a:endParaRPr lang="en-US"/>
           </a:p>
@@ -1475,7 +1475,7 @@
           <a:p>
             <a:fld id="{972605B8-2E90-124E-924E-6F58993143C6}" type="datetimeFigureOut">
               <a:rPr lang="en-US" smtClean="0"/>
-              <a:t>4/10/17</a:t>
+              <a:t>8/27/17</a:t>
             </a:fld>
             <a:endParaRPr lang="en-US"/>
           </a:p>
@@ -1763,7 +1763,7 @@
           <a:p>
             <a:fld id="{972605B8-2E90-124E-924E-6F58993143C6}" type="datetimeFigureOut">
               <a:rPr lang="en-US" smtClean="0"/>
-              <a:t>4/10/17</a:t>
+              <a:t>8/27/17</a:t>
             </a:fld>
             <a:endParaRPr lang="en-US"/>
           </a:p>
@@ -2185,7 +2185,7 @@
           <a:p>
             <a:fld id="{972605B8-2E90-124E-924E-6F58993143C6}" type="datetimeFigureOut">
               <a:rPr lang="en-US" smtClean="0"/>
-              <a:t>4/10/17</a:t>
+              <a:t>8/27/17</a:t>
             </a:fld>
             <a:endParaRPr lang="en-US"/>
           </a:p>
@@ -2303,7 +2303,7 @@
           <a:p>
             <a:fld id="{972605B8-2E90-124E-924E-6F58993143C6}" type="datetimeFigureOut">
               <a:rPr lang="en-US" smtClean="0"/>
-              <a:t>4/10/17</a:t>
+              <a:t>8/27/17</a:t>
             </a:fld>
             <a:endParaRPr lang="en-US"/>
           </a:p>
@@ -2398,7 +2398,7 @@
           <a:p>
             <a:fld id="{972605B8-2E90-124E-924E-6F58993143C6}" type="datetimeFigureOut">
               <a:rPr lang="en-US" smtClean="0"/>
-              <a:t>4/10/17</a:t>
+              <a:t>8/27/17</a:t>
             </a:fld>
             <a:endParaRPr lang="en-US"/>
           </a:p>
@@ -2675,7 +2675,7 @@
           <a:p>
             <a:fld id="{972605B8-2E90-124E-924E-6F58993143C6}" type="datetimeFigureOut">
               <a:rPr lang="en-US" smtClean="0"/>
-              <a:t>4/10/17</a:t>
+              <a:t>8/27/17</a:t>
             </a:fld>
             <a:endParaRPr lang="en-US"/>
           </a:p>
@@ -2928,7 +2928,7 @@
           <a:p>
             <a:fld id="{972605B8-2E90-124E-924E-6F58993143C6}" type="datetimeFigureOut">
               <a:rPr lang="en-US" smtClean="0"/>
-              <a:t>4/10/17</a:t>
+              <a:t>8/27/17</a:t>
             </a:fld>
             <a:endParaRPr lang="en-US"/>
           </a:p>
@@ -3141,7 +3141,7 @@
           <a:p>
             <a:fld id="{972605B8-2E90-124E-924E-6F58993143C6}" type="datetimeFigureOut">
               <a:rPr lang="en-US" smtClean="0"/>
-              <a:t>4/10/17</a:t>
+              <a:t>8/27/17</a:t>
             </a:fld>
             <a:endParaRPr lang="en-US"/>
           </a:p>
@@ -3539,12 +3539,8 @@
           <a:lstStyle/>
           <a:p>
             <a:r>
-              <a:rPr lang="en-US" sz="3600" dirty="0" err="1"/>
-              <a:t>DevOps</a:t>
-            </a:r>
-            <a:r>
               <a:rPr lang="en-US" sz="3600" dirty="0"/>
-              <a:t> &amp; Cloud Infrastructure</a:t>
+              <a:t>DevOps &amp; Cloud Infrastructure</a:t>
             </a:r>
             <a:br>
               <a:rPr lang="en-US" sz="3600" dirty="0"/>
@@ -3570,7 +3566,11 @@
             </a:r>
             <a:r>
               <a:rPr lang="en-US" sz="3600" dirty="0" smtClean="0"/>
-              <a:t>10</a:t>
+              <a:t>10: </a:t>
+            </a:r>
+            <a:r>
+              <a:rPr lang="en-US" sz="3600" smtClean="0"/>
+              <a:t>Configuration Management</a:t>
             </a:r>
             <a:endParaRPr lang="en-US" sz="3600" dirty="0"/>
           </a:p>

</xml_diff>

<commit_message>
update reading assignments in lectures and rewrite lecture 11
</commit_message>
<xml_diff>
--- a/lectures/infrastructure-week-10.pptx
+++ b/lectures/infrastructure-week-10.pptx
@@ -260,7 +260,7 @@
           <a:p>
             <a:fld id="{EAA08BAD-04ED-244C-92B6-E3671520D864}" type="datetimeFigureOut">
               <a:rPr lang="en-US" smtClean="0"/>
-              <a:t>8/27/17</a:t>
+              <a:t>9/7/17</a:t>
             </a:fld>
             <a:endParaRPr lang="en-US"/>
           </a:p>
@@ -709,7 +709,7 @@
           <a:p>
             <a:fld id="{972605B8-2E90-124E-924E-6F58993143C6}" type="datetimeFigureOut">
               <a:rPr lang="en-US" smtClean="0"/>
-              <a:t>8/27/17</a:t>
+              <a:t>9/7/17</a:t>
             </a:fld>
             <a:endParaRPr lang="en-US"/>
           </a:p>
@@ -879,7 +879,7 @@
           <a:p>
             <a:fld id="{972605B8-2E90-124E-924E-6F58993143C6}" type="datetimeFigureOut">
               <a:rPr lang="en-US" smtClean="0"/>
-              <a:t>8/27/17</a:t>
+              <a:t>9/7/17</a:t>
             </a:fld>
             <a:endParaRPr lang="en-US"/>
           </a:p>
@@ -1059,7 +1059,7 @@
           <a:p>
             <a:fld id="{972605B8-2E90-124E-924E-6F58993143C6}" type="datetimeFigureOut">
               <a:rPr lang="en-US" smtClean="0"/>
-              <a:t>8/27/17</a:t>
+              <a:t>9/7/17</a:t>
             </a:fld>
             <a:endParaRPr lang="en-US"/>
           </a:p>
@@ -1229,7 +1229,7 @@
           <a:p>
             <a:fld id="{972605B8-2E90-124E-924E-6F58993143C6}" type="datetimeFigureOut">
               <a:rPr lang="en-US" smtClean="0"/>
-              <a:t>8/27/17</a:t>
+              <a:t>9/7/17</a:t>
             </a:fld>
             <a:endParaRPr lang="en-US"/>
           </a:p>
@@ -1475,7 +1475,7 @@
           <a:p>
             <a:fld id="{972605B8-2E90-124E-924E-6F58993143C6}" type="datetimeFigureOut">
               <a:rPr lang="en-US" smtClean="0"/>
-              <a:t>8/27/17</a:t>
+              <a:t>9/7/17</a:t>
             </a:fld>
             <a:endParaRPr lang="en-US"/>
           </a:p>
@@ -1763,7 +1763,7 @@
           <a:p>
             <a:fld id="{972605B8-2E90-124E-924E-6F58993143C6}" type="datetimeFigureOut">
               <a:rPr lang="en-US" smtClean="0"/>
-              <a:t>8/27/17</a:t>
+              <a:t>9/7/17</a:t>
             </a:fld>
             <a:endParaRPr lang="en-US"/>
           </a:p>
@@ -2185,7 +2185,7 @@
           <a:p>
             <a:fld id="{972605B8-2E90-124E-924E-6F58993143C6}" type="datetimeFigureOut">
               <a:rPr lang="en-US" smtClean="0"/>
-              <a:t>8/27/17</a:t>
+              <a:t>9/7/17</a:t>
             </a:fld>
             <a:endParaRPr lang="en-US"/>
           </a:p>
@@ -2303,7 +2303,7 @@
           <a:p>
             <a:fld id="{972605B8-2E90-124E-924E-6F58993143C6}" type="datetimeFigureOut">
               <a:rPr lang="en-US" smtClean="0"/>
-              <a:t>8/27/17</a:t>
+              <a:t>9/7/17</a:t>
             </a:fld>
             <a:endParaRPr lang="en-US"/>
           </a:p>
@@ -2398,7 +2398,7 @@
           <a:p>
             <a:fld id="{972605B8-2E90-124E-924E-6F58993143C6}" type="datetimeFigureOut">
               <a:rPr lang="en-US" smtClean="0"/>
-              <a:t>8/27/17</a:t>
+              <a:t>9/7/17</a:t>
             </a:fld>
             <a:endParaRPr lang="en-US"/>
           </a:p>
@@ -2675,7 +2675,7 @@
           <a:p>
             <a:fld id="{972605B8-2E90-124E-924E-6F58993143C6}" type="datetimeFigureOut">
               <a:rPr lang="en-US" smtClean="0"/>
-              <a:t>8/27/17</a:t>
+              <a:t>9/7/17</a:t>
             </a:fld>
             <a:endParaRPr lang="en-US"/>
           </a:p>
@@ -2928,7 +2928,7 @@
           <a:p>
             <a:fld id="{972605B8-2E90-124E-924E-6F58993143C6}" type="datetimeFigureOut">
               <a:rPr lang="en-US" smtClean="0"/>
-              <a:t>8/27/17</a:t>
+              <a:t>9/7/17</a:t>
             </a:fld>
             <a:endParaRPr lang="en-US"/>
           </a:p>
@@ -3141,7 +3141,7 @@
           <a:p>
             <a:fld id="{972605B8-2E90-124E-924E-6F58993143C6}" type="datetimeFigureOut">
               <a:rPr lang="en-US" smtClean="0"/>
-              <a:t>8/27/17</a:t>
+              <a:t>9/7/17</a:t>
             </a:fld>
             <a:endParaRPr lang="en-US"/>
           </a:p>
@@ -16353,7 +16353,7 @@
           <a:lstStyle/>
           <a:p>
             <a:r>
-              <a:rPr lang="en-US" smtClean="0"/>
+              <a:rPr lang="en-US" dirty="0" smtClean="0"/>
               <a:t>Assignment </a:t>
             </a:r>
             <a:r>
@@ -16372,12 +16372,24 @@
               <a:t> Infrastructure as Code </a:t>
             </a:r>
             <a:r>
-              <a:rPr lang="en-US" dirty="0" smtClean="0"/>
+              <a:rPr lang="en-US" smtClean="0"/>
               <a:t>Chapters</a:t>
             </a:r>
             <a:r>
-              <a:rPr lang="en-US" i="1" dirty="0" smtClean="0"/>
-              <a:t> 9 &amp; 10</a:t>
+              <a:rPr lang="en-US" i="1" smtClean="0"/>
+              <a:t> </a:t>
+            </a:r>
+            <a:r>
+              <a:rPr lang="en-US" i="1" smtClean="0"/>
+              <a:t>12 </a:t>
+            </a:r>
+            <a:r>
+              <a:rPr lang="en-US" i="1" smtClean="0"/>
+              <a:t>&amp; </a:t>
+            </a:r>
+            <a:r>
+              <a:rPr lang="en-US" i="1" smtClean="0"/>
+              <a:t>13</a:t>
             </a:r>
             <a:endParaRPr lang="en-US" dirty="0"/>
           </a:p>

</xml_diff>

<commit_message>
update assignment 9 and ansible cf template
</commit_message>
<xml_diff>
--- a/lectures/infrastructure-week-10.pptx
+++ b/lectures/infrastructure-week-10.pptx
@@ -16,22 +16,22 @@
     <p:sldId id="262" r:id="rId7"/>
     <p:sldId id="263" r:id="rId8"/>
     <p:sldId id="264" r:id="rId9"/>
-    <p:sldId id="272" r:id="rId10"/>
-    <p:sldId id="266" r:id="rId11"/>
-    <p:sldId id="267" r:id="rId12"/>
-    <p:sldId id="268" r:id="rId13"/>
-    <p:sldId id="270" r:id="rId14"/>
-    <p:sldId id="273" r:id="rId15"/>
-    <p:sldId id="265" r:id="rId16"/>
-    <p:sldId id="275" r:id="rId17"/>
-    <p:sldId id="271" r:id="rId18"/>
-    <p:sldId id="274" r:id="rId19"/>
-    <p:sldId id="276" r:id="rId20"/>
-    <p:sldId id="284" r:id="rId21"/>
-    <p:sldId id="285" r:id="rId22"/>
-    <p:sldId id="277" r:id="rId23"/>
-    <p:sldId id="278" r:id="rId24"/>
-    <p:sldId id="279" r:id="rId25"/>
+    <p:sldId id="320" r:id="rId10"/>
+    <p:sldId id="272" r:id="rId11"/>
+    <p:sldId id="266" r:id="rId12"/>
+    <p:sldId id="267" r:id="rId13"/>
+    <p:sldId id="268" r:id="rId14"/>
+    <p:sldId id="270" r:id="rId15"/>
+    <p:sldId id="273" r:id="rId16"/>
+    <p:sldId id="265" r:id="rId17"/>
+    <p:sldId id="275" r:id="rId18"/>
+    <p:sldId id="271" r:id="rId19"/>
+    <p:sldId id="274" r:id="rId20"/>
+    <p:sldId id="276" r:id="rId21"/>
+    <p:sldId id="284" r:id="rId22"/>
+    <p:sldId id="285" r:id="rId23"/>
+    <p:sldId id="277" r:id="rId24"/>
+    <p:sldId id="278" r:id="rId25"/>
     <p:sldId id="318" r:id="rId26"/>
     <p:sldId id="281" r:id="rId27"/>
     <p:sldId id="286" r:id="rId28"/>
@@ -260,7 +260,7 @@
           <a:p>
             <a:fld id="{EAA08BAD-04ED-244C-92B6-E3671520D864}" type="datetimeFigureOut">
               <a:rPr lang="en-US" smtClean="0"/>
-              <a:t>9/7/17</a:t>
+              <a:t>11/13/17</a:t>
             </a:fld>
             <a:endParaRPr lang="en-US"/>
           </a:p>
@@ -709,7 +709,7 @@
           <a:p>
             <a:fld id="{972605B8-2E90-124E-924E-6F58993143C6}" type="datetimeFigureOut">
               <a:rPr lang="en-US" smtClean="0"/>
-              <a:t>9/7/17</a:t>
+              <a:t>11/13/17</a:t>
             </a:fld>
             <a:endParaRPr lang="en-US"/>
           </a:p>
@@ -879,7 +879,7 @@
           <a:p>
             <a:fld id="{972605B8-2E90-124E-924E-6F58993143C6}" type="datetimeFigureOut">
               <a:rPr lang="en-US" smtClean="0"/>
-              <a:t>9/7/17</a:t>
+              <a:t>11/13/17</a:t>
             </a:fld>
             <a:endParaRPr lang="en-US"/>
           </a:p>
@@ -1059,7 +1059,7 @@
           <a:p>
             <a:fld id="{972605B8-2E90-124E-924E-6F58993143C6}" type="datetimeFigureOut">
               <a:rPr lang="en-US" smtClean="0"/>
-              <a:t>9/7/17</a:t>
+              <a:t>11/13/17</a:t>
             </a:fld>
             <a:endParaRPr lang="en-US"/>
           </a:p>
@@ -1229,7 +1229,7 @@
           <a:p>
             <a:fld id="{972605B8-2E90-124E-924E-6F58993143C6}" type="datetimeFigureOut">
               <a:rPr lang="en-US" smtClean="0"/>
-              <a:t>9/7/17</a:t>
+              <a:t>11/13/17</a:t>
             </a:fld>
             <a:endParaRPr lang="en-US"/>
           </a:p>
@@ -1475,7 +1475,7 @@
           <a:p>
             <a:fld id="{972605B8-2E90-124E-924E-6F58993143C6}" type="datetimeFigureOut">
               <a:rPr lang="en-US" smtClean="0"/>
-              <a:t>9/7/17</a:t>
+              <a:t>11/13/17</a:t>
             </a:fld>
             <a:endParaRPr lang="en-US"/>
           </a:p>
@@ -1763,7 +1763,7 @@
           <a:p>
             <a:fld id="{972605B8-2E90-124E-924E-6F58993143C6}" type="datetimeFigureOut">
               <a:rPr lang="en-US" smtClean="0"/>
-              <a:t>9/7/17</a:t>
+              <a:t>11/13/17</a:t>
             </a:fld>
             <a:endParaRPr lang="en-US"/>
           </a:p>
@@ -2185,7 +2185,7 @@
           <a:p>
             <a:fld id="{972605B8-2E90-124E-924E-6F58993143C6}" type="datetimeFigureOut">
               <a:rPr lang="en-US" smtClean="0"/>
-              <a:t>9/7/17</a:t>
+              <a:t>11/13/17</a:t>
             </a:fld>
             <a:endParaRPr lang="en-US"/>
           </a:p>
@@ -2303,7 +2303,7 @@
           <a:p>
             <a:fld id="{972605B8-2E90-124E-924E-6F58993143C6}" type="datetimeFigureOut">
               <a:rPr lang="en-US" smtClean="0"/>
-              <a:t>9/7/17</a:t>
+              <a:t>11/13/17</a:t>
             </a:fld>
             <a:endParaRPr lang="en-US"/>
           </a:p>
@@ -2398,7 +2398,7 @@
           <a:p>
             <a:fld id="{972605B8-2E90-124E-924E-6F58993143C6}" type="datetimeFigureOut">
               <a:rPr lang="en-US" smtClean="0"/>
-              <a:t>9/7/17</a:t>
+              <a:t>11/13/17</a:t>
             </a:fld>
             <a:endParaRPr lang="en-US"/>
           </a:p>
@@ -2675,7 +2675,7 @@
           <a:p>
             <a:fld id="{972605B8-2E90-124E-924E-6F58993143C6}" type="datetimeFigureOut">
               <a:rPr lang="en-US" smtClean="0"/>
-              <a:t>9/7/17</a:t>
+              <a:t>11/13/17</a:t>
             </a:fld>
             <a:endParaRPr lang="en-US"/>
           </a:p>
@@ -2928,7 +2928,7 @@
           <a:p>
             <a:fld id="{972605B8-2E90-124E-924E-6F58993143C6}" type="datetimeFigureOut">
               <a:rPr lang="en-US" smtClean="0"/>
-              <a:t>9/7/17</a:t>
+              <a:t>11/13/17</a:t>
             </a:fld>
             <a:endParaRPr lang="en-US"/>
           </a:p>
@@ -3141,7 +3141,7 @@
           <a:p>
             <a:fld id="{972605B8-2E90-124E-924E-6F58993143C6}" type="datetimeFigureOut">
               <a:rPr lang="en-US" smtClean="0"/>
-              <a:t>9/7/17</a:t>
+              <a:t>11/13/17</a:t>
             </a:fld>
             <a:endParaRPr lang="en-US"/>
           </a:p>
@@ -3713,171 +3713,40 @@
           <a:p>
             <a:r>
               <a:rPr lang="en-US" dirty="0" smtClean="0"/>
-              <a:t>Create a new server</a:t>
+              <a:t>Application Server Lifecycle</a:t>
             </a:r>
             <a:endParaRPr lang="en-US" dirty="0"/>
           </a:p>
         </p:txBody>
       </p:sp>
-      <p:sp>
-        <p:nvSpPr>
-          <p:cNvPr id="3" name="Content Placeholder 2"/>
-          <p:cNvSpPr>
-            <a:spLocks noGrp="1"/>
-          </p:cNvSpPr>
-          <p:nvPr>
-            <p:ph idx="1"/>
-          </p:nvPr>
-        </p:nvSpPr>
+      <p:pic>
+        <p:nvPicPr>
+          <p:cNvPr id="4" name="Picture 3"/>
+          <p:cNvPicPr>
+            <a:picLocks noChangeAspect="1"/>
+          </p:cNvPicPr>
+          <p:nvPr/>
+        </p:nvPicPr>
+        <p:blipFill>
+          <a:blip r:embed="rId2"/>
+          <a:stretch>
+            <a:fillRect/>
+          </a:stretch>
+        </p:blipFill>
         <p:spPr>
           <a:xfrm>
-            <a:off x="457200" y="1600200"/>
-            <a:ext cx="8229600" cy="4872519"/>
+            <a:off x="554804" y="2252234"/>
+            <a:ext cx="8332342" cy="2812428"/>
           </a:xfrm>
+          <a:prstGeom prst="rect">
+            <a:avLst/>
+          </a:prstGeom>
         </p:spPr>
-        <p:txBody>
-          <a:bodyPr>
-            <a:normAutofit fontScale="62500" lnSpcReduction="20000"/>
-          </a:bodyPr>
-          <a:lstStyle/>
-          <a:p>
-            <a:r>
-              <a:rPr lang="en-US" dirty="0" smtClean="0"/>
-              <a:t>How do we create new servers using automation?</a:t>
-            </a:r>
-          </a:p>
-          <a:p>
-            <a:pPr lvl="1"/>
-            <a:r>
-              <a:rPr lang="en-US" dirty="0" smtClean="0"/>
-              <a:t>Server consists of:</a:t>
-            </a:r>
-          </a:p>
-          <a:p>
-            <a:pPr lvl="2"/>
-            <a:r>
-              <a:rPr lang="en-US" dirty="0"/>
-              <a:t>I</a:t>
-            </a:r>
-            <a:r>
-              <a:rPr lang="en-US" dirty="0" smtClean="0"/>
-              <a:t>nfrastructure definition (server type)</a:t>
-            </a:r>
-          </a:p>
-          <a:p>
-            <a:pPr lvl="2"/>
-            <a:r>
-              <a:rPr lang="en-US" dirty="0" smtClean="0"/>
-              <a:t>Operating system</a:t>
-            </a:r>
-          </a:p>
-          <a:p>
-            <a:pPr lvl="2"/>
-            <a:r>
-              <a:rPr lang="en-US" dirty="0" smtClean="0"/>
-              <a:t>Software (</a:t>
-            </a:r>
-            <a:r>
-              <a:rPr lang="en-US" dirty="0" err="1" smtClean="0"/>
-              <a:t>php</a:t>
-            </a:r>
-            <a:r>
-              <a:rPr lang="en-US" dirty="0" smtClean="0"/>
-              <a:t>, apache, </a:t>
-            </a:r>
-            <a:r>
-              <a:rPr lang="en-US" dirty="0" err="1" smtClean="0"/>
-              <a:t>mysql</a:t>
-            </a:r>
-            <a:r>
-              <a:rPr lang="en-US" dirty="0" smtClean="0"/>
-              <a:t>)</a:t>
-            </a:r>
-          </a:p>
-          <a:p>
-            <a:pPr lvl="2"/>
-            <a:r>
-              <a:rPr lang="en-US" dirty="0" smtClean="0"/>
-              <a:t>OS &amp; application configuration</a:t>
-            </a:r>
-          </a:p>
-          <a:p>
-            <a:pPr lvl="2"/>
-            <a:r>
-              <a:rPr lang="en-US" dirty="0" smtClean="0"/>
-              <a:t>Data</a:t>
-            </a:r>
-          </a:p>
-          <a:p>
-            <a:pPr lvl="1"/>
-            <a:endParaRPr lang="en-US" dirty="0"/>
-          </a:p>
-          <a:p>
-            <a:pPr lvl="1"/>
-            <a:r>
-              <a:rPr lang="en-US" dirty="0" smtClean="0"/>
-              <a:t>Use Terraform, CloudFormation, Auto-scaling or other tools to create the infrastructure.</a:t>
-            </a:r>
-          </a:p>
-          <a:p>
-            <a:pPr lvl="1"/>
-            <a:endParaRPr lang="en-US" dirty="0" smtClean="0"/>
-          </a:p>
-          <a:p>
-            <a:pPr lvl="1"/>
-            <a:r>
-              <a:rPr lang="en-US" dirty="0"/>
-              <a:t>S</a:t>
-            </a:r>
-            <a:r>
-              <a:rPr lang="en-US" dirty="0" smtClean="0"/>
-              <a:t>elect a server template (image) containing an operating system and software.</a:t>
-            </a:r>
-          </a:p>
-          <a:p>
-            <a:pPr lvl="1"/>
-            <a:endParaRPr lang="en-US" dirty="0"/>
-          </a:p>
-          <a:p>
-            <a:pPr lvl="1"/>
-            <a:r>
-              <a:rPr lang="en-US" dirty="0" smtClean="0"/>
-              <a:t>Deploy software and configuration using a command tool (Capistrano) or configuration management tool (Chef/ Puppet/ </a:t>
-            </a:r>
-            <a:r>
-              <a:rPr lang="en-US" dirty="0" err="1" smtClean="0"/>
-              <a:t>Ansible</a:t>
-            </a:r>
-            <a:r>
-              <a:rPr lang="en-US" dirty="0" smtClean="0"/>
-              <a:t>).</a:t>
-            </a:r>
-          </a:p>
-          <a:p>
-            <a:pPr lvl="1"/>
-            <a:endParaRPr lang="en-US" dirty="0"/>
-          </a:p>
-          <a:p>
-            <a:pPr lvl="1"/>
-            <a:r>
-              <a:rPr lang="en-US" dirty="0" smtClean="0"/>
-              <a:t>Potentially package everything in containers (Docker – Lecture 12).</a:t>
-            </a:r>
-          </a:p>
-          <a:p>
-            <a:pPr lvl="1"/>
-            <a:endParaRPr lang="en-US" dirty="0"/>
-          </a:p>
-          <a:p>
-            <a:pPr lvl="1"/>
-            <a:endParaRPr lang="en-US" dirty="0" smtClean="0"/>
-          </a:p>
-        </p:txBody>
-      </p:sp>
+      </p:pic>
     </p:spTree>
     <p:extLst>
       <p:ext uri="{BB962C8B-B14F-4D97-AF65-F5344CB8AC3E}">
-        <p14:creationId xmlns:p14="http://schemas.microsoft.com/office/powerpoint/2010/main" val="1108213971"/>
+        <p14:creationId xmlns:p14="http://schemas.microsoft.com/office/powerpoint/2010/main" val="845040489"/>
       </p:ext>
     </p:extLst>
   </p:cSld>
@@ -3928,7 +3797,7 @@
           <a:p>
             <a:r>
               <a:rPr lang="en-US" dirty="0" smtClean="0"/>
-              <a:t>Server Template</a:t>
+              <a:t>Create a new server</a:t>
             </a:r>
             <a:endParaRPr lang="en-US" dirty="0"/>
           </a:p>
@@ -3947,120 +3816,152 @@
         <p:spPr>
           <a:xfrm>
             <a:off x="457200" y="1600200"/>
-            <a:ext cx="8229600" cy="5149921"/>
+            <a:ext cx="8229600" cy="4872519"/>
           </a:xfrm>
         </p:spPr>
         <p:txBody>
           <a:bodyPr>
-            <a:normAutofit fontScale="85000" lnSpcReduction="20000"/>
+            <a:normAutofit fontScale="62500" lnSpcReduction="20000"/>
           </a:bodyPr>
           <a:lstStyle/>
           <a:p>
             <a:r>
               <a:rPr lang="en-US" dirty="0" smtClean="0"/>
-              <a:t>There are two general approaches to building a server:</a:t>
+              <a:t>How do we create new servers using automation?</a:t>
             </a:r>
           </a:p>
           <a:p>
             <a:pPr lvl="1"/>
             <a:r>
-              <a:rPr lang="en-US" b="1" dirty="0" smtClean="0"/>
-              <a:t>Bake</a:t>
-            </a:r>
-            <a:r>
-              <a:rPr lang="en-US" dirty="0" smtClean="0"/>
-              <a:t>: pre-generate a software image which contains an OS and all the required software components.</a:t>
+              <a:rPr lang="en-US" dirty="0" smtClean="0"/>
+              <a:t>Server consists of:</a:t>
             </a:r>
           </a:p>
           <a:p>
             <a:pPr lvl="2"/>
             <a:r>
-              <a:rPr lang="en-US" dirty="0" smtClean="0"/>
-              <a:t>Example: Use an AMI based on a snapshot of a fully working system.</a:t>
+              <a:rPr lang="en-US" dirty="0"/>
+              <a:t>I</a:t>
+            </a:r>
+            <a:r>
+              <a:rPr lang="en-US" dirty="0" smtClean="0"/>
+              <a:t>nfrastructure definition (server type)</a:t>
             </a:r>
           </a:p>
           <a:p>
             <a:pPr lvl="2"/>
             <a:r>
               <a:rPr lang="en-US" dirty="0" smtClean="0"/>
-              <a:t>May need to perform a few configuration tasks once it’s launched.</a:t>
+              <a:t>Operating system</a:t>
             </a:r>
           </a:p>
           <a:p>
             <a:pPr lvl="2"/>
             <a:r>
               <a:rPr lang="en-US" dirty="0" smtClean="0"/>
-              <a:t>Benefit: Allows you to launch a new server quickly.</a:t>
+              <a:t>Software (</a:t>
+            </a:r>
+            <a:r>
+              <a:rPr lang="en-US" dirty="0" err="1" smtClean="0"/>
+              <a:t>php</a:t>
+            </a:r>
+            <a:r>
+              <a:rPr lang="en-US" dirty="0" smtClean="0"/>
+              <a:t>, apache, </a:t>
+            </a:r>
+            <a:r>
+              <a:rPr lang="en-US" dirty="0" err="1" smtClean="0"/>
+              <a:t>mysql</a:t>
+            </a:r>
+            <a:r>
+              <a:rPr lang="en-US" dirty="0" smtClean="0"/>
+              <a:t>)</a:t>
             </a:r>
           </a:p>
           <a:p>
             <a:pPr lvl="2"/>
             <a:r>
               <a:rPr lang="en-US" dirty="0" smtClean="0"/>
-              <a:t>Risk: May require you to frequently create and manage new images.</a:t>
+              <a:t>OS &amp; application configuration</a:t>
             </a:r>
           </a:p>
           <a:p>
             <a:pPr lvl="2"/>
             <a:r>
+              <a:rPr lang="en-US" dirty="0" smtClean="0"/>
+              <a:t>Data</a:t>
+            </a:r>
+          </a:p>
+          <a:p>
+            <a:pPr lvl="1"/>
+            <a:endParaRPr lang="en-US" dirty="0"/>
+          </a:p>
+          <a:p>
+            <a:pPr lvl="1"/>
+            <a:r>
+              <a:rPr lang="en-US" dirty="0" smtClean="0"/>
+              <a:t>Use Terraform, CloudFormation, Auto-scaling or other tools to create the infrastructure.</a:t>
+            </a:r>
+          </a:p>
+          <a:p>
+            <a:pPr lvl="1"/>
+            <a:endParaRPr lang="en-US" dirty="0" smtClean="0"/>
+          </a:p>
+          <a:p>
+            <a:pPr lvl="1"/>
+            <a:r>
               <a:rPr lang="en-US" dirty="0"/>
-              <a:t>Practice: minimize amount of software in a template</a:t>
-            </a:r>
-            <a:r>
-              <a:rPr lang="en-US" dirty="0" smtClean="0"/>
-              <a:t>.</a:t>
-            </a:r>
-          </a:p>
-          <a:p>
-            <a:pPr lvl="2"/>
+              <a:t>S</a:t>
+            </a:r>
+            <a:r>
+              <a:rPr lang="en-US" dirty="0" smtClean="0"/>
+              <a:t>elect a server template (image) containing an operating system and software.</a:t>
+            </a:r>
+          </a:p>
+          <a:p>
+            <a:pPr lvl="1"/>
+            <a:endParaRPr lang="en-US" dirty="0"/>
+          </a:p>
+          <a:p>
+            <a:pPr lvl="1"/>
+            <a:r>
+              <a:rPr lang="en-US" dirty="0" smtClean="0"/>
+              <a:t>Deploy software and configuration using a command tool (Capistrano) or configuration management tool (Chef/ Puppet/ </a:t>
+            </a:r>
+            <a:r>
+              <a:rPr lang="en-US" dirty="0" err="1" smtClean="0"/>
+              <a:t>Ansible</a:t>
+            </a:r>
+            <a:r>
+              <a:rPr lang="en-US" dirty="0" smtClean="0"/>
+              <a:t>).</a:t>
+            </a:r>
+          </a:p>
+          <a:p>
+            <a:pPr lvl="1"/>
+            <a:endParaRPr lang="en-US" dirty="0"/>
+          </a:p>
+          <a:p>
+            <a:pPr lvl="1"/>
+            <a:r>
+              <a:rPr lang="en-US" dirty="0" smtClean="0"/>
+              <a:t>Potentially package everything in containers (Docker – Lecture 12).</a:t>
+            </a:r>
+          </a:p>
+          <a:p>
+            <a:pPr lvl="1"/>
+            <a:endParaRPr lang="en-US" dirty="0"/>
+          </a:p>
+          <a:p>
+            <a:pPr lvl="1"/>
             <a:endParaRPr lang="en-US" dirty="0" smtClean="0"/>
-          </a:p>
-          <a:p>
-            <a:pPr lvl="1"/>
-            <a:r>
-              <a:rPr lang="en-US" b="1" dirty="0" smtClean="0"/>
-              <a:t>Fry</a:t>
-            </a:r>
-            <a:r>
-              <a:rPr lang="en-US" dirty="0" smtClean="0"/>
-              <a:t>: launch a server with a plain OS distribution and then install required software on-the-fly.</a:t>
-            </a:r>
-          </a:p>
-          <a:p>
-            <a:pPr lvl="2"/>
-            <a:r>
-              <a:rPr lang="en-US" dirty="0" smtClean="0"/>
-              <a:t>Example: Use a base AMI image and run a </a:t>
-            </a:r>
-            <a:r>
-              <a:rPr lang="en-US" dirty="0" err="1" smtClean="0"/>
-              <a:t>userdata</a:t>
-            </a:r>
-            <a:r>
-              <a:rPr lang="en-US" dirty="0" smtClean="0"/>
-              <a:t> shell script.</a:t>
-            </a:r>
-          </a:p>
-          <a:p>
-            <a:pPr lvl="2"/>
-            <a:r>
-              <a:rPr lang="en-US" dirty="0" smtClean="0"/>
-              <a:t>Benefit: No need to manage images.</a:t>
-            </a:r>
-          </a:p>
-          <a:p>
-            <a:pPr lvl="2"/>
-            <a:r>
-              <a:rPr lang="en-US" dirty="0" smtClean="0"/>
-              <a:t>Risk: New instances may take a long time to deploy.</a:t>
-            </a:r>
           </a:p>
         </p:txBody>
       </p:sp>
     </p:spTree>
     <p:extLst>
       <p:ext uri="{BB962C8B-B14F-4D97-AF65-F5344CB8AC3E}">
-        <p14:creationId xmlns:p14="http://schemas.microsoft.com/office/powerpoint/2010/main" val="1394062895"/>
+        <p14:creationId xmlns:p14="http://schemas.microsoft.com/office/powerpoint/2010/main" val="1108213971"/>
       </p:ext>
     </p:extLst>
   </p:cSld>
@@ -4111,6 +4012,189 @@
           <a:p>
             <a:r>
               <a:rPr lang="en-US" dirty="0" smtClean="0"/>
+              <a:t>Server Template</a:t>
+            </a:r>
+            <a:endParaRPr lang="en-US" dirty="0"/>
+          </a:p>
+        </p:txBody>
+      </p:sp>
+      <p:sp>
+        <p:nvSpPr>
+          <p:cNvPr id="3" name="Content Placeholder 2"/>
+          <p:cNvSpPr>
+            <a:spLocks noGrp="1"/>
+          </p:cNvSpPr>
+          <p:nvPr>
+            <p:ph idx="1"/>
+          </p:nvPr>
+        </p:nvSpPr>
+        <p:spPr>
+          <a:xfrm>
+            <a:off x="457200" y="1600200"/>
+            <a:ext cx="8229600" cy="5149921"/>
+          </a:xfrm>
+        </p:spPr>
+        <p:txBody>
+          <a:bodyPr>
+            <a:normAutofit fontScale="85000" lnSpcReduction="20000"/>
+          </a:bodyPr>
+          <a:lstStyle/>
+          <a:p>
+            <a:r>
+              <a:rPr lang="en-US" dirty="0" smtClean="0"/>
+              <a:t>There are two general approaches to building a server:</a:t>
+            </a:r>
+          </a:p>
+          <a:p>
+            <a:pPr lvl="1"/>
+            <a:r>
+              <a:rPr lang="en-US" b="1" dirty="0" smtClean="0"/>
+              <a:t>Bake</a:t>
+            </a:r>
+            <a:r>
+              <a:rPr lang="en-US" dirty="0" smtClean="0"/>
+              <a:t>: pre-generate a software image which contains an OS and all the required software components.</a:t>
+            </a:r>
+          </a:p>
+          <a:p>
+            <a:pPr lvl="2"/>
+            <a:r>
+              <a:rPr lang="en-US" dirty="0" smtClean="0"/>
+              <a:t>Example: Use an AMI based on a snapshot of a fully working system.</a:t>
+            </a:r>
+          </a:p>
+          <a:p>
+            <a:pPr lvl="2"/>
+            <a:r>
+              <a:rPr lang="en-US" dirty="0" smtClean="0"/>
+              <a:t>May need to perform a few configuration tasks once it’s launched.</a:t>
+            </a:r>
+          </a:p>
+          <a:p>
+            <a:pPr lvl="2"/>
+            <a:r>
+              <a:rPr lang="en-US" dirty="0" smtClean="0"/>
+              <a:t>Benefit: Allows you to launch a new server quickly.</a:t>
+            </a:r>
+          </a:p>
+          <a:p>
+            <a:pPr lvl="2"/>
+            <a:r>
+              <a:rPr lang="en-US" dirty="0" smtClean="0"/>
+              <a:t>Risk: May require you to frequently create and manage new images.</a:t>
+            </a:r>
+          </a:p>
+          <a:p>
+            <a:pPr lvl="2"/>
+            <a:r>
+              <a:rPr lang="en-US" dirty="0"/>
+              <a:t>Practice: minimize amount of software in a template</a:t>
+            </a:r>
+            <a:r>
+              <a:rPr lang="en-US" dirty="0" smtClean="0"/>
+              <a:t>.</a:t>
+            </a:r>
+          </a:p>
+          <a:p>
+            <a:pPr lvl="2"/>
+            <a:endParaRPr lang="en-US" dirty="0" smtClean="0"/>
+          </a:p>
+          <a:p>
+            <a:pPr lvl="1"/>
+            <a:r>
+              <a:rPr lang="en-US" b="1" dirty="0" smtClean="0"/>
+              <a:t>Fry</a:t>
+            </a:r>
+            <a:r>
+              <a:rPr lang="en-US" dirty="0" smtClean="0"/>
+              <a:t>: launch a server with a plain OS distribution and then install required software on-the-fly.</a:t>
+            </a:r>
+          </a:p>
+          <a:p>
+            <a:pPr lvl="2"/>
+            <a:r>
+              <a:rPr lang="en-US" dirty="0" smtClean="0"/>
+              <a:t>Example: Use a base AMI image and run a </a:t>
+            </a:r>
+            <a:r>
+              <a:rPr lang="en-US" dirty="0" err="1" smtClean="0"/>
+              <a:t>userdata</a:t>
+            </a:r>
+            <a:r>
+              <a:rPr lang="en-US" dirty="0" smtClean="0"/>
+              <a:t> shell script.</a:t>
+            </a:r>
+          </a:p>
+          <a:p>
+            <a:pPr lvl="2"/>
+            <a:r>
+              <a:rPr lang="en-US" dirty="0" smtClean="0"/>
+              <a:t>Benefit: No need to manage images.</a:t>
+            </a:r>
+          </a:p>
+          <a:p>
+            <a:pPr lvl="2"/>
+            <a:r>
+              <a:rPr lang="en-US" dirty="0" smtClean="0"/>
+              <a:t>Risk: New instances may take a long time to deploy.</a:t>
+            </a:r>
+          </a:p>
+        </p:txBody>
+      </p:sp>
+    </p:spTree>
+    <p:extLst>
+      <p:ext uri="{BB962C8B-B14F-4D97-AF65-F5344CB8AC3E}">
+        <p14:creationId xmlns:p14="http://schemas.microsoft.com/office/powerpoint/2010/main" val="1394062895"/>
+      </p:ext>
+    </p:extLst>
+  </p:cSld>
+  <p:clrMapOvr>
+    <a:masterClrMapping/>
+  </p:clrMapOvr>
+  <p:timing>
+    <p:tnLst>
+      <p:par>
+        <p:cTn id="1" dur="indefinite" restart="never" nodeType="tmRoot"/>
+      </p:par>
+    </p:tnLst>
+  </p:timing>
+</p:sld>
+</file>
+
+<file path=ppt/slides/slide13.xml><?xml version="1.0" encoding="utf-8"?>
+<p:sld xmlns:a="http://schemas.openxmlformats.org/drawingml/2006/main" xmlns:r="http://schemas.openxmlformats.org/officeDocument/2006/relationships" xmlns:p="http://schemas.openxmlformats.org/presentationml/2006/main">
+  <p:cSld>
+    <p:spTree>
+      <p:nvGrpSpPr>
+        <p:cNvPr id="1" name=""/>
+        <p:cNvGrpSpPr/>
+        <p:nvPr/>
+      </p:nvGrpSpPr>
+      <p:grpSpPr>
+        <a:xfrm>
+          <a:off x="0" y="0"/>
+          <a:ext cx="0" cy="0"/>
+          <a:chOff x="0" y="0"/>
+          <a:chExt cx="0" cy="0"/>
+        </a:xfrm>
+      </p:grpSpPr>
+      <p:sp>
+        <p:nvSpPr>
+          <p:cNvPr id="2" name="Title 1"/>
+          <p:cNvSpPr>
+            <a:spLocks noGrp="1"/>
+          </p:cNvSpPr>
+          <p:nvPr>
+            <p:ph type="title"/>
+          </p:nvPr>
+        </p:nvSpPr>
+        <p:spPr/>
+        <p:txBody>
+          <a:bodyPr/>
+          <a:lstStyle/>
+          <a:p>
+            <a:r>
+              <a:rPr lang="en-US" dirty="0" smtClean="0"/>
               <a:t>Packer</a:t>
             </a:r>
             <a:endParaRPr lang="en-US" dirty="0"/>
@@ -4244,7 +4328,7 @@
 </p:sld>
 </file>
 
-<file path=ppt/slides/slide13.xml><?xml version="1.0" encoding="utf-8"?>
+<file path=ppt/slides/slide14.xml><?xml version="1.0" encoding="utf-8"?>
 <p:sld xmlns:a="http://schemas.openxmlformats.org/drawingml/2006/main" xmlns:r="http://schemas.openxmlformats.org/officeDocument/2006/relationships" xmlns:p="http://schemas.openxmlformats.org/presentationml/2006/main">
   <p:cSld>
     <p:spTree>
@@ -4425,166 +4509,6 @@
 </p:sld>
 </file>
 
-<file path=ppt/slides/slide14.xml><?xml version="1.0" encoding="utf-8"?>
-<p:sld xmlns:a="http://schemas.openxmlformats.org/drawingml/2006/main" xmlns:r="http://schemas.openxmlformats.org/officeDocument/2006/relationships" xmlns:p="http://schemas.openxmlformats.org/presentationml/2006/main">
-  <p:cSld>
-    <p:spTree>
-      <p:nvGrpSpPr>
-        <p:cNvPr id="1" name=""/>
-        <p:cNvGrpSpPr/>
-        <p:nvPr/>
-      </p:nvGrpSpPr>
-      <p:grpSpPr>
-        <a:xfrm>
-          <a:off x="0" y="0"/>
-          <a:ext cx="0" cy="0"/>
-          <a:chOff x="0" y="0"/>
-          <a:chExt cx="0" cy="0"/>
-        </a:xfrm>
-      </p:grpSpPr>
-      <p:sp>
-        <p:nvSpPr>
-          <p:cNvPr id="2" name="Title 1"/>
-          <p:cNvSpPr>
-            <a:spLocks noGrp="1"/>
-          </p:cNvSpPr>
-          <p:nvPr>
-            <p:ph type="title"/>
-          </p:nvPr>
-        </p:nvSpPr>
-        <p:spPr/>
-        <p:txBody>
-          <a:bodyPr/>
-          <a:lstStyle/>
-          <a:p>
-            <a:r>
-              <a:rPr lang="en-US" dirty="0" smtClean="0"/>
-              <a:t>Update a server</a:t>
-            </a:r>
-            <a:endParaRPr lang="en-US" dirty="0"/>
-          </a:p>
-        </p:txBody>
-      </p:sp>
-      <p:sp>
-        <p:nvSpPr>
-          <p:cNvPr id="3" name="Content Placeholder 2"/>
-          <p:cNvSpPr>
-            <a:spLocks noGrp="1"/>
-          </p:cNvSpPr>
-          <p:nvPr>
-            <p:ph idx="1"/>
-          </p:nvPr>
-        </p:nvSpPr>
-        <p:spPr>
-          <a:xfrm>
-            <a:off x="457200" y="1600200"/>
-            <a:ext cx="8229600" cy="4903342"/>
-          </a:xfrm>
-        </p:spPr>
-        <p:txBody>
-          <a:bodyPr>
-            <a:normAutofit fontScale="77500" lnSpcReduction="20000"/>
-          </a:bodyPr>
-          <a:lstStyle/>
-          <a:p>
-            <a:r>
-              <a:rPr lang="en-US" dirty="0" smtClean="0"/>
-              <a:t>4 models for making configuration changes to servers:</a:t>
-            </a:r>
-          </a:p>
-          <a:p>
-            <a:pPr lvl="1"/>
-            <a:r>
-              <a:rPr lang="en-US" b="1" dirty="0" smtClean="0"/>
-              <a:t>Ad hoc </a:t>
-            </a:r>
-            <a:r>
-              <a:rPr lang="en-US" dirty="0" smtClean="0"/>
-              <a:t>change management: leave server alone until a specific change needs to be made and manually make the change.</a:t>
-            </a:r>
-          </a:p>
-          <a:p>
-            <a:pPr lvl="2"/>
-            <a:r>
-              <a:rPr lang="en-US" dirty="0" smtClean="0"/>
-              <a:t>Tends to leave servers inconsistently configured.</a:t>
-            </a:r>
-          </a:p>
-          <a:p>
-            <a:pPr lvl="2"/>
-            <a:endParaRPr lang="en-US" dirty="0" smtClean="0"/>
-          </a:p>
-          <a:p>
-            <a:pPr lvl="2"/>
-            <a:r>
-              <a:rPr lang="en-US" dirty="0" smtClean="0"/>
-              <a:t>Leads to </a:t>
-            </a:r>
-            <a:r>
-              <a:rPr lang="en-US" b="1" dirty="0" smtClean="0"/>
-              <a:t>configuration drift </a:t>
-            </a:r>
-            <a:r>
-              <a:rPr lang="en-US" dirty="0" smtClean="0"/>
-              <a:t>– a set of servers identically configured will gradually drift apart.</a:t>
-            </a:r>
-          </a:p>
-          <a:p>
-            <a:pPr lvl="1"/>
-            <a:endParaRPr lang="en-US" dirty="0"/>
-          </a:p>
-          <a:p>
-            <a:pPr lvl="1"/>
-            <a:r>
-              <a:rPr lang="en-US" b="1" dirty="0" smtClean="0"/>
-              <a:t>Continuous configuration synchronization</a:t>
-            </a:r>
-            <a:r>
-              <a:rPr lang="en-US" dirty="0" smtClean="0"/>
-              <a:t>: server configuration tool runs on an unattended schedule and applies the current set of configuration definitions.</a:t>
-            </a:r>
-          </a:p>
-          <a:p>
-            <a:pPr lvl="2"/>
-            <a:r>
-              <a:rPr lang="en-US" dirty="0" smtClean="0"/>
-              <a:t>Minimizes configuration drift by continuously reapplying configuration.</a:t>
-            </a:r>
-          </a:p>
-          <a:p>
-            <a:pPr lvl="2"/>
-            <a:endParaRPr lang="en-US" dirty="0" smtClean="0"/>
-          </a:p>
-          <a:p>
-            <a:pPr lvl="2"/>
-            <a:r>
-              <a:rPr lang="en-US" dirty="0" smtClean="0"/>
-              <a:t>Only manages configuration covered by definition files, creating opportunities for other parts of the server configuration to drift.</a:t>
-            </a:r>
-            <a:endParaRPr lang="en-US" dirty="0"/>
-          </a:p>
-        </p:txBody>
-      </p:sp>
-    </p:spTree>
-    <p:extLst>
-      <p:ext uri="{BB962C8B-B14F-4D97-AF65-F5344CB8AC3E}">
-        <p14:creationId xmlns:p14="http://schemas.microsoft.com/office/powerpoint/2010/main" val="2022118344"/>
-      </p:ext>
-    </p:extLst>
-  </p:cSld>
-  <p:clrMapOvr>
-    <a:masterClrMapping/>
-  </p:clrMapOvr>
-  <p:timing>
-    <p:tnLst>
-      <p:par>
-        <p:cTn id="1" dur="indefinite" restart="never" nodeType="tmRoot"/>
-      </p:par>
-    </p:tnLst>
-  </p:timing>
-</p:sld>
-</file>
-
 <file path=ppt/slides/slide15.xml><?xml version="1.0" encoding="utf-8"?>
 <p:sld xmlns:a="http://schemas.openxmlformats.org/drawingml/2006/main" xmlns:r="http://schemas.openxmlformats.org/officeDocument/2006/relationships" xmlns:p="http://schemas.openxmlformats.org/presentationml/2006/main">
   <p:cSld>
@@ -4638,30 +4562,36 @@
         <p:spPr>
           <a:xfrm>
             <a:off x="457200" y="1600200"/>
-            <a:ext cx="8229600" cy="4687584"/>
+            <a:ext cx="8229600" cy="4903342"/>
           </a:xfrm>
         </p:spPr>
         <p:txBody>
           <a:bodyPr>
-            <a:normAutofit fontScale="70000" lnSpcReduction="20000"/>
+            <a:normAutofit fontScale="77500" lnSpcReduction="20000"/>
           </a:bodyPr>
           <a:lstStyle/>
           <a:p>
+            <a:r>
+              <a:rPr lang="en-US" dirty="0" smtClean="0"/>
+              <a:t>4 models for making configuration changes to servers:</a:t>
+            </a:r>
+          </a:p>
+          <a:p>
             <a:pPr lvl="1"/>
             <a:r>
               <a:rPr lang="en-US" b="1" dirty="0" smtClean="0"/>
-              <a:t>Immutable servers</a:t>
-            </a:r>
-            <a:r>
-              <a:rPr lang="en-US" dirty="0" smtClean="0"/>
-              <a:t>: a deployment methodology where we replace systems instead of updating them.</a:t>
+              <a:t>Ad hoc </a:t>
+            </a:r>
+            <a:r>
+              <a:rPr lang="en-US" dirty="0" smtClean="0"/>
+              <a:t>change management: leave server alone until a specific change needs to be made and manually make the change.</a:t>
             </a:r>
           </a:p>
           <a:p>
             <a:pPr lvl="2"/>
             <a:r>
               <a:rPr lang="en-US" dirty="0" smtClean="0"/>
-              <a:t>Allows us to fully test configuration changes and not worry about unexpected effects of changing running systems.</a:t>
+              <a:t>Tends to leave servers inconsistently configured.</a:t>
             </a:r>
           </a:p>
           <a:p>
@@ -4672,29 +4602,15 @@
             <a:pPr lvl="2"/>
             <a:r>
               <a:rPr lang="en-US" dirty="0" smtClean="0"/>
-              <a:t>Eliminates pets from the infrastructure environment.</a:t>
-            </a:r>
-          </a:p>
-          <a:p>
-            <a:pPr lvl="1"/>
-            <a:endParaRPr lang="en-US" dirty="0" smtClean="0"/>
-          </a:p>
-          <a:p>
-            <a:pPr lvl="2"/>
-            <a:r>
-              <a:rPr lang="en-US" dirty="0" smtClean="0"/>
-              <a:t>Mitigates configuration drift because systems don’t live long.</a:t>
-            </a:r>
-          </a:p>
-          <a:p>
-            <a:pPr lvl="2"/>
-            <a:endParaRPr lang="en-US" dirty="0"/>
-          </a:p>
-          <a:p>
-            <a:pPr lvl="2"/>
-            <a:r>
-              <a:rPr lang="en-US" dirty="0" smtClean="0"/>
-              <a:t>Practice: replace servers anytime a server template changes.</a:t>
+              <a:t>Leads to </a:t>
+            </a:r>
+            <a:r>
+              <a:rPr lang="en-US" b="1" dirty="0" smtClean="0"/>
+              <a:t>configuration drift </a:t>
+            </a:r>
+            <a:r>
+              <a:rPr lang="en-US" dirty="0" smtClean="0"/>
+              <a:t>– a set of servers identically configured will gradually drift apart.</a:t>
             </a:r>
           </a:p>
           <a:p>
@@ -4702,36 +4618,21 @@
             <a:endParaRPr lang="en-US" dirty="0"/>
           </a:p>
           <a:p>
+            <a:pPr lvl="1"/>
+            <a:r>
+              <a:rPr lang="en-US" b="1" dirty="0" smtClean="0"/>
+              <a:t>Continuous configuration synchronization</a:t>
+            </a:r>
+            <a:r>
+              <a:rPr lang="en-US" dirty="0" smtClean="0"/>
+              <a:t>: server configuration tool runs on an unattended schedule and applies the current set of configuration definitions.</a:t>
+            </a:r>
+          </a:p>
+          <a:p>
             <a:pPr lvl="2"/>
             <a:r>
-              <a:rPr lang="en-US" b="1" dirty="0" smtClean="0"/>
-              <a:t>Phoenix server </a:t>
-            </a:r>
-            <a:r>
-              <a:rPr lang="en-US" dirty="0" smtClean="0"/>
-              <a:t>pattern: replace servers on a scheduled basis regardless of whether changes need to be made or not. </a:t>
-            </a:r>
-          </a:p>
-          <a:p>
-            <a:pPr lvl="1"/>
-            <a:endParaRPr lang="en-US" dirty="0"/>
-          </a:p>
-          <a:p>
-            <a:pPr lvl="1"/>
-            <a:r>
-              <a:rPr lang="en-US" b="1" dirty="0" smtClean="0"/>
-              <a:t>Containerized servers</a:t>
-            </a:r>
-            <a:r>
-              <a:rPr lang="en-US" dirty="0" smtClean="0"/>
-              <a:t>: use containers to package applications and their dependencies.</a:t>
-            </a:r>
-          </a:p>
-          <a:p>
-            <a:pPr lvl="2"/>
-            <a:r>
-              <a:rPr lang="en-US" dirty="0" smtClean="0"/>
-              <a:t>Basically immutable servers, but with containers.</a:t>
+              <a:rPr lang="en-US" dirty="0" smtClean="0"/>
+              <a:t>Minimizes configuration drift by continuously reapplying configuration.</a:t>
             </a:r>
           </a:p>
           <a:p>
@@ -4739,7 +4640,11 @@
             <a:endParaRPr lang="en-US" dirty="0" smtClean="0"/>
           </a:p>
           <a:p>
-            <a:pPr lvl="1"/>
+            <a:pPr lvl="2"/>
+            <a:r>
+              <a:rPr lang="en-US" dirty="0" smtClean="0"/>
+              <a:t>Only manages configuration covered by definition files, creating opportunities for other parts of the server configuration to drift.</a:t>
+            </a:r>
             <a:endParaRPr lang="en-US" dirty="0"/>
           </a:p>
         </p:txBody>
@@ -4747,7 +4652,7 @@
     </p:spTree>
     <p:extLst>
       <p:ext uri="{BB962C8B-B14F-4D97-AF65-F5344CB8AC3E}">
-        <p14:creationId xmlns:p14="http://schemas.microsoft.com/office/powerpoint/2010/main" val="1969535460"/>
+        <p14:creationId xmlns:p14="http://schemas.microsoft.com/office/powerpoint/2010/main" val="2022118344"/>
       </p:ext>
     </p:extLst>
   </p:cSld>
@@ -4798,7 +4703,7 @@
           <a:p>
             <a:r>
               <a:rPr lang="en-US" dirty="0" smtClean="0"/>
-              <a:t>Dynamic Infrastructure Challenges</a:t>
+              <a:t>Update a server</a:t>
             </a:r>
             <a:endParaRPr lang="en-US" dirty="0"/>
           </a:p>
@@ -4816,33 +4721,42 @@
         </p:nvSpPr>
         <p:spPr>
           <a:xfrm>
-            <a:off x="457200" y="1600199"/>
-            <a:ext cx="8229600" cy="4625940"/>
+            <a:off x="457200" y="1600200"/>
+            <a:ext cx="8229600" cy="4687584"/>
           </a:xfrm>
         </p:spPr>
         <p:txBody>
           <a:bodyPr>
-            <a:normAutofit fontScale="55000" lnSpcReduction="20000"/>
+            <a:normAutofit fontScale="70000" lnSpcReduction="20000"/>
           </a:bodyPr>
           <a:lstStyle/>
           <a:p>
-            <a:r>
-              <a:rPr lang="en-US" dirty="0" smtClean="0"/>
-              <a:t>Server sprawl</a:t>
-            </a:r>
-          </a:p>
-          <a:p>
             <a:pPr lvl="1"/>
             <a:r>
-              <a:rPr lang="en-US" sz="2900" dirty="0" smtClean="0"/>
-              <a:t>It’s really easy to provision new servers.</a:t>
-            </a:r>
-          </a:p>
-          <a:p>
-            <a:pPr lvl="1"/>
-            <a:r>
-              <a:rPr lang="en-US" sz="2900" dirty="0" smtClean="0"/>
-              <a:t>It becomes difficult to patch and consistently maintain servers and the numbers grow.</a:t>
+              <a:rPr lang="en-US" b="1" dirty="0" smtClean="0"/>
+              <a:t>Immutable servers</a:t>
+            </a:r>
+            <a:r>
+              <a:rPr lang="en-US" dirty="0" smtClean="0"/>
+              <a:t>: a deployment methodology where we replace systems instead of updating them.</a:t>
+            </a:r>
+          </a:p>
+          <a:p>
+            <a:pPr lvl="2"/>
+            <a:r>
+              <a:rPr lang="en-US" dirty="0" smtClean="0"/>
+              <a:t>Allows us to fully test configuration changes and not worry about unexpected effects of changing running systems.</a:t>
+            </a:r>
+          </a:p>
+          <a:p>
+            <a:pPr lvl="2"/>
+            <a:endParaRPr lang="en-US" dirty="0" smtClean="0"/>
+          </a:p>
+          <a:p>
+            <a:pPr lvl="2"/>
+            <a:r>
+              <a:rPr lang="en-US" dirty="0" smtClean="0"/>
+              <a:t>Eliminates pets from the infrastructure environment.</a:t>
             </a:r>
           </a:p>
           <a:p>
@@ -4850,89 +4764,74 @@
             <a:endParaRPr lang="en-US" dirty="0" smtClean="0"/>
           </a:p>
           <a:p>
-            <a:r>
-              <a:rPr lang="en-US" dirty="0" smtClean="0"/>
-              <a:t>Configuration drift</a:t>
+            <a:pPr lvl="2"/>
+            <a:r>
+              <a:rPr lang="en-US" dirty="0" smtClean="0"/>
+              <a:t>Mitigates configuration drift because systems don’t live long.</a:t>
+            </a:r>
+          </a:p>
+          <a:p>
+            <a:pPr lvl="2"/>
+            <a:endParaRPr lang="en-US" dirty="0"/>
+          </a:p>
+          <a:p>
+            <a:pPr lvl="2"/>
+            <a:r>
+              <a:rPr lang="en-US" dirty="0" smtClean="0"/>
+              <a:t>Practice: replace servers anytime a server template changes.</a:t>
             </a:r>
           </a:p>
           <a:p>
             <a:pPr lvl="1"/>
-            <a:r>
-              <a:rPr lang="en-US" sz="2900" dirty="0" smtClean="0"/>
-              <a:t>Configuration of servers gradually change over time.</a:t>
+            <a:endParaRPr lang="en-US" dirty="0"/>
+          </a:p>
+          <a:p>
+            <a:pPr lvl="2"/>
+            <a:r>
+              <a:rPr lang="en-US" b="1" dirty="0" smtClean="0"/>
+              <a:t>Phoenix server </a:t>
+            </a:r>
+            <a:r>
+              <a:rPr lang="en-US" dirty="0" smtClean="0"/>
+              <a:t>pattern: replace servers on a scheduled basis regardless of whether changes need to be made or not. </a:t>
             </a:r>
           </a:p>
           <a:p>
             <a:pPr lvl="1"/>
-            <a:r>
-              <a:rPr lang="en-US" sz="2900" dirty="0" smtClean="0"/>
-              <a:t>Unmanaged variation leads to support and maintenance challenges.</a:t>
-            </a:r>
+            <a:endParaRPr lang="en-US" dirty="0"/>
           </a:p>
           <a:p>
             <a:pPr lvl="1"/>
+            <a:r>
+              <a:rPr lang="en-US" b="1" dirty="0" smtClean="0"/>
+              <a:t>Containerized servers</a:t>
+            </a:r>
+            <a:r>
+              <a:rPr lang="en-US" dirty="0" smtClean="0"/>
+              <a:t>: use containers to package applications and their dependencies.</a:t>
+            </a:r>
+          </a:p>
+          <a:p>
+            <a:pPr lvl="2"/>
+            <a:r>
+              <a:rPr lang="en-US" dirty="0" smtClean="0"/>
+              <a:t>Basically immutable servers, but with containers.</a:t>
+            </a:r>
+          </a:p>
+          <a:p>
+            <a:pPr lvl="2"/>
             <a:endParaRPr lang="en-US" dirty="0" smtClean="0"/>
           </a:p>
           <a:p>
-            <a:r>
-              <a:rPr lang="en-US" dirty="0" smtClean="0"/>
-              <a:t>Snowflake servers</a:t>
-            </a:r>
-          </a:p>
-          <a:p>
             <a:pPr lvl="1"/>
-            <a:r>
-              <a:rPr lang="en-US" sz="2900" dirty="0" smtClean="0"/>
-              <a:t>Unique servers that cannot be easily replicated.</a:t>
-            </a:r>
-          </a:p>
-          <a:p>
-            <a:pPr lvl="1"/>
-            <a:r>
-              <a:rPr lang="en-US" sz="2900" dirty="0" smtClean="0"/>
-              <a:t>Leads to fragile infrastructure and components that nobody knows how to fix.</a:t>
-            </a:r>
-          </a:p>
-          <a:p>
-            <a:endParaRPr lang="en-US" dirty="0" smtClean="0"/>
-          </a:p>
-          <a:p>
-            <a:r>
-              <a:rPr lang="en-US" dirty="0" smtClean="0"/>
-              <a:t>Automation fear</a:t>
-            </a:r>
-          </a:p>
-          <a:p>
-            <a:pPr lvl="1"/>
-            <a:r>
-              <a:rPr lang="en-US" sz="2900" dirty="0" smtClean="0"/>
-              <a:t>Fear of running automation tools because so much infrastructure is hand-cranked.</a:t>
-            </a:r>
-          </a:p>
-          <a:p>
-            <a:pPr lvl="1"/>
-            <a:endParaRPr lang="en-US" dirty="0" smtClean="0"/>
-          </a:p>
-          <a:p>
-            <a:r>
-              <a:rPr lang="en-US" dirty="0" smtClean="0"/>
-              <a:t>Erosion</a:t>
-            </a:r>
-          </a:p>
-          <a:p>
-            <a:pPr lvl="1"/>
-            <a:r>
-              <a:rPr lang="en-US" sz="2900" dirty="0" smtClean="0"/>
-              <a:t>Natural entropy suggests that problems will creep into systems over time.</a:t>
-            </a:r>
-            <a:endParaRPr lang="en-US" sz="2900" dirty="0"/>
+            <a:endParaRPr lang="en-US" dirty="0"/>
           </a:p>
         </p:txBody>
       </p:sp>
     </p:spTree>
     <p:extLst>
       <p:ext uri="{BB962C8B-B14F-4D97-AF65-F5344CB8AC3E}">
-        <p14:creationId xmlns:p14="http://schemas.microsoft.com/office/powerpoint/2010/main" val="1937070469"/>
+        <p14:creationId xmlns:p14="http://schemas.microsoft.com/office/powerpoint/2010/main" val="1969535460"/>
       </p:ext>
     </p:extLst>
   </p:cSld>
@@ -4983,6 +4882,191 @@
           <a:p>
             <a:r>
               <a:rPr lang="en-US" dirty="0" smtClean="0"/>
+              <a:t>Dynamic Infrastructure Challenges</a:t>
+            </a:r>
+            <a:endParaRPr lang="en-US" dirty="0"/>
+          </a:p>
+        </p:txBody>
+      </p:sp>
+      <p:sp>
+        <p:nvSpPr>
+          <p:cNvPr id="3" name="Content Placeholder 2"/>
+          <p:cNvSpPr>
+            <a:spLocks noGrp="1"/>
+          </p:cNvSpPr>
+          <p:nvPr>
+            <p:ph idx="1"/>
+          </p:nvPr>
+        </p:nvSpPr>
+        <p:spPr>
+          <a:xfrm>
+            <a:off x="457200" y="1600199"/>
+            <a:ext cx="8229600" cy="4625940"/>
+          </a:xfrm>
+        </p:spPr>
+        <p:txBody>
+          <a:bodyPr>
+            <a:normAutofit fontScale="55000" lnSpcReduction="20000"/>
+          </a:bodyPr>
+          <a:lstStyle/>
+          <a:p>
+            <a:r>
+              <a:rPr lang="en-US" dirty="0" smtClean="0"/>
+              <a:t>Server sprawl</a:t>
+            </a:r>
+          </a:p>
+          <a:p>
+            <a:pPr lvl="1"/>
+            <a:r>
+              <a:rPr lang="en-US" sz="2900" dirty="0" smtClean="0"/>
+              <a:t>It’s really easy to provision new servers.</a:t>
+            </a:r>
+          </a:p>
+          <a:p>
+            <a:pPr lvl="1"/>
+            <a:r>
+              <a:rPr lang="en-US" sz="2900" dirty="0" smtClean="0"/>
+              <a:t>It becomes difficult to patch and consistently maintain servers and the numbers grow.</a:t>
+            </a:r>
+          </a:p>
+          <a:p>
+            <a:pPr lvl="1"/>
+            <a:endParaRPr lang="en-US" dirty="0" smtClean="0"/>
+          </a:p>
+          <a:p>
+            <a:r>
+              <a:rPr lang="en-US" dirty="0" smtClean="0"/>
+              <a:t>Configuration drift</a:t>
+            </a:r>
+          </a:p>
+          <a:p>
+            <a:pPr lvl="1"/>
+            <a:r>
+              <a:rPr lang="en-US" sz="2900" dirty="0" smtClean="0"/>
+              <a:t>Configuration of servers gradually change over time.</a:t>
+            </a:r>
+          </a:p>
+          <a:p>
+            <a:pPr lvl="1"/>
+            <a:r>
+              <a:rPr lang="en-US" sz="2900" dirty="0" smtClean="0"/>
+              <a:t>Unmanaged variation leads to support and maintenance challenges.</a:t>
+            </a:r>
+          </a:p>
+          <a:p>
+            <a:pPr lvl="1"/>
+            <a:endParaRPr lang="en-US" dirty="0" smtClean="0"/>
+          </a:p>
+          <a:p>
+            <a:r>
+              <a:rPr lang="en-US" dirty="0" smtClean="0"/>
+              <a:t>Snowflake servers</a:t>
+            </a:r>
+          </a:p>
+          <a:p>
+            <a:pPr lvl="1"/>
+            <a:r>
+              <a:rPr lang="en-US" sz="2900" dirty="0" smtClean="0"/>
+              <a:t>Unique servers that cannot be easily replicated.</a:t>
+            </a:r>
+          </a:p>
+          <a:p>
+            <a:pPr lvl="1"/>
+            <a:r>
+              <a:rPr lang="en-US" sz="2900" dirty="0" smtClean="0"/>
+              <a:t>Leads to fragile infrastructure and components that nobody knows how to fix.</a:t>
+            </a:r>
+          </a:p>
+          <a:p>
+            <a:endParaRPr lang="en-US" dirty="0" smtClean="0"/>
+          </a:p>
+          <a:p>
+            <a:r>
+              <a:rPr lang="en-US" dirty="0" smtClean="0"/>
+              <a:t>Automation fear</a:t>
+            </a:r>
+          </a:p>
+          <a:p>
+            <a:pPr lvl="1"/>
+            <a:r>
+              <a:rPr lang="en-US" sz="2900" dirty="0" smtClean="0"/>
+              <a:t>Fear of running automation tools because so much infrastructure is hand-cranked.</a:t>
+            </a:r>
+          </a:p>
+          <a:p>
+            <a:pPr lvl="1"/>
+            <a:endParaRPr lang="en-US" dirty="0" smtClean="0"/>
+          </a:p>
+          <a:p>
+            <a:r>
+              <a:rPr lang="en-US" dirty="0" smtClean="0"/>
+              <a:t>Erosion</a:t>
+            </a:r>
+          </a:p>
+          <a:p>
+            <a:pPr lvl="1"/>
+            <a:r>
+              <a:rPr lang="en-US" sz="2900" dirty="0" smtClean="0"/>
+              <a:t>Natural entropy suggests that problems will creep into systems over time.</a:t>
+            </a:r>
+            <a:endParaRPr lang="en-US" sz="2900" dirty="0"/>
+          </a:p>
+        </p:txBody>
+      </p:sp>
+    </p:spTree>
+    <p:extLst>
+      <p:ext uri="{BB962C8B-B14F-4D97-AF65-F5344CB8AC3E}">
+        <p14:creationId xmlns:p14="http://schemas.microsoft.com/office/powerpoint/2010/main" val="1937070469"/>
+      </p:ext>
+    </p:extLst>
+  </p:cSld>
+  <p:clrMapOvr>
+    <a:masterClrMapping/>
+  </p:clrMapOvr>
+  <p:timing>
+    <p:tnLst>
+      <p:par>
+        <p:cTn id="1" dur="indefinite" restart="never" nodeType="tmRoot"/>
+      </p:par>
+    </p:tnLst>
+  </p:timing>
+</p:sld>
+</file>
+
+<file path=ppt/slides/slide18.xml><?xml version="1.0" encoding="utf-8"?>
+<p:sld xmlns:a="http://schemas.openxmlformats.org/drawingml/2006/main" xmlns:r="http://schemas.openxmlformats.org/officeDocument/2006/relationships" xmlns:p="http://schemas.openxmlformats.org/presentationml/2006/main">
+  <p:cSld>
+    <p:spTree>
+      <p:nvGrpSpPr>
+        <p:cNvPr id="1" name=""/>
+        <p:cNvGrpSpPr/>
+        <p:nvPr/>
+      </p:nvGrpSpPr>
+      <p:grpSpPr>
+        <a:xfrm>
+          <a:off x="0" y="0"/>
+          <a:ext cx="0" cy="0"/>
+          <a:chOff x="0" y="0"/>
+          <a:chExt cx="0" cy="0"/>
+        </a:xfrm>
+      </p:grpSpPr>
+      <p:sp>
+        <p:nvSpPr>
+          <p:cNvPr id="2" name="Title 1"/>
+          <p:cNvSpPr>
+            <a:spLocks noGrp="1"/>
+          </p:cNvSpPr>
+          <p:nvPr>
+            <p:ph type="title"/>
+          </p:nvPr>
+        </p:nvSpPr>
+        <p:spPr/>
+        <p:txBody>
+          <a:bodyPr/>
+          <a:lstStyle/>
+          <a:p>
+            <a:r>
+              <a:rPr lang="en-US" dirty="0" smtClean="0"/>
               <a:t>Continuous synchronization</a:t>
             </a:r>
             <a:endParaRPr lang="en-US" dirty="0"/>
@@ -5141,7 +5225,7 @@
 </p:sld>
 </file>
 
-<file path=ppt/slides/slide18.xml><?xml version="1.0" encoding="utf-8"?>
+<file path=ppt/slides/slide19.xml><?xml version="1.0" encoding="utf-8"?>
 <p:sld xmlns:a="http://schemas.openxmlformats.org/drawingml/2006/main" xmlns:r="http://schemas.openxmlformats.org/officeDocument/2006/relationships" xmlns:p="http://schemas.openxmlformats.org/presentationml/2006/main">
   <p:cSld>
     <p:spTree>
@@ -5350,7 +5434,114 @@
 </p:sld>
 </file>
 
-<file path=ppt/slides/slide19.xml><?xml version="1.0" encoding="utf-8"?>
+<file path=ppt/slides/slide2.xml><?xml version="1.0" encoding="utf-8"?>
+<p:sld xmlns:a="http://schemas.openxmlformats.org/drawingml/2006/main" xmlns:r="http://schemas.openxmlformats.org/officeDocument/2006/relationships" xmlns:p="http://schemas.openxmlformats.org/presentationml/2006/main">
+  <p:cSld>
+    <p:spTree>
+      <p:nvGrpSpPr>
+        <p:cNvPr id="1" name=""/>
+        <p:cNvGrpSpPr/>
+        <p:nvPr/>
+      </p:nvGrpSpPr>
+      <p:grpSpPr>
+        <a:xfrm>
+          <a:off x="0" y="0"/>
+          <a:ext cx="0" cy="0"/>
+          <a:chOff x="0" y="0"/>
+          <a:chExt cx="0" cy="0"/>
+        </a:xfrm>
+      </p:grpSpPr>
+      <p:sp>
+        <p:nvSpPr>
+          <p:cNvPr id="2" name="Title 1"/>
+          <p:cNvSpPr>
+            <a:spLocks noGrp="1"/>
+          </p:cNvSpPr>
+          <p:nvPr>
+            <p:ph type="title"/>
+          </p:nvPr>
+        </p:nvSpPr>
+        <p:spPr/>
+        <p:txBody>
+          <a:bodyPr/>
+          <a:lstStyle/>
+          <a:p>
+            <a:r>
+              <a:rPr lang="en-US" dirty="0" smtClean="0"/>
+              <a:t>Agenda</a:t>
+            </a:r>
+            <a:endParaRPr lang="en-US" dirty="0"/>
+          </a:p>
+        </p:txBody>
+      </p:sp>
+      <p:sp>
+        <p:nvSpPr>
+          <p:cNvPr id="3" name="Content Placeholder 2"/>
+          <p:cNvSpPr>
+            <a:spLocks noGrp="1"/>
+          </p:cNvSpPr>
+          <p:nvPr>
+            <p:ph idx="1"/>
+          </p:nvPr>
+        </p:nvSpPr>
+        <p:spPr/>
+        <p:txBody>
+          <a:bodyPr/>
+          <a:lstStyle/>
+          <a:p>
+            <a:r>
+              <a:rPr lang="en-US" dirty="0" smtClean="0"/>
+              <a:t>Application Deployment Strategies</a:t>
+            </a:r>
+          </a:p>
+          <a:p>
+            <a:r>
+              <a:rPr lang="en-US" dirty="0" smtClean="0"/>
+              <a:t>Immutable Infrastructure</a:t>
+            </a:r>
+          </a:p>
+          <a:p>
+            <a:r>
+              <a:rPr lang="en-US" dirty="0" smtClean="0"/>
+              <a:t>Packer</a:t>
+            </a:r>
+          </a:p>
+          <a:p>
+            <a:r>
+              <a:rPr lang="en-US" dirty="0" smtClean="0"/>
+              <a:t>Configuration Management</a:t>
+            </a:r>
+          </a:p>
+          <a:p>
+            <a:r>
+              <a:rPr lang="en-US" dirty="0" err="1" smtClean="0"/>
+              <a:t>Ansible</a:t>
+            </a:r>
+            <a:endParaRPr lang="en-US" dirty="0" smtClean="0"/>
+          </a:p>
+        </p:txBody>
+      </p:sp>
+    </p:spTree>
+    <p:extLst>
+      <p:ext uri="{BB962C8B-B14F-4D97-AF65-F5344CB8AC3E}">
+        <p14:creationId xmlns:p14="http://schemas.microsoft.com/office/powerpoint/2010/main" val="1923720609"/>
+      </p:ext>
+    </p:extLst>
+  </p:cSld>
+  <p:clrMapOvr>
+    <a:masterClrMapping/>
+  </p:clrMapOvr>
+  <p:timing>
+    <p:tnLst>
+      <p:par>
+        <p:cTn id="1" dur="indefinite" restart="never" nodeType="tmRoot"/>
+      </p:par>
+    </p:tnLst>
+  </p:timing>
+</p:sld>
+</file>
+
+<file path=ppt/slides/slide20.xml><?xml version="1.0" encoding="utf-8"?>
 <p:sld xmlns:a="http://schemas.openxmlformats.org/drawingml/2006/main" xmlns:r="http://schemas.openxmlformats.org/officeDocument/2006/relationships" xmlns:p="http://schemas.openxmlformats.org/presentationml/2006/main">
   <p:cSld>
     <p:spTree>
@@ -5438,114 +5629,7 @@
 </p:sld>
 </file>
 
-<file path=ppt/slides/slide2.xml><?xml version="1.0" encoding="utf-8"?>
-<p:sld xmlns:a="http://schemas.openxmlformats.org/drawingml/2006/main" xmlns:r="http://schemas.openxmlformats.org/officeDocument/2006/relationships" xmlns:p="http://schemas.openxmlformats.org/presentationml/2006/main">
-  <p:cSld>
-    <p:spTree>
-      <p:nvGrpSpPr>
-        <p:cNvPr id="1" name=""/>
-        <p:cNvGrpSpPr/>
-        <p:nvPr/>
-      </p:nvGrpSpPr>
-      <p:grpSpPr>
-        <a:xfrm>
-          <a:off x="0" y="0"/>
-          <a:ext cx="0" cy="0"/>
-          <a:chOff x="0" y="0"/>
-          <a:chExt cx="0" cy="0"/>
-        </a:xfrm>
-      </p:grpSpPr>
-      <p:sp>
-        <p:nvSpPr>
-          <p:cNvPr id="2" name="Title 1"/>
-          <p:cNvSpPr>
-            <a:spLocks noGrp="1"/>
-          </p:cNvSpPr>
-          <p:nvPr>
-            <p:ph type="title"/>
-          </p:nvPr>
-        </p:nvSpPr>
-        <p:spPr/>
-        <p:txBody>
-          <a:bodyPr/>
-          <a:lstStyle/>
-          <a:p>
-            <a:r>
-              <a:rPr lang="en-US" dirty="0" smtClean="0"/>
-              <a:t>Agenda</a:t>
-            </a:r>
-            <a:endParaRPr lang="en-US" dirty="0"/>
-          </a:p>
-        </p:txBody>
-      </p:sp>
-      <p:sp>
-        <p:nvSpPr>
-          <p:cNvPr id="3" name="Content Placeholder 2"/>
-          <p:cNvSpPr>
-            <a:spLocks noGrp="1"/>
-          </p:cNvSpPr>
-          <p:nvPr>
-            <p:ph idx="1"/>
-          </p:nvPr>
-        </p:nvSpPr>
-        <p:spPr/>
-        <p:txBody>
-          <a:bodyPr/>
-          <a:lstStyle/>
-          <a:p>
-            <a:r>
-              <a:rPr lang="en-US" dirty="0" smtClean="0"/>
-              <a:t>Application Deployment Strategies</a:t>
-            </a:r>
-          </a:p>
-          <a:p>
-            <a:r>
-              <a:rPr lang="en-US" dirty="0" smtClean="0"/>
-              <a:t>Immutable Infrastructure</a:t>
-            </a:r>
-          </a:p>
-          <a:p>
-            <a:r>
-              <a:rPr lang="en-US" dirty="0" smtClean="0"/>
-              <a:t>Packer</a:t>
-            </a:r>
-          </a:p>
-          <a:p>
-            <a:r>
-              <a:rPr lang="en-US" dirty="0" smtClean="0"/>
-              <a:t>Configuration Management</a:t>
-            </a:r>
-          </a:p>
-          <a:p>
-            <a:r>
-              <a:rPr lang="en-US" dirty="0" err="1" smtClean="0"/>
-              <a:t>Ansible</a:t>
-            </a:r>
-            <a:endParaRPr lang="en-US" dirty="0" smtClean="0"/>
-          </a:p>
-        </p:txBody>
-      </p:sp>
-    </p:spTree>
-    <p:extLst>
-      <p:ext uri="{BB962C8B-B14F-4D97-AF65-F5344CB8AC3E}">
-        <p14:creationId xmlns:p14="http://schemas.microsoft.com/office/powerpoint/2010/main" val="1923720609"/>
-      </p:ext>
-    </p:extLst>
-  </p:cSld>
-  <p:clrMapOvr>
-    <a:masterClrMapping/>
-  </p:clrMapOvr>
-  <p:timing>
-    <p:tnLst>
-      <p:par>
-        <p:cTn id="1" dur="indefinite" restart="never" nodeType="tmRoot"/>
-      </p:par>
-    </p:tnLst>
-  </p:timing>
-</p:sld>
-</file>
-
-<file path=ppt/slides/slide20.xml><?xml version="1.0" encoding="utf-8"?>
+<file path=ppt/slides/slide21.xml><?xml version="1.0" encoding="utf-8"?>
 <p:sld xmlns:a="http://schemas.openxmlformats.org/drawingml/2006/main" xmlns:r="http://schemas.openxmlformats.org/officeDocument/2006/relationships" xmlns:p="http://schemas.openxmlformats.org/presentationml/2006/main">
   <p:cSld>
     <p:spTree>
@@ -5741,7 +5825,7 @@
 </p:sld>
 </file>
 
-<file path=ppt/slides/slide21.xml><?xml version="1.0" encoding="utf-8"?>
+<file path=ppt/slides/slide22.xml><?xml version="1.0" encoding="utf-8"?>
 <p:sld xmlns:a="http://schemas.openxmlformats.org/drawingml/2006/main" xmlns:r="http://schemas.openxmlformats.org/officeDocument/2006/relationships" xmlns:p="http://schemas.openxmlformats.org/presentationml/2006/main">
   <p:cSld>
     <p:spTree>
@@ -5825,323 +5909,6 @@
 </p:sld>
 </file>
 
-<file path=ppt/slides/slide22.xml><?xml version="1.0" encoding="utf-8"?>
-<p:sld xmlns:a="http://schemas.openxmlformats.org/drawingml/2006/main" xmlns:r="http://schemas.openxmlformats.org/officeDocument/2006/relationships" xmlns:p="http://schemas.openxmlformats.org/presentationml/2006/main">
-  <p:cSld>
-    <p:spTree>
-      <p:nvGrpSpPr>
-        <p:cNvPr id="1" name=""/>
-        <p:cNvGrpSpPr/>
-        <p:nvPr/>
-      </p:nvGrpSpPr>
-      <p:grpSpPr>
-        <a:xfrm>
-          <a:off x="0" y="0"/>
-          <a:ext cx="0" cy="0"/>
-          <a:chOff x="0" y="0"/>
-          <a:chExt cx="0" cy="0"/>
-        </a:xfrm>
-      </p:grpSpPr>
-      <p:sp>
-        <p:nvSpPr>
-          <p:cNvPr id="2" name="Title 1"/>
-          <p:cNvSpPr>
-            <a:spLocks noGrp="1"/>
-          </p:cNvSpPr>
-          <p:nvPr>
-            <p:ph type="title"/>
-          </p:nvPr>
-        </p:nvSpPr>
-        <p:spPr/>
-        <p:txBody>
-          <a:bodyPr/>
-          <a:lstStyle/>
-          <a:p>
-            <a:r>
-              <a:rPr lang="en-US" dirty="0" smtClean="0"/>
-              <a:t>Inventory</a:t>
-            </a:r>
-            <a:endParaRPr lang="en-US" dirty="0"/>
-          </a:p>
-        </p:txBody>
-      </p:sp>
-      <p:sp>
-        <p:nvSpPr>
-          <p:cNvPr id="3" name="Content Placeholder 2"/>
-          <p:cNvSpPr>
-            <a:spLocks noGrp="1"/>
-          </p:cNvSpPr>
-          <p:nvPr>
-            <p:ph idx="1"/>
-          </p:nvPr>
-        </p:nvSpPr>
-        <p:spPr/>
-        <p:txBody>
-          <a:bodyPr>
-            <a:normAutofit fontScale="92500" lnSpcReduction="10000"/>
-          </a:bodyPr>
-          <a:lstStyle/>
-          <a:p>
-            <a:r>
-              <a:rPr lang="en-US" dirty="0" err="1" smtClean="0"/>
-              <a:t>Ansible</a:t>
-            </a:r>
-            <a:r>
-              <a:rPr lang="en-US" dirty="0" smtClean="0"/>
-              <a:t> uses an inventory file, named </a:t>
-            </a:r>
-            <a:r>
-              <a:rPr lang="en-US" sz="2800" b="1" dirty="0" smtClean="0">
-                <a:latin typeface="Consolas" charset="0"/>
-                <a:ea typeface="Consolas" charset="0"/>
-                <a:cs typeface="Consolas" charset="0"/>
-              </a:rPr>
-              <a:t>hosts</a:t>
-            </a:r>
-            <a:r>
-              <a:rPr lang="en-US" dirty="0" smtClean="0"/>
-              <a:t>, to store a list of systems that may be configured.</a:t>
-            </a:r>
-          </a:p>
-          <a:p>
-            <a:endParaRPr lang="en-US" dirty="0" smtClean="0"/>
-          </a:p>
-          <a:p>
-            <a:pPr lvl="1"/>
-            <a:r>
-              <a:rPr lang="en-US" dirty="0" smtClean="0"/>
-              <a:t>The hosts file uses an INI-like format:</a:t>
-            </a:r>
-          </a:p>
-          <a:p>
-            <a:pPr lvl="1"/>
-            <a:endParaRPr lang="en-US" dirty="0" smtClean="0"/>
-          </a:p>
-          <a:p>
-            <a:pPr marL="457200" lvl="1" indent="0">
-              <a:buNone/>
-            </a:pPr>
-            <a:r>
-              <a:rPr lang="en-US" sz="1600" dirty="0">
-                <a:latin typeface="Consolas" charset="0"/>
-                <a:ea typeface="Consolas" charset="0"/>
-                <a:cs typeface="Consolas" charset="0"/>
-              </a:rPr>
-              <a:t>[webservers</a:t>
-            </a:r>
-            <a:r>
-              <a:rPr lang="en-US" sz="1600" dirty="0" smtClean="0">
-                <a:latin typeface="Consolas" charset="0"/>
-                <a:ea typeface="Consolas" charset="0"/>
-                <a:cs typeface="Consolas" charset="0"/>
-              </a:rPr>
-              <a:t>]</a:t>
-            </a:r>
-          </a:p>
-          <a:p>
-            <a:pPr marL="457200" lvl="1" indent="0">
-              <a:buNone/>
-            </a:pPr>
-            <a:r>
-              <a:rPr lang="en-US" sz="1600" dirty="0" smtClean="0">
-                <a:latin typeface="Consolas" charset="0"/>
-                <a:ea typeface="Consolas" charset="0"/>
-                <a:cs typeface="Consolas" charset="0"/>
-              </a:rPr>
-              <a:t>web1 </a:t>
-            </a:r>
-            <a:r>
-              <a:rPr lang="en-US" sz="1600" dirty="0" err="1">
-                <a:latin typeface="Consolas" charset="0"/>
-                <a:ea typeface="Consolas" charset="0"/>
-                <a:cs typeface="Consolas" charset="0"/>
-              </a:rPr>
-              <a:t>ansible_host</a:t>
-            </a:r>
-            <a:r>
-              <a:rPr lang="en-US" sz="1600" dirty="0">
-                <a:latin typeface="Consolas" charset="0"/>
-                <a:ea typeface="Consolas" charset="0"/>
-                <a:cs typeface="Consolas" charset="0"/>
-              </a:rPr>
-              <a:t>=54.162.154.245 </a:t>
-            </a:r>
-            <a:r>
-              <a:rPr lang="en-US" sz="1600" dirty="0" err="1" smtClean="0">
-                <a:latin typeface="Consolas" charset="0"/>
-                <a:ea typeface="Consolas" charset="0"/>
-                <a:cs typeface="Consolas" charset="0"/>
-              </a:rPr>
-              <a:t>ansible_user</a:t>
-            </a:r>
-            <a:r>
-              <a:rPr lang="en-US" sz="1600" dirty="0" smtClean="0">
-                <a:latin typeface="Consolas" charset="0"/>
-                <a:ea typeface="Consolas" charset="0"/>
-                <a:cs typeface="Consolas" charset="0"/>
-              </a:rPr>
-              <a:t>=ec2-user</a:t>
-            </a:r>
-          </a:p>
-          <a:p>
-            <a:pPr marL="457200" lvl="1" indent="0">
-              <a:buNone/>
-            </a:pPr>
-            <a:r>
-              <a:rPr lang="en-US" sz="1600" dirty="0">
-                <a:latin typeface="Consolas" charset="0"/>
-                <a:ea typeface="Consolas" charset="0"/>
-                <a:cs typeface="Consolas" charset="0"/>
-              </a:rPr>
-              <a:t>w</a:t>
-            </a:r>
-            <a:r>
-              <a:rPr lang="en-US" sz="1600" dirty="0" smtClean="0">
-                <a:latin typeface="Consolas" charset="0"/>
-                <a:ea typeface="Consolas" charset="0"/>
-                <a:cs typeface="Consolas" charset="0"/>
-              </a:rPr>
-              <a:t>eb2.mydomain.com </a:t>
-            </a:r>
-            <a:r>
-              <a:rPr lang="en-US" sz="1600" dirty="0" err="1" smtClean="0">
-                <a:latin typeface="Consolas" charset="0"/>
-                <a:ea typeface="Consolas" charset="0"/>
-                <a:cs typeface="Consolas" charset="0"/>
-              </a:rPr>
-              <a:t>ansible_user</a:t>
-            </a:r>
-            <a:r>
-              <a:rPr lang="en-US" sz="1600" dirty="0" smtClean="0">
-                <a:latin typeface="Consolas" charset="0"/>
-                <a:ea typeface="Consolas" charset="0"/>
-                <a:cs typeface="Consolas" charset="0"/>
-              </a:rPr>
-              <a:t>=ec2-user</a:t>
-            </a:r>
-          </a:p>
-          <a:p>
-            <a:pPr marL="457200" lvl="1" indent="0">
-              <a:buNone/>
-            </a:pPr>
-            <a:endParaRPr lang="en-US" sz="1600" dirty="0">
-              <a:latin typeface="Consolas" charset="0"/>
-              <a:ea typeface="Consolas" charset="0"/>
-              <a:cs typeface="Consolas" charset="0"/>
-            </a:endParaRPr>
-          </a:p>
-          <a:p>
-            <a:pPr marL="457200" lvl="1" indent="0">
-              <a:buNone/>
-            </a:pPr>
-            <a:r>
-              <a:rPr lang="en-US" sz="1600" dirty="0" smtClean="0">
-                <a:latin typeface="Consolas" charset="0"/>
-                <a:ea typeface="Consolas" charset="0"/>
-                <a:cs typeface="Consolas" charset="0"/>
-              </a:rPr>
-              <a:t>[databases]</a:t>
-            </a:r>
-          </a:p>
-          <a:p>
-            <a:pPr marL="457200" lvl="1" indent="0">
-              <a:buNone/>
-            </a:pPr>
-            <a:r>
-              <a:rPr lang="en-US" sz="1600" dirty="0" err="1" smtClean="0">
-                <a:latin typeface="Consolas" charset="0"/>
-                <a:ea typeface="Consolas" charset="0"/>
-                <a:cs typeface="Consolas" charset="0"/>
-              </a:rPr>
-              <a:t>db</a:t>
-            </a:r>
-            <a:r>
-              <a:rPr lang="en-US" sz="1600" dirty="0" smtClean="0">
-                <a:latin typeface="Consolas" charset="0"/>
-                <a:ea typeface="Consolas" charset="0"/>
-                <a:cs typeface="Consolas" charset="0"/>
-              </a:rPr>
-              <a:t>[01:10].</a:t>
-            </a:r>
-            <a:r>
-              <a:rPr lang="en-US" sz="1600" dirty="0" err="1" smtClean="0">
-                <a:latin typeface="Consolas" charset="0"/>
-                <a:ea typeface="Consolas" charset="0"/>
-                <a:cs typeface="Consolas" charset="0"/>
-              </a:rPr>
-              <a:t>mydomain.com</a:t>
-            </a:r>
-            <a:r>
-              <a:rPr lang="en-US" sz="1600" dirty="0" smtClean="0">
-                <a:latin typeface="Consolas" charset="0"/>
-                <a:ea typeface="Consolas" charset="0"/>
-                <a:cs typeface="Consolas" charset="0"/>
-              </a:rPr>
-              <a:t> </a:t>
-            </a:r>
-            <a:r>
-              <a:rPr lang="en-US" sz="1600" dirty="0" err="1" smtClean="0">
-                <a:latin typeface="Consolas" charset="0"/>
-                <a:ea typeface="Consolas" charset="0"/>
-                <a:cs typeface="Consolas" charset="0"/>
-              </a:rPr>
-              <a:t>maxRequests</a:t>
-            </a:r>
-            <a:r>
-              <a:rPr lang="en-US" sz="1600" dirty="0" smtClean="0">
-                <a:latin typeface="Consolas" charset="0"/>
-                <a:ea typeface="Consolas" charset="0"/>
-                <a:cs typeface="Consolas" charset="0"/>
-              </a:rPr>
-              <a:t>=1000</a:t>
-            </a:r>
-          </a:p>
-          <a:p>
-            <a:pPr marL="457200" lvl="1" indent="0">
-              <a:buNone/>
-            </a:pPr>
-            <a:endParaRPr lang="en-US" sz="1600" dirty="0">
-              <a:latin typeface="Consolas" charset="0"/>
-              <a:ea typeface="Consolas" charset="0"/>
-              <a:cs typeface="Consolas" charset="0"/>
-            </a:endParaRPr>
-          </a:p>
-          <a:p>
-            <a:pPr lvl="1"/>
-            <a:r>
-              <a:rPr lang="en-US" dirty="0" smtClean="0">
-                <a:ea typeface="Consolas" charset="0"/>
-                <a:cs typeface="Consolas" charset="0"/>
-              </a:rPr>
-              <a:t>Hosts may be members of one or more groups.</a:t>
-            </a:r>
-            <a:endParaRPr lang="en-US" dirty="0">
-              <a:ea typeface="Consolas" charset="0"/>
-              <a:cs typeface="Consolas" charset="0"/>
-            </a:endParaRPr>
-          </a:p>
-        </p:txBody>
-      </p:sp>
-    </p:spTree>
-    <p:extLst>
-      <p:ext uri="{BB962C8B-B14F-4D97-AF65-F5344CB8AC3E}">
-        <p14:creationId xmlns:p14="http://schemas.microsoft.com/office/powerpoint/2010/main" val="246243568"/>
-      </p:ext>
-    </p:extLst>
-  </p:cSld>
-  <p:clrMapOvr>
-    <a:masterClrMapping/>
-  </p:clrMapOvr>
-  <p:timing>
-    <p:tnLst>
-      <p:par>
-        <p:cTn id="1" dur="indefinite" restart="never" nodeType="tmRoot"/>
-      </p:par>
-    </p:tnLst>
-  </p:timing>
-</p:sld>
-</file>
-
 <file path=ppt/slides/slide23.xml><?xml version="1.0" encoding="utf-8"?>
 <p:sld xmlns:a="http://schemas.openxmlformats.org/drawingml/2006/main" xmlns:r="http://schemas.openxmlformats.org/officeDocument/2006/relationships" xmlns:p="http://schemas.openxmlformats.org/presentationml/2006/main">
   <p:cSld>
@@ -6176,7 +5943,7 @@
           <a:p>
             <a:r>
               <a:rPr lang="en-US" dirty="0" smtClean="0"/>
-              <a:t>Inventory Variables</a:t>
+              <a:t>Inventory</a:t>
             </a:r>
             <a:endParaRPr lang="en-US" dirty="0"/>
           </a:p>
@@ -6195,187 +5962,254 @@
         <p:spPr/>
         <p:txBody>
           <a:bodyPr>
-            <a:normAutofit fontScale="85000" lnSpcReduction="20000"/>
+            <a:normAutofit fontScale="92500" lnSpcReduction="10000"/>
           </a:bodyPr>
           <a:lstStyle/>
           <a:p>
             <a:r>
-              <a:rPr lang="en-US" dirty="0" smtClean="0"/>
-              <a:t>Variables hold values that hosts or groups of hosts can use for configuration.</a:t>
-            </a:r>
+              <a:rPr lang="en-US" dirty="0" err="1" smtClean="0"/>
+              <a:t>Ansible</a:t>
+            </a:r>
+            <a:r>
+              <a:rPr lang="en-US" dirty="0" smtClean="0"/>
+              <a:t> uses an inventory file, named </a:t>
+            </a:r>
+            <a:r>
+              <a:rPr lang="en-US" sz="2800" b="1" dirty="0" smtClean="0">
+                <a:latin typeface="Consolas" charset="0"/>
+                <a:ea typeface="Consolas" charset="0"/>
+                <a:cs typeface="Consolas" charset="0"/>
+              </a:rPr>
+              <a:t>hosts</a:t>
+            </a:r>
+            <a:r>
+              <a:rPr lang="en-US" dirty="0" smtClean="0"/>
+              <a:t>, to store a list of systems that may be configured.</a:t>
+            </a:r>
+          </a:p>
+          <a:p>
+            <a:endParaRPr lang="en-US" dirty="0" smtClean="0"/>
           </a:p>
           <a:p>
             <a:pPr lvl="1"/>
             <a:r>
               <a:rPr lang="en-US" dirty="0" smtClean="0"/>
-              <a:t>Dynamically alter how playbooks run.</a:t>
-            </a:r>
-          </a:p>
-          <a:p>
-            <a:endParaRPr lang="en-US" dirty="0"/>
-          </a:p>
-          <a:p>
-            <a:r>
-              <a:rPr lang="en-US" dirty="0" smtClean="0"/>
-              <a:t>We can pass in variables via the inventory (</a:t>
-            </a:r>
-            <a:r>
-              <a:rPr lang="en-US" b="1" dirty="0" err="1" smtClean="0"/>
-              <a:t>group_vars</a:t>
-            </a:r>
-            <a:r>
-              <a:rPr lang="en-US" dirty="0" smtClean="0"/>
-              <a:t> or </a:t>
-            </a:r>
-            <a:r>
-              <a:rPr lang="en-US" b="1" dirty="0" err="1" smtClean="0"/>
-              <a:t>host_vars</a:t>
-            </a:r>
-            <a:r>
-              <a:rPr lang="en-US" dirty="0"/>
-              <a:t> </a:t>
-            </a:r>
-            <a:r>
-              <a:rPr lang="en-US" dirty="0" smtClean="0"/>
-              <a:t>directories), command line, or using facts.</a:t>
-            </a:r>
-          </a:p>
-          <a:p>
+              <a:t>The hosts file uses an INI-like format:</a:t>
+            </a:r>
+          </a:p>
+          <a:p>
+            <a:pPr lvl="1"/>
             <a:endParaRPr lang="en-US" dirty="0" smtClean="0"/>
           </a:p>
           <a:p>
-            <a:r>
-              <a:rPr lang="en-US" dirty="0" smtClean="0"/>
-              <a:t>Example for ../</a:t>
-            </a:r>
-            <a:r>
-              <a:rPr lang="en-US" dirty="0" err="1" smtClean="0"/>
-              <a:t>group_vars</a:t>
-            </a:r>
-            <a:r>
-              <a:rPr lang="en-US" dirty="0" smtClean="0"/>
-              <a:t>/</a:t>
-            </a:r>
-            <a:r>
-              <a:rPr lang="en-US" dirty="0" err="1" smtClean="0"/>
-              <a:t>webservers.yml</a:t>
-            </a:r>
-            <a:endParaRPr lang="en-US" dirty="0" smtClean="0"/>
-          </a:p>
-          <a:p>
-            <a:endParaRPr lang="en-US" dirty="0"/>
-          </a:p>
-          <a:p>
-            <a:pPr marL="0" indent="0">
-              <a:buNone/>
-            </a:pPr>
-            <a:r>
-              <a:rPr lang="en-US" dirty="0" smtClean="0">
-                <a:latin typeface="Consolas" charset="0"/>
-                <a:ea typeface="Consolas" charset="0"/>
-                <a:cs typeface="Consolas" charset="0"/>
-              </a:rPr>
-              <a:t>	</a:t>
-            </a:r>
-            <a:r>
-              <a:rPr lang="en-US" sz="2400" dirty="0" smtClean="0">
-                <a:latin typeface="Consolas" charset="0"/>
-                <a:ea typeface="Consolas" charset="0"/>
-                <a:cs typeface="Consolas" charset="0"/>
-              </a:rPr>
-              <a:t>---</a:t>
-            </a:r>
-          </a:p>
-          <a:p>
-            <a:pPr marL="0" indent="0">
-              <a:buNone/>
-            </a:pPr>
-            <a:r>
-              <a:rPr lang="en-US" sz="2400" dirty="0">
-                <a:latin typeface="Consolas" charset="0"/>
-                <a:ea typeface="Consolas" charset="0"/>
-                <a:cs typeface="Consolas" charset="0"/>
-              </a:rPr>
-              <a:t>	</a:t>
-            </a:r>
-            <a:r>
-              <a:rPr lang="en-US" sz="2400" dirty="0" err="1" smtClean="0">
-                <a:latin typeface="Consolas" charset="0"/>
-                <a:ea typeface="Consolas" charset="0"/>
-                <a:cs typeface="Consolas" charset="0"/>
-              </a:rPr>
-              <a:t>ntp_server</a:t>
-            </a:r>
-            <a:r>
-              <a:rPr lang="en-US" sz="2400" dirty="0" smtClean="0">
-                <a:latin typeface="Consolas" charset="0"/>
-                <a:ea typeface="Consolas" charset="0"/>
-                <a:cs typeface="Consolas" charset="0"/>
-              </a:rPr>
-              <a:t>: </a:t>
-            </a:r>
-            <a:r>
-              <a:rPr lang="en-US" sz="2400" dirty="0" err="1" smtClean="0">
-                <a:latin typeface="Consolas" charset="0"/>
-                <a:ea typeface="Consolas" charset="0"/>
-                <a:cs typeface="Consolas" charset="0"/>
-              </a:rPr>
-              <a:t>ntp.google.com</a:t>
-            </a:r>
-            <a:endParaRPr lang="en-US" sz="2400" dirty="0" smtClean="0">
+            <a:pPr marL="457200" lvl="1" indent="0">
+              <a:buNone/>
+            </a:pPr>
+            <a:r>
+              <a:rPr lang="en-US" sz="1600" dirty="0">
+                <a:latin typeface="Consolas" charset="0"/>
+                <a:ea typeface="Consolas" charset="0"/>
+                <a:cs typeface="Consolas" charset="0"/>
+              </a:rPr>
+              <a:t>[webservers</a:t>
+            </a:r>
+            <a:r>
+              <a:rPr lang="en-US" sz="1600" dirty="0" smtClean="0">
+                <a:latin typeface="Consolas" charset="0"/>
+                <a:ea typeface="Consolas" charset="0"/>
+                <a:cs typeface="Consolas" charset="0"/>
+              </a:rPr>
+              <a:t>]</a:t>
+            </a:r>
+          </a:p>
+          <a:p>
+            <a:pPr marL="457200" lvl="1" indent="0">
+              <a:buNone/>
+            </a:pPr>
+            <a:r>
+              <a:rPr lang="en-US" sz="1600" dirty="0" smtClean="0">
+                <a:latin typeface="Consolas" charset="0"/>
+                <a:ea typeface="Consolas" charset="0"/>
+                <a:cs typeface="Consolas" charset="0"/>
+              </a:rPr>
+              <a:t>web1 </a:t>
+            </a:r>
+            <a:r>
+              <a:rPr lang="en-US" sz="1600" dirty="0" err="1">
+                <a:latin typeface="Consolas" charset="0"/>
+                <a:ea typeface="Consolas" charset="0"/>
+                <a:cs typeface="Consolas" charset="0"/>
+              </a:rPr>
+              <a:t>ansible_host</a:t>
+            </a:r>
+            <a:r>
+              <a:rPr lang="en-US" sz="1600" dirty="0">
+                <a:latin typeface="Consolas" charset="0"/>
+                <a:ea typeface="Consolas" charset="0"/>
+                <a:cs typeface="Consolas" charset="0"/>
+              </a:rPr>
+              <a:t>=54.162.154.245 </a:t>
+            </a:r>
+            <a:r>
+              <a:rPr lang="en-US" sz="1600" dirty="0" err="1" smtClean="0">
+                <a:latin typeface="Consolas" charset="0"/>
+                <a:ea typeface="Consolas" charset="0"/>
+                <a:cs typeface="Consolas" charset="0"/>
+              </a:rPr>
+              <a:t>ansible_user</a:t>
+            </a:r>
+            <a:r>
+              <a:rPr lang="en-US" sz="1600" dirty="0" smtClean="0">
+                <a:latin typeface="Consolas" charset="0"/>
+                <a:ea typeface="Consolas" charset="0"/>
+                <a:cs typeface="Consolas" charset="0"/>
+              </a:rPr>
+              <a:t>=ec2-user</a:t>
+            </a:r>
+          </a:p>
+          <a:p>
+            <a:pPr marL="457200" lvl="1" indent="0">
+              <a:buNone/>
+            </a:pPr>
+            <a:r>
+              <a:rPr lang="en-US" sz="1600" dirty="0">
+                <a:latin typeface="Consolas" charset="0"/>
+                <a:ea typeface="Consolas" charset="0"/>
+                <a:cs typeface="Consolas" charset="0"/>
+              </a:rPr>
+              <a:t>w</a:t>
+            </a:r>
+            <a:r>
+              <a:rPr lang="en-US" sz="1600" dirty="0" smtClean="0">
+                <a:latin typeface="Consolas" charset="0"/>
+                <a:ea typeface="Consolas" charset="0"/>
+                <a:cs typeface="Consolas" charset="0"/>
+              </a:rPr>
+              <a:t>eb2.mydomain.com </a:t>
+            </a:r>
+            <a:r>
+              <a:rPr lang="en-US" sz="1600" dirty="0" err="1" smtClean="0">
+                <a:latin typeface="Consolas" charset="0"/>
+                <a:ea typeface="Consolas" charset="0"/>
+                <a:cs typeface="Consolas" charset="0"/>
+              </a:rPr>
+              <a:t>ansible_user</a:t>
+            </a:r>
+            <a:r>
+              <a:rPr lang="en-US" sz="1600" dirty="0" smtClean="0">
+                <a:latin typeface="Consolas" charset="0"/>
+                <a:ea typeface="Consolas" charset="0"/>
+                <a:cs typeface="Consolas" charset="0"/>
+              </a:rPr>
+              <a:t>=ec2-user</a:t>
+            </a:r>
+          </a:p>
+          <a:p>
+            <a:pPr marL="457200" lvl="1" indent="0">
+              <a:buNone/>
+            </a:pPr>
+            <a:endParaRPr lang="en-US" sz="1600" dirty="0">
               <a:latin typeface="Consolas" charset="0"/>
               <a:ea typeface="Consolas" charset="0"/>
               <a:cs typeface="Consolas" charset="0"/>
             </a:endParaRPr>
           </a:p>
           <a:p>
-            <a:pPr marL="0" indent="0">
-              <a:buNone/>
-            </a:pPr>
-            <a:r>
-              <a:rPr lang="en-US" sz="2400" dirty="0">
-                <a:latin typeface="Consolas" charset="0"/>
-                <a:ea typeface="Consolas" charset="0"/>
-                <a:cs typeface="Consolas" charset="0"/>
-              </a:rPr>
-              <a:t>	</a:t>
-            </a:r>
-            <a:r>
-              <a:rPr lang="en-US" sz="2400" dirty="0" err="1" smtClean="0">
-                <a:latin typeface="Consolas" charset="0"/>
-                <a:ea typeface="Consolas" charset="0"/>
-                <a:cs typeface="Consolas" charset="0"/>
-              </a:rPr>
-              <a:t>database_server</a:t>
-            </a:r>
-            <a:r>
-              <a:rPr lang="en-US" sz="2400" dirty="0" smtClean="0">
-                <a:latin typeface="Consolas" charset="0"/>
-                <a:ea typeface="Consolas" charset="0"/>
-                <a:cs typeface="Consolas" charset="0"/>
-              </a:rPr>
-              <a:t>: </a:t>
-            </a:r>
-            <a:r>
-              <a:rPr lang="en-US" sz="2400" dirty="0" err="1" smtClean="0">
-                <a:latin typeface="Consolas" charset="0"/>
-                <a:ea typeface="Consolas" charset="0"/>
-                <a:cs typeface="Consolas" charset="0"/>
-              </a:rPr>
-              <a:t>storage.mydomain.com</a:t>
-            </a:r>
-            <a:endParaRPr lang="en-US" sz="2400" dirty="0" smtClean="0">
+            <a:pPr marL="457200" lvl="1" indent="0">
+              <a:buNone/>
+            </a:pPr>
+            <a:r>
+              <a:rPr lang="en-US" sz="1600" dirty="0" smtClean="0">
+                <a:latin typeface="Consolas" charset="0"/>
+                <a:ea typeface="Consolas" charset="0"/>
+                <a:cs typeface="Consolas" charset="0"/>
+              </a:rPr>
+              <a:t>[databases]</a:t>
+            </a:r>
+          </a:p>
+          <a:p>
+            <a:pPr marL="457200" lvl="1" indent="0">
+              <a:buNone/>
+            </a:pPr>
+            <a:r>
+              <a:rPr lang="en-US" sz="1600" dirty="0" err="1" smtClean="0">
+                <a:latin typeface="Consolas" charset="0"/>
+                <a:ea typeface="Consolas" charset="0"/>
+                <a:cs typeface="Consolas" charset="0"/>
+              </a:rPr>
+              <a:t>db</a:t>
+            </a:r>
+            <a:r>
+              <a:rPr lang="en-US" sz="1600" dirty="0" smtClean="0">
+                <a:latin typeface="Consolas" charset="0"/>
+                <a:ea typeface="Consolas" charset="0"/>
+                <a:cs typeface="Consolas" charset="0"/>
+              </a:rPr>
+              <a:t>[01:10].</a:t>
+            </a:r>
+            <a:r>
+              <a:rPr lang="en-US" sz="1600" dirty="0" err="1" smtClean="0">
+                <a:latin typeface="Consolas" charset="0"/>
+                <a:ea typeface="Consolas" charset="0"/>
+                <a:cs typeface="Consolas" charset="0"/>
+              </a:rPr>
+              <a:t>mydomain.com</a:t>
+            </a:r>
+            <a:r>
+              <a:rPr lang="en-US" sz="1600" dirty="0" smtClean="0">
+                <a:latin typeface="Consolas" charset="0"/>
+                <a:ea typeface="Consolas" charset="0"/>
+                <a:cs typeface="Consolas" charset="0"/>
+              </a:rPr>
+              <a:t> </a:t>
+            </a:r>
+            <a:r>
+              <a:rPr lang="en-US" sz="1600" dirty="0" err="1" smtClean="0">
+                <a:latin typeface="Consolas" charset="0"/>
+                <a:ea typeface="Consolas" charset="0"/>
+                <a:cs typeface="Consolas" charset="0"/>
+              </a:rPr>
+              <a:t>maxRequests</a:t>
+            </a:r>
+            <a:r>
+              <a:rPr lang="en-US" sz="1600" dirty="0" smtClean="0">
+                <a:latin typeface="Consolas" charset="0"/>
+                <a:ea typeface="Consolas" charset="0"/>
+                <a:cs typeface="Consolas" charset="0"/>
+              </a:rPr>
+              <a:t>=1000</a:t>
+            </a:r>
+          </a:p>
+          <a:p>
+            <a:pPr marL="457200" lvl="1" indent="0">
+              <a:buNone/>
+            </a:pPr>
+            <a:endParaRPr lang="en-US" sz="1600" dirty="0">
               <a:latin typeface="Consolas" charset="0"/>
               <a:ea typeface="Consolas" charset="0"/>
               <a:cs typeface="Consolas" charset="0"/>
             </a:endParaRPr>
           </a:p>
+          <a:p>
+            <a:pPr lvl="1"/>
+            <a:r>
+              <a:rPr lang="en-US" dirty="0" smtClean="0">
+                <a:ea typeface="Consolas" charset="0"/>
+                <a:cs typeface="Consolas" charset="0"/>
+              </a:rPr>
+              <a:t>Hosts may be members of one or more groups.</a:t>
+            </a:r>
+            <a:endParaRPr lang="en-US" dirty="0">
+              <a:ea typeface="Consolas" charset="0"/>
+              <a:cs typeface="Consolas" charset="0"/>
+            </a:endParaRPr>
+          </a:p>
         </p:txBody>
       </p:sp>
     </p:spTree>
     <p:extLst>
       <p:ext uri="{BB962C8B-B14F-4D97-AF65-F5344CB8AC3E}">
-        <p14:creationId xmlns:p14="http://schemas.microsoft.com/office/powerpoint/2010/main" val="1896023455"/>
+        <p14:creationId xmlns:p14="http://schemas.microsoft.com/office/powerpoint/2010/main" val="246243568"/>
       </p:ext>
     </p:extLst>
   </p:cSld>
@@ -6426,7 +6260,7 @@
           <a:p>
             <a:r>
               <a:rPr lang="en-US" dirty="0" smtClean="0"/>
-              <a:t>Dynamic Inventory</a:t>
+              <a:t>Inventory Variables</a:t>
             </a:r>
             <a:endParaRPr lang="en-US" dirty="0"/>
           </a:p>
@@ -6451,7 +6285,14 @@
           <a:p>
             <a:r>
               <a:rPr lang="en-US" dirty="0" smtClean="0"/>
-              <a:t>Oftentimes the set of hosts in an environment is not static because of mechanisms like auto scaling.</a:t>
+              <a:t>Variables hold values that hosts or groups of hosts can use for configuration.</a:t>
+            </a:r>
+          </a:p>
+          <a:p>
+            <a:pPr lvl="1"/>
+            <a:r>
+              <a:rPr lang="en-US" dirty="0" smtClean="0"/>
+              <a:t>Dynamically alter how playbooks run.</a:t>
             </a:r>
           </a:p>
           <a:p>
@@ -6459,42 +6300,75 @@
           </a:p>
           <a:p>
             <a:r>
+              <a:rPr lang="en-US" dirty="0" smtClean="0"/>
+              <a:t>We can pass in variables via the inventory (</a:t>
+            </a:r>
+            <a:r>
+              <a:rPr lang="en-US" b="1" dirty="0" err="1" smtClean="0"/>
+              <a:t>group_vars</a:t>
+            </a:r>
+            <a:r>
+              <a:rPr lang="en-US" dirty="0" smtClean="0"/>
+              <a:t> or </a:t>
+            </a:r>
+            <a:r>
+              <a:rPr lang="en-US" b="1" dirty="0" err="1" smtClean="0"/>
+              <a:t>host_vars</a:t>
+            </a:r>
+            <a:r>
+              <a:rPr lang="en-US" dirty="0"/>
+              <a:t> </a:t>
+            </a:r>
+            <a:r>
+              <a:rPr lang="en-US" dirty="0" smtClean="0"/>
+              <a:t>directories), command line, or using facts.</a:t>
+            </a:r>
+          </a:p>
+          <a:p>
+            <a:endParaRPr lang="en-US" dirty="0" smtClean="0"/>
+          </a:p>
+          <a:p>
+            <a:r>
+              <a:rPr lang="en-US" dirty="0" smtClean="0"/>
+              <a:t>Example for ../</a:t>
+            </a:r>
+            <a:r>
               <a:rPr lang="en-US" dirty="0" err="1" smtClean="0"/>
-              <a:t>Ansible</a:t>
-            </a:r>
-            <a:r>
-              <a:rPr lang="en-US" dirty="0" smtClean="0"/>
-              <a:t> can use inventory data generated dynamically by scripts.</a:t>
-            </a:r>
-          </a:p>
-          <a:p>
-            <a:pPr lvl="1"/>
-            <a:r>
-              <a:rPr lang="en-US" dirty="0" smtClean="0"/>
-              <a:t>Gather the current list of running EC2 instances.</a:t>
-            </a:r>
-          </a:p>
-          <a:p>
-            <a:pPr lvl="1"/>
-            <a:r>
-              <a:rPr lang="en-US" dirty="0" smtClean="0"/>
-              <a:t>Pull host list from enterprise CMDB.</a:t>
-            </a:r>
+              <a:t>group_vars</a:t>
+            </a:r>
+            <a:r>
+              <a:rPr lang="en-US" dirty="0" smtClean="0"/>
+              <a:t>/</a:t>
+            </a:r>
+            <a:r>
+              <a:rPr lang="en-US" dirty="0" err="1" smtClean="0"/>
+              <a:t>webservers.yml</a:t>
+            </a:r>
+            <a:endParaRPr lang="en-US" dirty="0" smtClean="0"/>
           </a:p>
           <a:p>
             <a:endParaRPr lang="en-US" dirty="0"/>
           </a:p>
           <a:p>
-            <a:r>
-              <a:rPr lang="en-US" dirty="0" smtClean="0"/>
-              <a:t>Example using Terraform:</a:t>
-            </a:r>
-          </a:p>
-          <a:p>
             <a:pPr marL="0" indent="0">
               <a:buNone/>
             </a:pPr>
-            <a:endParaRPr lang="en-US" dirty="0" smtClean="0"/>
+            <a:r>
+              <a:rPr lang="en-US" dirty="0" smtClean="0">
+                <a:latin typeface="Consolas" charset="0"/>
+                <a:ea typeface="Consolas" charset="0"/>
+                <a:cs typeface="Consolas" charset="0"/>
+              </a:rPr>
+              <a:t>	</a:t>
+            </a:r>
+            <a:r>
+              <a:rPr lang="en-US" sz="2400" dirty="0" smtClean="0">
+                <a:latin typeface="Consolas" charset="0"/>
+                <a:ea typeface="Consolas" charset="0"/>
+                <a:cs typeface="Consolas" charset="0"/>
+              </a:rPr>
+              <a:t>---</a:t>
+            </a:r>
           </a:p>
           <a:p>
             <a:pPr marL="0" indent="0">
@@ -6509,12 +6383,20 @@
               <a:t>	</a:t>
             </a:r>
             <a:r>
+              <a:rPr lang="en-US" sz="2400" dirty="0" err="1" smtClean="0">
+                <a:latin typeface="Consolas" charset="0"/>
+                <a:ea typeface="Consolas" charset="0"/>
+                <a:cs typeface="Consolas" charset="0"/>
+              </a:rPr>
+              <a:t>ntp_server</a:t>
+            </a:r>
+            <a:r>
               <a:rPr lang="en-US" sz="2400" dirty="0" smtClean="0">
                 <a:latin typeface="Consolas" charset="0"/>
                 <a:ea typeface="Consolas" charset="0"/>
                 <a:cs typeface="Consolas" charset="0"/>
               </a:rPr>
-              <a:t>$ </a:t>
+              <a:t>: </a:t>
             </a:r>
             <a:r>
               <a:rPr lang="en-US" sz="2400" dirty="0" err="1" smtClean="0">
@@ -6522,7 +6404,33 @@
                 <a:ea typeface="Consolas" charset="0"/>
                 <a:cs typeface="Consolas" charset="0"/>
               </a:rPr>
-              <a:t>ansible</a:t>
+              <a:t>ntp.google.com</a:t>
+            </a:r>
+            <a:endParaRPr lang="en-US" sz="2400" dirty="0" smtClean="0">
+              <a:latin typeface="Consolas" charset="0"/>
+              <a:ea typeface="Consolas" charset="0"/>
+              <a:cs typeface="Consolas" charset="0"/>
+            </a:endParaRPr>
+          </a:p>
+          <a:p>
+            <a:pPr marL="0" indent="0">
+              <a:buNone/>
+            </a:pPr>
+            <a:r>
+              <a:rPr lang="en-US" sz="2400" dirty="0">
+                <a:latin typeface="Consolas" charset="0"/>
+                <a:ea typeface="Consolas" charset="0"/>
+                <a:cs typeface="Consolas" charset="0"/>
+              </a:rPr>
+              <a:t>	</a:t>
+            </a:r>
+            <a:r>
+              <a:rPr lang="en-US" sz="2400" dirty="0" err="1" smtClean="0">
+                <a:latin typeface="Consolas" charset="0"/>
+                <a:ea typeface="Consolas" charset="0"/>
+                <a:cs typeface="Consolas" charset="0"/>
+              </a:rPr>
+              <a:t>database_server</a:t>
             </a:r>
             <a:r>
               <a:rPr lang="en-US" sz="2400" dirty="0" smtClean="0">
@@ -6530,59 +6438,28 @@
                 <a:ea typeface="Consolas" charset="0"/>
                 <a:cs typeface="Consolas" charset="0"/>
               </a:rPr>
-              <a:t> </a:t>
-            </a:r>
-            <a:r>
-              <a:rPr lang="en-US" sz="2400" dirty="0">
-                <a:latin typeface="Consolas" charset="0"/>
-                <a:ea typeface="Consolas" charset="0"/>
-                <a:cs typeface="Consolas" charset="0"/>
-              </a:rPr>
-              <a:t>-</a:t>
-            </a:r>
-            <a:r>
-              <a:rPr lang="en-US" sz="2400" dirty="0" err="1">
-                <a:latin typeface="Consolas" charset="0"/>
-                <a:ea typeface="Consolas" charset="0"/>
-                <a:cs typeface="Consolas" charset="0"/>
-              </a:rPr>
-              <a:t>i</a:t>
-            </a:r>
-            <a:r>
-              <a:rPr lang="en-US" sz="2400" dirty="0">
-                <a:latin typeface="Consolas" charset="0"/>
-                <a:ea typeface="Consolas" charset="0"/>
-                <a:cs typeface="Consolas" charset="0"/>
-              </a:rPr>
-              <a:t> </a:t>
-            </a:r>
-            <a:r>
-              <a:rPr lang="en-US" sz="2400" dirty="0" err="1">
-                <a:latin typeface="Consolas" charset="0"/>
-                <a:ea typeface="Consolas" charset="0"/>
-                <a:cs typeface="Consolas" charset="0"/>
-              </a:rPr>
-              <a:t>terraform.py</a:t>
-            </a:r>
-            <a:r>
-              <a:rPr lang="en-US" sz="2400" dirty="0">
-                <a:latin typeface="Consolas" charset="0"/>
-                <a:ea typeface="Consolas" charset="0"/>
-                <a:cs typeface="Consolas" charset="0"/>
-              </a:rPr>
-              <a:t> -m ping all</a:t>
-            </a:r>
-          </a:p>
-          <a:p>
-            <a:pPr lvl="1"/>
-            <a:endParaRPr lang="en-US" dirty="0" smtClean="0"/>
+              <a:t>: </a:t>
+            </a:r>
+            <a:r>
+              <a:rPr lang="en-US" sz="2400" dirty="0" err="1" smtClean="0">
+                <a:latin typeface="Consolas" charset="0"/>
+                <a:ea typeface="Consolas" charset="0"/>
+                <a:cs typeface="Consolas" charset="0"/>
+              </a:rPr>
+              <a:t>storage.mydomain.com</a:t>
+            </a:r>
+            <a:endParaRPr lang="en-US" sz="2400" dirty="0" smtClean="0">
+              <a:latin typeface="Consolas" charset="0"/>
+              <a:ea typeface="Consolas" charset="0"/>
+              <a:cs typeface="Consolas" charset="0"/>
+            </a:endParaRPr>
           </a:p>
         </p:txBody>
       </p:sp>
     </p:spTree>
     <p:extLst>
       <p:ext uri="{BB962C8B-B14F-4D97-AF65-F5344CB8AC3E}">
-        <p14:creationId xmlns:p14="http://schemas.microsoft.com/office/powerpoint/2010/main" val="902307781"/>
+        <p14:creationId xmlns:p14="http://schemas.microsoft.com/office/powerpoint/2010/main" val="1896023455"/>
       </p:ext>
     </p:extLst>
   </p:cSld>
@@ -7142,7 +7019,7 @@
         <p:spPr/>
         <p:txBody>
           <a:bodyPr>
-            <a:normAutofit fontScale="92500" lnSpcReduction="20000"/>
+            <a:normAutofit fontScale="85000" lnSpcReduction="10000"/>
           </a:bodyPr>
           <a:lstStyle/>
           <a:p>
@@ -7156,8 +7033,13 @@
             </a:r>
             <a:r>
               <a:rPr lang="en-US" dirty="0" smtClean="0"/>
-              <a:t> uses to automate every part of your infrastructure.</a:t>
-            </a:r>
+              <a:t> uses to automate every part of your </a:t>
+            </a:r>
+            <a:r>
+              <a:rPr lang="en-US" smtClean="0"/>
+              <a:t>server configuration.</a:t>
+            </a:r>
+            <a:endParaRPr lang="en-US" dirty="0" smtClean="0"/>
           </a:p>
           <a:p>
             <a:pPr lvl="1"/>
@@ -7784,7 +7666,15 @@
             </a:r>
             <a:r>
               <a:rPr lang="en-US" sz="2000" dirty="0" smtClean="0"/>
-              <a:t> web1 command –a “uptime”</a:t>
+              <a:t> web1 </a:t>
+            </a:r>
+            <a:r>
+              <a:rPr lang="en-US" sz="2000" smtClean="0"/>
+              <a:t>-m command </a:t>
+            </a:r>
+            <a:r>
+              <a:rPr lang="en-US" sz="2000" dirty="0" smtClean="0"/>
+              <a:t>–a “uptime”</a:t>
             </a:r>
           </a:p>
           <a:p>
@@ -8487,7 +8377,7 @@
         </p:spPr>
         <p:txBody>
           <a:bodyPr>
-            <a:normAutofit fontScale="55000" lnSpcReduction="20000"/>
+            <a:normAutofit fontScale="77500" lnSpcReduction="20000"/>
           </a:bodyPr>
           <a:lstStyle/>
           <a:p>
@@ -8516,78 +8406,13 @@
               <a:rPr lang="en-US" u="sng" dirty="0" smtClean="0">
                 <a:hlinkClick r:id="rId2"/>
               </a:rPr>
-              <a:t>s3.amazonaws.com/seis665/AnsibleClass.json</a:t>
+              <a:t>s3.amazonaws.com/seis665/AnsibleSystems.json</a:t>
             </a:r>
             <a:endParaRPr lang="en-US" u="sng" dirty="0" smtClean="0"/>
           </a:p>
           <a:p>
             <a:pPr lvl="1"/>
             <a:endParaRPr lang="en-US" u="sng" dirty="0"/>
-          </a:p>
-          <a:p>
-            <a:r>
-              <a:rPr lang="en-US" dirty="0" smtClean="0"/>
-              <a:t>Configure security keys for secure communications:</a:t>
-            </a:r>
-          </a:p>
-          <a:p>
-            <a:pPr lvl="1"/>
-            <a:r>
-              <a:rPr lang="en-US" dirty="0" smtClean="0"/>
-              <a:t>cd ~/.</a:t>
-            </a:r>
-            <a:r>
-              <a:rPr lang="en-US" dirty="0" err="1" smtClean="0"/>
-              <a:t>ssh</a:t>
-            </a:r>
-            <a:endParaRPr lang="en-US" dirty="0" smtClean="0"/>
-          </a:p>
-          <a:p>
-            <a:pPr lvl="1"/>
-            <a:r>
-              <a:rPr lang="en-US" dirty="0" err="1" smtClean="0"/>
-              <a:t>ssh-keygen</a:t>
-            </a:r>
-            <a:r>
-              <a:rPr lang="en-US" dirty="0" smtClean="0"/>
-              <a:t> -f </a:t>
-            </a:r>
-            <a:r>
-              <a:rPr lang="en-US" dirty="0" err="1" smtClean="0"/>
-              <a:t>key.pem</a:t>
-            </a:r>
-            <a:endParaRPr lang="en-US" dirty="0" smtClean="0"/>
-          </a:p>
-          <a:p>
-            <a:pPr lvl="1"/>
-            <a:r>
-              <a:rPr lang="en-US" dirty="0" smtClean="0"/>
-              <a:t>Append the </a:t>
-            </a:r>
-            <a:r>
-              <a:rPr lang="en-US" dirty="0" err="1" smtClean="0"/>
-              <a:t>key.pem.pub</a:t>
-            </a:r>
-            <a:r>
-              <a:rPr lang="en-US" dirty="0" smtClean="0"/>
-              <a:t> contents into the ~/.</a:t>
-            </a:r>
-            <a:r>
-              <a:rPr lang="en-US" dirty="0" err="1" smtClean="0"/>
-              <a:t>ssh</a:t>
-            </a:r>
-            <a:r>
-              <a:rPr lang="en-US" dirty="0" smtClean="0"/>
-              <a:t>/</a:t>
-            </a:r>
-            <a:r>
-              <a:rPr lang="en-US" dirty="0" err="1" smtClean="0"/>
-              <a:t>authorized_keys</a:t>
-            </a:r>
-            <a:r>
-              <a:rPr lang="en-US" dirty="0" smtClean="0"/>
-              <a:t> file on web1 (make sure newlines are removed!)</a:t>
-            </a:r>
           </a:p>
           <a:p>
             <a:pPr lvl="1"/>
@@ -16377,19 +16202,7 @@
             </a:r>
             <a:r>
               <a:rPr lang="en-US" i="1" smtClean="0"/>
-              <a:t> </a:t>
-            </a:r>
-            <a:r>
-              <a:rPr lang="en-US" i="1" smtClean="0"/>
-              <a:t>12 </a:t>
-            </a:r>
-            <a:r>
-              <a:rPr lang="en-US" i="1" smtClean="0"/>
-              <a:t>&amp; </a:t>
-            </a:r>
-            <a:r>
-              <a:rPr lang="en-US" i="1" smtClean="0"/>
-              <a:t>13</a:t>
+              <a:t> 12 &amp; 13</a:t>
             </a:r>
             <a:endParaRPr lang="en-US" dirty="0"/>
           </a:p>
@@ -20137,40 +19950,91 @@
           <a:p>
             <a:r>
               <a:rPr lang="en-US" dirty="0" smtClean="0"/>
-              <a:t>Server Lifecycle</a:t>
+              <a:t>Deployment Challenges Summary</a:t>
             </a:r>
             <a:endParaRPr lang="en-US" dirty="0"/>
           </a:p>
         </p:txBody>
       </p:sp>
-      <p:pic>
-        <p:nvPicPr>
-          <p:cNvPr id="4" name="Picture 3"/>
-          <p:cNvPicPr>
-            <a:picLocks noChangeAspect="1"/>
-          </p:cNvPicPr>
-          <p:nvPr/>
-        </p:nvPicPr>
-        <p:blipFill>
-          <a:blip r:embed="rId2"/>
-          <a:stretch>
-            <a:fillRect/>
-          </a:stretch>
-        </p:blipFill>
-        <p:spPr>
-          <a:xfrm>
-            <a:off x="554804" y="2252234"/>
-            <a:ext cx="8332342" cy="2812428"/>
-          </a:xfrm>
-          <a:prstGeom prst="rect">
-            <a:avLst/>
-          </a:prstGeom>
-        </p:spPr>
-      </p:pic>
+      <p:sp>
+        <p:nvSpPr>
+          <p:cNvPr id="3" name="Content Placeholder 2"/>
+          <p:cNvSpPr>
+            <a:spLocks noGrp="1"/>
+          </p:cNvSpPr>
+          <p:nvPr>
+            <p:ph idx="1"/>
+          </p:nvPr>
+        </p:nvSpPr>
+        <p:spPr/>
+        <p:txBody>
+          <a:bodyPr>
+            <a:normAutofit fontScale="85000" lnSpcReduction="10000"/>
+          </a:bodyPr>
+          <a:lstStyle/>
+          <a:p>
+            <a:r>
+              <a:rPr lang="en-US" dirty="0" smtClean="0"/>
+              <a:t>Minimizing disruption to customer services.</a:t>
+            </a:r>
+          </a:p>
+          <a:p>
+            <a:endParaRPr lang="en-US" dirty="0"/>
+          </a:p>
+          <a:p>
+            <a:r>
+              <a:rPr lang="en-US" dirty="0" smtClean="0"/>
+              <a:t>Supporting multiple versions of application simultaneously.</a:t>
+            </a:r>
+          </a:p>
+          <a:p>
+            <a:pPr lvl="1"/>
+            <a:r>
+              <a:rPr lang="en-US" dirty="0" smtClean="0"/>
+              <a:t>Database scheme must support multiple app versions.</a:t>
+            </a:r>
+          </a:p>
+          <a:p>
+            <a:pPr lvl="1"/>
+            <a:r>
+              <a:rPr lang="en-US" dirty="0" smtClean="0"/>
+              <a:t>Application APIs must support multiple contract versions.</a:t>
+            </a:r>
+          </a:p>
+          <a:p>
+            <a:endParaRPr lang="en-US" dirty="0"/>
+          </a:p>
+          <a:p>
+            <a:r>
+              <a:rPr lang="en-US" dirty="0" smtClean="0"/>
+              <a:t>Gracefully recovering from failure.</a:t>
+            </a:r>
+          </a:p>
+          <a:p>
+            <a:pPr lvl="1"/>
+            <a:r>
+              <a:rPr lang="en-US" dirty="0" smtClean="0"/>
+              <a:t>Rolling back updates -- what about the database?</a:t>
+            </a:r>
+          </a:p>
+          <a:p>
+            <a:pPr lvl="1"/>
+            <a:r>
+              <a:rPr lang="en-US" dirty="0" smtClean="0"/>
+              <a:t>Maybe we just roll forward</a:t>
+            </a:r>
+            <a:r>
+              <a:rPr lang="mr-IN" dirty="0" smtClean="0"/>
+              <a:t>…</a:t>
+            </a:r>
+            <a:endParaRPr lang="en-US" dirty="0"/>
+          </a:p>
+        </p:txBody>
+      </p:sp>
     </p:spTree>
     <p:extLst>
       <p:ext uri="{BB962C8B-B14F-4D97-AF65-F5344CB8AC3E}">
-        <p14:creationId xmlns:p14="http://schemas.microsoft.com/office/powerpoint/2010/main" val="845040489"/>
+        <p14:creationId xmlns:p14="http://schemas.microsoft.com/office/powerpoint/2010/main" val="1442105712"/>
       </p:ext>
     </p:extLst>
   </p:cSld>

</xml_diff>

<commit_message>
update hands-on section in lecture 13
</commit_message>
<xml_diff>
--- a/lectures/infrastructure-week-10.pptx
+++ b/lectures/infrastructure-week-10.pptx
@@ -3144,7 +3144,7 @@
           <a:p>
             <a:fld id="{EAA08BAD-04ED-244C-92B6-E3671520D864}" type="datetimeFigureOut">
               <a:rPr lang="en-US" smtClean="0"/>
-              <a:t>7/8/19</a:t>
+              <a:t>7/9/19</a:t>
             </a:fld>
             <a:endParaRPr lang="en-US"/>
           </a:p>
@@ -3411,6 +3411,491 @@
 </p:notesMaster>
 </file>
 
+<file path=ppt/notesSlides/notesSlide1.xml><?xml version="1.0" encoding="utf-8"?>
+<p:notes xmlns:a="http://schemas.openxmlformats.org/drawingml/2006/main" xmlns:r="http://schemas.openxmlformats.org/officeDocument/2006/relationships" xmlns:p="http://schemas.openxmlformats.org/presentationml/2006/main">
+  <p:cSld>
+    <p:spTree>
+      <p:nvGrpSpPr>
+        <p:cNvPr id="1" name=""/>
+        <p:cNvGrpSpPr/>
+        <p:nvPr/>
+      </p:nvGrpSpPr>
+      <p:grpSpPr>
+        <a:xfrm>
+          <a:off x="0" y="0"/>
+          <a:ext cx="0" cy="0"/>
+          <a:chOff x="0" y="0"/>
+          <a:chExt cx="0" cy="0"/>
+        </a:xfrm>
+      </p:grpSpPr>
+      <p:sp>
+        <p:nvSpPr>
+          <p:cNvPr id="2" name="Slide Image Placeholder 1"/>
+          <p:cNvSpPr>
+            <a:spLocks noGrp="1" noRot="1" noChangeAspect="1"/>
+          </p:cNvSpPr>
+          <p:nvPr>
+            <p:ph type="sldImg"/>
+          </p:nvPr>
+        </p:nvSpPr>
+        <p:spPr/>
+      </p:sp>
+      <p:sp>
+        <p:nvSpPr>
+          <p:cNvPr id="3" name="Notes Placeholder 2"/>
+          <p:cNvSpPr>
+            <a:spLocks noGrp="1"/>
+          </p:cNvSpPr>
+          <p:nvPr>
+            <p:ph type="body" idx="1"/>
+          </p:nvPr>
+        </p:nvSpPr>
+        <p:spPr/>
+        <p:txBody>
+          <a:bodyPr/>
+          <a:lstStyle/>
+          <a:p>
+            <a:endParaRPr lang="en-US"/>
+          </a:p>
+        </p:txBody>
+      </p:sp>
+      <p:sp>
+        <p:nvSpPr>
+          <p:cNvPr id="4" name="Slide Number Placeholder 3"/>
+          <p:cNvSpPr>
+            <a:spLocks noGrp="1"/>
+          </p:cNvSpPr>
+          <p:nvPr>
+            <p:ph type="sldNum" sz="quarter" idx="5"/>
+          </p:nvPr>
+        </p:nvSpPr>
+        <p:spPr/>
+        <p:txBody>
+          <a:bodyPr/>
+          <a:lstStyle/>
+          <a:p>
+            <a:fld id="{2CB9420B-0DAF-E943-A682-96A9F2947B10}" type="slidenum">
+              <a:rPr lang="en-US" smtClean="0"/>
+              <a:t>24</a:t>
+            </a:fld>
+            <a:endParaRPr lang="en-US"/>
+          </a:p>
+        </p:txBody>
+      </p:sp>
+    </p:spTree>
+    <p:extLst>
+      <p:ext uri="{BB962C8B-B14F-4D97-AF65-F5344CB8AC3E}">
+        <p14:creationId xmlns:p14="http://schemas.microsoft.com/office/powerpoint/2010/main" val="612630252"/>
+      </p:ext>
+    </p:extLst>
+  </p:cSld>
+  <p:clrMapOvr>
+    <a:masterClrMapping/>
+  </p:clrMapOvr>
+</p:notes>
+</file>
+
+<file path=ppt/notesSlides/notesSlide2.xml><?xml version="1.0" encoding="utf-8"?>
+<p:notes xmlns:a="http://schemas.openxmlformats.org/drawingml/2006/main" xmlns:r="http://schemas.openxmlformats.org/officeDocument/2006/relationships" xmlns:p="http://schemas.openxmlformats.org/presentationml/2006/main">
+  <p:cSld>
+    <p:spTree>
+      <p:nvGrpSpPr>
+        <p:cNvPr id="1" name=""/>
+        <p:cNvGrpSpPr/>
+        <p:nvPr/>
+      </p:nvGrpSpPr>
+      <p:grpSpPr>
+        <a:xfrm>
+          <a:off x="0" y="0"/>
+          <a:ext cx="0" cy="0"/>
+          <a:chOff x="0" y="0"/>
+          <a:chExt cx="0" cy="0"/>
+        </a:xfrm>
+      </p:grpSpPr>
+      <p:sp>
+        <p:nvSpPr>
+          <p:cNvPr id="2" name="Slide Image Placeholder 1"/>
+          <p:cNvSpPr>
+            <a:spLocks noGrp="1" noRot="1" noChangeAspect="1"/>
+          </p:cNvSpPr>
+          <p:nvPr>
+            <p:ph type="sldImg"/>
+          </p:nvPr>
+        </p:nvSpPr>
+        <p:spPr/>
+      </p:sp>
+      <p:sp>
+        <p:nvSpPr>
+          <p:cNvPr id="3" name="Notes Placeholder 2"/>
+          <p:cNvSpPr>
+            <a:spLocks noGrp="1"/>
+          </p:cNvSpPr>
+          <p:nvPr>
+            <p:ph type="body" idx="1"/>
+          </p:nvPr>
+        </p:nvSpPr>
+        <p:spPr/>
+        <p:txBody>
+          <a:bodyPr/>
+          <a:lstStyle/>
+          <a:p>
+            <a:r>
+              <a:rPr lang="en-US" sz="1000" dirty="0"/>
+              <a:t>Create build project:</a:t>
+            </a:r>
+          </a:p>
+          <a:p>
+            <a:br>
+              <a:rPr lang="en-US" sz="1000" dirty="0"/>
+            </a:br>
+            <a:endParaRPr lang="en-US" sz="1000" dirty="0"/>
+          </a:p>
+          <a:p>
+            <a:r>
+              <a:rPr lang="en-US" sz="1000" dirty="0"/>
+              <a:t>Click on Create build project link</a:t>
+            </a:r>
+          </a:p>
+          <a:p>
+            <a:r>
+              <a:rPr lang="en-US" sz="1000" dirty="0"/>
+              <a:t>Project configuration:</a:t>
+            </a:r>
+          </a:p>
+          <a:p>
+            <a:pPr lvl="1"/>
+            <a:r>
+              <a:rPr lang="en-US" sz="1000" dirty="0"/>
+              <a:t>Project name: java-project</a:t>
+            </a:r>
+          </a:p>
+          <a:p>
+            <a:r>
+              <a:rPr lang="en-US" sz="1000" dirty="0"/>
+              <a:t>Source:</a:t>
+            </a:r>
+          </a:p>
+          <a:p>
+            <a:pPr lvl="1"/>
+            <a:r>
+              <a:rPr lang="en-US" sz="1000" dirty="0"/>
+              <a:t>Source provider: GitHub</a:t>
+            </a:r>
+          </a:p>
+          <a:p>
+            <a:pPr lvl="1"/>
+            <a:r>
+              <a:rPr lang="en-US" sz="1000" dirty="0"/>
+              <a:t>Repository: Connect using OAuth</a:t>
+            </a:r>
+          </a:p>
+          <a:p>
+            <a:pPr lvl="1"/>
+            <a:r>
+              <a:rPr lang="en-US" sz="1000" dirty="0" err="1"/>
+              <a:t>CodeCommit</a:t>
+            </a:r>
+            <a:r>
+              <a:rPr lang="en-US" sz="1000" dirty="0"/>
+              <a:t> connects to GitHub</a:t>
+            </a:r>
+          </a:p>
+          <a:p>
+            <a:pPr lvl="1"/>
+            <a:r>
+              <a:rPr lang="en-US" sz="1000" dirty="0"/>
+              <a:t>Repository URL: Repository in my GitHub account</a:t>
+            </a:r>
+          </a:p>
+          <a:p>
+            <a:pPr lvl="1"/>
+            <a:r>
+              <a:rPr lang="en-US" sz="1000" dirty="0"/>
+              <a:t>GitHub repository: </a:t>
+            </a:r>
+            <a:r>
+              <a:rPr lang="en-US" sz="1000" dirty="0" err="1"/>
+              <a:t>jasondbaker</a:t>
+            </a:r>
+            <a:r>
+              <a:rPr lang="en-US" sz="1000" dirty="0"/>
+              <a:t>/java-project</a:t>
+            </a:r>
+          </a:p>
+          <a:p>
+            <a:r>
+              <a:rPr lang="en-US" sz="1000" dirty="0"/>
+              <a:t>Primary source webhook events:</a:t>
+            </a:r>
+          </a:p>
+          <a:p>
+            <a:pPr lvl="1"/>
+            <a:r>
+              <a:rPr lang="en-US" sz="1000" dirty="0"/>
+              <a:t>Enable: Rebuild every time a code change is pushed to this repository</a:t>
+            </a:r>
+          </a:p>
+          <a:p>
+            <a:r>
+              <a:rPr lang="en-US" sz="1000" dirty="0"/>
+              <a:t>Environment:</a:t>
+            </a:r>
+          </a:p>
+          <a:p>
+            <a:pPr lvl="1"/>
+            <a:r>
+              <a:rPr lang="en-US" sz="1000" dirty="0"/>
+              <a:t>Environment image: Managed image</a:t>
+            </a:r>
+          </a:p>
+          <a:p>
+            <a:pPr lvl="1"/>
+            <a:r>
+              <a:rPr lang="en-US" sz="1000" dirty="0"/>
+              <a:t>Operating system: Ubuntu</a:t>
+            </a:r>
+          </a:p>
+          <a:p>
+            <a:pPr lvl="1"/>
+            <a:r>
+              <a:rPr lang="en-US" sz="1000" dirty="0"/>
+              <a:t>Runtime(s): Standard</a:t>
+            </a:r>
+          </a:p>
+          <a:p>
+            <a:pPr lvl="1"/>
+            <a:r>
+              <a:rPr lang="en-US" sz="1000" dirty="0"/>
+              <a:t>Image: </a:t>
+            </a:r>
+            <a:r>
+              <a:rPr lang="en-US" sz="1000" dirty="0" err="1"/>
+              <a:t>aws</a:t>
+            </a:r>
+            <a:r>
+              <a:rPr lang="en-US" sz="1000" dirty="0"/>
+              <a:t>/</a:t>
+            </a:r>
+            <a:r>
+              <a:rPr lang="en-US" sz="1000" dirty="0" err="1"/>
+              <a:t>codebuild</a:t>
+            </a:r>
+            <a:r>
+              <a:rPr lang="en-US" sz="1000" dirty="0"/>
+              <a:t>//standard:2.0</a:t>
+            </a:r>
+          </a:p>
+          <a:p>
+            <a:pPr lvl="1"/>
+            <a:r>
+              <a:rPr lang="en-US" sz="1000" dirty="0"/>
+              <a:t>Service role: New service role</a:t>
+            </a:r>
+          </a:p>
+          <a:p>
+            <a:r>
+              <a:rPr lang="en-US" sz="1000" dirty="0" err="1"/>
+              <a:t>Buildspec</a:t>
+            </a:r>
+            <a:r>
+              <a:rPr lang="en-US" sz="1000" dirty="0"/>
+              <a:t>:</a:t>
+            </a:r>
+          </a:p>
+          <a:p>
+            <a:pPr lvl="1"/>
+            <a:r>
+              <a:rPr lang="en-US" sz="1000" dirty="0"/>
+              <a:t>Build specifications: Use a </a:t>
+            </a:r>
+            <a:r>
+              <a:rPr lang="en-US" sz="1000" dirty="0" err="1"/>
+              <a:t>buildspec</a:t>
+            </a:r>
+            <a:r>
+              <a:rPr lang="en-US" sz="1000" dirty="0"/>
+              <a:t> file</a:t>
+            </a:r>
+          </a:p>
+          <a:p>
+            <a:r>
+              <a:rPr lang="en-US" sz="1000" dirty="0"/>
+              <a:t>Artifacts:</a:t>
+            </a:r>
+          </a:p>
+          <a:p>
+            <a:pPr lvl="1"/>
+            <a:r>
+              <a:rPr lang="en-US" sz="1000" dirty="0"/>
+              <a:t>Type: Amazon S3</a:t>
+            </a:r>
+          </a:p>
+          <a:p>
+            <a:pPr lvl="1"/>
+            <a:r>
+              <a:rPr lang="en-US" sz="1000" dirty="0"/>
+              <a:t>Bucket name: &lt;your </a:t>
+            </a:r>
+            <a:r>
+              <a:rPr lang="en-US" sz="1000" dirty="0" err="1"/>
+              <a:t>codebuild</a:t>
+            </a:r>
+            <a:r>
+              <a:rPr lang="en-US" sz="1000" dirty="0"/>
+              <a:t> bucket name&gt;</a:t>
+            </a:r>
+          </a:p>
+          <a:p>
+            <a:pPr lvl="1"/>
+            <a:r>
+              <a:rPr lang="en-US" sz="1000" dirty="0"/>
+              <a:t>Enable semantic versioning</a:t>
+            </a:r>
+          </a:p>
+          <a:p>
+            <a:r>
+              <a:rPr lang="en-US" sz="1000" dirty="0"/>
+              <a:t>Logs:</a:t>
+            </a:r>
+          </a:p>
+          <a:p>
+            <a:pPr lvl="1"/>
+            <a:r>
+              <a:rPr lang="en-US" sz="1000" dirty="0"/>
+              <a:t>CloudWatch: Enable CloudWatch logs</a:t>
+            </a:r>
+          </a:p>
+          <a:p>
+            <a:r>
+              <a:rPr lang="en-US" sz="1000" dirty="0"/>
+              <a:t>Click Create Project button</a:t>
+            </a:r>
+          </a:p>
+          <a:p>
+            <a:endParaRPr lang="en-US" dirty="0"/>
+          </a:p>
+        </p:txBody>
+      </p:sp>
+      <p:sp>
+        <p:nvSpPr>
+          <p:cNvPr id="4" name="Slide Number Placeholder 3"/>
+          <p:cNvSpPr>
+            <a:spLocks noGrp="1"/>
+          </p:cNvSpPr>
+          <p:nvPr>
+            <p:ph type="sldNum" sz="quarter" idx="5"/>
+          </p:nvPr>
+        </p:nvSpPr>
+        <p:spPr/>
+        <p:txBody>
+          <a:bodyPr/>
+          <a:lstStyle/>
+          <a:p>
+            <a:fld id="{2CB9420B-0DAF-E943-A682-96A9F2947B10}" type="slidenum">
+              <a:rPr lang="en-US" smtClean="0"/>
+              <a:t>25</a:t>
+            </a:fld>
+            <a:endParaRPr lang="en-US"/>
+          </a:p>
+        </p:txBody>
+      </p:sp>
+    </p:spTree>
+    <p:extLst>
+      <p:ext uri="{BB962C8B-B14F-4D97-AF65-F5344CB8AC3E}">
+        <p14:creationId xmlns:p14="http://schemas.microsoft.com/office/powerpoint/2010/main" val="3613317981"/>
+      </p:ext>
+    </p:extLst>
+  </p:cSld>
+  <p:clrMapOvr>
+    <a:masterClrMapping/>
+  </p:clrMapOvr>
+</p:notes>
+</file>
+
+<file path=ppt/notesSlides/notesSlide3.xml><?xml version="1.0" encoding="utf-8"?>
+<p:notes xmlns:a="http://schemas.openxmlformats.org/drawingml/2006/main" xmlns:r="http://schemas.openxmlformats.org/officeDocument/2006/relationships" xmlns:p="http://schemas.openxmlformats.org/presentationml/2006/main">
+  <p:cSld>
+    <p:spTree>
+      <p:nvGrpSpPr>
+        <p:cNvPr id="1" name=""/>
+        <p:cNvGrpSpPr/>
+        <p:nvPr/>
+      </p:nvGrpSpPr>
+      <p:grpSpPr>
+        <a:xfrm>
+          <a:off x="0" y="0"/>
+          <a:ext cx="0" cy="0"/>
+          <a:chOff x="0" y="0"/>
+          <a:chExt cx="0" cy="0"/>
+        </a:xfrm>
+      </p:grpSpPr>
+      <p:sp>
+        <p:nvSpPr>
+          <p:cNvPr id="2" name="Slide Image Placeholder 1"/>
+          <p:cNvSpPr>
+            <a:spLocks noGrp="1" noRot="1" noChangeAspect="1"/>
+          </p:cNvSpPr>
+          <p:nvPr>
+            <p:ph type="sldImg"/>
+          </p:nvPr>
+        </p:nvSpPr>
+        <p:spPr/>
+      </p:sp>
+      <p:sp>
+        <p:nvSpPr>
+          <p:cNvPr id="3" name="Notes Placeholder 2"/>
+          <p:cNvSpPr>
+            <a:spLocks noGrp="1"/>
+          </p:cNvSpPr>
+          <p:nvPr>
+            <p:ph type="body" idx="1"/>
+          </p:nvPr>
+        </p:nvSpPr>
+        <p:spPr/>
+        <p:txBody>
+          <a:bodyPr/>
+          <a:lstStyle/>
+          <a:p>
+            <a:endParaRPr lang="en-US"/>
+          </a:p>
+        </p:txBody>
+      </p:sp>
+      <p:sp>
+        <p:nvSpPr>
+          <p:cNvPr id="4" name="Slide Number Placeholder 3"/>
+          <p:cNvSpPr>
+            <a:spLocks noGrp="1"/>
+          </p:cNvSpPr>
+          <p:nvPr>
+            <p:ph type="sldNum" sz="quarter" idx="5"/>
+          </p:nvPr>
+        </p:nvSpPr>
+        <p:spPr/>
+        <p:txBody>
+          <a:bodyPr/>
+          <a:lstStyle/>
+          <a:p>
+            <a:fld id="{2CB9420B-0DAF-E943-A682-96A9F2947B10}" type="slidenum">
+              <a:rPr lang="en-US" smtClean="0"/>
+              <a:t>26</a:t>
+            </a:fld>
+            <a:endParaRPr lang="en-US"/>
+          </a:p>
+        </p:txBody>
+      </p:sp>
+    </p:spTree>
+    <p:extLst>
+      <p:ext uri="{BB962C8B-B14F-4D97-AF65-F5344CB8AC3E}">
+        <p14:creationId xmlns:p14="http://schemas.microsoft.com/office/powerpoint/2010/main" val="3421418325"/>
+      </p:ext>
+    </p:extLst>
+  </p:cSld>
+  <p:clrMapOvr>
+    <a:masterClrMapping/>
+  </p:clrMapOvr>
+</p:notes>
+</file>
+
 <file path=ppt/slideLayouts/slideLayout1.xml><?xml version="1.0" encoding="utf-8"?>
 <p:sldLayout xmlns:a="http://schemas.openxmlformats.org/drawingml/2006/main" xmlns:r="http://schemas.openxmlformats.org/officeDocument/2006/relationships" xmlns:p="http://schemas.openxmlformats.org/presentationml/2006/main" type="title" preserve="1">
   <p:cSld name="Title Slide">
@@ -3590,7 +4075,7 @@
           <a:p>
             <a:fld id="{972605B8-2E90-124E-924E-6F58993143C6}" type="datetimeFigureOut">
               <a:rPr lang="en-US" smtClean="0"/>
-              <a:t>7/8/19</a:t>
+              <a:t>7/9/19</a:t>
             </a:fld>
             <a:endParaRPr lang="en-US"/>
           </a:p>
@@ -3758,7 +4243,7 @@
           <a:p>
             <a:fld id="{972605B8-2E90-124E-924E-6F58993143C6}" type="datetimeFigureOut">
               <a:rPr lang="en-US" smtClean="0"/>
-              <a:t>7/8/19</a:t>
+              <a:t>7/9/19</a:t>
             </a:fld>
             <a:endParaRPr lang="en-US"/>
           </a:p>
@@ -3936,7 +4421,7 @@
           <a:p>
             <a:fld id="{972605B8-2E90-124E-924E-6F58993143C6}" type="datetimeFigureOut">
               <a:rPr lang="en-US" smtClean="0"/>
-              <a:t>7/8/19</a:t>
+              <a:t>7/9/19</a:t>
             </a:fld>
             <a:endParaRPr lang="en-US"/>
           </a:p>
@@ -4104,7 +4589,7 @@
           <a:p>
             <a:fld id="{972605B8-2E90-124E-924E-6F58993143C6}" type="datetimeFigureOut">
               <a:rPr lang="en-US" smtClean="0"/>
-              <a:t>7/8/19</a:t>
+              <a:t>7/9/19</a:t>
             </a:fld>
             <a:endParaRPr lang="en-US"/>
           </a:p>
@@ -4349,7 +4834,7 @@
           <a:p>
             <a:fld id="{972605B8-2E90-124E-924E-6F58993143C6}" type="datetimeFigureOut">
               <a:rPr lang="en-US" smtClean="0"/>
-              <a:t>7/8/19</a:t>
+              <a:t>7/9/19</a:t>
             </a:fld>
             <a:endParaRPr lang="en-US"/>
           </a:p>
@@ -4634,7 +5119,7 @@
           <a:p>
             <a:fld id="{972605B8-2E90-124E-924E-6F58993143C6}" type="datetimeFigureOut">
               <a:rPr lang="en-US" smtClean="0"/>
-              <a:t>7/8/19</a:t>
+              <a:t>7/9/19</a:t>
             </a:fld>
             <a:endParaRPr lang="en-US"/>
           </a:p>
@@ -5053,7 +5538,7 @@
           <a:p>
             <a:fld id="{972605B8-2E90-124E-924E-6F58993143C6}" type="datetimeFigureOut">
               <a:rPr lang="en-US" smtClean="0"/>
-              <a:t>7/8/19</a:t>
+              <a:t>7/9/19</a:t>
             </a:fld>
             <a:endParaRPr lang="en-US"/>
           </a:p>
@@ -5170,7 +5655,7 @@
           <a:p>
             <a:fld id="{972605B8-2E90-124E-924E-6F58993143C6}" type="datetimeFigureOut">
               <a:rPr lang="en-US" smtClean="0"/>
-              <a:t>7/8/19</a:t>
+              <a:t>7/9/19</a:t>
             </a:fld>
             <a:endParaRPr lang="en-US"/>
           </a:p>
@@ -5265,7 +5750,7 @@
           <a:p>
             <a:fld id="{972605B8-2E90-124E-924E-6F58993143C6}" type="datetimeFigureOut">
               <a:rPr lang="en-US" smtClean="0"/>
-              <a:t>7/8/19</a:t>
+              <a:t>7/9/19</a:t>
             </a:fld>
             <a:endParaRPr lang="en-US"/>
           </a:p>
@@ -5540,7 +6025,7 @@
           <a:p>
             <a:fld id="{972605B8-2E90-124E-924E-6F58993143C6}" type="datetimeFigureOut">
               <a:rPr lang="en-US" smtClean="0"/>
-              <a:t>7/8/19</a:t>
+              <a:t>7/9/19</a:t>
             </a:fld>
             <a:endParaRPr lang="en-US"/>
           </a:p>
@@ -5792,7 +6277,7 @@
           <a:p>
             <a:fld id="{972605B8-2E90-124E-924E-6F58993143C6}" type="datetimeFigureOut">
               <a:rPr lang="en-US" smtClean="0"/>
-              <a:t>7/8/19</a:t>
+              <a:t>7/9/19</a:t>
             </a:fld>
             <a:endParaRPr lang="en-US"/>
           </a:p>
@@ -6003,7 +6488,7 @@
           <a:p>
             <a:fld id="{972605B8-2E90-124E-924E-6F58993143C6}" type="datetimeFigureOut">
               <a:rPr lang="en-US" smtClean="0"/>
-              <a:t>7/8/19</a:t>
+              <a:t>7/9/19</a:t>
             </a:fld>
             <a:endParaRPr lang="en-US"/>
           </a:p>
@@ -9329,7 +9814,7 @@
         </p:spPr>
         <p:txBody>
           <a:bodyPr>
-            <a:normAutofit fontScale="62500" lnSpcReduction="20000"/>
+            <a:normAutofit fontScale="92500" lnSpcReduction="20000"/>
           </a:bodyPr>
           <a:lstStyle/>
           <a:p>
@@ -9376,7 +9861,7 @@
             </a:pPr>
             <a:r>
               <a:rPr lang="en-US" dirty="0">
-                <a:hlinkClick r:id="rId2"/>
+                <a:hlinkClick r:id="rId3"/>
               </a:rPr>
               <a:t>https://github.com/seis665/java-project</a:t>
             </a:r>
@@ -9391,73 +9876,20 @@
           <a:p>
             <a:r>
               <a:rPr lang="en-US" dirty="0"/>
-              <a:t>Generate GitHub personal access token</a:t>
-            </a:r>
-          </a:p>
-          <a:p>
-            <a:pPr lvl="1"/>
-            <a:r>
-              <a:rPr lang="en-US" dirty="0"/>
-              <a:t>Log into GitHub</a:t>
-            </a:r>
-          </a:p>
-          <a:p>
-            <a:pPr lvl="1"/>
-            <a:r>
-              <a:rPr lang="en-US" dirty="0"/>
-              <a:t>Go to Settings -&gt; Developer Settings -&gt; Personal access tokens page</a:t>
-            </a:r>
-          </a:p>
-          <a:p>
-            <a:pPr lvl="1"/>
-            <a:r>
-              <a:rPr lang="en-US" dirty="0"/>
-              <a:t>Generate a new personal token</a:t>
-            </a:r>
-          </a:p>
-          <a:p>
-            <a:pPr lvl="2"/>
-            <a:r>
-              <a:rPr lang="en-US" dirty="0"/>
-              <a:t>Description: </a:t>
-            </a:r>
-            <a:r>
-              <a:rPr lang="en-US" dirty="0" err="1"/>
-              <a:t>CodeBuild</a:t>
-            </a:r>
-            <a:r>
-              <a:rPr lang="en-US" dirty="0"/>
-              <a:t> access</a:t>
-            </a:r>
-          </a:p>
-          <a:p>
-            <a:pPr lvl="3"/>
-            <a:r>
-              <a:rPr lang="en-US" dirty="0"/>
-              <a:t>Required permissions:</a:t>
-            </a:r>
-          </a:p>
-          <a:p>
-            <a:pPr lvl="4"/>
-            <a:r>
-              <a:rPr lang="en-US" dirty="0"/>
-              <a:t>repo</a:t>
-            </a:r>
-          </a:p>
-          <a:p>
-            <a:pPr lvl="4"/>
-            <a:r>
-              <a:rPr lang="en-US" dirty="0" err="1"/>
-              <a:t>admin:repo_hook</a:t>
-            </a:r>
+              <a:t>Create an output artifact S3 bucket.</a:t>
+            </a:r>
+          </a:p>
+          <a:p>
+            <a:pPr marL="457200" lvl="1" indent="0">
+              <a:buNone/>
+            </a:pPr>
             <a:endParaRPr lang="en-US" dirty="0"/>
           </a:p>
           <a:p>
-            <a:pPr lvl="1"/>
-            <a:r>
-              <a:rPr lang="en-US" dirty="0"/>
-              <a:t>Copy generated token and store in safe place.</a:t>
-            </a:r>
+            <a:pPr marL="457200" lvl="1" indent="0">
+              <a:buNone/>
+            </a:pPr>
+            <a:endParaRPr lang="en-US" dirty="0"/>
           </a:p>
           <a:p>
             <a:endParaRPr lang="en-US" dirty="0"/>
@@ -9479,7 +9911,7 @@
           <p:nvPr/>
         </p:nvPicPr>
         <p:blipFill>
-          <a:blip r:embed="rId3"/>
+          <a:blip r:embed="rId4"/>
           <a:stretch>
             <a:fillRect/>
           </a:stretch>
@@ -9563,13 +9995,13 @@
         <p:spPr/>
         <p:txBody>
           <a:bodyPr>
-            <a:normAutofit fontScale="77500" lnSpcReduction="20000"/>
+            <a:normAutofit fontScale="70000" lnSpcReduction="20000"/>
           </a:bodyPr>
           <a:lstStyle/>
           <a:p>
             <a:r>
               <a:rPr lang="en-US" dirty="0"/>
-              <a:t>Create an output artifact S3 bucket.</a:t>
+              <a:t>Create a build project.</a:t>
             </a:r>
           </a:p>
           <a:p>
@@ -9578,16 +10010,7 @@
           <a:p>
             <a:r>
               <a:rPr lang="en-US" dirty="0"/>
-              <a:t>Create a build project.</a:t>
-            </a:r>
-          </a:p>
-          <a:p>
-            <a:endParaRPr lang="en-US" dirty="0"/>
-          </a:p>
-          <a:p>
-            <a:r>
-              <a:rPr lang="en-US" dirty="0"/>
-              <a:t>Initiate a build using Apache Ant (a Java build manager).</a:t>
+              <a:t>Start a build and run Apache Ant (a Java build manager).</a:t>
             </a:r>
           </a:p>
           <a:p>
@@ -9627,8 +10050,35 @@
           <a:p>
             <a:r>
               <a:rPr lang="en-US" dirty="0"/>
-              <a:t>Update build project to use webhooks to create new builds automatically when code repository is updated.</a:t>
-            </a:r>
+              <a:t>Update the source code repository and trigger an automated build.</a:t>
+            </a:r>
+          </a:p>
+          <a:p>
+            <a:endParaRPr lang="en-US" dirty="0"/>
+          </a:p>
+          <a:p>
+            <a:r>
+              <a:rPr lang="en-US" dirty="0"/>
+              <a:t>We can automate this entire configuration using CloudFormation </a:t>
+            </a:r>
+            <a:r>
+              <a:rPr lang="en-US" dirty="0">
+                <a:sym typeface="Wingdings" pitchFamily="2" charset="2"/>
+              </a:rPr>
+              <a:t></a:t>
+            </a:r>
+          </a:p>
+          <a:p>
+            <a:pPr lvl="1"/>
+            <a:r>
+              <a:rPr lang="en-US" dirty="0"/>
+              <a:t>https://seis665.s3.amazonaws.com/java-build-</a:t>
+            </a:r>
+            <a:r>
+              <a:rPr lang="en-US" dirty="0" err="1"/>
+              <a:t>template.json</a:t>
+            </a:r>
+            <a:endParaRPr lang="en-US" dirty="0"/>
           </a:p>
         </p:txBody>
       </p:sp>
@@ -9647,7 +10097,7 @@
           <p:nvPr/>
         </p:nvPicPr>
         <p:blipFill>
-          <a:blip r:embed="rId2"/>
+          <a:blip r:embed="rId3"/>
           <a:stretch>
             <a:fillRect/>
           </a:stretch>

</xml_diff>

<commit_message>
add codedeploy hands-on example
</commit_message>
<xml_diff>
--- a/lectures/infrastructure-week-10.pptx
+++ b/lectures/infrastructure-week-10.pptx
@@ -5,7 +5,7 @@
     <p:sldMasterId id="2147483648" r:id="rId1"/>
   </p:sldMasterIdLst>
   <p:notesMasterIdLst>
-    <p:notesMasterId r:id="rId30"/>
+    <p:notesMasterId r:id="rId37"/>
   </p:notesMasterIdLst>
   <p:sldIdLst>
     <p:sldId id="256" r:id="rId2"/>
@@ -34,8 +34,15 @@
     <p:sldId id="328" r:id="rId25"/>
     <p:sldId id="281" r:id="rId26"/>
     <p:sldId id="330" r:id="rId27"/>
-    <p:sldId id="302" r:id="rId28"/>
-    <p:sldId id="303" r:id="rId29"/>
+    <p:sldId id="331" r:id="rId28"/>
+    <p:sldId id="332" r:id="rId29"/>
+    <p:sldId id="333" r:id="rId30"/>
+    <p:sldId id="334" r:id="rId31"/>
+    <p:sldId id="335" r:id="rId32"/>
+    <p:sldId id="336" r:id="rId33"/>
+    <p:sldId id="337" r:id="rId34"/>
+    <p:sldId id="302" r:id="rId35"/>
+    <p:sldId id="303" r:id="rId36"/>
   </p:sldIdLst>
   <p:sldSz cx="9144000" cy="6858000" type="screen4x3"/>
   <p:notesSz cx="6858000" cy="9144000"/>
@@ -3896,6 +3903,90 @@
 </p:notes>
 </file>
 
+<file path=ppt/notesSlides/notesSlide4.xml><?xml version="1.0" encoding="utf-8"?>
+<p:notes xmlns:a="http://schemas.openxmlformats.org/drawingml/2006/main" xmlns:r="http://schemas.openxmlformats.org/officeDocument/2006/relationships" xmlns:p="http://schemas.openxmlformats.org/presentationml/2006/main">
+  <p:cSld>
+    <p:spTree>
+      <p:nvGrpSpPr>
+        <p:cNvPr id="1" name=""/>
+        <p:cNvGrpSpPr/>
+        <p:nvPr/>
+      </p:nvGrpSpPr>
+      <p:grpSpPr>
+        <a:xfrm>
+          <a:off x="0" y="0"/>
+          <a:ext cx="0" cy="0"/>
+          <a:chOff x="0" y="0"/>
+          <a:chExt cx="0" cy="0"/>
+        </a:xfrm>
+      </p:grpSpPr>
+      <p:sp>
+        <p:nvSpPr>
+          <p:cNvPr id="2" name="Slide Image Placeholder 1"/>
+          <p:cNvSpPr>
+            <a:spLocks noGrp="1" noRot="1" noChangeAspect="1"/>
+          </p:cNvSpPr>
+          <p:nvPr>
+            <p:ph type="sldImg"/>
+          </p:nvPr>
+        </p:nvSpPr>
+        <p:spPr/>
+      </p:sp>
+      <p:sp>
+        <p:nvSpPr>
+          <p:cNvPr id="3" name="Notes Placeholder 2"/>
+          <p:cNvSpPr>
+            <a:spLocks noGrp="1"/>
+          </p:cNvSpPr>
+          <p:nvPr>
+            <p:ph type="body" idx="1"/>
+          </p:nvPr>
+        </p:nvSpPr>
+        <p:spPr/>
+        <p:txBody>
+          <a:bodyPr/>
+          <a:lstStyle/>
+          <a:p>
+            <a:endParaRPr lang="en-US"/>
+          </a:p>
+        </p:txBody>
+      </p:sp>
+      <p:sp>
+        <p:nvSpPr>
+          <p:cNvPr id="4" name="Slide Number Placeholder 3"/>
+          <p:cNvSpPr>
+            <a:spLocks noGrp="1"/>
+          </p:cNvSpPr>
+          <p:nvPr>
+            <p:ph type="sldNum" sz="quarter" idx="5"/>
+          </p:nvPr>
+        </p:nvSpPr>
+        <p:spPr/>
+        <p:txBody>
+          <a:bodyPr/>
+          <a:lstStyle/>
+          <a:p>
+            <a:fld id="{2CB9420B-0DAF-E943-A682-96A9F2947B10}" type="slidenum">
+              <a:rPr lang="en-US" smtClean="0"/>
+              <a:t>33</a:t>
+            </a:fld>
+            <a:endParaRPr lang="en-US"/>
+          </a:p>
+        </p:txBody>
+      </p:sp>
+    </p:spTree>
+    <p:extLst>
+      <p:ext uri="{BB962C8B-B14F-4D97-AF65-F5344CB8AC3E}">
+        <p14:creationId xmlns:p14="http://schemas.microsoft.com/office/powerpoint/2010/main" val="3684734468"/>
+      </p:ext>
+    </p:extLst>
+  </p:cSld>
+  <p:clrMapOvr>
+    <a:masterClrMapping/>
+  </p:clrMapOvr>
+</p:notes>
+</file>
+
 <file path=ppt/slideLayouts/slideLayout1.xml><?xml version="1.0" encoding="utf-8"?>
 <p:sldLayout xmlns:a="http://schemas.openxmlformats.org/drawingml/2006/main" xmlns:r="http://schemas.openxmlformats.org/officeDocument/2006/relationships" xmlns:p="http://schemas.openxmlformats.org/presentationml/2006/main" type="title" preserve="1">
   <p:cSld name="Title Slide">
@@ -10144,7 +10235,13 @@
       </p:grpSpPr>
       <p:sp>
         <p:nvSpPr>
-          <p:cNvPr id="2" name="Title 1"/>
+          <p:cNvPr id="2" name="Title 1">
+            <a:extLst>
+              <a:ext uri="{FF2B5EF4-FFF2-40B4-BE49-F238E27FC236}">
+                <a16:creationId xmlns:a16="http://schemas.microsoft.com/office/drawing/2014/main" id="{7E66EE6B-BFEC-654C-9A64-26BCFB95BE60}"/>
+              </a:ext>
+            </a:extLst>
+          </p:cNvPr>
           <p:cNvSpPr>
             <a:spLocks noGrp="1"/>
           </p:cNvSpPr>
@@ -10158,15 +10255,22 @@
           <a:lstStyle/>
           <a:p>
             <a:r>
-              <a:rPr lang="en-US" dirty="0"/>
-              <a:t>Infrastructure Pipelines</a:t>
-            </a:r>
-          </a:p>
-        </p:txBody>
-      </p:sp>
-      <p:sp>
-        <p:nvSpPr>
-          <p:cNvPr id="3" name="Content Placeholder 2"/>
+              <a:rPr lang="en-US" dirty="0" err="1"/>
+              <a:t>CodeDeploy</a:t>
+            </a:r>
+            <a:endParaRPr lang="en-US" dirty="0"/>
+          </a:p>
+        </p:txBody>
+      </p:sp>
+      <p:sp>
+        <p:nvSpPr>
+          <p:cNvPr id="3" name="Content Placeholder 2">
+            <a:extLst>
+              <a:ext uri="{FF2B5EF4-FFF2-40B4-BE49-F238E27FC236}">
+                <a16:creationId xmlns:a16="http://schemas.microsoft.com/office/drawing/2014/main" id="{01DF21DF-01D6-4843-8AFC-4153FB2E233D}"/>
+              </a:ext>
+            </a:extLst>
+          </p:cNvPr>
           <p:cNvSpPr>
             <a:spLocks noGrp="1"/>
           </p:cNvSpPr>
@@ -10177,58 +10281,91 @@
         <p:spPr/>
         <p:txBody>
           <a:bodyPr>
-            <a:normAutofit fontScale="92500" lnSpcReduction="20000"/>
+            <a:normAutofit fontScale="85000" lnSpcReduction="20000"/>
           </a:bodyPr>
           <a:lstStyle/>
           <a:p>
             <a:r>
               <a:rPr lang="en-US" dirty="0"/>
-              <a:t>CI/CD pipelines aren’t just used to build software, we also use them to build infrastructure.</a:t>
-            </a:r>
-          </a:p>
-          <a:p>
+              <a:t>A service which automates application code deployments to:</a:t>
+            </a:r>
+          </a:p>
+          <a:p>
+            <a:pPr lvl="1"/>
+            <a:r>
+              <a:rPr lang="en-US" dirty="0"/>
+              <a:t>EC2 instances</a:t>
+            </a:r>
+          </a:p>
+          <a:p>
+            <a:pPr lvl="1"/>
+            <a:r>
+              <a:rPr lang="en-US" dirty="0"/>
+              <a:t>Lambda functions</a:t>
+            </a:r>
+          </a:p>
+          <a:p>
+            <a:pPr lvl="1"/>
+            <a:r>
+              <a:rPr lang="en-US" dirty="0"/>
+              <a:t>Containers (ECS)</a:t>
+            </a:r>
+          </a:p>
+          <a:p>
+            <a:pPr lvl="1"/>
+            <a:r>
+              <a:rPr lang="en-US" dirty="0"/>
+              <a:t>On-premise servers</a:t>
+            </a:r>
+          </a:p>
+          <a:p>
+            <a:pPr lvl="1"/>
             <a:endParaRPr lang="en-US" dirty="0"/>
           </a:p>
           <a:p>
             <a:r>
               <a:rPr lang="en-US" dirty="0"/>
-              <a:t>Two general use cases:</a:t>
-            </a:r>
-          </a:p>
-          <a:p>
+              <a:t>Benefits:</a:t>
+            </a:r>
+          </a:p>
+          <a:p>
+            <a:pPr lvl="1"/>
+            <a:r>
+              <a:rPr lang="en-US" dirty="0"/>
+              <a:t>Rapidly release new features.</a:t>
+            </a:r>
+          </a:p>
+          <a:p>
+            <a:pPr lvl="1"/>
+            <a:r>
+              <a:rPr lang="en-US" dirty="0"/>
+              <a:t>Avoid downtime during application deployment.</a:t>
+            </a:r>
+          </a:p>
+          <a:p>
+            <a:pPr lvl="1"/>
+            <a:r>
+              <a:rPr lang="en-US" dirty="0"/>
+              <a:t>Automate deployments and eliminate manual steps.</a:t>
+            </a:r>
+          </a:p>
+          <a:p>
+            <a:pPr lvl="1"/>
+            <a:r>
+              <a:rPr lang="en-US" dirty="0"/>
+              <a:t>Scales deployments from a single instance to thousands.</a:t>
+            </a:r>
+          </a:p>
+          <a:p>
+            <a:pPr lvl="1"/>
             <a:endParaRPr lang="en-US" dirty="0"/>
-          </a:p>
-          <a:p>
-            <a:pPr lvl="1"/>
-            <a:r>
-              <a:rPr lang="en-US" dirty="0"/>
-              <a:t>Automate testing of our infrastructure.</a:t>
-            </a:r>
-          </a:p>
-          <a:p>
-            <a:pPr lvl="2"/>
-            <a:r>
-              <a:rPr lang="en-US" dirty="0"/>
-              <a:t>A change to a configuration management or infrastructure definition script triggers a pipeline.</a:t>
-            </a:r>
-          </a:p>
-          <a:p>
-            <a:pPr lvl="1"/>
-            <a:endParaRPr lang="en-US" dirty="0"/>
-          </a:p>
-          <a:p>
-            <a:pPr lvl="1"/>
-            <a:r>
-              <a:rPr lang="en-US" dirty="0"/>
-              <a:t>Automate deployment of infrastructure and our software.</a:t>
-            </a:r>
           </a:p>
         </p:txBody>
       </p:sp>
     </p:spTree>
     <p:extLst>
       <p:ext uri="{BB962C8B-B14F-4D97-AF65-F5344CB8AC3E}">
-        <p14:creationId xmlns:p14="http://schemas.microsoft.com/office/powerpoint/2010/main" val="219701665"/>
+        <p14:creationId xmlns:p14="http://schemas.microsoft.com/office/powerpoint/2010/main" val="1430834894"/>
       </p:ext>
     </p:extLst>
   </p:cSld>
@@ -10257,7 +10394,13 @@
       </p:grpSpPr>
       <p:sp>
         <p:nvSpPr>
-          <p:cNvPr id="2" name="Title 1"/>
+          <p:cNvPr id="2" name="Title 1">
+            <a:extLst>
+              <a:ext uri="{FF2B5EF4-FFF2-40B4-BE49-F238E27FC236}">
+                <a16:creationId xmlns:a16="http://schemas.microsoft.com/office/drawing/2014/main" id="{7E66EE6B-BFEC-654C-9A64-26BCFB95BE60}"/>
+              </a:ext>
+            </a:extLst>
+          </p:cNvPr>
           <p:cNvSpPr>
             <a:spLocks noGrp="1"/>
           </p:cNvSpPr>
@@ -10271,15 +10414,22 @@
           <a:lstStyle/>
           <a:p>
             <a:r>
-              <a:rPr lang="en-US" dirty="0"/>
-              <a:t>Infrastructure Pipeline</a:t>
-            </a:r>
-          </a:p>
-        </p:txBody>
-      </p:sp>
-      <p:sp>
-        <p:nvSpPr>
-          <p:cNvPr id="3" name="Content Placeholder 2"/>
+              <a:rPr lang="en-US" dirty="0" err="1"/>
+              <a:t>CodeDeploy</a:t>
+            </a:r>
+            <a:endParaRPr lang="en-US" dirty="0"/>
+          </a:p>
+        </p:txBody>
+      </p:sp>
+      <p:sp>
+        <p:nvSpPr>
+          <p:cNvPr id="3" name="Content Placeholder 2">
+            <a:extLst>
+              <a:ext uri="{FF2B5EF4-FFF2-40B4-BE49-F238E27FC236}">
+                <a16:creationId xmlns:a16="http://schemas.microsoft.com/office/drawing/2014/main" id="{01DF21DF-01D6-4843-8AFC-4153FB2E233D}"/>
+              </a:ext>
+            </a:extLst>
+          </p:cNvPr>
           <p:cNvSpPr>
             <a:spLocks noGrp="1"/>
           </p:cNvSpPr>
@@ -10290,23 +10440,39 @@
         <p:spPr/>
         <p:txBody>
           <a:bodyPr>
-            <a:normAutofit fontScale="77500" lnSpcReduction="20000"/>
+            <a:normAutofit fontScale="92500" lnSpcReduction="20000"/>
           </a:bodyPr>
           <a:lstStyle/>
           <a:p>
             <a:r>
               <a:rPr lang="en-US" dirty="0"/>
-              <a:t>CloudFormation template pipeline example:</a:t>
-            </a:r>
-          </a:p>
-          <a:p>
+              <a:t>Key components:</a:t>
+            </a:r>
+          </a:p>
+          <a:p>
+            <a:pPr lvl="1"/>
+            <a:r>
+              <a:rPr lang="en-US" b="1" dirty="0"/>
+              <a:t>Application</a:t>
+            </a:r>
+            <a:r>
+              <a:rPr lang="en-US" dirty="0"/>
+              <a:t>: code components you want to deploy.</a:t>
+            </a:r>
+          </a:p>
+          <a:p>
+            <a:pPr lvl="1"/>
             <a:endParaRPr lang="en-US" dirty="0"/>
           </a:p>
           <a:p>
             <a:pPr lvl="1"/>
             <a:r>
-              <a:rPr lang="en-US" dirty="0"/>
-              <a:t>Lint CloudFormation template to validate syntax</a:t>
+              <a:rPr lang="en-US" b="1" dirty="0"/>
+              <a:t>Compute platform</a:t>
+            </a:r>
+            <a:r>
+              <a:rPr lang="en-US" dirty="0"/>
+              <a:t>: where you want to deploy application code to (EC2, Lambda, ECS…)</a:t>
             </a:r>
           </a:p>
           <a:p>
@@ -10316,56 +10482,187 @@
           <a:p>
             <a:pPr lvl="1"/>
             <a:r>
-              <a:rPr lang="en-US" dirty="0"/>
-              <a:t>Deploy CloudFormation template</a:t>
-            </a:r>
-          </a:p>
-          <a:p>
-            <a:pPr lvl="2"/>
-            <a:r>
-              <a:rPr lang="en-US" dirty="0"/>
-              <a:t>Wait for AWS resources to be built</a:t>
-            </a:r>
-          </a:p>
-          <a:p>
-            <a:pPr lvl="2"/>
+              <a:rPr lang="en-US" b="1" dirty="0"/>
+              <a:t>Deployment group</a:t>
+            </a:r>
+            <a:r>
+              <a:rPr lang="en-US" dirty="0"/>
+              <a:t>: a set of individual compute instances (EC2)</a:t>
+            </a:r>
+          </a:p>
+          <a:p>
+            <a:pPr lvl="1"/>
             <a:endParaRPr lang="en-US" dirty="0"/>
           </a:p>
           <a:p>
             <a:pPr lvl="1"/>
             <a:r>
-              <a:rPr lang="en-US" dirty="0"/>
-              <a:t>Test AWS resources to verify that required resources are installed and working properly</a:t>
+              <a:rPr lang="en-US" b="1" dirty="0"/>
+              <a:t>Deployment type</a:t>
+            </a:r>
+            <a:r>
+              <a:rPr lang="en-US" dirty="0"/>
+              <a:t>:  the method used to make the latest application version available.</a:t>
             </a:r>
           </a:p>
           <a:p>
             <a:pPr lvl="1"/>
             <a:endParaRPr lang="en-US" dirty="0"/>
-          </a:p>
-          <a:p>
-            <a:pPr lvl="1"/>
-            <a:r>
-              <a:rPr lang="en-US" dirty="0"/>
-              <a:t>Terminate AWS resources</a:t>
-            </a:r>
-          </a:p>
-          <a:p>
-            <a:pPr lvl="1"/>
-            <a:endParaRPr lang="en-US" dirty="0"/>
-          </a:p>
-          <a:p>
-            <a:pPr lvl="1"/>
-            <a:r>
-              <a:rPr lang="en-US" dirty="0"/>
-              <a:t>Publish new template</a:t>
-            </a:r>
           </a:p>
         </p:txBody>
       </p:sp>
     </p:spTree>
     <p:extLst>
       <p:ext uri="{BB962C8B-B14F-4D97-AF65-F5344CB8AC3E}">
-        <p14:creationId xmlns:p14="http://schemas.microsoft.com/office/powerpoint/2010/main" val="804898301"/>
+        <p14:creationId xmlns:p14="http://schemas.microsoft.com/office/powerpoint/2010/main" val="453861540"/>
+      </p:ext>
+    </p:extLst>
+  </p:cSld>
+  <p:clrMapOvr>
+    <a:masterClrMapping/>
+  </p:clrMapOvr>
+</p:sld>
+</file>
+
+<file path=ppt/slides/slide29.xml><?xml version="1.0" encoding="utf-8"?>
+<p:sld xmlns:a="http://schemas.openxmlformats.org/drawingml/2006/main" xmlns:r="http://schemas.openxmlformats.org/officeDocument/2006/relationships" xmlns:p="http://schemas.openxmlformats.org/presentationml/2006/main">
+  <p:cSld>
+    <p:spTree>
+      <p:nvGrpSpPr>
+        <p:cNvPr id="1" name=""/>
+        <p:cNvGrpSpPr/>
+        <p:nvPr/>
+      </p:nvGrpSpPr>
+      <p:grpSpPr>
+        <a:xfrm>
+          <a:off x="0" y="0"/>
+          <a:ext cx="0" cy="0"/>
+          <a:chOff x="0" y="0"/>
+          <a:chExt cx="0" cy="0"/>
+        </a:xfrm>
+      </p:grpSpPr>
+      <p:sp>
+        <p:nvSpPr>
+          <p:cNvPr id="2" name="Title 1">
+            <a:extLst>
+              <a:ext uri="{FF2B5EF4-FFF2-40B4-BE49-F238E27FC236}">
+                <a16:creationId xmlns:a16="http://schemas.microsoft.com/office/drawing/2014/main" id="{7E66EE6B-BFEC-654C-9A64-26BCFB95BE60}"/>
+              </a:ext>
+            </a:extLst>
+          </p:cNvPr>
+          <p:cNvSpPr>
+            <a:spLocks noGrp="1"/>
+          </p:cNvSpPr>
+          <p:nvPr>
+            <p:ph type="title"/>
+          </p:nvPr>
+        </p:nvSpPr>
+        <p:spPr/>
+        <p:txBody>
+          <a:bodyPr/>
+          <a:lstStyle/>
+          <a:p>
+            <a:r>
+              <a:rPr lang="en-US" dirty="0" err="1"/>
+              <a:t>CodeDeploy</a:t>
+            </a:r>
+            <a:endParaRPr lang="en-US" dirty="0"/>
+          </a:p>
+        </p:txBody>
+      </p:sp>
+      <p:sp>
+        <p:nvSpPr>
+          <p:cNvPr id="3" name="Content Placeholder 2">
+            <a:extLst>
+              <a:ext uri="{FF2B5EF4-FFF2-40B4-BE49-F238E27FC236}">
+                <a16:creationId xmlns:a16="http://schemas.microsoft.com/office/drawing/2014/main" id="{01DF21DF-01D6-4843-8AFC-4153FB2E233D}"/>
+              </a:ext>
+            </a:extLst>
+          </p:cNvPr>
+          <p:cNvSpPr>
+            <a:spLocks noGrp="1"/>
+          </p:cNvSpPr>
+          <p:nvPr>
+            <p:ph idx="1"/>
+          </p:nvPr>
+        </p:nvSpPr>
+        <p:spPr/>
+        <p:txBody>
+          <a:bodyPr>
+            <a:normAutofit/>
+          </a:bodyPr>
+          <a:lstStyle/>
+          <a:p>
+            <a:r>
+              <a:rPr lang="en-US" dirty="0"/>
+              <a:t>Two deployment types:</a:t>
+            </a:r>
+          </a:p>
+          <a:p>
+            <a:pPr lvl="1"/>
+            <a:r>
+              <a:rPr lang="en-US" dirty="0"/>
+              <a:t>In-place deployment</a:t>
+            </a:r>
+          </a:p>
+          <a:p>
+            <a:pPr lvl="2"/>
+            <a:r>
+              <a:rPr lang="en-US" dirty="0" err="1"/>
+              <a:t>OneAtATime</a:t>
+            </a:r>
+            <a:r>
+              <a:rPr lang="en-US" dirty="0"/>
+              <a:t> (Rolling release)</a:t>
+            </a:r>
+          </a:p>
+          <a:p>
+            <a:pPr lvl="2"/>
+            <a:r>
+              <a:rPr lang="en-US" dirty="0" err="1"/>
+              <a:t>HalfAtATime</a:t>
+            </a:r>
+            <a:r>
+              <a:rPr lang="en-US" dirty="0"/>
+              <a:t> (Rolling release/Min in service)</a:t>
+            </a:r>
+          </a:p>
+          <a:p>
+            <a:pPr lvl="2"/>
+            <a:r>
+              <a:rPr lang="en-US" dirty="0" err="1"/>
+              <a:t>AllAtOnce</a:t>
+            </a:r>
+            <a:r>
+              <a:rPr lang="en-US" dirty="0"/>
+              <a:t> (Big Bang release)</a:t>
+            </a:r>
+          </a:p>
+          <a:p>
+            <a:pPr lvl="1"/>
+            <a:endParaRPr lang="en-US" dirty="0"/>
+          </a:p>
+          <a:p>
+            <a:pPr lvl="1"/>
+            <a:r>
+              <a:rPr lang="en-US" dirty="0"/>
+              <a:t>Blue/green</a:t>
+            </a:r>
+          </a:p>
+          <a:p>
+            <a:pPr lvl="2"/>
+            <a:endParaRPr lang="en-US" dirty="0"/>
+          </a:p>
+          <a:p>
+            <a:pPr lvl="1"/>
+            <a:endParaRPr lang="en-US" dirty="0"/>
+          </a:p>
+        </p:txBody>
+      </p:sp>
+    </p:spTree>
+    <p:extLst>
+      <p:ext uri="{BB962C8B-B14F-4D97-AF65-F5344CB8AC3E}">
+        <p14:creationId xmlns:p14="http://schemas.microsoft.com/office/powerpoint/2010/main" val="2644914098"/>
       </p:ext>
     </p:extLst>
   </p:cSld>
@@ -10494,6 +10791,1011 @@
     <p:extLst>
       <p:ext uri="{BB962C8B-B14F-4D97-AF65-F5344CB8AC3E}">
         <p14:creationId xmlns:p14="http://schemas.microsoft.com/office/powerpoint/2010/main" val="1820130156"/>
+      </p:ext>
+    </p:extLst>
+  </p:cSld>
+  <p:clrMapOvr>
+    <a:masterClrMapping/>
+  </p:clrMapOvr>
+</p:sld>
+</file>
+
+<file path=ppt/slides/slide30.xml><?xml version="1.0" encoding="utf-8"?>
+<p:sld xmlns:a="http://schemas.openxmlformats.org/drawingml/2006/main" xmlns:r="http://schemas.openxmlformats.org/officeDocument/2006/relationships" xmlns:p="http://schemas.openxmlformats.org/presentationml/2006/main">
+  <p:cSld>
+    <p:spTree>
+      <p:nvGrpSpPr>
+        <p:cNvPr id="1" name=""/>
+        <p:cNvGrpSpPr/>
+        <p:nvPr/>
+      </p:nvGrpSpPr>
+      <p:grpSpPr>
+        <a:xfrm>
+          <a:off x="0" y="0"/>
+          <a:ext cx="0" cy="0"/>
+          <a:chOff x="0" y="0"/>
+          <a:chExt cx="0" cy="0"/>
+        </a:xfrm>
+      </p:grpSpPr>
+      <p:sp>
+        <p:nvSpPr>
+          <p:cNvPr id="2" name="Title 1">
+            <a:extLst>
+              <a:ext uri="{FF2B5EF4-FFF2-40B4-BE49-F238E27FC236}">
+                <a16:creationId xmlns:a16="http://schemas.microsoft.com/office/drawing/2014/main" id="{7E66EE6B-BFEC-654C-9A64-26BCFB95BE60}"/>
+              </a:ext>
+            </a:extLst>
+          </p:cNvPr>
+          <p:cNvSpPr>
+            <a:spLocks noGrp="1"/>
+          </p:cNvSpPr>
+          <p:nvPr>
+            <p:ph type="title"/>
+          </p:nvPr>
+        </p:nvSpPr>
+        <p:spPr/>
+        <p:txBody>
+          <a:bodyPr/>
+          <a:lstStyle/>
+          <a:p>
+            <a:r>
+              <a:rPr lang="en-US" dirty="0" err="1"/>
+              <a:t>CodeDeploy</a:t>
+            </a:r>
+            <a:endParaRPr lang="en-US" dirty="0"/>
+          </a:p>
+        </p:txBody>
+      </p:sp>
+      <p:sp>
+        <p:nvSpPr>
+          <p:cNvPr id="3" name="Content Placeholder 2">
+            <a:extLst>
+              <a:ext uri="{FF2B5EF4-FFF2-40B4-BE49-F238E27FC236}">
+                <a16:creationId xmlns:a16="http://schemas.microsoft.com/office/drawing/2014/main" id="{01DF21DF-01D6-4843-8AFC-4153FB2E233D}"/>
+              </a:ext>
+            </a:extLst>
+          </p:cNvPr>
+          <p:cNvSpPr>
+            <a:spLocks noGrp="1"/>
+          </p:cNvSpPr>
+          <p:nvPr>
+            <p:ph idx="1"/>
+          </p:nvPr>
+        </p:nvSpPr>
+        <p:spPr/>
+        <p:txBody>
+          <a:bodyPr>
+            <a:normAutofit/>
+          </a:bodyPr>
+          <a:lstStyle/>
+          <a:p>
+            <a:r>
+              <a:rPr lang="en-US" dirty="0" err="1"/>
+              <a:t>AppSpec</a:t>
+            </a:r>
+            <a:r>
+              <a:rPr lang="en-US" dirty="0"/>
+              <a:t> file:</a:t>
+            </a:r>
+          </a:p>
+          <a:p>
+            <a:pPr lvl="1"/>
+            <a:r>
+              <a:rPr lang="en-US" dirty="0"/>
+              <a:t>YAML file which describes how to install the application on the compute platform.</a:t>
+            </a:r>
+          </a:p>
+          <a:p>
+            <a:pPr lvl="1"/>
+            <a:r>
+              <a:rPr lang="en-US" dirty="0"/>
+              <a:t>Maps application files to destinations on the instance.</a:t>
+            </a:r>
+          </a:p>
+          <a:p>
+            <a:pPr lvl="1"/>
+            <a:r>
+              <a:rPr lang="en-US" dirty="0"/>
+              <a:t>Specifies custom permissions for deployed files.</a:t>
+            </a:r>
+          </a:p>
+          <a:p>
+            <a:pPr lvl="1"/>
+            <a:r>
+              <a:rPr lang="en-US" dirty="0"/>
+              <a:t>Specifies scripts to run during stages of the deployment process.</a:t>
+            </a:r>
+          </a:p>
+          <a:p>
+            <a:pPr lvl="2"/>
+            <a:endParaRPr lang="en-US" dirty="0"/>
+          </a:p>
+          <a:p>
+            <a:pPr lvl="1"/>
+            <a:endParaRPr lang="en-US" dirty="0"/>
+          </a:p>
+        </p:txBody>
+      </p:sp>
+    </p:spTree>
+    <p:extLst>
+      <p:ext uri="{BB962C8B-B14F-4D97-AF65-F5344CB8AC3E}">
+        <p14:creationId xmlns:p14="http://schemas.microsoft.com/office/powerpoint/2010/main" val="3794057545"/>
+      </p:ext>
+    </p:extLst>
+  </p:cSld>
+  <p:clrMapOvr>
+    <a:masterClrMapping/>
+  </p:clrMapOvr>
+</p:sld>
+</file>
+
+<file path=ppt/slides/slide31.xml><?xml version="1.0" encoding="utf-8"?>
+<p:sld xmlns:a="http://schemas.openxmlformats.org/drawingml/2006/main" xmlns:r="http://schemas.openxmlformats.org/officeDocument/2006/relationships" xmlns:p="http://schemas.openxmlformats.org/presentationml/2006/main">
+  <p:cSld>
+    <p:spTree>
+      <p:nvGrpSpPr>
+        <p:cNvPr id="1" name=""/>
+        <p:cNvGrpSpPr/>
+        <p:nvPr/>
+      </p:nvGrpSpPr>
+      <p:grpSpPr>
+        <a:xfrm>
+          <a:off x="0" y="0"/>
+          <a:ext cx="0" cy="0"/>
+          <a:chOff x="0" y="0"/>
+          <a:chExt cx="0" cy="0"/>
+        </a:xfrm>
+      </p:grpSpPr>
+      <p:sp>
+        <p:nvSpPr>
+          <p:cNvPr id="2" name="Title 1">
+            <a:extLst>
+              <a:ext uri="{FF2B5EF4-FFF2-40B4-BE49-F238E27FC236}">
+                <a16:creationId xmlns:a16="http://schemas.microsoft.com/office/drawing/2014/main" id="{7E66EE6B-BFEC-654C-9A64-26BCFB95BE60}"/>
+              </a:ext>
+            </a:extLst>
+          </p:cNvPr>
+          <p:cNvSpPr>
+            <a:spLocks noGrp="1"/>
+          </p:cNvSpPr>
+          <p:nvPr>
+            <p:ph type="title"/>
+          </p:nvPr>
+        </p:nvSpPr>
+        <p:spPr/>
+        <p:txBody>
+          <a:bodyPr/>
+          <a:lstStyle/>
+          <a:p>
+            <a:r>
+              <a:rPr lang="en-US" dirty="0" err="1"/>
+              <a:t>CodeDeploy</a:t>
+            </a:r>
+            <a:r>
+              <a:rPr lang="en-US" dirty="0"/>
+              <a:t> </a:t>
+            </a:r>
+            <a:r>
+              <a:rPr lang="en-US" dirty="0" err="1"/>
+              <a:t>appspec.yml</a:t>
+            </a:r>
+            <a:endParaRPr lang="en-US" dirty="0"/>
+          </a:p>
+        </p:txBody>
+      </p:sp>
+      <p:sp>
+        <p:nvSpPr>
+          <p:cNvPr id="3" name="Content Placeholder 2">
+            <a:extLst>
+              <a:ext uri="{FF2B5EF4-FFF2-40B4-BE49-F238E27FC236}">
+                <a16:creationId xmlns:a16="http://schemas.microsoft.com/office/drawing/2014/main" id="{01DF21DF-01D6-4843-8AFC-4153FB2E233D}"/>
+              </a:ext>
+            </a:extLst>
+          </p:cNvPr>
+          <p:cNvSpPr>
+            <a:spLocks noGrp="1"/>
+          </p:cNvSpPr>
+          <p:nvPr>
+            <p:ph idx="1"/>
+          </p:nvPr>
+        </p:nvSpPr>
+        <p:spPr/>
+        <p:txBody>
+          <a:bodyPr>
+            <a:normAutofit fontScale="77500" lnSpcReduction="20000"/>
+          </a:bodyPr>
+          <a:lstStyle/>
+          <a:p>
+            <a:pPr marL="914400" lvl="2" indent="0">
+              <a:buNone/>
+            </a:pPr>
+            <a:r>
+              <a:rPr lang="en-US" dirty="0"/>
+              <a:t>version: 0.0</a:t>
+            </a:r>
+          </a:p>
+          <a:p>
+            <a:pPr marL="914400" lvl="2" indent="0">
+              <a:buNone/>
+            </a:pPr>
+            <a:r>
+              <a:rPr lang="en-US" dirty="0" err="1"/>
+              <a:t>os</a:t>
+            </a:r>
+            <a:r>
+              <a:rPr lang="en-US" dirty="0"/>
+              <a:t>: </a:t>
+            </a:r>
+            <a:r>
+              <a:rPr lang="en-US" dirty="0" err="1"/>
+              <a:t>linux</a:t>
+            </a:r>
+            <a:endParaRPr lang="en-US" dirty="0"/>
+          </a:p>
+          <a:p>
+            <a:pPr marL="914400" lvl="2" indent="0">
+              <a:buNone/>
+            </a:pPr>
+            <a:r>
+              <a:rPr lang="en-US" dirty="0"/>
+              <a:t>files:</a:t>
+            </a:r>
+          </a:p>
+          <a:p>
+            <a:pPr marL="914400" lvl="2" indent="0">
+              <a:buNone/>
+            </a:pPr>
+            <a:r>
+              <a:rPr lang="en-US" dirty="0"/>
+              <a:t>	- source: </a:t>
+            </a:r>
+            <a:r>
+              <a:rPr lang="en-US" dirty="0" err="1"/>
+              <a:t>myApp.jar</a:t>
+            </a:r>
+            <a:endParaRPr lang="en-US" dirty="0"/>
+          </a:p>
+          <a:p>
+            <a:pPr marL="914400" lvl="2" indent="0">
+              <a:buNone/>
+            </a:pPr>
+            <a:r>
+              <a:rPr lang="en-US" dirty="0"/>
+              <a:t>	  destination: /var/app/</a:t>
+            </a:r>
+            <a:r>
+              <a:rPr lang="en-US" dirty="0" err="1"/>
+              <a:t>myApp.jar</a:t>
+            </a:r>
+            <a:endParaRPr lang="en-US" dirty="0"/>
+          </a:p>
+          <a:p>
+            <a:pPr marL="914400" lvl="2" indent="0">
+              <a:buNone/>
+            </a:pPr>
+            <a:r>
+              <a:rPr lang="en-US" dirty="0"/>
+              <a:t>permissions:</a:t>
+            </a:r>
+          </a:p>
+          <a:p>
+            <a:pPr marL="914400" lvl="2" indent="0">
+              <a:buNone/>
+            </a:pPr>
+            <a:r>
+              <a:rPr lang="en-US" dirty="0"/>
+              <a:t>	- object: /var/app</a:t>
+            </a:r>
+          </a:p>
+          <a:p>
+            <a:pPr marL="914400" lvl="2" indent="0">
+              <a:buNone/>
+            </a:pPr>
+            <a:r>
+              <a:rPr lang="en-US" dirty="0"/>
+              <a:t>	  group: wheel</a:t>
+            </a:r>
+          </a:p>
+          <a:p>
+            <a:pPr marL="914400" lvl="2" indent="0">
+              <a:buNone/>
+            </a:pPr>
+            <a:r>
+              <a:rPr lang="en-US" dirty="0"/>
+              <a:t>	  mode: 440</a:t>
+            </a:r>
+          </a:p>
+          <a:p>
+            <a:pPr marL="914400" lvl="2" indent="0">
+              <a:buNone/>
+            </a:pPr>
+            <a:r>
+              <a:rPr lang="en-US" dirty="0"/>
+              <a:t>	  type:</a:t>
+            </a:r>
+          </a:p>
+          <a:p>
+            <a:pPr marL="914400" lvl="2" indent="0">
+              <a:buNone/>
+            </a:pPr>
+            <a:r>
+              <a:rPr lang="en-US" dirty="0"/>
+              <a:t>	    - directory</a:t>
+            </a:r>
+          </a:p>
+          <a:p>
+            <a:pPr marL="914400" lvl="2" indent="0">
+              <a:buNone/>
+            </a:pPr>
+            <a:r>
+              <a:rPr lang="en-US" dirty="0"/>
+              <a:t>hooks:</a:t>
+            </a:r>
+          </a:p>
+          <a:p>
+            <a:pPr marL="914400" lvl="2" indent="0">
+              <a:buNone/>
+            </a:pPr>
+            <a:r>
+              <a:rPr lang="en-US" dirty="0"/>
+              <a:t>	</a:t>
+            </a:r>
+            <a:r>
+              <a:rPr lang="en-US" dirty="0" err="1"/>
+              <a:t>AfterInstall</a:t>
+            </a:r>
+            <a:r>
+              <a:rPr lang="en-US" dirty="0"/>
+              <a:t>:</a:t>
+            </a:r>
+          </a:p>
+          <a:p>
+            <a:pPr marL="914400" lvl="2" indent="0">
+              <a:buNone/>
+            </a:pPr>
+            <a:r>
+              <a:rPr lang="en-US" dirty="0"/>
+              <a:t>		- location: scripts/</a:t>
+            </a:r>
+            <a:r>
+              <a:rPr lang="en-US" dirty="0" err="1"/>
+              <a:t>run_tests.sh</a:t>
+            </a:r>
+            <a:endParaRPr lang="en-US" dirty="0"/>
+          </a:p>
+          <a:p>
+            <a:pPr marL="914400" lvl="2" indent="0">
+              <a:buNone/>
+            </a:pPr>
+            <a:r>
+              <a:rPr lang="en-US" dirty="0"/>
+              <a:t>		  timeout: 90</a:t>
+            </a:r>
+          </a:p>
+          <a:p>
+            <a:pPr lvl="1"/>
+            <a:endParaRPr lang="en-US" dirty="0"/>
+          </a:p>
+        </p:txBody>
+      </p:sp>
+    </p:spTree>
+    <p:extLst>
+      <p:ext uri="{BB962C8B-B14F-4D97-AF65-F5344CB8AC3E}">
+        <p14:creationId xmlns:p14="http://schemas.microsoft.com/office/powerpoint/2010/main" val="3367741918"/>
+      </p:ext>
+    </p:extLst>
+  </p:cSld>
+  <p:clrMapOvr>
+    <a:masterClrMapping/>
+  </p:clrMapOvr>
+</p:sld>
+</file>
+
+<file path=ppt/slides/slide32.xml><?xml version="1.0" encoding="utf-8"?>
+<p:sld xmlns:a="http://schemas.openxmlformats.org/drawingml/2006/main" xmlns:r="http://schemas.openxmlformats.org/officeDocument/2006/relationships" xmlns:p="http://schemas.openxmlformats.org/presentationml/2006/main">
+  <p:cSld>
+    <p:spTree>
+      <p:nvGrpSpPr>
+        <p:cNvPr id="1" name=""/>
+        <p:cNvGrpSpPr/>
+        <p:nvPr/>
+      </p:nvGrpSpPr>
+      <p:grpSpPr>
+        <a:xfrm>
+          <a:off x="0" y="0"/>
+          <a:ext cx="0" cy="0"/>
+          <a:chOff x="0" y="0"/>
+          <a:chExt cx="0" cy="0"/>
+        </a:xfrm>
+      </p:grpSpPr>
+      <p:sp>
+        <p:nvSpPr>
+          <p:cNvPr id="2" name="Title 1">
+            <a:extLst>
+              <a:ext uri="{FF2B5EF4-FFF2-40B4-BE49-F238E27FC236}">
+                <a16:creationId xmlns:a16="http://schemas.microsoft.com/office/drawing/2014/main" id="{7E66EE6B-BFEC-654C-9A64-26BCFB95BE60}"/>
+              </a:ext>
+            </a:extLst>
+          </p:cNvPr>
+          <p:cNvSpPr>
+            <a:spLocks noGrp="1"/>
+          </p:cNvSpPr>
+          <p:nvPr>
+            <p:ph type="title"/>
+          </p:nvPr>
+        </p:nvSpPr>
+        <p:spPr/>
+        <p:txBody>
+          <a:bodyPr/>
+          <a:lstStyle/>
+          <a:p>
+            <a:r>
+              <a:rPr lang="en-US" dirty="0" err="1"/>
+              <a:t>CodeDeploy</a:t>
+            </a:r>
+            <a:r>
+              <a:rPr lang="en-US" dirty="0"/>
+              <a:t> </a:t>
+            </a:r>
+            <a:r>
+              <a:rPr lang="en-US" dirty="0" err="1"/>
+              <a:t>appspec.yml</a:t>
+            </a:r>
+            <a:endParaRPr lang="en-US" dirty="0"/>
+          </a:p>
+        </p:txBody>
+      </p:sp>
+      <p:sp>
+        <p:nvSpPr>
+          <p:cNvPr id="3" name="Content Placeholder 2">
+            <a:extLst>
+              <a:ext uri="{FF2B5EF4-FFF2-40B4-BE49-F238E27FC236}">
+                <a16:creationId xmlns:a16="http://schemas.microsoft.com/office/drawing/2014/main" id="{01DF21DF-01D6-4843-8AFC-4153FB2E233D}"/>
+              </a:ext>
+            </a:extLst>
+          </p:cNvPr>
+          <p:cNvSpPr>
+            <a:spLocks noGrp="1"/>
+          </p:cNvSpPr>
+          <p:nvPr>
+            <p:ph idx="1"/>
+          </p:nvPr>
+        </p:nvSpPr>
+        <p:spPr>
+          <a:xfrm>
+            <a:off x="457200" y="1600200"/>
+            <a:ext cx="6185338" cy="4525963"/>
+          </a:xfrm>
+        </p:spPr>
+        <p:txBody>
+          <a:bodyPr>
+            <a:normAutofit fontScale="92500" lnSpcReduction="20000"/>
+          </a:bodyPr>
+          <a:lstStyle/>
+          <a:p>
+            <a:r>
+              <a:rPr lang="en-US" dirty="0"/>
+              <a:t>Hooks describe lifecycle events which occur during the deployment process.</a:t>
+            </a:r>
+          </a:p>
+          <a:p>
+            <a:endParaRPr lang="en-US" dirty="0"/>
+          </a:p>
+          <a:p>
+            <a:pPr lvl="1"/>
+            <a:r>
+              <a:rPr lang="en-US" dirty="0"/>
+              <a:t>Events differ based on compute platform and deployment type.</a:t>
+            </a:r>
+          </a:p>
+          <a:p>
+            <a:pPr lvl="1"/>
+            <a:endParaRPr lang="en-US" dirty="0"/>
+          </a:p>
+          <a:p>
+            <a:pPr lvl="1"/>
+            <a:r>
+              <a:rPr lang="en-US" dirty="0"/>
+              <a:t>We can specify scripts to run at each event.</a:t>
+            </a:r>
+          </a:p>
+          <a:p>
+            <a:pPr lvl="2"/>
+            <a:r>
+              <a:rPr lang="en-US" dirty="0"/>
+              <a:t>Install application dependencies</a:t>
+            </a:r>
+          </a:p>
+          <a:p>
+            <a:pPr lvl="2"/>
+            <a:r>
+              <a:rPr lang="en-US" dirty="0"/>
+              <a:t>Configure application settings</a:t>
+            </a:r>
+          </a:p>
+          <a:p>
+            <a:pPr lvl="2"/>
+            <a:r>
+              <a:rPr lang="en-US" dirty="0"/>
+              <a:t>Run post-installation smoke tests</a:t>
+            </a:r>
+          </a:p>
+        </p:txBody>
+      </p:sp>
+      <p:pic>
+        <p:nvPicPr>
+          <p:cNvPr id="4" name="Picture 3">
+            <a:extLst>
+              <a:ext uri="{FF2B5EF4-FFF2-40B4-BE49-F238E27FC236}">
+                <a16:creationId xmlns:a16="http://schemas.microsoft.com/office/drawing/2014/main" id="{09A21C8A-D194-F049-AD1C-6D2F007589ED}"/>
+              </a:ext>
+            </a:extLst>
+          </p:cNvPr>
+          <p:cNvPicPr>
+            <a:picLocks noChangeAspect="1"/>
+          </p:cNvPicPr>
+          <p:nvPr/>
+        </p:nvPicPr>
+        <p:blipFill>
+          <a:blip r:embed="rId2"/>
+          <a:stretch>
+            <a:fillRect/>
+          </a:stretch>
+        </p:blipFill>
+        <p:spPr>
+          <a:xfrm>
+            <a:off x="6876921" y="1600200"/>
+            <a:ext cx="1809879" cy="4159879"/>
+          </a:xfrm>
+          <a:prstGeom prst="rect">
+            <a:avLst/>
+          </a:prstGeom>
+        </p:spPr>
+      </p:pic>
+    </p:spTree>
+    <p:extLst>
+      <p:ext uri="{BB962C8B-B14F-4D97-AF65-F5344CB8AC3E}">
+        <p14:creationId xmlns:p14="http://schemas.microsoft.com/office/powerpoint/2010/main" val="3238344813"/>
+      </p:ext>
+    </p:extLst>
+  </p:cSld>
+  <p:clrMapOvr>
+    <a:masterClrMapping/>
+  </p:clrMapOvr>
+</p:sld>
+</file>
+
+<file path=ppt/slides/slide33.xml><?xml version="1.0" encoding="utf-8"?>
+<p:sld xmlns:a="http://schemas.openxmlformats.org/drawingml/2006/main" xmlns:r="http://schemas.openxmlformats.org/officeDocument/2006/relationships" xmlns:p="http://schemas.openxmlformats.org/presentationml/2006/main">
+  <p:cSld>
+    <p:spTree>
+      <p:nvGrpSpPr>
+        <p:cNvPr id="1" name=""/>
+        <p:cNvGrpSpPr/>
+        <p:nvPr/>
+      </p:nvGrpSpPr>
+      <p:grpSpPr>
+        <a:xfrm>
+          <a:off x="0" y="0"/>
+          <a:ext cx="0" cy="0"/>
+          <a:chOff x="0" y="0"/>
+          <a:chExt cx="0" cy="0"/>
+        </a:xfrm>
+      </p:grpSpPr>
+      <p:sp>
+        <p:nvSpPr>
+          <p:cNvPr id="2" name="Title 1"/>
+          <p:cNvSpPr>
+            <a:spLocks noGrp="1"/>
+          </p:cNvSpPr>
+          <p:nvPr>
+            <p:ph type="title"/>
+          </p:nvPr>
+        </p:nvSpPr>
+        <p:spPr/>
+        <p:txBody>
+          <a:bodyPr/>
+          <a:lstStyle/>
+          <a:p>
+            <a:r>
+              <a:rPr lang="en-US" dirty="0" err="1"/>
+              <a:t>CodeDeploy</a:t>
+            </a:r>
+            <a:r>
+              <a:rPr lang="en-US" dirty="0"/>
+              <a:t> Hands-on</a:t>
+            </a:r>
+          </a:p>
+        </p:txBody>
+      </p:sp>
+      <p:sp>
+        <p:nvSpPr>
+          <p:cNvPr id="3" name="Content Placeholder 2"/>
+          <p:cNvSpPr>
+            <a:spLocks noGrp="1"/>
+          </p:cNvSpPr>
+          <p:nvPr>
+            <p:ph idx="1"/>
+          </p:nvPr>
+        </p:nvSpPr>
+        <p:spPr/>
+        <p:txBody>
+          <a:bodyPr>
+            <a:normAutofit fontScale="62500" lnSpcReduction="20000"/>
+          </a:bodyPr>
+          <a:lstStyle/>
+          <a:p>
+            <a:r>
+              <a:rPr lang="en-US" dirty="0"/>
+              <a:t>Goal: Deploy and application update to a simulated production environment.</a:t>
+            </a:r>
+          </a:p>
+          <a:p>
+            <a:endParaRPr lang="en-US" dirty="0"/>
+          </a:p>
+          <a:p>
+            <a:r>
+              <a:rPr lang="en-US" dirty="0"/>
+              <a:t>Deploy production environment stack:</a:t>
+            </a:r>
+          </a:p>
+          <a:p>
+            <a:pPr lvl="1"/>
+            <a:r>
+              <a:rPr lang="en-US" dirty="0">
+                <a:hlinkClick r:id="rId3"/>
+              </a:rPr>
+              <a:t>https://seis665.s3.amazonaws.com/app-prod-env-template.json</a:t>
+            </a:r>
+            <a:endParaRPr lang="en-US" dirty="0"/>
+          </a:p>
+          <a:p>
+            <a:pPr lvl="1"/>
+            <a:endParaRPr lang="en-US" dirty="0"/>
+          </a:p>
+          <a:p>
+            <a:r>
+              <a:rPr lang="en-US" dirty="0"/>
+              <a:t>Upload </a:t>
+            </a:r>
+            <a:r>
+              <a:rPr lang="en-US" dirty="0" err="1"/>
+              <a:t>website.zip</a:t>
+            </a:r>
+            <a:r>
+              <a:rPr lang="en-US" dirty="0"/>
+              <a:t> file to S3 artifact bucket in stack.</a:t>
+            </a:r>
+          </a:p>
+          <a:p>
+            <a:endParaRPr lang="en-US" dirty="0"/>
+          </a:p>
+          <a:p>
+            <a:r>
+              <a:rPr lang="en-US" dirty="0"/>
+              <a:t>Test access to production ALB</a:t>
+            </a:r>
+          </a:p>
+          <a:p>
+            <a:endParaRPr lang="en-US" dirty="0"/>
+          </a:p>
+          <a:p>
+            <a:r>
+              <a:rPr lang="en-US" dirty="0"/>
+              <a:t>Create </a:t>
+            </a:r>
+            <a:r>
+              <a:rPr lang="en-US" dirty="0" err="1"/>
+              <a:t>CodeDeploy</a:t>
+            </a:r>
+            <a:r>
+              <a:rPr lang="en-US" dirty="0"/>
+              <a:t> resources:</a:t>
+            </a:r>
+          </a:p>
+          <a:p>
+            <a:pPr lvl="1"/>
+            <a:r>
+              <a:rPr lang="en-US" dirty="0"/>
+              <a:t>Application, Deployment Group, Deployment</a:t>
+            </a:r>
+          </a:p>
+          <a:p>
+            <a:pPr lvl="1"/>
+            <a:endParaRPr lang="en-US" dirty="0"/>
+          </a:p>
+          <a:p>
+            <a:r>
+              <a:rPr lang="en-US" dirty="0"/>
+              <a:t>Watch the deployment process and lifecycle events.</a:t>
+            </a:r>
+          </a:p>
+        </p:txBody>
+      </p:sp>
+      <p:pic>
+        <p:nvPicPr>
+          <p:cNvPr id="4" name="Picture 3">
+            <a:extLst>
+              <a:ext uri="{FF2B5EF4-FFF2-40B4-BE49-F238E27FC236}">
+                <a16:creationId xmlns:a16="http://schemas.microsoft.com/office/drawing/2014/main" id="{5AA7886C-BCF1-334D-8175-46E1B6E5200D}"/>
+              </a:ext>
+            </a:extLst>
+          </p:cNvPr>
+          <p:cNvPicPr>
+            <a:picLocks noChangeAspect="1"/>
+          </p:cNvPicPr>
+          <p:nvPr/>
+        </p:nvPicPr>
+        <p:blipFill>
+          <a:blip r:embed="rId4"/>
+          <a:stretch>
+            <a:fillRect/>
+          </a:stretch>
+        </p:blipFill>
+        <p:spPr>
+          <a:xfrm>
+            <a:off x="7891174" y="403586"/>
+            <a:ext cx="1014052" cy="1014052"/>
+          </a:xfrm>
+          <a:prstGeom prst="rect">
+            <a:avLst/>
+          </a:prstGeom>
+        </p:spPr>
+      </p:pic>
+    </p:spTree>
+    <p:extLst>
+      <p:ext uri="{BB962C8B-B14F-4D97-AF65-F5344CB8AC3E}">
+        <p14:creationId xmlns:p14="http://schemas.microsoft.com/office/powerpoint/2010/main" val="761670131"/>
+      </p:ext>
+    </p:extLst>
+  </p:cSld>
+  <p:clrMapOvr>
+    <a:masterClrMapping/>
+  </p:clrMapOvr>
+</p:sld>
+</file>
+
+<file path=ppt/slides/slide34.xml><?xml version="1.0" encoding="utf-8"?>
+<p:sld xmlns:a="http://schemas.openxmlformats.org/drawingml/2006/main" xmlns:r="http://schemas.openxmlformats.org/officeDocument/2006/relationships" xmlns:p="http://schemas.openxmlformats.org/presentationml/2006/main">
+  <p:cSld>
+    <p:spTree>
+      <p:nvGrpSpPr>
+        <p:cNvPr id="1" name=""/>
+        <p:cNvGrpSpPr/>
+        <p:nvPr/>
+      </p:nvGrpSpPr>
+      <p:grpSpPr>
+        <a:xfrm>
+          <a:off x="0" y="0"/>
+          <a:ext cx="0" cy="0"/>
+          <a:chOff x="0" y="0"/>
+          <a:chExt cx="0" cy="0"/>
+        </a:xfrm>
+      </p:grpSpPr>
+      <p:sp>
+        <p:nvSpPr>
+          <p:cNvPr id="2" name="Title 1"/>
+          <p:cNvSpPr>
+            <a:spLocks noGrp="1"/>
+          </p:cNvSpPr>
+          <p:nvPr>
+            <p:ph type="title"/>
+          </p:nvPr>
+        </p:nvSpPr>
+        <p:spPr/>
+        <p:txBody>
+          <a:bodyPr/>
+          <a:lstStyle/>
+          <a:p>
+            <a:r>
+              <a:rPr lang="en-US" dirty="0"/>
+              <a:t>Infrastructure Pipelines</a:t>
+            </a:r>
+          </a:p>
+        </p:txBody>
+      </p:sp>
+      <p:sp>
+        <p:nvSpPr>
+          <p:cNvPr id="3" name="Content Placeholder 2"/>
+          <p:cNvSpPr>
+            <a:spLocks noGrp="1"/>
+          </p:cNvSpPr>
+          <p:nvPr>
+            <p:ph idx="1"/>
+          </p:nvPr>
+        </p:nvSpPr>
+        <p:spPr/>
+        <p:txBody>
+          <a:bodyPr>
+            <a:normAutofit fontScale="92500" lnSpcReduction="20000"/>
+          </a:bodyPr>
+          <a:lstStyle/>
+          <a:p>
+            <a:r>
+              <a:rPr lang="en-US" dirty="0"/>
+              <a:t>CI/CD pipelines aren’t just used to build software, we also use them to build infrastructure.</a:t>
+            </a:r>
+          </a:p>
+          <a:p>
+            <a:endParaRPr lang="en-US" dirty="0"/>
+          </a:p>
+          <a:p>
+            <a:r>
+              <a:rPr lang="en-US" dirty="0"/>
+              <a:t>Two general use cases:</a:t>
+            </a:r>
+          </a:p>
+          <a:p>
+            <a:endParaRPr lang="en-US" dirty="0"/>
+          </a:p>
+          <a:p>
+            <a:pPr lvl="1"/>
+            <a:r>
+              <a:rPr lang="en-US" dirty="0"/>
+              <a:t>Automate testing of our infrastructure.</a:t>
+            </a:r>
+          </a:p>
+          <a:p>
+            <a:pPr lvl="2"/>
+            <a:r>
+              <a:rPr lang="en-US" dirty="0"/>
+              <a:t>A change to a configuration management or infrastructure definition script triggers a pipeline.</a:t>
+            </a:r>
+          </a:p>
+          <a:p>
+            <a:pPr lvl="1"/>
+            <a:endParaRPr lang="en-US" dirty="0"/>
+          </a:p>
+          <a:p>
+            <a:pPr lvl="1"/>
+            <a:r>
+              <a:rPr lang="en-US" dirty="0"/>
+              <a:t>Automate deployment of infrastructure and our software.</a:t>
+            </a:r>
+          </a:p>
+        </p:txBody>
+      </p:sp>
+    </p:spTree>
+    <p:extLst>
+      <p:ext uri="{BB962C8B-B14F-4D97-AF65-F5344CB8AC3E}">
+        <p14:creationId xmlns:p14="http://schemas.microsoft.com/office/powerpoint/2010/main" val="219701665"/>
+      </p:ext>
+    </p:extLst>
+  </p:cSld>
+  <p:clrMapOvr>
+    <a:masterClrMapping/>
+  </p:clrMapOvr>
+</p:sld>
+</file>
+
+<file path=ppt/slides/slide35.xml><?xml version="1.0" encoding="utf-8"?>
+<p:sld xmlns:a="http://schemas.openxmlformats.org/drawingml/2006/main" xmlns:r="http://schemas.openxmlformats.org/officeDocument/2006/relationships" xmlns:p="http://schemas.openxmlformats.org/presentationml/2006/main">
+  <p:cSld>
+    <p:spTree>
+      <p:nvGrpSpPr>
+        <p:cNvPr id="1" name=""/>
+        <p:cNvGrpSpPr/>
+        <p:nvPr/>
+      </p:nvGrpSpPr>
+      <p:grpSpPr>
+        <a:xfrm>
+          <a:off x="0" y="0"/>
+          <a:ext cx="0" cy="0"/>
+          <a:chOff x="0" y="0"/>
+          <a:chExt cx="0" cy="0"/>
+        </a:xfrm>
+      </p:grpSpPr>
+      <p:sp>
+        <p:nvSpPr>
+          <p:cNvPr id="2" name="Title 1"/>
+          <p:cNvSpPr>
+            <a:spLocks noGrp="1"/>
+          </p:cNvSpPr>
+          <p:nvPr>
+            <p:ph type="title"/>
+          </p:nvPr>
+        </p:nvSpPr>
+        <p:spPr/>
+        <p:txBody>
+          <a:bodyPr/>
+          <a:lstStyle/>
+          <a:p>
+            <a:r>
+              <a:rPr lang="en-US" dirty="0"/>
+              <a:t>Infrastructure Pipeline</a:t>
+            </a:r>
+          </a:p>
+        </p:txBody>
+      </p:sp>
+      <p:sp>
+        <p:nvSpPr>
+          <p:cNvPr id="3" name="Content Placeholder 2"/>
+          <p:cNvSpPr>
+            <a:spLocks noGrp="1"/>
+          </p:cNvSpPr>
+          <p:nvPr>
+            <p:ph idx="1"/>
+          </p:nvPr>
+        </p:nvSpPr>
+        <p:spPr/>
+        <p:txBody>
+          <a:bodyPr>
+            <a:normAutofit fontScale="77500" lnSpcReduction="20000"/>
+          </a:bodyPr>
+          <a:lstStyle/>
+          <a:p>
+            <a:r>
+              <a:rPr lang="en-US" dirty="0"/>
+              <a:t>CloudFormation template pipeline example:</a:t>
+            </a:r>
+          </a:p>
+          <a:p>
+            <a:endParaRPr lang="en-US" dirty="0"/>
+          </a:p>
+          <a:p>
+            <a:pPr lvl="1"/>
+            <a:r>
+              <a:rPr lang="en-US" dirty="0"/>
+              <a:t>Lint CloudFormation template to validate syntax</a:t>
+            </a:r>
+          </a:p>
+          <a:p>
+            <a:pPr lvl="1"/>
+            <a:endParaRPr lang="en-US" dirty="0"/>
+          </a:p>
+          <a:p>
+            <a:pPr lvl="1"/>
+            <a:r>
+              <a:rPr lang="en-US" dirty="0"/>
+              <a:t>Deploy CloudFormation template</a:t>
+            </a:r>
+          </a:p>
+          <a:p>
+            <a:pPr lvl="2"/>
+            <a:r>
+              <a:rPr lang="en-US" dirty="0"/>
+              <a:t>Wait for AWS resources to be built</a:t>
+            </a:r>
+          </a:p>
+          <a:p>
+            <a:pPr lvl="2"/>
+            <a:endParaRPr lang="en-US" dirty="0"/>
+          </a:p>
+          <a:p>
+            <a:pPr lvl="1"/>
+            <a:r>
+              <a:rPr lang="en-US" dirty="0"/>
+              <a:t>Test AWS resources to verify that required resources are installed and working properly</a:t>
+            </a:r>
+          </a:p>
+          <a:p>
+            <a:pPr lvl="1"/>
+            <a:endParaRPr lang="en-US" dirty="0"/>
+          </a:p>
+          <a:p>
+            <a:pPr lvl="1"/>
+            <a:r>
+              <a:rPr lang="en-US" dirty="0"/>
+              <a:t>Terminate AWS resources</a:t>
+            </a:r>
+          </a:p>
+          <a:p>
+            <a:pPr lvl="1"/>
+            <a:endParaRPr lang="en-US" dirty="0"/>
+          </a:p>
+          <a:p>
+            <a:pPr lvl="1"/>
+            <a:r>
+              <a:rPr lang="en-US" dirty="0"/>
+              <a:t>Publish new template</a:t>
+            </a:r>
+          </a:p>
+        </p:txBody>
+      </p:sp>
+    </p:spTree>
+    <p:extLst>
+      <p:ext uri="{BB962C8B-B14F-4D97-AF65-F5344CB8AC3E}">
+        <p14:creationId xmlns:p14="http://schemas.microsoft.com/office/powerpoint/2010/main" val="804898301"/>
       </p:ext>
     </p:extLst>
   </p:cSld>

</xml_diff>

<commit_message>
update all lecture review presentations
</commit_message>
<xml_diff>
--- a/lectures/infrastructure-week-10.pptx
+++ b/lectures/infrastructure-week-10.pptx
@@ -46,9 +46,9 @@
     <p:sldId id="340" r:id="rId37"/>
     <p:sldId id="342" r:id="rId38"/>
     <p:sldId id="341" r:id="rId39"/>
-    <p:sldId id="343" r:id="rId40"/>
-    <p:sldId id="302" r:id="rId41"/>
-    <p:sldId id="303" r:id="rId42"/>
+    <p:sldId id="302" r:id="rId40"/>
+    <p:sldId id="303" r:id="rId41"/>
+    <p:sldId id="343" r:id="rId42"/>
   </p:sldIdLst>
   <p:sldSz cx="9144000" cy="6858000" type="screen4x3"/>
   <p:notesSz cx="6858000" cy="9144000"/>
@@ -4058,7 +4058,7 @@
           <a:p>
             <a:fld id="{2CB9420B-0DAF-E943-A682-96A9F2947B10}" type="slidenum">
               <a:rPr lang="en-US" smtClean="0"/>
-              <a:t>39</a:t>
+              <a:t>41</a:t>
             </a:fld>
             <a:endParaRPr lang="en-US"/>
           </a:p>
@@ -8846,20 +8846,38 @@
           <a:p>
             <a:r>
               <a:rPr lang="en-US" dirty="0"/>
-              <a:t>Deployment Pipelines</a:t>
-            </a:r>
-          </a:p>
-          <a:p>
-            <a:r>
-              <a:rPr lang="en-US" dirty="0"/>
-              <a:t>Jenkins</a:t>
-            </a:r>
-          </a:p>
-          <a:p>
-            <a:r>
-              <a:rPr lang="en-US" dirty="0"/>
-              <a:t>Pipeline-as-Code</a:t>
-            </a:r>
+              <a:t>Delivery Pipelines</a:t>
+            </a:r>
+          </a:p>
+          <a:p>
+            <a:r>
+              <a:rPr lang="en-US" dirty="0"/>
+              <a:t>AWS services</a:t>
+            </a:r>
+          </a:p>
+          <a:p>
+            <a:pPr lvl="1"/>
+            <a:r>
+              <a:rPr lang="en-US" dirty="0" err="1"/>
+              <a:t>CodeBuild</a:t>
+            </a:r>
+            <a:endParaRPr lang="en-US" dirty="0"/>
+          </a:p>
+          <a:p>
+            <a:pPr lvl="1"/>
+            <a:r>
+              <a:rPr lang="en-US" dirty="0" err="1"/>
+              <a:t>CodeDeploy</a:t>
+            </a:r>
+            <a:endParaRPr lang="en-US" dirty="0"/>
+          </a:p>
+          <a:p>
+            <a:pPr lvl="1"/>
+            <a:r>
+              <a:rPr lang="en-US"/>
+              <a:t>CodePipeline</a:t>
+            </a:r>
+            <a:endParaRPr lang="en-US" dirty="0"/>
           </a:p>
         </p:txBody>
       </p:sp>
@@ -12513,6 +12531,397 @@
           <a:lstStyle/>
           <a:p>
             <a:r>
+              <a:rPr lang="en-US" dirty="0"/>
+              <a:t>Infrastructure Pipelines</a:t>
+            </a:r>
+          </a:p>
+        </p:txBody>
+      </p:sp>
+      <p:sp>
+        <p:nvSpPr>
+          <p:cNvPr id="3" name="Content Placeholder 2"/>
+          <p:cNvSpPr>
+            <a:spLocks noGrp="1"/>
+          </p:cNvSpPr>
+          <p:nvPr>
+            <p:ph idx="1"/>
+          </p:nvPr>
+        </p:nvSpPr>
+        <p:spPr/>
+        <p:txBody>
+          <a:bodyPr>
+            <a:normAutofit fontScale="92500" lnSpcReduction="20000"/>
+          </a:bodyPr>
+          <a:lstStyle/>
+          <a:p>
+            <a:r>
+              <a:rPr lang="en-US" dirty="0"/>
+              <a:t>CI/CD pipelines aren’t just used to build software, we also use them to build infrastructure.</a:t>
+            </a:r>
+          </a:p>
+          <a:p>
+            <a:endParaRPr lang="en-US" dirty="0"/>
+          </a:p>
+          <a:p>
+            <a:r>
+              <a:rPr lang="en-US" dirty="0"/>
+              <a:t>Two general use cases:</a:t>
+            </a:r>
+          </a:p>
+          <a:p>
+            <a:endParaRPr lang="en-US" dirty="0"/>
+          </a:p>
+          <a:p>
+            <a:pPr lvl="1"/>
+            <a:r>
+              <a:rPr lang="en-US" dirty="0"/>
+              <a:t>Automate testing of our infrastructure.</a:t>
+            </a:r>
+          </a:p>
+          <a:p>
+            <a:pPr lvl="2"/>
+            <a:r>
+              <a:rPr lang="en-US" dirty="0"/>
+              <a:t>A change to a configuration management or infrastructure definition script triggers a pipeline.</a:t>
+            </a:r>
+          </a:p>
+          <a:p>
+            <a:pPr lvl="1"/>
+            <a:endParaRPr lang="en-US" dirty="0"/>
+          </a:p>
+          <a:p>
+            <a:pPr lvl="1"/>
+            <a:r>
+              <a:rPr lang="en-US" dirty="0"/>
+              <a:t>Automate deployment of infrastructure and our software.</a:t>
+            </a:r>
+          </a:p>
+        </p:txBody>
+      </p:sp>
+    </p:spTree>
+    <p:extLst>
+      <p:ext uri="{BB962C8B-B14F-4D97-AF65-F5344CB8AC3E}">
+        <p14:creationId xmlns:p14="http://schemas.microsoft.com/office/powerpoint/2010/main" val="219701665"/>
+      </p:ext>
+    </p:extLst>
+  </p:cSld>
+  <p:clrMapOvr>
+    <a:masterClrMapping/>
+  </p:clrMapOvr>
+</p:sld>
+</file>
+
+<file path=ppt/slides/slide4.xml><?xml version="1.0" encoding="utf-8"?>
+<p:sld xmlns:a="http://schemas.openxmlformats.org/drawingml/2006/main" xmlns:r="http://schemas.openxmlformats.org/officeDocument/2006/relationships" xmlns:p="http://schemas.openxmlformats.org/presentationml/2006/main">
+  <p:cSld>
+    <p:spTree>
+      <p:nvGrpSpPr>
+        <p:cNvPr id="1" name=""/>
+        <p:cNvGrpSpPr/>
+        <p:nvPr/>
+      </p:nvGrpSpPr>
+      <p:grpSpPr>
+        <a:xfrm>
+          <a:off x="0" y="0"/>
+          <a:ext cx="0" cy="0"/>
+          <a:chOff x="0" y="0"/>
+          <a:chExt cx="0" cy="0"/>
+        </a:xfrm>
+      </p:grpSpPr>
+      <p:sp>
+        <p:nvSpPr>
+          <p:cNvPr id="2" name="Title 1"/>
+          <p:cNvSpPr>
+            <a:spLocks noGrp="1"/>
+          </p:cNvSpPr>
+          <p:nvPr>
+            <p:ph type="title"/>
+          </p:nvPr>
+        </p:nvSpPr>
+        <p:spPr/>
+        <p:txBody>
+          <a:bodyPr/>
+          <a:lstStyle/>
+          <a:p>
+            <a:r>
+              <a:rPr lang="en-US" dirty="0"/>
+              <a:t>Pipeline Benefits</a:t>
+            </a:r>
+          </a:p>
+        </p:txBody>
+      </p:sp>
+      <p:sp>
+        <p:nvSpPr>
+          <p:cNvPr id="3" name="Content Placeholder 2"/>
+          <p:cNvSpPr>
+            <a:spLocks noGrp="1"/>
+          </p:cNvSpPr>
+          <p:nvPr>
+            <p:ph idx="1"/>
+          </p:nvPr>
+        </p:nvSpPr>
+        <p:spPr/>
+        <p:txBody>
+          <a:bodyPr>
+            <a:normAutofit fontScale="85000" lnSpcReduction="20000"/>
+          </a:bodyPr>
+          <a:lstStyle/>
+          <a:p>
+            <a:r>
+              <a:rPr lang="en-US" b="1" dirty="0"/>
+              <a:t>Software is automatically built and tested. </a:t>
+            </a:r>
+          </a:p>
+          <a:p>
+            <a:pPr lvl="1"/>
+            <a:r>
+              <a:rPr lang="en-US" dirty="0"/>
+              <a:t>Ready to go to production at any time.</a:t>
+            </a:r>
+          </a:p>
+          <a:p>
+            <a:endParaRPr lang="en-US" dirty="0"/>
+          </a:p>
+          <a:p>
+            <a:r>
+              <a:rPr lang="en-US" b="1" dirty="0"/>
+              <a:t>Making changes to software is much easier.</a:t>
+            </a:r>
+          </a:p>
+          <a:p>
+            <a:pPr lvl="1"/>
+            <a:r>
+              <a:rPr lang="en-US" dirty="0"/>
+              <a:t>Every change is tested the same way</a:t>
+            </a:r>
+          </a:p>
+          <a:p>
+            <a:pPr lvl="1"/>
+            <a:r>
+              <a:rPr lang="en-US" dirty="0"/>
+              <a:t>Easier to automatically deploy changes versus using manual methods</a:t>
+            </a:r>
+          </a:p>
+          <a:p>
+            <a:pPr lvl="1"/>
+            <a:r>
+              <a:rPr lang="en-US" dirty="0"/>
+              <a:t>Reinforces practice of using small batch sizes</a:t>
+            </a:r>
+          </a:p>
+          <a:p>
+            <a:pPr lvl="1"/>
+            <a:endParaRPr lang="en-US" dirty="0"/>
+          </a:p>
+          <a:p>
+            <a:r>
+              <a:rPr lang="en-US" b="1" dirty="0"/>
+              <a:t>Compliance and governance tasks are easier.</a:t>
+            </a:r>
+          </a:p>
+          <a:p>
+            <a:pPr lvl="1"/>
+            <a:r>
+              <a:rPr lang="en-US" dirty="0"/>
+              <a:t>Traceability improved and tests are enforced.</a:t>
+            </a:r>
+          </a:p>
+          <a:p>
+            <a:pPr lvl="1"/>
+            <a:r>
+              <a:rPr lang="en-US" dirty="0"/>
+              <a:t>Reduces need for heavy change control tasks.</a:t>
+            </a:r>
+          </a:p>
+          <a:p>
+            <a:pPr lvl="1"/>
+            <a:endParaRPr lang="en-US" dirty="0"/>
+          </a:p>
+        </p:txBody>
+      </p:sp>
+    </p:spTree>
+    <p:extLst>
+      <p:ext uri="{BB962C8B-B14F-4D97-AF65-F5344CB8AC3E}">
+        <p14:creationId xmlns:p14="http://schemas.microsoft.com/office/powerpoint/2010/main" val="645478110"/>
+      </p:ext>
+    </p:extLst>
+  </p:cSld>
+  <p:clrMapOvr>
+    <a:masterClrMapping/>
+  </p:clrMapOvr>
+</p:sld>
+</file>
+
+<file path=ppt/slides/slide40.xml><?xml version="1.0" encoding="utf-8"?>
+<p:sld xmlns:a="http://schemas.openxmlformats.org/drawingml/2006/main" xmlns:r="http://schemas.openxmlformats.org/officeDocument/2006/relationships" xmlns:p="http://schemas.openxmlformats.org/presentationml/2006/main">
+  <p:cSld>
+    <p:spTree>
+      <p:nvGrpSpPr>
+        <p:cNvPr id="1" name=""/>
+        <p:cNvGrpSpPr/>
+        <p:nvPr/>
+      </p:nvGrpSpPr>
+      <p:grpSpPr>
+        <a:xfrm>
+          <a:off x="0" y="0"/>
+          <a:ext cx="0" cy="0"/>
+          <a:chOff x="0" y="0"/>
+          <a:chExt cx="0" cy="0"/>
+        </a:xfrm>
+      </p:grpSpPr>
+      <p:sp>
+        <p:nvSpPr>
+          <p:cNvPr id="2" name="Title 1"/>
+          <p:cNvSpPr>
+            <a:spLocks noGrp="1"/>
+          </p:cNvSpPr>
+          <p:nvPr>
+            <p:ph type="title"/>
+          </p:nvPr>
+        </p:nvSpPr>
+        <p:spPr/>
+        <p:txBody>
+          <a:bodyPr/>
+          <a:lstStyle/>
+          <a:p>
+            <a:r>
+              <a:rPr lang="en-US" dirty="0"/>
+              <a:t>Infrastructure Pipeline</a:t>
+            </a:r>
+          </a:p>
+        </p:txBody>
+      </p:sp>
+      <p:sp>
+        <p:nvSpPr>
+          <p:cNvPr id="3" name="Content Placeholder 2"/>
+          <p:cNvSpPr>
+            <a:spLocks noGrp="1"/>
+          </p:cNvSpPr>
+          <p:nvPr>
+            <p:ph idx="1"/>
+          </p:nvPr>
+        </p:nvSpPr>
+        <p:spPr/>
+        <p:txBody>
+          <a:bodyPr>
+            <a:normAutofit fontScale="77500" lnSpcReduction="20000"/>
+          </a:bodyPr>
+          <a:lstStyle/>
+          <a:p>
+            <a:r>
+              <a:rPr lang="en-US" dirty="0"/>
+              <a:t>CloudFormation template pipeline example:</a:t>
+            </a:r>
+          </a:p>
+          <a:p>
+            <a:endParaRPr lang="en-US" dirty="0"/>
+          </a:p>
+          <a:p>
+            <a:pPr lvl="1"/>
+            <a:r>
+              <a:rPr lang="en-US" dirty="0"/>
+              <a:t>Lint CloudFormation template to validate syntax</a:t>
+            </a:r>
+          </a:p>
+          <a:p>
+            <a:pPr lvl="1"/>
+            <a:endParaRPr lang="en-US" dirty="0"/>
+          </a:p>
+          <a:p>
+            <a:pPr lvl="1"/>
+            <a:r>
+              <a:rPr lang="en-US" dirty="0"/>
+              <a:t>Deploy CloudFormation template</a:t>
+            </a:r>
+          </a:p>
+          <a:p>
+            <a:pPr lvl="2"/>
+            <a:r>
+              <a:rPr lang="en-US" dirty="0"/>
+              <a:t>Wait for AWS resources to be built</a:t>
+            </a:r>
+          </a:p>
+          <a:p>
+            <a:pPr lvl="2"/>
+            <a:endParaRPr lang="en-US" dirty="0"/>
+          </a:p>
+          <a:p>
+            <a:pPr lvl="1"/>
+            <a:r>
+              <a:rPr lang="en-US" dirty="0"/>
+              <a:t>Test AWS resources to verify that required resources are installed and working properly</a:t>
+            </a:r>
+          </a:p>
+          <a:p>
+            <a:pPr lvl="1"/>
+            <a:endParaRPr lang="en-US" dirty="0"/>
+          </a:p>
+          <a:p>
+            <a:pPr lvl="1"/>
+            <a:r>
+              <a:rPr lang="en-US" dirty="0"/>
+              <a:t>Terminate AWS resources</a:t>
+            </a:r>
+          </a:p>
+          <a:p>
+            <a:pPr lvl="1"/>
+            <a:endParaRPr lang="en-US" dirty="0"/>
+          </a:p>
+          <a:p>
+            <a:pPr lvl="1"/>
+            <a:r>
+              <a:rPr lang="en-US" dirty="0"/>
+              <a:t>Publish new template</a:t>
+            </a:r>
+          </a:p>
+        </p:txBody>
+      </p:sp>
+    </p:spTree>
+    <p:extLst>
+      <p:ext uri="{BB962C8B-B14F-4D97-AF65-F5344CB8AC3E}">
+        <p14:creationId xmlns:p14="http://schemas.microsoft.com/office/powerpoint/2010/main" val="804898301"/>
+      </p:ext>
+    </p:extLst>
+  </p:cSld>
+  <p:clrMapOvr>
+    <a:masterClrMapping/>
+  </p:clrMapOvr>
+</p:sld>
+</file>
+
+<file path=ppt/slides/slide41.xml><?xml version="1.0" encoding="utf-8"?>
+<p:sld xmlns:a="http://schemas.openxmlformats.org/drawingml/2006/main" xmlns:r="http://schemas.openxmlformats.org/officeDocument/2006/relationships" xmlns:p="http://schemas.openxmlformats.org/presentationml/2006/main">
+  <p:cSld>
+    <p:spTree>
+      <p:nvGrpSpPr>
+        <p:cNvPr id="1" name=""/>
+        <p:cNvGrpSpPr/>
+        <p:nvPr/>
+      </p:nvGrpSpPr>
+      <p:grpSpPr>
+        <a:xfrm>
+          <a:off x="0" y="0"/>
+          <a:ext cx="0" cy="0"/>
+          <a:chOff x="0" y="0"/>
+          <a:chExt cx="0" cy="0"/>
+        </a:xfrm>
+      </p:grpSpPr>
+      <p:sp>
+        <p:nvSpPr>
+          <p:cNvPr id="2" name="Title 1"/>
+          <p:cNvSpPr>
+            <a:spLocks noGrp="1"/>
+          </p:cNvSpPr>
+          <p:nvPr>
+            <p:ph type="title"/>
+          </p:nvPr>
+        </p:nvSpPr>
+        <p:spPr/>
+        <p:txBody>
+          <a:bodyPr/>
+          <a:lstStyle/>
+          <a:p>
+            <a:r>
               <a:rPr lang="en-US" dirty="0" err="1"/>
               <a:t>CodePipeline</a:t>
             </a:r>
@@ -12541,11 +12950,113 @@
         </p:spPr>
         <p:txBody>
           <a:bodyPr>
-            <a:normAutofit/>
+            <a:normAutofit fontScale="70000" lnSpcReduction="20000"/>
           </a:bodyPr>
           <a:lstStyle/>
           <a:p>
+            <a:r>
+              <a:rPr lang="en-US" dirty="0"/>
+              <a:t>Create GitHub personal access token</a:t>
+            </a:r>
+          </a:p>
+          <a:p>
             <a:endParaRPr lang="en-US" dirty="0"/>
+          </a:p>
+          <a:p>
+            <a:r>
+              <a:rPr lang="en-US" dirty="0"/>
+              <a:t>Fork python-project repository:</a:t>
+            </a:r>
+          </a:p>
+          <a:p>
+            <a:pPr lvl="1"/>
+            <a:r>
+              <a:rPr lang="en-US" dirty="0"/>
+              <a:t>https://</a:t>
+            </a:r>
+            <a:r>
+              <a:rPr lang="en-US" dirty="0" err="1"/>
+              <a:t>github.com</a:t>
+            </a:r>
+            <a:r>
+              <a:rPr lang="en-US" dirty="0"/>
+              <a:t>/seis665/python-project</a:t>
+            </a:r>
+          </a:p>
+          <a:p>
+            <a:endParaRPr lang="en-US" dirty="0"/>
+          </a:p>
+          <a:p>
+            <a:r>
+              <a:rPr lang="en-US" dirty="0"/>
+              <a:t>Review changes to </a:t>
+            </a:r>
+            <a:r>
+              <a:rPr lang="en-US" dirty="0" err="1"/>
+              <a:t>CodeBuild</a:t>
+            </a:r>
+            <a:r>
+              <a:rPr lang="en-US" dirty="0"/>
+              <a:t> template code</a:t>
+            </a:r>
+          </a:p>
+          <a:p>
+            <a:pPr lvl="1"/>
+            <a:r>
+              <a:rPr lang="en-US" dirty="0"/>
+              <a:t>Source and Artifacts are managed by </a:t>
+            </a:r>
+            <a:r>
+              <a:rPr lang="en-US" dirty="0" err="1"/>
+              <a:t>CodePipeline</a:t>
+            </a:r>
+            <a:endParaRPr lang="en-US" dirty="0"/>
+          </a:p>
+          <a:p>
+            <a:endParaRPr lang="en-US" dirty="0"/>
+          </a:p>
+          <a:p>
+            <a:r>
+              <a:rPr lang="en-US" dirty="0"/>
+              <a:t>Deploy </a:t>
+            </a:r>
+            <a:r>
+              <a:rPr lang="en-US" dirty="0" err="1"/>
+              <a:t>CodePipeline</a:t>
+            </a:r>
+            <a:r>
+              <a:rPr lang="en-US" dirty="0"/>
+              <a:t> template</a:t>
+            </a:r>
+          </a:p>
+          <a:p>
+            <a:pPr lvl="1"/>
+            <a:r>
+              <a:rPr lang="en-US" dirty="0"/>
+              <a:t>https://seis665.s3.amazonaws.com/app-</a:t>
+            </a:r>
+            <a:r>
+              <a:rPr lang="en-US" dirty="0" err="1"/>
+              <a:t>codepipeline</a:t>
+            </a:r>
+            <a:r>
+              <a:rPr lang="en-US" dirty="0"/>
+              <a:t>-</a:t>
+            </a:r>
+            <a:r>
+              <a:rPr lang="en-US" dirty="0" err="1"/>
+              <a:t>template.json</a:t>
+            </a:r>
+            <a:endParaRPr lang="en-US" dirty="0"/>
+          </a:p>
+          <a:p>
+            <a:endParaRPr lang="en-US" dirty="0"/>
+          </a:p>
+          <a:p>
+            <a:r>
+              <a:rPr lang="en-US" dirty="0"/>
+              <a:t>Watch pipeline execute stages and test application deployment.</a:t>
+            </a:r>
           </a:p>
         </p:txBody>
       </p:sp>
@@ -12583,397 +13094,6 @@
     <p:extLst>
       <p:ext uri="{BB962C8B-B14F-4D97-AF65-F5344CB8AC3E}">
         <p14:creationId xmlns:p14="http://schemas.microsoft.com/office/powerpoint/2010/main" val="1783639349"/>
-      </p:ext>
-    </p:extLst>
-  </p:cSld>
-  <p:clrMapOvr>
-    <a:masterClrMapping/>
-  </p:clrMapOvr>
-</p:sld>
-</file>
-
-<file path=ppt/slides/slide4.xml><?xml version="1.0" encoding="utf-8"?>
-<p:sld xmlns:a="http://schemas.openxmlformats.org/drawingml/2006/main" xmlns:r="http://schemas.openxmlformats.org/officeDocument/2006/relationships" xmlns:p="http://schemas.openxmlformats.org/presentationml/2006/main">
-  <p:cSld>
-    <p:spTree>
-      <p:nvGrpSpPr>
-        <p:cNvPr id="1" name=""/>
-        <p:cNvGrpSpPr/>
-        <p:nvPr/>
-      </p:nvGrpSpPr>
-      <p:grpSpPr>
-        <a:xfrm>
-          <a:off x="0" y="0"/>
-          <a:ext cx="0" cy="0"/>
-          <a:chOff x="0" y="0"/>
-          <a:chExt cx="0" cy="0"/>
-        </a:xfrm>
-      </p:grpSpPr>
-      <p:sp>
-        <p:nvSpPr>
-          <p:cNvPr id="2" name="Title 1"/>
-          <p:cNvSpPr>
-            <a:spLocks noGrp="1"/>
-          </p:cNvSpPr>
-          <p:nvPr>
-            <p:ph type="title"/>
-          </p:nvPr>
-        </p:nvSpPr>
-        <p:spPr/>
-        <p:txBody>
-          <a:bodyPr/>
-          <a:lstStyle/>
-          <a:p>
-            <a:r>
-              <a:rPr lang="en-US" dirty="0"/>
-              <a:t>Pipeline Benefits</a:t>
-            </a:r>
-          </a:p>
-        </p:txBody>
-      </p:sp>
-      <p:sp>
-        <p:nvSpPr>
-          <p:cNvPr id="3" name="Content Placeholder 2"/>
-          <p:cNvSpPr>
-            <a:spLocks noGrp="1"/>
-          </p:cNvSpPr>
-          <p:nvPr>
-            <p:ph idx="1"/>
-          </p:nvPr>
-        </p:nvSpPr>
-        <p:spPr/>
-        <p:txBody>
-          <a:bodyPr>
-            <a:normAutofit fontScale="85000" lnSpcReduction="20000"/>
-          </a:bodyPr>
-          <a:lstStyle/>
-          <a:p>
-            <a:r>
-              <a:rPr lang="en-US" b="1" dirty="0"/>
-              <a:t>Software is automatically built and tested. </a:t>
-            </a:r>
-          </a:p>
-          <a:p>
-            <a:pPr lvl="1"/>
-            <a:r>
-              <a:rPr lang="en-US" dirty="0"/>
-              <a:t>Ready to go to production at any time.</a:t>
-            </a:r>
-          </a:p>
-          <a:p>
-            <a:endParaRPr lang="en-US" dirty="0"/>
-          </a:p>
-          <a:p>
-            <a:r>
-              <a:rPr lang="en-US" b="1" dirty="0"/>
-              <a:t>Making changes to software is much easier.</a:t>
-            </a:r>
-          </a:p>
-          <a:p>
-            <a:pPr lvl="1"/>
-            <a:r>
-              <a:rPr lang="en-US" dirty="0"/>
-              <a:t>Every change is tested the same way</a:t>
-            </a:r>
-          </a:p>
-          <a:p>
-            <a:pPr lvl="1"/>
-            <a:r>
-              <a:rPr lang="en-US" dirty="0"/>
-              <a:t>Easier to automatically deploy changes versus using manual methods</a:t>
-            </a:r>
-          </a:p>
-          <a:p>
-            <a:pPr lvl="1"/>
-            <a:r>
-              <a:rPr lang="en-US" dirty="0"/>
-              <a:t>Reinforces practice of using small batch sizes</a:t>
-            </a:r>
-          </a:p>
-          <a:p>
-            <a:pPr lvl="1"/>
-            <a:endParaRPr lang="en-US" dirty="0"/>
-          </a:p>
-          <a:p>
-            <a:r>
-              <a:rPr lang="en-US" b="1" dirty="0"/>
-              <a:t>Compliance and governance tasks are easier.</a:t>
-            </a:r>
-          </a:p>
-          <a:p>
-            <a:pPr lvl="1"/>
-            <a:r>
-              <a:rPr lang="en-US" dirty="0"/>
-              <a:t>Traceability improved and tests are enforced.</a:t>
-            </a:r>
-          </a:p>
-          <a:p>
-            <a:pPr lvl="1"/>
-            <a:r>
-              <a:rPr lang="en-US" dirty="0"/>
-              <a:t>Reduces need for heavy change control tasks.</a:t>
-            </a:r>
-          </a:p>
-          <a:p>
-            <a:pPr lvl="1"/>
-            <a:endParaRPr lang="en-US" dirty="0"/>
-          </a:p>
-        </p:txBody>
-      </p:sp>
-    </p:spTree>
-    <p:extLst>
-      <p:ext uri="{BB962C8B-B14F-4D97-AF65-F5344CB8AC3E}">
-        <p14:creationId xmlns:p14="http://schemas.microsoft.com/office/powerpoint/2010/main" val="645478110"/>
-      </p:ext>
-    </p:extLst>
-  </p:cSld>
-  <p:clrMapOvr>
-    <a:masterClrMapping/>
-  </p:clrMapOvr>
-</p:sld>
-</file>
-
-<file path=ppt/slides/slide40.xml><?xml version="1.0" encoding="utf-8"?>
-<p:sld xmlns:a="http://schemas.openxmlformats.org/drawingml/2006/main" xmlns:r="http://schemas.openxmlformats.org/officeDocument/2006/relationships" xmlns:p="http://schemas.openxmlformats.org/presentationml/2006/main">
-  <p:cSld>
-    <p:spTree>
-      <p:nvGrpSpPr>
-        <p:cNvPr id="1" name=""/>
-        <p:cNvGrpSpPr/>
-        <p:nvPr/>
-      </p:nvGrpSpPr>
-      <p:grpSpPr>
-        <a:xfrm>
-          <a:off x="0" y="0"/>
-          <a:ext cx="0" cy="0"/>
-          <a:chOff x="0" y="0"/>
-          <a:chExt cx="0" cy="0"/>
-        </a:xfrm>
-      </p:grpSpPr>
-      <p:sp>
-        <p:nvSpPr>
-          <p:cNvPr id="2" name="Title 1"/>
-          <p:cNvSpPr>
-            <a:spLocks noGrp="1"/>
-          </p:cNvSpPr>
-          <p:nvPr>
-            <p:ph type="title"/>
-          </p:nvPr>
-        </p:nvSpPr>
-        <p:spPr/>
-        <p:txBody>
-          <a:bodyPr/>
-          <a:lstStyle/>
-          <a:p>
-            <a:r>
-              <a:rPr lang="en-US" dirty="0"/>
-              <a:t>Infrastructure Pipelines</a:t>
-            </a:r>
-          </a:p>
-        </p:txBody>
-      </p:sp>
-      <p:sp>
-        <p:nvSpPr>
-          <p:cNvPr id="3" name="Content Placeholder 2"/>
-          <p:cNvSpPr>
-            <a:spLocks noGrp="1"/>
-          </p:cNvSpPr>
-          <p:nvPr>
-            <p:ph idx="1"/>
-          </p:nvPr>
-        </p:nvSpPr>
-        <p:spPr/>
-        <p:txBody>
-          <a:bodyPr>
-            <a:normAutofit fontScale="92500" lnSpcReduction="20000"/>
-          </a:bodyPr>
-          <a:lstStyle/>
-          <a:p>
-            <a:r>
-              <a:rPr lang="en-US" dirty="0"/>
-              <a:t>CI/CD pipelines aren’t just used to build software, we also use them to build infrastructure.</a:t>
-            </a:r>
-          </a:p>
-          <a:p>
-            <a:endParaRPr lang="en-US" dirty="0"/>
-          </a:p>
-          <a:p>
-            <a:r>
-              <a:rPr lang="en-US" dirty="0"/>
-              <a:t>Two general use cases:</a:t>
-            </a:r>
-          </a:p>
-          <a:p>
-            <a:endParaRPr lang="en-US" dirty="0"/>
-          </a:p>
-          <a:p>
-            <a:pPr lvl="1"/>
-            <a:r>
-              <a:rPr lang="en-US" dirty="0"/>
-              <a:t>Automate testing of our infrastructure.</a:t>
-            </a:r>
-          </a:p>
-          <a:p>
-            <a:pPr lvl="2"/>
-            <a:r>
-              <a:rPr lang="en-US" dirty="0"/>
-              <a:t>A change to a configuration management or infrastructure definition script triggers a pipeline.</a:t>
-            </a:r>
-          </a:p>
-          <a:p>
-            <a:pPr lvl="1"/>
-            <a:endParaRPr lang="en-US" dirty="0"/>
-          </a:p>
-          <a:p>
-            <a:pPr lvl="1"/>
-            <a:r>
-              <a:rPr lang="en-US" dirty="0"/>
-              <a:t>Automate deployment of infrastructure and our software.</a:t>
-            </a:r>
-          </a:p>
-        </p:txBody>
-      </p:sp>
-    </p:spTree>
-    <p:extLst>
-      <p:ext uri="{BB962C8B-B14F-4D97-AF65-F5344CB8AC3E}">
-        <p14:creationId xmlns:p14="http://schemas.microsoft.com/office/powerpoint/2010/main" val="219701665"/>
-      </p:ext>
-    </p:extLst>
-  </p:cSld>
-  <p:clrMapOvr>
-    <a:masterClrMapping/>
-  </p:clrMapOvr>
-</p:sld>
-</file>
-
-<file path=ppt/slides/slide41.xml><?xml version="1.0" encoding="utf-8"?>
-<p:sld xmlns:a="http://schemas.openxmlformats.org/drawingml/2006/main" xmlns:r="http://schemas.openxmlformats.org/officeDocument/2006/relationships" xmlns:p="http://schemas.openxmlformats.org/presentationml/2006/main">
-  <p:cSld>
-    <p:spTree>
-      <p:nvGrpSpPr>
-        <p:cNvPr id="1" name=""/>
-        <p:cNvGrpSpPr/>
-        <p:nvPr/>
-      </p:nvGrpSpPr>
-      <p:grpSpPr>
-        <a:xfrm>
-          <a:off x="0" y="0"/>
-          <a:ext cx="0" cy="0"/>
-          <a:chOff x="0" y="0"/>
-          <a:chExt cx="0" cy="0"/>
-        </a:xfrm>
-      </p:grpSpPr>
-      <p:sp>
-        <p:nvSpPr>
-          <p:cNvPr id="2" name="Title 1"/>
-          <p:cNvSpPr>
-            <a:spLocks noGrp="1"/>
-          </p:cNvSpPr>
-          <p:nvPr>
-            <p:ph type="title"/>
-          </p:nvPr>
-        </p:nvSpPr>
-        <p:spPr/>
-        <p:txBody>
-          <a:bodyPr/>
-          <a:lstStyle/>
-          <a:p>
-            <a:r>
-              <a:rPr lang="en-US" dirty="0"/>
-              <a:t>Infrastructure Pipeline</a:t>
-            </a:r>
-          </a:p>
-        </p:txBody>
-      </p:sp>
-      <p:sp>
-        <p:nvSpPr>
-          <p:cNvPr id="3" name="Content Placeholder 2"/>
-          <p:cNvSpPr>
-            <a:spLocks noGrp="1"/>
-          </p:cNvSpPr>
-          <p:nvPr>
-            <p:ph idx="1"/>
-          </p:nvPr>
-        </p:nvSpPr>
-        <p:spPr/>
-        <p:txBody>
-          <a:bodyPr>
-            <a:normAutofit fontScale="77500" lnSpcReduction="20000"/>
-          </a:bodyPr>
-          <a:lstStyle/>
-          <a:p>
-            <a:r>
-              <a:rPr lang="en-US" dirty="0"/>
-              <a:t>CloudFormation template pipeline example:</a:t>
-            </a:r>
-          </a:p>
-          <a:p>
-            <a:endParaRPr lang="en-US" dirty="0"/>
-          </a:p>
-          <a:p>
-            <a:pPr lvl="1"/>
-            <a:r>
-              <a:rPr lang="en-US" dirty="0"/>
-              <a:t>Lint CloudFormation template to validate syntax</a:t>
-            </a:r>
-          </a:p>
-          <a:p>
-            <a:pPr lvl="1"/>
-            <a:endParaRPr lang="en-US" dirty="0"/>
-          </a:p>
-          <a:p>
-            <a:pPr lvl="1"/>
-            <a:r>
-              <a:rPr lang="en-US" dirty="0"/>
-              <a:t>Deploy CloudFormation template</a:t>
-            </a:r>
-          </a:p>
-          <a:p>
-            <a:pPr lvl="2"/>
-            <a:r>
-              <a:rPr lang="en-US" dirty="0"/>
-              <a:t>Wait for AWS resources to be built</a:t>
-            </a:r>
-          </a:p>
-          <a:p>
-            <a:pPr lvl="2"/>
-            <a:endParaRPr lang="en-US" dirty="0"/>
-          </a:p>
-          <a:p>
-            <a:pPr lvl="1"/>
-            <a:r>
-              <a:rPr lang="en-US" dirty="0"/>
-              <a:t>Test AWS resources to verify that required resources are installed and working properly</a:t>
-            </a:r>
-          </a:p>
-          <a:p>
-            <a:pPr lvl="1"/>
-            <a:endParaRPr lang="en-US" dirty="0"/>
-          </a:p>
-          <a:p>
-            <a:pPr lvl="1"/>
-            <a:r>
-              <a:rPr lang="en-US" dirty="0"/>
-              <a:t>Terminate AWS resources</a:t>
-            </a:r>
-          </a:p>
-          <a:p>
-            <a:pPr lvl="1"/>
-            <a:endParaRPr lang="en-US" dirty="0"/>
-          </a:p>
-          <a:p>
-            <a:pPr lvl="1"/>
-            <a:r>
-              <a:rPr lang="en-US" dirty="0"/>
-              <a:t>Publish new template</a:t>
-            </a:r>
-          </a:p>
-        </p:txBody>
-      </p:sp>
-    </p:spTree>
-    <p:extLst>
-      <p:ext uri="{BB962C8B-B14F-4D97-AF65-F5344CB8AC3E}">
-        <p14:creationId xmlns:p14="http://schemas.microsoft.com/office/powerpoint/2010/main" val="804898301"/>
       </p:ext>
     </p:extLst>
   </p:cSld>

</xml_diff>

<commit_message>
update template to support new build options
</commit_message>
<xml_diff>
--- a/lectures/infrastructure-week-10.pptx
+++ b/lectures/infrastructure-week-10.pptx
@@ -161,6 +161,9 @@
           </p15:clr>
         </p15:guide>
       </p15:sldGuideLst>
+    </p:ext>
+    <p:ext uri="{2D200454-40CA-4A62-9FC3-DE9A4176ACB9}">
+      <p15:notesGuideLst xmlns:p15="http://schemas.microsoft.com/office/powerpoint/2012/main"/>
     </p:ext>
   </p:extLst>
 </p:presentation>
@@ -3157,7 +3160,7 @@
           <a:p>
             <a:fld id="{EAA08BAD-04ED-244C-92B6-E3671520D864}" type="datetimeFigureOut">
               <a:rPr lang="en-US" smtClean="0"/>
-              <a:t>7/9/19</a:t>
+              <a:t>7/20/19</a:t>
             </a:fld>
             <a:endParaRPr lang="en-US"/>
           </a:p>
@@ -4256,7 +4259,7 @@
           <a:p>
             <a:fld id="{972605B8-2E90-124E-924E-6F58993143C6}" type="datetimeFigureOut">
               <a:rPr lang="en-US" smtClean="0"/>
-              <a:t>7/9/19</a:t>
+              <a:t>7/20/19</a:t>
             </a:fld>
             <a:endParaRPr lang="en-US"/>
           </a:p>
@@ -4424,7 +4427,7 @@
           <a:p>
             <a:fld id="{972605B8-2E90-124E-924E-6F58993143C6}" type="datetimeFigureOut">
               <a:rPr lang="en-US" smtClean="0"/>
-              <a:t>7/9/19</a:t>
+              <a:t>7/20/19</a:t>
             </a:fld>
             <a:endParaRPr lang="en-US"/>
           </a:p>
@@ -4602,7 +4605,7 @@
           <a:p>
             <a:fld id="{972605B8-2E90-124E-924E-6F58993143C6}" type="datetimeFigureOut">
               <a:rPr lang="en-US" smtClean="0"/>
-              <a:t>7/9/19</a:t>
+              <a:t>7/20/19</a:t>
             </a:fld>
             <a:endParaRPr lang="en-US"/>
           </a:p>
@@ -4770,7 +4773,7 @@
           <a:p>
             <a:fld id="{972605B8-2E90-124E-924E-6F58993143C6}" type="datetimeFigureOut">
               <a:rPr lang="en-US" smtClean="0"/>
-              <a:t>7/9/19</a:t>
+              <a:t>7/20/19</a:t>
             </a:fld>
             <a:endParaRPr lang="en-US"/>
           </a:p>
@@ -5015,7 +5018,7 @@
           <a:p>
             <a:fld id="{972605B8-2E90-124E-924E-6F58993143C6}" type="datetimeFigureOut">
               <a:rPr lang="en-US" smtClean="0"/>
-              <a:t>7/9/19</a:t>
+              <a:t>7/20/19</a:t>
             </a:fld>
             <a:endParaRPr lang="en-US"/>
           </a:p>
@@ -5300,7 +5303,7 @@
           <a:p>
             <a:fld id="{972605B8-2E90-124E-924E-6F58993143C6}" type="datetimeFigureOut">
               <a:rPr lang="en-US" smtClean="0"/>
-              <a:t>7/9/19</a:t>
+              <a:t>7/20/19</a:t>
             </a:fld>
             <a:endParaRPr lang="en-US"/>
           </a:p>
@@ -5719,7 +5722,7 @@
           <a:p>
             <a:fld id="{972605B8-2E90-124E-924E-6F58993143C6}" type="datetimeFigureOut">
               <a:rPr lang="en-US" smtClean="0"/>
-              <a:t>7/9/19</a:t>
+              <a:t>7/20/19</a:t>
             </a:fld>
             <a:endParaRPr lang="en-US"/>
           </a:p>
@@ -5836,7 +5839,7 @@
           <a:p>
             <a:fld id="{972605B8-2E90-124E-924E-6F58993143C6}" type="datetimeFigureOut">
               <a:rPr lang="en-US" smtClean="0"/>
-              <a:t>7/9/19</a:t>
+              <a:t>7/20/19</a:t>
             </a:fld>
             <a:endParaRPr lang="en-US"/>
           </a:p>
@@ -5931,7 +5934,7 @@
           <a:p>
             <a:fld id="{972605B8-2E90-124E-924E-6F58993143C6}" type="datetimeFigureOut">
               <a:rPr lang="en-US" smtClean="0"/>
-              <a:t>7/9/19</a:t>
+              <a:t>7/20/19</a:t>
             </a:fld>
             <a:endParaRPr lang="en-US"/>
           </a:p>
@@ -6206,7 +6209,7 @@
           <a:p>
             <a:fld id="{972605B8-2E90-124E-924E-6F58993143C6}" type="datetimeFigureOut">
               <a:rPr lang="en-US" smtClean="0"/>
-              <a:t>7/9/19</a:t>
+              <a:t>7/20/19</a:t>
             </a:fld>
             <a:endParaRPr lang="en-US"/>
           </a:p>
@@ -6458,7 +6461,7 @@
           <a:p>
             <a:fld id="{972605B8-2E90-124E-924E-6F58993143C6}" type="datetimeFigureOut">
               <a:rPr lang="en-US" smtClean="0"/>
-              <a:t>7/9/19</a:t>
+              <a:t>7/20/19</a:t>
             </a:fld>
             <a:endParaRPr lang="en-US"/>
           </a:p>
@@ -6669,7 +6672,7 @@
           <a:p>
             <a:fld id="{972605B8-2E90-124E-924E-6F58993143C6}" type="datetimeFigureOut">
               <a:rPr lang="en-US" smtClean="0"/>
-              <a:t>7/9/19</a:t>
+              <a:t>7/20/19</a:t>
             </a:fld>
             <a:endParaRPr lang="en-US"/>
           </a:p>
@@ -10478,6 +10481,42 @@
           </a:p>
         </p:txBody>
       </p:sp>
+      <p:pic>
+        <p:nvPicPr>
+          <p:cNvPr id="6" name="Graphic 5">
+            <a:extLst>
+              <a:ext uri="{FF2B5EF4-FFF2-40B4-BE49-F238E27FC236}">
+                <a16:creationId xmlns:a16="http://schemas.microsoft.com/office/drawing/2014/main" id="{11C88377-D4E9-B746-9A3A-1075140371F5}"/>
+              </a:ext>
+            </a:extLst>
+          </p:cNvPr>
+          <p:cNvPicPr>
+            <a:picLocks noChangeAspect="1"/>
+          </p:cNvPicPr>
+          <p:nvPr/>
+        </p:nvPicPr>
+        <p:blipFill>
+          <a:blip r:embed="rId2">
+            <a:extLst>
+              <a:ext uri="{96DAC541-7B7A-43D3-8B79-37D633B846F1}">
+                <asvg:svgBlip xmlns:asvg="http://schemas.microsoft.com/office/drawing/2016/SVG/main" r:embed="rId3"/>
+              </a:ext>
+            </a:extLst>
+          </a:blip>
+          <a:stretch>
+            <a:fillRect/>
+          </a:stretch>
+        </p:blipFill>
+        <p:spPr>
+          <a:xfrm>
+            <a:off x="7750736" y="370738"/>
+            <a:ext cx="1046900" cy="1046900"/>
+          </a:xfrm>
+          <a:prstGeom prst="rect">
+            <a:avLst/>
+          </a:prstGeom>
+        </p:spPr>
+      </p:pic>
     </p:spTree>
     <p:extLst>
       <p:ext uri="{BB962C8B-B14F-4D97-AF65-F5344CB8AC3E}">
@@ -11984,6 +12023,42 @@
           </a:p>
         </p:txBody>
       </p:sp>
+      <p:pic>
+        <p:nvPicPr>
+          <p:cNvPr id="4" name="Graphic 3">
+            <a:extLst>
+              <a:ext uri="{FF2B5EF4-FFF2-40B4-BE49-F238E27FC236}">
+                <a16:creationId xmlns:a16="http://schemas.microsoft.com/office/drawing/2014/main" id="{956467BF-53BB-5647-AE39-F63677D733F3}"/>
+              </a:ext>
+            </a:extLst>
+          </p:cNvPr>
+          <p:cNvPicPr>
+            <a:picLocks noChangeAspect="1"/>
+          </p:cNvPicPr>
+          <p:nvPr/>
+        </p:nvPicPr>
+        <p:blipFill>
+          <a:blip r:embed="rId2">
+            <a:extLst>
+              <a:ext uri="{96DAC541-7B7A-43D3-8B79-37D633B846F1}">
+                <asvg:svgBlip xmlns:asvg="http://schemas.microsoft.com/office/drawing/2016/SVG/main" r:embed="rId3"/>
+              </a:ext>
+            </a:extLst>
+          </a:blip>
+          <a:stretch>
+            <a:fillRect/>
+          </a:stretch>
+        </p:blipFill>
+        <p:spPr>
+          <a:xfrm>
+            <a:off x="7712150" y="358813"/>
+            <a:ext cx="974650" cy="974650"/>
+          </a:xfrm>
+          <a:prstGeom prst="rect">
+            <a:avLst/>
+          </a:prstGeom>
+        </p:spPr>
+      </p:pic>
     </p:spTree>
     <p:extLst>
       <p:ext uri="{BB962C8B-B14F-4D97-AF65-F5344CB8AC3E}">

</xml_diff>

<commit_message>
Update content for fall 2020 class
</commit_message>
<xml_diff>
--- a/lectures/infrastructure-week-10.pptx
+++ b/lectures/infrastructure-week-10.pptx
@@ -3160,7 +3160,7 @@
           <a:p>
             <a:fld id="{EAA08BAD-04ED-244C-92B6-E3671520D864}" type="datetimeFigureOut">
               <a:rPr lang="en-US" smtClean="0"/>
-              <a:t>11/2/19</a:t>
+              <a:t>8/10/20</a:t>
             </a:fld>
             <a:endParaRPr lang="en-US"/>
           </a:p>
@@ -4259,7 +4259,7 @@
           <a:p>
             <a:fld id="{972605B8-2E90-124E-924E-6F58993143C6}" type="datetimeFigureOut">
               <a:rPr lang="en-US" smtClean="0"/>
-              <a:t>11/2/19</a:t>
+              <a:t>8/10/20</a:t>
             </a:fld>
             <a:endParaRPr lang="en-US"/>
           </a:p>
@@ -4427,7 +4427,7 @@
           <a:p>
             <a:fld id="{972605B8-2E90-124E-924E-6F58993143C6}" type="datetimeFigureOut">
               <a:rPr lang="en-US" smtClean="0"/>
-              <a:t>11/2/19</a:t>
+              <a:t>8/10/20</a:t>
             </a:fld>
             <a:endParaRPr lang="en-US"/>
           </a:p>
@@ -4605,7 +4605,7 @@
           <a:p>
             <a:fld id="{972605B8-2E90-124E-924E-6F58993143C6}" type="datetimeFigureOut">
               <a:rPr lang="en-US" smtClean="0"/>
-              <a:t>11/2/19</a:t>
+              <a:t>8/10/20</a:t>
             </a:fld>
             <a:endParaRPr lang="en-US"/>
           </a:p>
@@ -4773,7 +4773,7 @@
           <a:p>
             <a:fld id="{972605B8-2E90-124E-924E-6F58993143C6}" type="datetimeFigureOut">
               <a:rPr lang="en-US" smtClean="0"/>
-              <a:t>11/2/19</a:t>
+              <a:t>8/10/20</a:t>
             </a:fld>
             <a:endParaRPr lang="en-US"/>
           </a:p>
@@ -5018,7 +5018,7 @@
           <a:p>
             <a:fld id="{972605B8-2E90-124E-924E-6F58993143C6}" type="datetimeFigureOut">
               <a:rPr lang="en-US" smtClean="0"/>
-              <a:t>11/2/19</a:t>
+              <a:t>8/10/20</a:t>
             </a:fld>
             <a:endParaRPr lang="en-US"/>
           </a:p>
@@ -5303,7 +5303,7 @@
           <a:p>
             <a:fld id="{972605B8-2E90-124E-924E-6F58993143C6}" type="datetimeFigureOut">
               <a:rPr lang="en-US" smtClean="0"/>
-              <a:t>11/2/19</a:t>
+              <a:t>8/10/20</a:t>
             </a:fld>
             <a:endParaRPr lang="en-US"/>
           </a:p>
@@ -5722,7 +5722,7 @@
           <a:p>
             <a:fld id="{972605B8-2E90-124E-924E-6F58993143C6}" type="datetimeFigureOut">
               <a:rPr lang="en-US" smtClean="0"/>
-              <a:t>11/2/19</a:t>
+              <a:t>8/10/20</a:t>
             </a:fld>
             <a:endParaRPr lang="en-US"/>
           </a:p>
@@ -5839,7 +5839,7 @@
           <a:p>
             <a:fld id="{972605B8-2E90-124E-924E-6F58993143C6}" type="datetimeFigureOut">
               <a:rPr lang="en-US" smtClean="0"/>
-              <a:t>11/2/19</a:t>
+              <a:t>8/10/20</a:t>
             </a:fld>
             <a:endParaRPr lang="en-US"/>
           </a:p>
@@ -5934,7 +5934,7 @@
           <a:p>
             <a:fld id="{972605B8-2E90-124E-924E-6F58993143C6}" type="datetimeFigureOut">
               <a:rPr lang="en-US" smtClean="0"/>
-              <a:t>11/2/19</a:t>
+              <a:t>8/10/20</a:t>
             </a:fld>
             <a:endParaRPr lang="en-US"/>
           </a:p>
@@ -6209,7 +6209,7 @@
           <a:p>
             <a:fld id="{972605B8-2E90-124E-924E-6F58993143C6}" type="datetimeFigureOut">
               <a:rPr lang="en-US" smtClean="0"/>
-              <a:t>11/2/19</a:t>
+              <a:t>8/10/20</a:t>
             </a:fld>
             <a:endParaRPr lang="en-US"/>
           </a:p>
@@ -6461,7 +6461,7 @@
           <a:p>
             <a:fld id="{972605B8-2E90-124E-924E-6F58993143C6}" type="datetimeFigureOut">
               <a:rPr lang="en-US" smtClean="0"/>
-              <a:t>11/2/19</a:t>
+              <a:t>8/10/20</a:t>
             </a:fld>
             <a:endParaRPr lang="en-US"/>
           </a:p>
@@ -6672,7 +6672,7 @@
           <a:p>
             <a:fld id="{972605B8-2E90-124E-924E-6F58993143C6}" type="datetimeFigureOut">
               <a:rPr lang="en-US" smtClean="0"/>
-              <a:t>11/2/19</a:t>
+              <a:t>8/10/20</a:t>
             </a:fld>
             <a:endParaRPr lang="en-US"/>
           </a:p>
@@ -7077,8 +7077,8 @@
               <a:rPr lang="en-US" sz="3600" dirty="0"/>
             </a:br>
             <a:r>
-              <a:rPr lang="en-US" sz="3600" dirty="0"/>
-              <a:t>SEIS 665</a:t>
+              <a:rPr lang="en-US" sz="3600"/>
+              <a:t>SEIS 615</a:t>
             </a:r>
             <a:br>
               <a:rPr lang="en-US" sz="3600" dirty="0"/>

</xml_diff>

<commit_message>
add session manager support
</commit_message>
<xml_diff>
--- a/lectures/infrastructure-week-10.pptx
+++ b/lectures/infrastructure-week-10.pptx
@@ -3160,7 +3160,7 @@
           <a:p>
             <a:fld id="{EAA08BAD-04ED-244C-92B6-E3671520D864}" type="datetimeFigureOut">
               <a:rPr lang="en-US" smtClean="0"/>
-              <a:t>11/17/20</a:t>
+              <a:t>9/5/21</a:t>
             </a:fld>
             <a:endParaRPr lang="en-US"/>
           </a:p>
@@ -4259,7 +4259,7 @@
           <a:p>
             <a:fld id="{972605B8-2E90-124E-924E-6F58993143C6}" type="datetimeFigureOut">
               <a:rPr lang="en-US" smtClean="0"/>
-              <a:t>11/17/20</a:t>
+              <a:t>9/5/21</a:t>
             </a:fld>
             <a:endParaRPr lang="en-US"/>
           </a:p>
@@ -4427,7 +4427,7 @@
           <a:p>
             <a:fld id="{972605B8-2E90-124E-924E-6F58993143C6}" type="datetimeFigureOut">
               <a:rPr lang="en-US" smtClean="0"/>
-              <a:t>11/17/20</a:t>
+              <a:t>9/5/21</a:t>
             </a:fld>
             <a:endParaRPr lang="en-US"/>
           </a:p>
@@ -4605,7 +4605,7 @@
           <a:p>
             <a:fld id="{972605B8-2E90-124E-924E-6F58993143C6}" type="datetimeFigureOut">
               <a:rPr lang="en-US" smtClean="0"/>
-              <a:t>11/17/20</a:t>
+              <a:t>9/5/21</a:t>
             </a:fld>
             <a:endParaRPr lang="en-US"/>
           </a:p>
@@ -4773,7 +4773,7 @@
           <a:p>
             <a:fld id="{972605B8-2E90-124E-924E-6F58993143C6}" type="datetimeFigureOut">
               <a:rPr lang="en-US" smtClean="0"/>
-              <a:t>11/17/20</a:t>
+              <a:t>9/5/21</a:t>
             </a:fld>
             <a:endParaRPr lang="en-US"/>
           </a:p>
@@ -5018,7 +5018,7 @@
           <a:p>
             <a:fld id="{972605B8-2E90-124E-924E-6F58993143C6}" type="datetimeFigureOut">
               <a:rPr lang="en-US" smtClean="0"/>
-              <a:t>11/17/20</a:t>
+              <a:t>9/5/21</a:t>
             </a:fld>
             <a:endParaRPr lang="en-US"/>
           </a:p>
@@ -5303,7 +5303,7 @@
           <a:p>
             <a:fld id="{972605B8-2E90-124E-924E-6F58993143C6}" type="datetimeFigureOut">
               <a:rPr lang="en-US" smtClean="0"/>
-              <a:t>11/17/20</a:t>
+              <a:t>9/5/21</a:t>
             </a:fld>
             <a:endParaRPr lang="en-US"/>
           </a:p>
@@ -5722,7 +5722,7 @@
           <a:p>
             <a:fld id="{972605B8-2E90-124E-924E-6F58993143C6}" type="datetimeFigureOut">
               <a:rPr lang="en-US" smtClean="0"/>
-              <a:t>11/17/20</a:t>
+              <a:t>9/5/21</a:t>
             </a:fld>
             <a:endParaRPr lang="en-US"/>
           </a:p>
@@ -5839,7 +5839,7 @@
           <a:p>
             <a:fld id="{972605B8-2E90-124E-924E-6F58993143C6}" type="datetimeFigureOut">
               <a:rPr lang="en-US" smtClean="0"/>
-              <a:t>11/17/20</a:t>
+              <a:t>9/5/21</a:t>
             </a:fld>
             <a:endParaRPr lang="en-US"/>
           </a:p>
@@ -5934,7 +5934,7 @@
           <a:p>
             <a:fld id="{972605B8-2E90-124E-924E-6F58993143C6}" type="datetimeFigureOut">
               <a:rPr lang="en-US" smtClean="0"/>
-              <a:t>11/17/20</a:t>
+              <a:t>9/5/21</a:t>
             </a:fld>
             <a:endParaRPr lang="en-US"/>
           </a:p>
@@ -6209,7 +6209,7 @@
           <a:p>
             <a:fld id="{972605B8-2E90-124E-924E-6F58993143C6}" type="datetimeFigureOut">
               <a:rPr lang="en-US" smtClean="0"/>
-              <a:t>11/17/20</a:t>
+              <a:t>9/5/21</a:t>
             </a:fld>
             <a:endParaRPr lang="en-US"/>
           </a:p>
@@ -6461,7 +6461,7 @@
           <a:p>
             <a:fld id="{972605B8-2E90-124E-924E-6F58993143C6}" type="datetimeFigureOut">
               <a:rPr lang="en-US" smtClean="0"/>
-              <a:t>11/17/20</a:t>
+              <a:t>9/5/21</a:t>
             </a:fld>
             <a:endParaRPr lang="en-US"/>
           </a:p>
@@ -6672,7 +6672,7 @@
           <a:p>
             <a:fld id="{972605B8-2E90-124E-924E-6F58993143C6}" type="datetimeFigureOut">
               <a:rPr lang="en-US" smtClean="0"/>
-              <a:t>11/17/20</a:t>
+              <a:t>9/5/21</a:t>
             </a:fld>
             <a:endParaRPr lang="en-US"/>
           </a:p>
@@ -8770,12 +8770,16 @@
               <a:t>We use a YAML file called </a:t>
             </a:r>
             <a:r>
-              <a:rPr lang="en-US" dirty="0" err="1"/>
+              <a:rPr lang="en-US" b="1" dirty="0" err="1"/>
               <a:t>buildspec.yml</a:t>
             </a:r>
             <a:r>
-              <a:rPr lang="en-US" dirty="0"/>
-              <a:t> located within the root directory of the source code repository to store the build spec.</a:t>
+              <a:rPr lang="en-US" b="1" dirty="0"/>
+              <a:t> </a:t>
+            </a:r>
+            <a:r>
+              <a:rPr lang="en-US" dirty="0"/>
+              <a:t>located within the root directory of the source code repository to store the build spec.</a:t>
             </a:r>
           </a:p>
         </p:txBody>
@@ -10286,7 +10290,7 @@
             </a:r>
             <a:r>
               <a:rPr lang="en-US" dirty="0" err="1"/>
-              <a:t>template.json</a:t>
+              <a:t>template.yaml</a:t>
             </a:r>
             <a:endParaRPr lang="en-US" dirty="0"/>
           </a:p>

</xml_diff>

<commit_message>
update ansible env variables
</commit_message>
<xml_diff>
--- a/lectures/infrastructure-week-10.pptx
+++ b/lectures/infrastructure-week-10.pptx
@@ -3160,7 +3160,7 @@
           <a:p>
             <a:fld id="{EAA08BAD-04ED-244C-92B6-E3671520D864}" type="datetimeFigureOut">
               <a:rPr lang="en-US" smtClean="0"/>
-              <a:t>11/7/21</a:t>
+              <a:t>11/9/21</a:t>
             </a:fld>
             <a:endParaRPr lang="en-US"/>
           </a:p>
@@ -4259,7 +4259,7 @@
           <a:p>
             <a:fld id="{972605B8-2E90-124E-924E-6F58993143C6}" type="datetimeFigureOut">
               <a:rPr lang="en-US" smtClean="0"/>
-              <a:t>11/7/21</a:t>
+              <a:t>11/9/21</a:t>
             </a:fld>
             <a:endParaRPr lang="en-US"/>
           </a:p>
@@ -4427,7 +4427,7 @@
           <a:p>
             <a:fld id="{972605B8-2E90-124E-924E-6F58993143C6}" type="datetimeFigureOut">
               <a:rPr lang="en-US" smtClean="0"/>
-              <a:t>11/7/21</a:t>
+              <a:t>11/9/21</a:t>
             </a:fld>
             <a:endParaRPr lang="en-US"/>
           </a:p>
@@ -4605,7 +4605,7 @@
           <a:p>
             <a:fld id="{972605B8-2E90-124E-924E-6F58993143C6}" type="datetimeFigureOut">
               <a:rPr lang="en-US" smtClean="0"/>
-              <a:t>11/7/21</a:t>
+              <a:t>11/9/21</a:t>
             </a:fld>
             <a:endParaRPr lang="en-US"/>
           </a:p>
@@ -4773,7 +4773,7 @@
           <a:p>
             <a:fld id="{972605B8-2E90-124E-924E-6F58993143C6}" type="datetimeFigureOut">
               <a:rPr lang="en-US" smtClean="0"/>
-              <a:t>11/7/21</a:t>
+              <a:t>11/9/21</a:t>
             </a:fld>
             <a:endParaRPr lang="en-US"/>
           </a:p>
@@ -5018,7 +5018,7 @@
           <a:p>
             <a:fld id="{972605B8-2E90-124E-924E-6F58993143C6}" type="datetimeFigureOut">
               <a:rPr lang="en-US" smtClean="0"/>
-              <a:t>11/7/21</a:t>
+              <a:t>11/9/21</a:t>
             </a:fld>
             <a:endParaRPr lang="en-US"/>
           </a:p>
@@ -5303,7 +5303,7 @@
           <a:p>
             <a:fld id="{972605B8-2E90-124E-924E-6F58993143C6}" type="datetimeFigureOut">
               <a:rPr lang="en-US" smtClean="0"/>
-              <a:t>11/7/21</a:t>
+              <a:t>11/9/21</a:t>
             </a:fld>
             <a:endParaRPr lang="en-US"/>
           </a:p>
@@ -5722,7 +5722,7 @@
           <a:p>
             <a:fld id="{972605B8-2E90-124E-924E-6F58993143C6}" type="datetimeFigureOut">
               <a:rPr lang="en-US" smtClean="0"/>
-              <a:t>11/7/21</a:t>
+              <a:t>11/9/21</a:t>
             </a:fld>
             <a:endParaRPr lang="en-US"/>
           </a:p>
@@ -5839,7 +5839,7 @@
           <a:p>
             <a:fld id="{972605B8-2E90-124E-924E-6F58993143C6}" type="datetimeFigureOut">
               <a:rPr lang="en-US" smtClean="0"/>
-              <a:t>11/7/21</a:t>
+              <a:t>11/9/21</a:t>
             </a:fld>
             <a:endParaRPr lang="en-US"/>
           </a:p>
@@ -5934,7 +5934,7 @@
           <a:p>
             <a:fld id="{972605B8-2E90-124E-924E-6F58993143C6}" type="datetimeFigureOut">
               <a:rPr lang="en-US" smtClean="0"/>
-              <a:t>11/7/21</a:t>
+              <a:t>11/9/21</a:t>
             </a:fld>
             <a:endParaRPr lang="en-US"/>
           </a:p>
@@ -6209,7 +6209,7 @@
           <a:p>
             <a:fld id="{972605B8-2E90-124E-924E-6F58993143C6}" type="datetimeFigureOut">
               <a:rPr lang="en-US" smtClean="0"/>
-              <a:t>11/7/21</a:t>
+              <a:t>11/9/21</a:t>
             </a:fld>
             <a:endParaRPr lang="en-US"/>
           </a:p>
@@ -6461,7 +6461,7 @@
           <a:p>
             <a:fld id="{972605B8-2E90-124E-924E-6F58993143C6}" type="datetimeFigureOut">
               <a:rPr lang="en-US" smtClean="0"/>
-              <a:t>11/7/21</a:t>
+              <a:t>11/9/21</a:t>
             </a:fld>
             <a:endParaRPr lang="en-US"/>
           </a:p>
@@ -6672,7 +6672,7 @@
           <a:p>
             <a:fld id="{972605B8-2E90-124E-924E-6F58993143C6}" type="datetimeFigureOut">
               <a:rPr lang="en-US" smtClean="0"/>
-              <a:t>11/7/21</a:t>
+              <a:t>11/9/21</a:t>
             </a:fld>
             <a:endParaRPr lang="en-US"/>
           </a:p>
@@ -11785,7 +11785,7 @@
         </p:spPr>
         <p:txBody>
           <a:bodyPr>
-            <a:normAutofit fontScale="55000" lnSpcReduction="20000"/>
+            <a:normAutofit fontScale="62500" lnSpcReduction="20000"/>
           </a:bodyPr>
           <a:lstStyle/>
           <a:p>
@@ -11809,7 +11809,7 @@
               <a:rPr lang="en-US" dirty="0">
                 <a:hlinkClick r:id="rId3"/>
               </a:rPr>
-              <a:t>https://seis615.s3.amazonaws.com/app-prod-env-template.yaml</a:t>
+              <a:t>https://seis615.s3.amazonaws.com/app-codedeploy-template.yaml</a:t>
             </a:r>
             <a:endParaRPr lang="en-US" dirty="0"/>
           </a:p>
@@ -11883,35 +11883,6 @@
               <a:rPr lang="en-US" dirty="0"/>
               <a:t>Watch the deployment process and lifecycle events.</a:t>
             </a:r>
-          </a:p>
-          <a:p>
-            <a:endParaRPr lang="en-US" dirty="0"/>
-          </a:p>
-          <a:p>
-            <a:r>
-              <a:rPr lang="en-US" dirty="0"/>
-              <a:t>Of course we can </a:t>
-            </a:r>
-            <a:r>
-              <a:rPr lang="en-US" dirty="0">
-                <a:hlinkClick r:id="rId5"/>
-              </a:rPr>
-              <a:t>always</a:t>
-            </a:r>
-            <a:r>
-              <a:rPr lang="en-US" dirty="0"/>
-              <a:t> build this configuration using code!</a:t>
-            </a:r>
-          </a:p>
-          <a:p>
-            <a:pPr lvl="1"/>
-            <a:r>
-              <a:rPr lang="en-US" dirty="0">
-                <a:hlinkClick r:id="rId6"/>
-              </a:rPr>
-              <a:t>https://seis615.s3.amazonaws.com/app-codedeploy-template.yaml</a:t>
-            </a:r>
-            <a:endParaRPr lang="en-US" dirty="0"/>
           </a:p>
         </p:txBody>
       </p:sp>
@@ -11930,7 +11901,7 @@
           <p:nvPr/>
         </p:nvPicPr>
         <p:blipFill>
-          <a:blip r:embed="rId7"/>
+          <a:blip r:embed="rId5"/>
           <a:stretch>
             <a:fillRect/>
           </a:stretch>
@@ -13105,21 +13076,12 @@
         </p:spPr>
         <p:txBody>
           <a:bodyPr>
-            <a:normAutofit fontScale="70000" lnSpcReduction="20000"/>
+            <a:normAutofit/>
           </a:bodyPr>
           <a:lstStyle/>
           <a:p>
             <a:r>
               <a:rPr lang="en-US" dirty="0"/>
-              <a:t>Create GitHub personal access token</a:t>
-            </a:r>
-          </a:p>
-          <a:p>
-            <a:endParaRPr lang="en-US" dirty="0"/>
-          </a:p>
-          <a:p>
-            <a:r>
-              <a:rPr lang="en-US" dirty="0"/>
               <a:t>Fork python-project repository:</a:t>
             </a:r>
           </a:p>
@@ -13139,46 +13101,20 @@
             </a:r>
           </a:p>
           <a:p>
+            <a:pPr marL="0" indent="0">
+              <a:buNone/>
+            </a:pPr>
             <a:endParaRPr lang="en-US" dirty="0"/>
           </a:p>
           <a:p>
             <a:r>
               <a:rPr lang="en-US" dirty="0"/>
-              <a:t>Review changes to </a:t>
-            </a:r>
-            <a:r>
-              <a:rPr lang="en-US" dirty="0" err="1"/>
-              <a:t>CodeBuild</a:t>
-            </a:r>
-            <a:r>
-              <a:rPr lang="en-US" dirty="0"/>
-              <a:t> template code</a:t>
-            </a:r>
-          </a:p>
-          <a:p>
-            <a:pPr lvl="1"/>
-            <a:r>
-              <a:rPr lang="en-US" dirty="0"/>
-              <a:t>Source and Artifacts are managed by </a:t>
+              <a:t>Deploy </a:t>
             </a:r>
             <a:r>
               <a:rPr lang="en-US" dirty="0" err="1"/>
               <a:t>CodePipeline</a:t>
             </a:r>
-            <a:endParaRPr lang="en-US" dirty="0"/>
-          </a:p>
-          <a:p>
-            <a:endParaRPr lang="en-US" dirty="0"/>
-          </a:p>
-          <a:p>
-            <a:r>
-              <a:rPr lang="en-US" dirty="0"/>
-              <a:t>Deploy </a:t>
-            </a:r>
-            <a:r>
-              <a:rPr lang="en-US" dirty="0" err="1"/>
-              <a:t>CodePipeline</a:t>
-            </a:r>
             <a:r>
               <a:rPr lang="en-US" dirty="0"/>
               <a:t> template</a:t>
@@ -13187,26 +13123,22 @@
           <a:p>
             <a:pPr lvl="1"/>
             <a:r>
-              <a:rPr lang="en-US" dirty="0"/>
+              <a:rPr lang="en-US" sz="2000" dirty="0"/>
               <a:t>https://seis615.s3.amazonaws.com/app-</a:t>
             </a:r>
             <a:r>
-              <a:rPr lang="en-US" dirty="0" err="1"/>
+              <a:rPr lang="en-US" sz="2000" dirty="0" err="1"/>
               <a:t>codepipeline</a:t>
             </a:r>
             <a:r>
-              <a:rPr lang="en-US" dirty="0"/>
+              <a:rPr lang="en-US" sz="2000" dirty="0"/>
               <a:t>-</a:t>
             </a:r>
             <a:r>
-              <a:rPr lang="en-US" err="1"/>
-              <a:t>template</a:t>
-            </a:r>
-            <a:r>
-              <a:rPr lang="en-US"/>
-              <a:t>.yaml</a:t>
-            </a:r>
-            <a:endParaRPr lang="en-US" dirty="0"/>
+              <a:rPr lang="en-US" sz="2000" dirty="0" err="1"/>
+              <a:t>template.yaml</a:t>
+            </a:r>
+            <a:endParaRPr lang="en-US" sz="2000" dirty="0"/>
           </a:p>
           <a:p>
             <a:endParaRPr lang="en-US" dirty="0"/>

</xml_diff>